<commit_message>
Changes the goal of the product of my script
</commit_message>
<xml_diff>
--- a/Task Catalyst Introduction.pptx
+++ b/Task Catalyst Introduction.pptx
@@ -28,6 +28,12 @@
     <p:sldId id="276" r:id="rId22"/>
     <p:sldId id="277" r:id="rId23"/>
     <p:sldId id="278" r:id="rId24"/>
+    <p:sldId id="280" r:id="rId25"/>
+    <p:sldId id="281" r:id="rId26"/>
+    <p:sldId id="282" r:id="rId27"/>
+    <p:sldId id="283" r:id="rId28"/>
+    <p:sldId id="284" r:id="rId29"/>
+    <p:sldId id="285" r:id="rId30"/>
   </p:sldIdLst>
   <p:sldSz cx="9144000" cy="6858000" type="screen4x3"/>
   <p:notesSz cx="6858000" cy="9144000"/>
@@ -126,6 +132,11 @@
       </a:defRPr>
     </a:lvl9pPr>
   </p:defaultTextStyle>
+  <p:extLst>
+    <p:ext uri="{EFAFB233-063F-42B5-8137-9DF3F51BA10A}">
+      <p15:sldGuideLst xmlns:p15="http://schemas.microsoft.com/office/powerpoint/2012/main"/>
+    </p:ext>
+  </p:extLst>
 </p:presentation>
 </file>
 
@@ -260,7 +271,7 @@
           <a:p>
             <a:fld id="{4B7C30BC-8773-4969-A17E-EC79D4EB08B4}" type="datetimeFigureOut">
               <a:rPr lang="en-US" smtClean="0"/>
-              <a:t>08/30/14</a:t>
+              <a:t>8/31/2014</a:t>
             </a:fld>
             <a:endParaRPr lang="en-US"/>
           </a:p>
@@ -430,7 +441,7 @@
           <a:p>
             <a:fld id="{4B7C30BC-8773-4969-A17E-EC79D4EB08B4}" type="datetimeFigureOut">
               <a:rPr lang="en-US" smtClean="0"/>
-              <a:t>08/30/14</a:t>
+              <a:t>8/31/2014</a:t>
             </a:fld>
             <a:endParaRPr lang="en-US"/>
           </a:p>
@@ -610,7 +621,7 @@
           <a:p>
             <a:fld id="{4B7C30BC-8773-4969-A17E-EC79D4EB08B4}" type="datetimeFigureOut">
               <a:rPr lang="en-US" smtClean="0"/>
-              <a:t>08/30/14</a:t>
+              <a:t>8/31/2014</a:t>
             </a:fld>
             <a:endParaRPr lang="en-US"/>
           </a:p>
@@ -780,7 +791,7 @@
           <a:p>
             <a:fld id="{4B7C30BC-8773-4969-A17E-EC79D4EB08B4}" type="datetimeFigureOut">
               <a:rPr lang="en-US" smtClean="0"/>
-              <a:t>08/30/14</a:t>
+              <a:t>8/31/2014</a:t>
             </a:fld>
             <a:endParaRPr lang="en-US"/>
           </a:p>
@@ -1024,7 +1035,7 @@
           <a:p>
             <a:fld id="{4B7C30BC-8773-4969-A17E-EC79D4EB08B4}" type="datetimeFigureOut">
               <a:rPr lang="en-US" smtClean="0"/>
-              <a:t>08/30/14</a:t>
+              <a:t>8/31/2014</a:t>
             </a:fld>
             <a:endParaRPr lang="en-US"/>
           </a:p>
@@ -1256,7 +1267,7 @@
           <a:p>
             <a:fld id="{4B7C30BC-8773-4969-A17E-EC79D4EB08B4}" type="datetimeFigureOut">
               <a:rPr lang="en-US" smtClean="0"/>
-              <a:t>08/30/14</a:t>
+              <a:t>8/31/2014</a:t>
             </a:fld>
             <a:endParaRPr lang="en-US"/>
           </a:p>
@@ -1623,7 +1634,7 @@
           <a:p>
             <a:fld id="{4B7C30BC-8773-4969-A17E-EC79D4EB08B4}" type="datetimeFigureOut">
               <a:rPr lang="en-US" smtClean="0"/>
-              <a:t>08/30/14</a:t>
+              <a:t>8/31/2014</a:t>
             </a:fld>
             <a:endParaRPr lang="en-US"/>
           </a:p>
@@ -1741,7 +1752,7 @@
           <a:p>
             <a:fld id="{4B7C30BC-8773-4969-A17E-EC79D4EB08B4}" type="datetimeFigureOut">
               <a:rPr lang="en-US" smtClean="0"/>
-              <a:t>08/30/14</a:t>
+              <a:t>8/31/2014</a:t>
             </a:fld>
             <a:endParaRPr lang="en-US"/>
           </a:p>
@@ -1836,7 +1847,7 @@
           <a:p>
             <a:fld id="{4B7C30BC-8773-4969-A17E-EC79D4EB08B4}" type="datetimeFigureOut">
               <a:rPr lang="en-US" smtClean="0"/>
-              <a:t>08/30/14</a:t>
+              <a:t>8/31/2014</a:t>
             </a:fld>
             <a:endParaRPr lang="en-US"/>
           </a:p>
@@ -2113,7 +2124,7 @@
           <a:p>
             <a:fld id="{4B7C30BC-8773-4969-A17E-EC79D4EB08B4}" type="datetimeFigureOut">
               <a:rPr lang="en-US" smtClean="0"/>
-              <a:t>08/30/14</a:t>
+              <a:t>8/31/2014</a:t>
             </a:fld>
             <a:endParaRPr lang="en-US"/>
           </a:p>
@@ -2370,7 +2381,7 @@
           <a:p>
             <a:fld id="{4B7C30BC-8773-4969-A17E-EC79D4EB08B4}" type="datetimeFigureOut">
               <a:rPr lang="en-US" smtClean="0"/>
-              <a:t>08/30/14</a:t>
+              <a:t>8/31/2014</a:t>
             </a:fld>
             <a:endParaRPr lang="en-US"/>
           </a:p>
@@ -2583,7 +2594,7 @@
           <a:p>
             <a:fld id="{4B7C30BC-8773-4969-A17E-EC79D4EB08B4}" type="datetimeFigureOut">
               <a:rPr lang="en-US" smtClean="0"/>
-              <a:t>08/30/14</a:t>
+              <a:t>8/31/2014</a:t>
             </a:fld>
             <a:endParaRPr lang="en-US"/>
           </a:p>
@@ -8979,6 +8990,4341 @@
 </p:sld>
 </file>
 
+<file path=ppt/slides/slide24.xml><?xml version="1.0" encoding="utf-8"?>
+<p:sld xmlns:a="http://schemas.openxmlformats.org/drawingml/2006/main" xmlns:r="http://schemas.openxmlformats.org/officeDocument/2006/relationships" xmlns:p="http://schemas.openxmlformats.org/presentationml/2006/main">
+  <p:cSld>
+    <p:spTree>
+      <p:nvGrpSpPr>
+        <p:cNvPr id="1" name=""/>
+        <p:cNvGrpSpPr/>
+        <p:nvPr/>
+      </p:nvGrpSpPr>
+      <p:grpSpPr>
+        <a:xfrm>
+          <a:off x="0" y="0"/>
+          <a:ext cx="0" cy="0"/>
+          <a:chOff x="0" y="0"/>
+          <a:chExt cx="0" cy="0"/>
+        </a:xfrm>
+      </p:grpSpPr>
+      <p:sp>
+        <p:nvSpPr>
+          <p:cNvPr id="2" name="Title 1"/>
+          <p:cNvSpPr>
+            <a:spLocks noGrp="1"/>
+          </p:cNvSpPr>
+          <p:nvPr>
+            <p:ph type="title"/>
+          </p:nvPr>
+        </p:nvSpPr>
+        <p:spPr/>
+        <p:txBody>
+          <a:bodyPr/>
+          <a:lstStyle/>
+          <a:p>
+            <a:pPr algn="ctr"/>
+            <a:r>
+              <a:rPr lang="en-US" dirty="0" smtClean="0"/>
+              <a:t>Task Catalyst</a:t>
+            </a:r>
+            <a:endParaRPr lang="en-MY" dirty="0"/>
+          </a:p>
+        </p:txBody>
+      </p:sp>
+      <p:pic>
+        <p:nvPicPr>
+          <p:cNvPr id="4" name="Content Placeholder 3"/>
+          <p:cNvPicPr>
+            <a:picLocks noGrp="1" noChangeAspect="1"/>
+          </p:cNvPicPr>
+          <p:nvPr>
+            <p:ph idx="1"/>
+          </p:nvPr>
+        </p:nvPicPr>
+        <p:blipFill>
+          <a:blip r:embed="rId2">
+            <a:extLst>
+              <a:ext uri="{28A0092B-C50C-407E-A947-70E740481C1C}">
+                <a14:useLocalDpi xmlns:a14="http://schemas.microsoft.com/office/drawing/2010/main" val="0"/>
+              </a:ext>
+            </a:extLst>
+          </a:blip>
+          <a:stretch>
+            <a:fillRect/>
+          </a:stretch>
+        </p:blipFill>
+        <p:spPr>
+          <a:xfrm>
+            <a:off x="628650" y="2883694"/>
+            <a:ext cx="2743200" cy="1828800"/>
+          </a:xfrm>
+        </p:spPr>
+      </p:pic>
+      <p:pic>
+        <p:nvPicPr>
+          <p:cNvPr id="5" name="Picture 4"/>
+          <p:cNvPicPr>
+            <a:picLocks noChangeAspect="1"/>
+          </p:cNvPicPr>
+          <p:nvPr/>
+        </p:nvPicPr>
+        <p:blipFill>
+          <a:blip r:embed="rId3">
+            <a:extLst>
+              <a:ext uri="{28A0092B-C50C-407E-A947-70E740481C1C}">
+                <a14:useLocalDpi xmlns:a14="http://schemas.microsoft.com/office/drawing/2010/main" val="0"/>
+              </a:ext>
+            </a:extLst>
+          </a:blip>
+          <a:stretch>
+            <a:fillRect/>
+          </a:stretch>
+        </p:blipFill>
+        <p:spPr>
+          <a:xfrm>
+            <a:off x="4574001" y="2693194"/>
+            <a:ext cx="3941349" cy="2215356"/>
+          </a:xfrm>
+          <a:prstGeom prst="rect">
+            <a:avLst/>
+          </a:prstGeom>
+        </p:spPr>
+      </p:pic>
+      <p:cxnSp>
+        <p:nvCxnSpPr>
+          <p:cNvPr id="7" name="Straight Arrow Connector 6"/>
+          <p:cNvCxnSpPr>
+            <a:stCxn id="2" idx="2"/>
+            <a:endCxn id="4" idx="0"/>
+          </p:cNvCxnSpPr>
+          <p:nvPr/>
+        </p:nvCxnSpPr>
+        <p:spPr>
+          <a:xfrm flipH="1">
+            <a:off x="2000250" y="1690689"/>
+            <a:ext cx="2571750" cy="1193005"/>
+          </a:xfrm>
+          <a:prstGeom prst="straightConnector1">
+            <a:avLst/>
+          </a:prstGeom>
+          <a:ln>
+            <a:tailEnd type="triangle"/>
+          </a:ln>
+        </p:spPr>
+        <p:style>
+          <a:lnRef idx="1">
+            <a:schemeClr val="dk1"/>
+          </a:lnRef>
+          <a:fillRef idx="0">
+            <a:schemeClr val="dk1"/>
+          </a:fillRef>
+          <a:effectRef idx="0">
+            <a:schemeClr val="dk1"/>
+          </a:effectRef>
+          <a:fontRef idx="minor">
+            <a:schemeClr val="tx1"/>
+          </a:fontRef>
+        </p:style>
+      </p:cxnSp>
+      <p:cxnSp>
+        <p:nvCxnSpPr>
+          <p:cNvPr id="9" name="Straight Arrow Connector 8"/>
+          <p:cNvCxnSpPr/>
+          <p:nvPr/>
+        </p:nvCxnSpPr>
+        <p:spPr>
+          <a:xfrm>
+            <a:off x="4572000" y="1690688"/>
+            <a:ext cx="2086708" cy="1247897"/>
+          </a:xfrm>
+          <a:prstGeom prst="straightConnector1">
+            <a:avLst/>
+          </a:prstGeom>
+          <a:ln>
+            <a:tailEnd type="triangle"/>
+          </a:ln>
+        </p:spPr>
+        <p:style>
+          <a:lnRef idx="1">
+            <a:schemeClr val="dk1"/>
+          </a:lnRef>
+          <a:fillRef idx="0">
+            <a:schemeClr val="dk1"/>
+          </a:fillRef>
+          <a:effectRef idx="0">
+            <a:schemeClr val="dk1"/>
+          </a:effectRef>
+          <a:fontRef idx="minor">
+            <a:schemeClr val="tx1"/>
+          </a:fontRef>
+        </p:style>
+      </p:cxnSp>
+    </p:spTree>
+    <p:extLst>
+      <p:ext uri="{BB962C8B-B14F-4D97-AF65-F5344CB8AC3E}">
+        <p14:creationId xmlns:p14="http://schemas.microsoft.com/office/powerpoint/2010/main" val="562229004"/>
+      </p:ext>
+    </p:extLst>
+  </p:cSld>
+  <p:clrMapOvr>
+    <a:masterClrMapping/>
+  </p:clrMapOvr>
+  <p:timing>
+    <p:tnLst>
+      <p:par>
+        <p:cTn id="1" dur="indefinite" restart="never" nodeType="tmRoot">
+          <p:childTnLst>
+            <p:seq concurrent="1" nextAc="seek">
+              <p:cTn id="2" dur="indefinite" nodeType="mainSeq">
+                <p:childTnLst>
+                  <p:par>
+                    <p:cTn id="3" fill="hold">
+                      <p:stCondLst>
+                        <p:cond delay="indefinite"/>
+                      </p:stCondLst>
+                      <p:childTnLst>
+                        <p:par>
+                          <p:cTn id="4" fill="hold">
+                            <p:stCondLst>
+                              <p:cond delay="0"/>
+                            </p:stCondLst>
+                            <p:childTnLst>
+                              <p:par>
+                                <p:cTn id="5" presetID="2" presetClass="entr" presetSubtype="4" fill="hold" nodeType="clickEffect">
+                                  <p:stCondLst>
+                                    <p:cond delay="0"/>
+                                  </p:stCondLst>
+                                  <p:childTnLst>
+                                    <p:set>
+                                      <p:cBhvr>
+                                        <p:cTn id="6" dur="1" fill="hold">
+                                          <p:stCondLst>
+                                            <p:cond delay="0"/>
+                                          </p:stCondLst>
+                                        </p:cTn>
+                                        <p:tgtEl>
+                                          <p:spTgt spid="4"/>
+                                        </p:tgtEl>
+                                        <p:attrNameLst>
+                                          <p:attrName>style.visibility</p:attrName>
+                                        </p:attrNameLst>
+                                      </p:cBhvr>
+                                      <p:to>
+                                        <p:strVal val="visible"/>
+                                      </p:to>
+                                    </p:set>
+                                    <p:anim calcmode="lin" valueType="num">
+                                      <p:cBhvr additive="base">
+                                        <p:cTn id="7" dur="500" fill="hold"/>
+                                        <p:tgtEl>
+                                          <p:spTgt spid="4"/>
+                                        </p:tgtEl>
+                                        <p:attrNameLst>
+                                          <p:attrName>ppt_x</p:attrName>
+                                        </p:attrNameLst>
+                                      </p:cBhvr>
+                                      <p:tavLst>
+                                        <p:tav tm="0">
+                                          <p:val>
+                                            <p:strVal val="#ppt_x"/>
+                                          </p:val>
+                                        </p:tav>
+                                        <p:tav tm="100000">
+                                          <p:val>
+                                            <p:strVal val="#ppt_x"/>
+                                          </p:val>
+                                        </p:tav>
+                                      </p:tavLst>
+                                    </p:anim>
+                                    <p:anim calcmode="lin" valueType="num">
+                                      <p:cBhvr additive="base">
+                                        <p:cTn id="8" dur="500" fill="hold"/>
+                                        <p:tgtEl>
+                                          <p:spTgt spid="4"/>
+                                        </p:tgtEl>
+                                        <p:attrNameLst>
+                                          <p:attrName>ppt_y</p:attrName>
+                                        </p:attrNameLst>
+                                      </p:cBhvr>
+                                      <p:tavLst>
+                                        <p:tav tm="0">
+                                          <p:val>
+                                            <p:strVal val="1+#ppt_h/2"/>
+                                          </p:val>
+                                        </p:tav>
+                                        <p:tav tm="100000">
+                                          <p:val>
+                                            <p:strVal val="#ppt_y"/>
+                                          </p:val>
+                                        </p:tav>
+                                      </p:tavLst>
+                                    </p:anim>
+                                  </p:childTnLst>
+                                </p:cTn>
+                              </p:par>
+                              <p:par>
+                                <p:cTn id="9" presetID="2" presetClass="entr" presetSubtype="4" fill="hold" nodeType="withEffect">
+                                  <p:stCondLst>
+                                    <p:cond delay="0"/>
+                                  </p:stCondLst>
+                                  <p:childTnLst>
+                                    <p:set>
+                                      <p:cBhvr>
+                                        <p:cTn id="10" dur="1" fill="hold">
+                                          <p:stCondLst>
+                                            <p:cond delay="0"/>
+                                          </p:stCondLst>
+                                        </p:cTn>
+                                        <p:tgtEl>
+                                          <p:spTgt spid="7"/>
+                                        </p:tgtEl>
+                                        <p:attrNameLst>
+                                          <p:attrName>style.visibility</p:attrName>
+                                        </p:attrNameLst>
+                                      </p:cBhvr>
+                                      <p:to>
+                                        <p:strVal val="visible"/>
+                                      </p:to>
+                                    </p:set>
+                                    <p:anim calcmode="lin" valueType="num">
+                                      <p:cBhvr additive="base">
+                                        <p:cTn id="11" dur="500" fill="hold"/>
+                                        <p:tgtEl>
+                                          <p:spTgt spid="7"/>
+                                        </p:tgtEl>
+                                        <p:attrNameLst>
+                                          <p:attrName>ppt_x</p:attrName>
+                                        </p:attrNameLst>
+                                      </p:cBhvr>
+                                      <p:tavLst>
+                                        <p:tav tm="0">
+                                          <p:val>
+                                            <p:strVal val="#ppt_x"/>
+                                          </p:val>
+                                        </p:tav>
+                                        <p:tav tm="100000">
+                                          <p:val>
+                                            <p:strVal val="#ppt_x"/>
+                                          </p:val>
+                                        </p:tav>
+                                      </p:tavLst>
+                                    </p:anim>
+                                    <p:anim calcmode="lin" valueType="num">
+                                      <p:cBhvr additive="base">
+                                        <p:cTn id="12" dur="500" fill="hold"/>
+                                        <p:tgtEl>
+                                          <p:spTgt spid="7"/>
+                                        </p:tgtEl>
+                                        <p:attrNameLst>
+                                          <p:attrName>ppt_y</p:attrName>
+                                        </p:attrNameLst>
+                                      </p:cBhvr>
+                                      <p:tavLst>
+                                        <p:tav tm="0">
+                                          <p:val>
+                                            <p:strVal val="1+#ppt_h/2"/>
+                                          </p:val>
+                                        </p:tav>
+                                        <p:tav tm="100000">
+                                          <p:val>
+                                            <p:strVal val="#ppt_y"/>
+                                          </p:val>
+                                        </p:tav>
+                                      </p:tavLst>
+                                    </p:anim>
+                                  </p:childTnLst>
+                                </p:cTn>
+                              </p:par>
+                            </p:childTnLst>
+                          </p:cTn>
+                        </p:par>
+                      </p:childTnLst>
+                    </p:cTn>
+                  </p:par>
+                  <p:par>
+                    <p:cTn id="13" fill="hold">
+                      <p:stCondLst>
+                        <p:cond delay="indefinite"/>
+                      </p:stCondLst>
+                      <p:childTnLst>
+                        <p:par>
+                          <p:cTn id="14" fill="hold">
+                            <p:stCondLst>
+                              <p:cond delay="0"/>
+                            </p:stCondLst>
+                            <p:childTnLst>
+                              <p:par>
+                                <p:cTn id="15" presetID="2" presetClass="entr" presetSubtype="4" fill="hold" nodeType="clickEffect">
+                                  <p:stCondLst>
+                                    <p:cond delay="0"/>
+                                  </p:stCondLst>
+                                  <p:childTnLst>
+                                    <p:set>
+                                      <p:cBhvr>
+                                        <p:cTn id="16" dur="1" fill="hold">
+                                          <p:stCondLst>
+                                            <p:cond delay="0"/>
+                                          </p:stCondLst>
+                                        </p:cTn>
+                                        <p:tgtEl>
+                                          <p:spTgt spid="5"/>
+                                        </p:tgtEl>
+                                        <p:attrNameLst>
+                                          <p:attrName>style.visibility</p:attrName>
+                                        </p:attrNameLst>
+                                      </p:cBhvr>
+                                      <p:to>
+                                        <p:strVal val="visible"/>
+                                      </p:to>
+                                    </p:set>
+                                    <p:anim calcmode="lin" valueType="num">
+                                      <p:cBhvr additive="base">
+                                        <p:cTn id="17" dur="500" fill="hold"/>
+                                        <p:tgtEl>
+                                          <p:spTgt spid="5"/>
+                                        </p:tgtEl>
+                                        <p:attrNameLst>
+                                          <p:attrName>ppt_x</p:attrName>
+                                        </p:attrNameLst>
+                                      </p:cBhvr>
+                                      <p:tavLst>
+                                        <p:tav tm="0">
+                                          <p:val>
+                                            <p:strVal val="#ppt_x"/>
+                                          </p:val>
+                                        </p:tav>
+                                        <p:tav tm="100000">
+                                          <p:val>
+                                            <p:strVal val="#ppt_x"/>
+                                          </p:val>
+                                        </p:tav>
+                                      </p:tavLst>
+                                    </p:anim>
+                                    <p:anim calcmode="lin" valueType="num">
+                                      <p:cBhvr additive="base">
+                                        <p:cTn id="18" dur="500" fill="hold"/>
+                                        <p:tgtEl>
+                                          <p:spTgt spid="5"/>
+                                        </p:tgtEl>
+                                        <p:attrNameLst>
+                                          <p:attrName>ppt_y</p:attrName>
+                                        </p:attrNameLst>
+                                      </p:cBhvr>
+                                      <p:tavLst>
+                                        <p:tav tm="0">
+                                          <p:val>
+                                            <p:strVal val="1+#ppt_h/2"/>
+                                          </p:val>
+                                        </p:tav>
+                                        <p:tav tm="100000">
+                                          <p:val>
+                                            <p:strVal val="#ppt_y"/>
+                                          </p:val>
+                                        </p:tav>
+                                      </p:tavLst>
+                                    </p:anim>
+                                  </p:childTnLst>
+                                </p:cTn>
+                              </p:par>
+                              <p:par>
+                                <p:cTn id="19" presetID="2" presetClass="entr" presetSubtype="4" fill="hold" nodeType="withEffect">
+                                  <p:stCondLst>
+                                    <p:cond delay="0"/>
+                                  </p:stCondLst>
+                                  <p:childTnLst>
+                                    <p:set>
+                                      <p:cBhvr>
+                                        <p:cTn id="20" dur="1" fill="hold">
+                                          <p:stCondLst>
+                                            <p:cond delay="0"/>
+                                          </p:stCondLst>
+                                        </p:cTn>
+                                        <p:tgtEl>
+                                          <p:spTgt spid="9"/>
+                                        </p:tgtEl>
+                                        <p:attrNameLst>
+                                          <p:attrName>style.visibility</p:attrName>
+                                        </p:attrNameLst>
+                                      </p:cBhvr>
+                                      <p:to>
+                                        <p:strVal val="visible"/>
+                                      </p:to>
+                                    </p:set>
+                                    <p:anim calcmode="lin" valueType="num">
+                                      <p:cBhvr additive="base">
+                                        <p:cTn id="21" dur="500" fill="hold"/>
+                                        <p:tgtEl>
+                                          <p:spTgt spid="9"/>
+                                        </p:tgtEl>
+                                        <p:attrNameLst>
+                                          <p:attrName>ppt_x</p:attrName>
+                                        </p:attrNameLst>
+                                      </p:cBhvr>
+                                      <p:tavLst>
+                                        <p:tav tm="0">
+                                          <p:val>
+                                            <p:strVal val="#ppt_x"/>
+                                          </p:val>
+                                        </p:tav>
+                                        <p:tav tm="100000">
+                                          <p:val>
+                                            <p:strVal val="#ppt_x"/>
+                                          </p:val>
+                                        </p:tav>
+                                      </p:tavLst>
+                                    </p:anim>
+                                    <p:anim calcmode="lin" valueType="num">
+                                      <p:cBhvr additive="base">
+                                        <p:cTn id="22" dur="500" fill="hold"/>
+                                        <p:tgtEl>
+                                          <p:spTgt spid="9"/>
+                                        </p:tgtEl>
+                                        <p:attrNameLst>
+                                          <p:attrName>ppt_y</p:attrName>
+                                        </p:attrNameLst>
+                                      </p:cBhvr>
+                                      <p:tavLst>
+                                        <p:tav tm="0">
+                                          <p:val>
+                                            <p:strVal val="1+#ppt_h/2"/>
+                                          </p:val>
+                                        </p:tav>
+                                        <p:tav tm="100000">
+                                          <p:val>
+                                            <p:strVal val="#ppt_y"/>
+                                          </p:val>
+                                        </p:tav>
+                                      </p:tavLst>
+                                    </p:anim>
+                                  </p:childTnLst>
+                                </p:cTn>
+                              </p:par>
+                            </p:childTnLst>
+                          </p:cTn>
+                        </p:par>
+                      </p:childTnLst>
+                    </p:cTn>
+                  </p:par>
+                </p:childTnLst>
+              </p:cTn>
+              <p:prevCondLst>
+                <p:cond evt="onPrev" delay="0">
+                  <p:tgtEl>
+                    <p:sldTgt/>
+                  </p:tgtEl>
+                </p:cond>
+              </p:prevCondLst>
+              <p:nextCondLst>
+                <p:cond evt="onNext" delay="0">
+                  <p:tgtEl>
+                    <p:sldTgt/>
+                  </p:tgtEl>
+                </p:cond>
+              </p:nextCondLst>
+            </p:seq>
+          </p:childTnLst>
+        </p:cTn>
+      </p:par>
+    </p:tnLst>
+  </p:timing>
+</p:sld>
+</file>
+
+<file path=ppt/slides/slide25.xml><?xml version="1.0" encoding="utf-8"?>
+<p:sld xmlns:a="http://schemas.openxmlformats.org/drawingml/2006/main" xmlns:r="http://schemas.openxmlformats.org/officeDocument/2006/relationships" xmlns:p="http://schemas.openxmlformats.org/presentationml/2006/main">
+  <p:cSld>
+    <p:spTree>
+      <p:nvGrpSpPr>
+        <p:cNvPr id="1" name=""/>
+        <p:cNvGrpSpPr/>
+        <p:nvPr/>
+      </p:nvGrpSpPr>
+      <p:grpSpPr>
+        <a:xfrm>
+          <a:off x="0" y="0"/>
+          <a:ext cx="0" cy="0"/>
+          <a:chOff x="0" y="0"/>
+          <a:chExt cx="0" cy="0"/>
+        </a:xfrm>
+      </p:grpSpPr>
+      <p:sp>
+        <p:nvSpPr>
+          <p:cNvPr id="2" name="Title 1"/>
+          <p:cNvSpPr>
+            <a:spLocks noGrp="1"/>
+          </p:cNvSpPr>
+          <p:nvPr>
+            <p:ph type="title"/>
+          </p:nvPr>
+        </p:nvSpPr>
+        <p:spPr/>
+        <p:txBody>
+          <a:bodyPr/>
+          <a:lstStyle/>
+          <a:p>
+            <a:pPr algn="ctr"/>
+            <a:r>
+              <a:rPr lang="en-US" dirty="0" smtClean="0"/>
+              <a:t>Vision</a:t>
+            </a:r>
+            <a:endParaRPr lang="en-MY" dirty="0"/>
+          </a:p>
+        </p:txBody>
+      </p:sp>
+      <p:pic>
+        <p:nvPicPr>
+          <p:cNvPr id="4" name="Content Placeholder 3"/>
+          <p:cNvPicPr>
+            <a:picLocks noGrp="1" noChangeAspect="1"/>
+          </p:cNvPicPr>
+          <p:nvPr>
+            <p:ph idx="1"/>
+          </p:nvPr>
+        </p:nvPicPr>
+        <p:blipFill>
+          <a:blip r:embed="rId2">
+            <a:extLst>
+              <a:ext uri="{28A0092B-C50C-407E-A947-70E740481C1C}">
+                <a14:useLocalDpi xmlns:a14="http://schemas.microsoft.com/office/drawing/2010/main" val="0"/>
+              </a:ext>
+            </a:extLst>
+          </a:blip>
+          <a:stretch>
+            <a:fillRect/>
+          </a:stretch>
+        </p:blipFill>
+        <p:spPr>
+          <a:xfrm>
+            <a:off x="628650" y="2728838"/>
+            <a:ext cx="3638550" cy="1924078"/>
+          </a:xfrm>
+        </p:spPr>
+      </p:pic>
+      <p:pic>
+        <p:nvPicPr>
+          <p:cNvPr id="5" name="Picture 4"/>
+          <p:cNvPicPr>
+            <a:picLocks noChangeAspect="1"/>
+          </p:cNvPicPr>
+          <p:nvPr/>
+        </p:nvPicPr>
+        <p:blipFill>
+          <a:blip r:embed="rId3" cstate="print">
+            <a:extLst>
+              <a:ext uri="{28A0092B-C50C-407E-A947-70E740481C1C}">
+                <a14:useLocalDpi xmlns:a14="http://schemas.microsoft.com/office/drawing/2010/main" val="0"/>
+              </a:ext>
+            </a:extLst>
+          </a:blip>
+          <a:stretch>
+            <a:fillRect/>
+          </a:stretch>
+        </p:blipFill>
+        <p:spPr>
+          <a:xfrm>
+            <a:off x="5272405" y="3255085"/>
+            <a:ext cx="1819398" cy="2440062"/>
+          </a:xfrm>
+          <a:prstGeom prst="rect">
+            <a:avLst/>
+          </a:prstGeom>
+        </p:spPr>
+      </p:pic>
+      <p:pic>
+        <p:nvPicPr>
+          <p:cNvPr id="7" name="Picture 6"/>
+          <p:cNvPicPr>
+            <a:picLocks noChangeAspect="1"/>
+          </p:cNvPicPr>
+          <p:nvPr/>
+        </p:nvPicPr>
+        <p:blipFill>
+          <a:blip r:embed="rId4" cstate="print">
+            <a:extLst>
+              <a:ext uri="{28A0092B-C50C-407E-A947-70E740481C1C}">
+                <a14:useLocalDpi xmlns:a14="http://schemas.microsoft.com/office/drawing/2010/main" val="0"/>
+              </a:ext>
+            </a:extLst>
+          </a:blip>
+          <a:stretch>
+            <a:fillRect/>
+          </a:stretch>
+        </p:blipFill>
+        <p:spPr>
+          <a:xfrm>
+            <a:off x="5810250" y="1621687"/>
+            <a:ext cx="2286758" cy="1633398"/>
+          </a:xfrm>
+          <a:prstGeom prst="rect">
+            <a:avLst/>
+          </a:prstGeom>
+        </p:spPr>
+      </p:pic>
+      <p:sp>
+        <p:nvSpPr>
+          <p:cNvPr id="8" name="TextBox 7"/>
+          <p:cNvSpPr txBox="1"/>
+          <p:nvPr/>
+        </p:nvSpPr>
+        <p:spPr>
+          <a:xfrm>
+            <a:off x="6259953" y="1904707"/>
+            <a:ext cx="1663700" cy="646331"/>
+          </a:xfrm>
+          <a:prstGeom prst="rect">
+            <a:avLst/>
+          </a:prstGeom>
+          <a:noFill/>
+        </p:spPr>
+        <p:txBody>
+          <a:bodyPr wrap="square" rtlCol="0">
+            <a:spAutoFit/>
+          </a:bodyPr>
+          <a:lstStyle/>
+          <a:p>
+            <a:r>
+              <a:rPr lang="en-US" dirty="0" smtClean="0"/>
+              <a:t>What am I doing next??</a:t>
+            </a:r>
+            <a:endParaRPr lang="en-MY" dirty="0"/>
+          </a:p>
+        </p:txBody>
+      </p:sp>
+      <p:pic>
+        <p:nvPicPr>
+          <p:cNvPr id="9" name="Picture 8"/>
+          <p:cNvPicPr>
+            <a:picLocks noChangeAspect="1"/>
+          </p:cNvPicPr>
+          <p:nvPr/>
+        </p:nvPicPr>
+        <p:blipFill>
+          <a:blip r:embed="rId5" cstate="print">
+            <a:extLst>
+              <a:ext uri="{28A0092B-C50C-407E-A947-70E740481C1C}">
+                <a14:useLocalDpi xmlns:a14="http://schemas.microsoft.com/office/drawing/2010/main" val="0"/>
+              </a:ext>
+            </a:extLst>
+          </a:blip>
+          <a:stretch>
+            <a:fillRect/>
+          </a:stretch>
+        </p:blipFill>
+        <p:spPr>
+          <a:xfrm>
+            <a:off x="4912435" y="1889419"/>
+            <a:ext cx="3602915" cy="3602915"/>
+          </a:xfrm>
+          <a:prstGeom prst="rect">
+            <a:avLst/>
+          </a:prstGeom>
+        </p:spPr>
+      </p:pic>
+    </p:spTree>
+    <p:extLst>
+      <p:ext uri="{BB962C8B-B14F-4D97-AF65-F5344CB8AC3E}">
+        <p14:creationId xmlns:p14="http://schemas.microsoft.com/office/powerpoint/2010/main" val="1546696151"/>
+      </p:ext>
+    </p:extLst>
+  </p:cSld>
+  <p:clrMapOvr>
+    <a:masterClrMapping/>
+  </p:clrMapOvr>
+  <p:timing>
+    <p:tnLst>
+      <p:par>
+        <p:cTn id="1" dur="indefinite" restart="never" nodeType="tmRoot">
+          <p:childTnLst>
+            <p:seq concurrent="1" nextAc="seek">
+              <p:cTn id="2" dur="indefinite" nodeType="mainSeq">
+                <p:childTnLst>
+                  <p:par>
+                    <p:cTn id="3" fill="hold">
+                      <p:stCondLst>
+                        <p:cond delay="indefinite"/>
+                      </p:stCondLst>
+                      <p:childTnLst>
+                        <p:par>
+                          <p:cTn id="4" fill="hold">
+                            <p:stCondLst>
+                              <p:cond delay="0"/>
+                            </p:stCondLst>
+                            <p:childTnLst>
+                              <p:par>
+                                <p:cTn id="5" presetID="2" presetClass="entr" presetSubtype="4" fill="hold" nodeType="clickEffect">
+                                  <p:stCondLst>
+                                    <p:cond delay="0"/>
+                                  </p:stCondLst>
+                                  <p:childTnLst>
+                                    <p:set>
+                                      <p:cBhvr>
+                                        <p:cTn id="6" dur="1" fill="hold">
+                                          <p:stCondLst>
+                                            <p:cond delay="0"/>
+                                          </p:stCondLst>
+                                        </p:cTn>
+                                        <p:tgtEl>
+                                          <p:spTgt spid="4"/>
+                                        </p:tgtEl>
+                                        <p:attrNameLst>
+                                          <p:attrName>style.visibility</p:attrName>
+                                        </p:attrNameLst>
+                                      </p:cBhvr>
+                                      <p:to>
+                                        <p:strVal val="visible"/>
+                                      </p:to>
+                                    </p:set>
+                                    <p:anim calcmode="lin" valueType="num">
+                                      <p:cBhvr additive="base">
+                                        <p:cTn id="7" dur="500" fill="hold"/>
+                                        <p:tgtEl>
+                                          <p:spTgt spid="4"/>
+                                        </p:tgtEl>
+                                        <p:attrNameLst>
+                                          <p:attrName>ppt_x</p:attrName>
+                                        </p:attrNameLst>
+                                      </p:cBhvr>
+                                      <p:tavLst>
+                                        <p:tav tm="0">
+                                          <p:val>
+                                            <p:strVal val="#ppt_x"/>
+                                          </p:val>
+                                        </p:tav>
+                                        <p:tav tm="100000">
+                                          <p:val>
+                                            <p:strVal val="#ppt_x"/>
+                                          </p:val>
+                                        </p:tav>
+                                      </p:tavLst>
+                                    </p:anim>
+                                    <p:anim calcmode="lin" valueType="num">
+                                      <p:cBhvr additive="base">
+                                        <p:cTn id="8" dur="500" fill="hold"/>
+                                        <p:tgtEl>
+                                          <p:spTgt spid="4"/>
+                                        </p:tgtEl>
+                                        <p:attrNameLst>
+                                          <p:attrName>ppt_y</p:attrName>
+                                        </p:attrNameLst>
+                                      </p:cBhvr>
+                                      <p:tavLst>
+                                        <p:tav tm="0">
+                                          <p:val>
+                                            <p:strVal val="1+#ppt_h/2"/>
+                                          </p:val>
+                                        </p:tav>
+                                        <p:tav tm="100000">
+                                          <p:val>
+                                            <p:strVal val="#ppt_y"/>
+                                          </p:val>
+                                        </p:tav>
+                                      </p:tavLst>
+                                    </p:anim>
+                                  </p:childTnLst>
+                                </p:cTn>
+                              </p:par>
+                            </p:childTnLst>
+                          </p:cTn>
+                        </p:par>
+                      </p:childTnLst>
+                    </p:cTn>
+                  </p:par>
+                  <p:par>
+                    <p:cTn id="9" fill="hold">
+                      <p:stCondLst>
+                        <p:cond delay="indefinite"/>
+                      </p:stCondLst>
+                      <p:childTnLst>
+                        <p:par>
+                          <p:cTn id="10" fill="hold">
+                            <p:stCondLst>
+                              <p:cond delay="0"/>
+                            </p:stCondLst>
+                            <p:childTnLst>
+                              <p:par>
+                                <p:cTn id="11" presetID="2" presetClass="entr" presetSubtype="4" fill="hold" nodeType="clickEffect">
+                                  <p:stCondLst>
+                                    <p:cond delay="0"/>
+                                  </p:stCondLst>
+                                  <p:childTnLst>
+                                    <p:set>
+                                      <p:cBhvr>
+                                        <p:cTn id="12" dur="1" fill="hold">
+                                          <p:stCondLst>
+                                            <p:cond delay="0"/>
+                                          </p:stCondLst>
+                                        </p:cTn>
+                                        <p:tgtEl>
+                                          <p:spTgt spid="5"/>
+                                        </p:tgtEl>
+                                        <p:attrNameLst>
+                                          <p:attrName>style.visibility</p:attrName>
+                                        </p:attrNameLst>
+                                      </p:cBhvr>
+                                      <p:to>
+                                        <p:strVal val="visible"/>
+                                      </p:to>
+                                    </p:set>
+                                    <p:anim calcmode="lin" valueType="num">
+                                      <p:cBhvr additive="base">
+                                        <p:cTn id="13" dur="500" fill="hold"/>
+                                        <p:tgtEl>
+                                          <p:spTgt spid="5"/>
+                                        </p:tgtEl>
+                                        <p:attrNameLst>
+                                          <p:attrName>ppt_x</p:attrName>
+                                        </p:attrNameLst>
+                                      </p:cBhvr>
+                                      <p:tavLst>
+                                        <p:tav tm="0">
+                                          <p:val>
+                                            <p:strVal val="#ppt_x"/>
+                                          </p:val>
+                                        </p:tav>
+                                        <p:tav tm="100000">
+                                          <p:val>
+                                            <p:strVal val="#ppt_x"/>
+                                          </p:val>
+                                        </p:tav>
+                                      </p:tavLst>
+                                    </p:anim>
+                                    <p:anim calcmode="lin" valueType="num">
+                                      <p:cBhvr additive="base">
+                                        <p:cTn id="14" dur="500" fill="hold"/>
+                                        <p:tgtEl>
+                                          <p:spTgt spid="5"/>
+                                        </p:tgtEl>
+                                        <p:attrNameLst>
+                                          <p:attrName>ppt_y</p:attrName>
+                                        </p:attrNameLst>
+                                      </p:cBhvr>
+                                      <p:tavLst>
+                                        <p:tav tm="0">
+                                          <p:val>
+                                            <p:strVal val="1+#ppt_h/2"/>
+                                          </p:val>
+                                        </p:tav>
+                                        <p:tav tm="100000">
+                                          <p:val>
+                                            <p:strVal val="#ppt_y"/>
+                                          </p:val>
+                                        </p:tav>
+                                      </p:tavLst>
+                                    </p:anim>
+                                  </p:childTnLst>
+                                </p:cTn>
+                              </p:par>
+                              <p:par>
+                                <p:cTn id="15" presetID="2" presetClass="entr" presetSubtype="4" fill="hold" grpId="0" nodeType="withEffect">
+                                  <p:stCondLst>
+                                    <p:cond delay="0"/>
+                                  </p:stCondLst>
+                                  <p:childTnLst>
+                                    <p:set>
+                                      <p:cBhvr>
+                                        <p:cTn id="16" dur="1" fill="hold">
+                                          <p:stCondLst>
+                                            <p:cond delay="0"/>
+                                          </p:stCondLst>
+                                        </p:cTn>
+                                        <p:tgtEl>
+                                          <p:spTgt spid="8"/>
+                                        </p:tgtEl>
+                                        <p:attrNameLst>
+                                          <p:attrName>style.visibility</p:attrName>
+                                        </p:attrNameLst>
+                                      </p:cBhvr>
+                                      <p:to>
+                                        <p:strVal val="visible"/>
+                                      </p:to>
+                                    </p:set>
+                                    <p:anim calcmode="lin" valueType="num">
+                                      <p:cBhvr additive="base">
+                                        <p:cTn id="17" dur="500" fill="hold"/>
+                                        <p:tgtEl>
+                                          <p:spTgt spid="8"/>
+                                        </p:tgtEl>
+                                        <p:attrNameLst>
+                                          <p:attrName>ppt_x</p:attrName>
+                                        </p:attrNameLst>
+                                      </p:cBhvr>
+                                      <p:tavLst>
+                                        <p:tav tm="0">
+                                          <p:val>
+                                            <p:strVal val="#ppt_x"/>
+                                          </p:val>
+                                        </p:tav>
+                                        <p:tav tm="100000">
+                                          <p:val>
+                                            <p:strVal val="#ppt_x"/>
+                                          </p:val>
+                                        </p:tav>
+                                      </p:tavLst>
+                                    </p:anim>
+                                    <p:anim calcmode="lin" valueType="num">
+                                      <p:cBhvr additive="base">
+                                        <p:cTn id="18" dur="500" fill="hold"/>
+                                        <p:tgtEl>
+                                          <p:spTgt spid="8"/>
+                                        </p:tgtEl>
+                                        <p:attrNameLst>
+                                          <p:attrName>ppt_y</p:attrName>
+                                        </p:attrNameLst>
+                                      </p:cBhvr>
+                                      <p:tavLst>
+                                        <p:tav tm="0">
+                                          <p:val>
+                                            <p:strVal val="1+#ppt_h/2"/>
+                                          </p:val>
+                                        </p:tav>
+                                        <p:tav tm="100000">
+                                          <p:val>
+                                            <p:strVal val="#ppt_y"/>
+                                          </p:val>
+                                        </p:tav>
+                                      </p:tavLst>
+                                    </p:anim>
+                                  </p:childTnLst>
+                                </p:cTn>
+                              </p:par>
+                              <p:par>
+                                <p:cTn id="19" presetID="2" presetClass="entr" presetSubtype="4" fill="hold" nodeType="withEffect">
+                                  <p:stCondLst>
+                                    <p:cond delay="0"/>
+                                  </p:stCondLst>
+                                  <p:childTnLst>
+                                    <p:set>
+                                      <p:cBhvr>
+                                        <p:cTn id="20" dur="1" fill="hold">
+                                          <p:stCondLst>
+                                            <p:cond delay="0"/>
+                                          </p:stCondLst>
+                                        </p:cTn>
+                                        <p:tgtEl>
+                                          <p:spTgt spid="7"/>
+                                        </p:tgtEl>
+                                        <p:attrNameLst>
+                                          <p:attrName>style.visibility</p:attrName>
+                                        </p:attrNameLst>
+                                      </p:cBhvr>
+                                      <p:to>
+                                        <p:strVal val="visible"/>
+                                      </p:to>
+                                    </p:set>
+                                    <p:anim calcmode="lin" valueType="num">
+                                      <p:cBhvr additive="base">
+                                        <p:cTn id="21" dur="500" fill="hold"/>
+                                        <p:tgtEl>
+                                          <p:spTgt spid="7"/>
+                                        </p:tgtEl>
+                                        <p:attrNameLst>
+                                          <p:attrName>ppt_x</p:attrName>
+                                        </p:attrNameLst>
+                                      </p:cBhvr>
+                                      <p:tavLst>
+                                        <p:tav tm="0">
+                                          <p:val>
+                                            <p:strVal val="#ppt_x"/>
+                                          </p:val>
+                                        </p:tav>
+                                        <p:tav tm="100000">
+                                          <p:val>
+                                            <p:strVal val="#ppt_x"/>
+                                          </p:val>
+                                        </p:tav>
+                                      </p:tavLst>
+                                    </p:anim>
+                                    <p:anim calcmode="lin" valueType="num">
+                                      <p:cBhvr additive="base">
+                                        <p:cTn id="22" dur="500" fill="hold"/>
+                                        <p:tgtEl>
+                                          <p:spTgt spid="7"/>
+                                        </p:tgtEl>
+                                        <p:attrNameLst>
+                                          <p:attrName>ppt_y</p:attrName>
+                                        </p:attrNameLst>
+                                      </p:cBhvr>
+                                      <p:tavLst>
+                                        <p:tav tm="0">
+                                          <p:val>
+                                            <p:strVal val="1+#ppt_h/2"/>
+                                          </p:val>
+                                        </p:tav>
+                                        <p:tav tm="100000">
+                                          <p:val>
+                                            <p:strVal val="#ppt_y"/>
+                                          </p:val>
+                                        </p:tav>
+                                      </p:tavLst>
+                                    </p:anim>
+                                  </p:childTnLst>
+                                </p:cTn>
+                              </p:par>
+                            </p:childTnLst>
+                          </p:cTn>
+                        </p:par>
+                      </p:childTnLst>
+                    </p:cTn>
+                  </p:par>
+                  <p:par>
+                    <p:cTn id="23" fill="hold">
+                      <p:stCondLst>
+                        <p:cond delay="indefinite"/>
+                      </p:stCondLst>
+                      <p:childTnLst>
+                        <p:par>
+                          <p:cTn id="24" fill="hold">
+                            <p:stCondLst>
+                              <p:cond delay="0"/>
+                            </p:stCondLst>
+                            <p:childTnLst>
+                              <p:par>
+                                <p:cTn id="25" presetID="2" presetClass="entr" presetSubtype="4" fill="hold" nodeType="clickEffect">
+                                  <p:stCondLst>
+                                    <p:cond delay="0"/>
+                                  </p:stCondLst>
+                                  <p:childTnLst>
+                                    <p:set>
+                                      <p:cBhvr>
+                                        <p:cTn id="26" dur="1" fill="hold">
+                                          <p:stCondLst>
+                                            <p:cond delay="0"/>
+                                          </p:stCondLst>
+                                        </p:cTn>
+                                        <p:tgtEl>
+                                          <p:spTgt spid="9"/>
+                                        </p:tgtEl>
+                                        <p:attrNameLst>
+                                          <p:attrName>style.visibility</p:attrName>
+                                        </p:attrNameLst>
+                                      </p:cBhvr>
+                                      <p:to>
+                                        <p:strVal val="visible"/>
+                                      </p:to>
+                                    </p:set>
+                                    <p:anim calcmode="lin" valueType="num">
+                                      <p:cBhvr additive="base">
+                                        <p:cTn id="27" dur="500" fill="hold"/>
+                                        <p:tgtEl>
+                                          <p:spTgt spid="9"/>
+                                        </p:tgtEl>
+                                        <p:attrNameLst>
+                                          <p:attrName>ppt_x</p:attrName>
+                                        </p:attrNameLst>
+                                      </p:cBhvr>
+                                      <p:tavLst>
+                                        <p:tav tm="0">
+                                          <p:val>
+                                            <p:strVal val="#ppt_x"/>
+                                          </p:val>
+                                        </p:tav>
+                                        <p:tav tm="100000">
+                                          <p:val>
+                                            <p:strVal val="#ppt_x"/>
+                                          </p:val>
+                                        </p:tav>
+                                      </p:tavLst>
+                                    </p:anim>
+                                    <p:anim calcmode="lin" valueType="num">
+                                      <p:cBhvr additive="base">
+                                        <p:cTn id="28" dur="500" fill="hold"/>
+                                        <p:tgtEl>
+                                          <p:spTgt spid="9"/>
+                                        </p:tgtEl>
+                                        <p:attrNameLst>
+                                          <p:attrName>ppt_y</p:attrName>
+                                        </p:attrNameLst>
+                                      </p:cBhvr>
+                                      <p:tavLst>
+                                        <p:tav tm="0">
+                                          <p:val>
+                                            <p:strVal val="1+#ppt_h/2"/>
+                                          </p:val>
+                                        </p:tav>
+                                        <p:tav tm="100000">
+                                          <p:val>
+                                            <p:strVal val="#ppt_y"/>
+                                          </p:val>
+                                        </p:tav>
+                                      </p:tavLst>
+                                    </p:anim>
+                                  </p:childTnLst>
+                                </p:cTn>
+                              </p:par>
+                            </p:childTnLst>
+                          </p:cTn>
+                        </p:par>
+                      </p:childTnLst>
+                    </p:cTn>
+                  </p:par>
+                </p:childTnLst>
+              </p:cTn>
+              <p:prevCondLst>
+                <p:cond evt="onPrev" delay="0">
+                  <p:tgtEl>
+                    <p:sldTgt/>
+                  </p:tgtEl>
+                </p:cond>
+              </p:prevCondLst>
+              <p:nextCondLst>
+                <p:cond evt="onNext" delay="0">
+                  <p:tgtEl>
+                    <p:sldTgt/>
+                  </p:tgtEl>
+                </p:cond>
+              </p:nextCondLst>
+            </p:seq>
+          </p:childTnLst>
+        </p:cTn>
+      </p:par>
+    </p:tnLst>
+    <p:bldLst>
+      <p:bldP spid="8" grpId="0"/>
+    </p:bldLst>
+  </p:timing>
+</p:sld>
+</file>
+
+<file path=ppt/slides/slide26.xml><?xml version="1.0" encoding="utf-8"?>
+<p:sld xmlns:a="http://schemas.openxmlformats.org/drawingml/2006/main" xmlns:r="http://schemas.openxmlformats.org/officeDocument/2006/relationships" xmlns:p="http://schemas.openxmlformats.org/presentationml/2006/main">
+  <p:cSld>
+    <p:spTree>
+      <p:nvGrpSpPr>
+        <p:cNvPr id="1" name=""/>
+        <p:cNvGrpSpPr/>
+        <p:nvPr/>
+      </p:nvGrpSpPr>
+      <p:grpSpPr>
+        <a:xfrm>
+          <a:off x="0" y="0"/>
+          <a:ext cx="0" cy="0"/>
+          <a:chOff x="0" y="0"/>
+          <a:chExt cx="0" cy="0"/>
+        </a:xfrm>
+      </p:grpSpPr>
+      <p:sp>
+        <p:nvSpPr>
+          <p:cNvPr id="2" name="Title 1"/>
+          <p:cNvSpPr>
+            <a:spLocks noGrp="1"/>
+          </p:cNvSpPr>
+          <p:nvPr>
+            <p:ph type="title"/>
+          </p:nvPr>
+        </p:nvSpPr>
+        <p:spPr/>
+        <p:txBody>
+          <a:bodyPr/>
+          <a:lstStyle/>
+          <a:p>
+            <a:pPr algn="ctr"/>
+            <a:r>
+              <a:rPr lang="en-US" dirty="0" smtClean="0"/>
+              <a:t>What </a:t>
+            </a:r>
+            <a:r>
+              <a:rPr lang="en-US" dirty="0" err="1" smtClean="0"/>
+              <a:t>Tast</a:t>
+            </a:r>
+            <a:r>
+              <a:rPr lang="en-US" dirty="0" smtClean="0"/>
+              <a:t> Catalyst Can Do</a:t>
+            </a:r>
+            <a:endParaRPr lang="en-MY" dirty="0"/>
+          </a:p>
+        </p:txBody>
+      </p:sp>
+      <p:sp>
+        <p:nvSpPr>
+          <p:cNvPr id="3" name="Content Placeholder 2"/>
+          <p:cNvSpPr>
+            <a:spLocks noGrp="1"/>
+          </p:cNvSpPr>
+          <p:nvPr>
+            <p:ph idx="1"/>
+          </p:nvPr>
+        </p:nvSpPr>
+        <p:spPr>
+          <a:xfrm>
+            <a:off x="3702050" y="1889125"/>
+            <a:ext cx="7886700" cy="4351338"/>
+          </a:xfrm>
+        </p:spPr>
+        <p:txBody>
+          <a:bodyPr>
+            <a:noAutofit/>
+          </a:bodyPr>
+          <a:lstStyle/>
+          <a:p>
+            <a:pPr marL="0" indent="0">
+              <a:buNone/>
+            </a:pPr>
+            <a:r>
+              <a:rPr lang="en-US" sz="4200" dirty="0" smtClean="0"/>
+              <a:t>C</a:t>
+            </a:r>
+          </a:p>
+          <a:p>
+            <a:pPr marL="0" indent="0">
+              <a:buNone/>
+            </a:pPr>
+            <a:endParaRPr lang="en-US" sz="2000" dirty="0" smtClean="0"/>
+          </a:p>
+          <a:p>
+            <a:pPr marL="0" indent="0">
+              <a:buNone/>
+            </a:pPr>
+            <a:r>
+              <a:rPr lang="en-US" sz="4200" dirty="0" smtClean="0"/>
+              <a:t>R</a:t>
+            </a:r>
+          </a:p>
+          <a:p>
+            <a:pPr marL="0" indent="0">
+              <a:buNone/>
+            </a:pPr>
+            <a:endParaRPr lang="en-US" sz="2000" dirty="0" smtClean="0"/>
+          </a:p>
+          <a:p>
+            <a:pPr marL="0" indent="0">
+              <a:buNone/>
+            </a:pPr>
+            <a:r>
+              <a:rPr lang="en-US" sz="4200" dirty="0" smtClean="0"/>
+              <a:t>U</a:t>
+            </a:r>
+            <a:endParaRPr lang="en-US" dirty="0" smtClean="0"/>
+          </a:p>
+          <a:p>
+            <a:pPr marL="0" indent="0">
+              <a:buNone/>
+            </a:pPr>
+            <a:endParaRPr lang="en-US" sz="2000" dirty="0" smtClean="0"/>
+          </a:p>
+          <a:p>
+            <a:pPr marL="0" indent="0">
+              <a:buNone/>
+            </a:pPr>
+            <a:r>
+              <a:rPr lang="en-US" sz="4200" dirty="0" smtClean="0"/>
+              <a:t>D</a:t>
+            </a:r>
+            <a:endParaRPr lang="en-US" dirty="0" smtClean="0"/>
+          </a:p>
+        </p:txBody>
+      </p:sp>
+      <p:sp>
+        <p:nvSpPr>
+          <p:cNvPr id="4" name="Content Placeholder 2"/>
+          <p:cNvSpPr txBox="1">
+            <a:spLocks/>
+          </p:cNvSpPr>
+          <p:nvPr/>
+        </p:nvSpPr>
+        <p:spPr>
+          <a:xfrm>
+            <a:off x="3782260" y="1889125"/>
+            <a:ext cx="7886700" cy="4351338"/>
+          </a:xfrm>
+          <a:prstGeom prst="rect">
+            <a:avLst/>
+          </a:prstGeom>
+        </p:spPr>
+        <p:txBody>
+          <a:bodyPr vert="horz" lIns="91440" tIns="45720" rIns="91440" bIns="45720" rtlCol="0">
+            <a:noAutofit/>
+          </a:bodyPr>
+          <a:lstStyle>
+            <a:lvl1pPr marL="228600" indent="-228600" algn="l" defTabSz="914400" rtl="0" eaLnBrk="1" latinLnBrk="0" hangingPunct="1">
+              <a:lnSpc>
+                <a:spcPct val="90000"/>
+              </a:lnSpc>
+              <a:spcBef>
+                <a:spcPts val="1000"/>
+              </a:spcBef>
+              <a:buFont typeface="Arial" panose="020B0604020202020204" pitchFamily="34" charset="0"/>
+              <a:buChar char="•"/>
+              <a:defRPr sz="2800" kern="1200">
+                <a:solidFill>
+                  <a:schemeClr val="tx1"/>
+                </a:solidFill>
+                <a:latin typeface="+mn-lt"/>
+                <a:ea typeface="+mn-ea"/>
+                <a:cs typeface="+mn-cs"/>
+              </a:defRPr>
+            </a:lvl1pPr>
+            <a:lvl2pPr marL="685800" indent="-228600" algn="l" defTabSz="914400" rtl="0" eaLnBrk="1" latinLnBrk="0" hangingPunct="1">
+              <a:lnSpc>
+                <a:spcPct val="90000"/>
+              </a:lnSpc>
+              <a:spcBef>
+                <a:spcPts val="500"/>
+              </a:spcBef>
+              <a:buFont typeface="Arial" panose="020B0604020202020204" pitchFamily="34" charset="0"/>
+              <a:buChar char="•"/>
+              <a:defRPr sz="2400" kern="1200">
+                <a:solidFill>
+                  <a:schemeClr val="tx1"/>
+                </a:solidFill>
+                <a:latin typeface="+mn-lt"/>
+                <a:ea typeface="+mn-ea"/>
+                <a:cs typeface="+mn-cs"/>
+              </a:defRPr>
+            </a:lvl2pPr>
+            <a:lvl3pPr marL="1143000" indent="-228600" algn="l" defTabSz="914400" rtl="0" eaLnBrk="1" latinLnBrk="0" hangingPunct="1">
+              <a:lnSpc>
+                <a:spcPct val="90000"/>
+              </a:lnSpc>
+              <a:spcBef>
+                <a:spcPts val="500"/>
+              </a:spcBef>
+              <a:buFont typeface="Arial" panose="020B0604020202020204" pitchFamily="34" charset="0"/>
+              <a:buChar char="•"/>
+              <a:defRPr sz="2000" kern="1200">
+                <a:solidFill>
+                  <a:schemeClr val="tx1"/>
+                </a:solidFill>
+                <a:latin typeface="+mn-lt"/>
+                <a:ea typeface="+mn-ea"/>
+                <a:cs typeface="+mn-cs"/>
+              </a:defRPr>
+            </a:lvl3pPr>
+            <a:lvl4pPr marL="1600200" indent="-228600" algn="l" defTabSz="914400" rtl="0" eaLnBrk="1" latinLnBrk="0" hangingPunct="1">
+              <a:lnSpc>
+                <a:spcPct val="90000"/>
+              </a:lnSpc>
+              <a:spcBef>
+                <a:spcPts val="500"/>
+              </a:spcBef>
+              <a:buFont typeface="Arial" panose="020B0604020202020204" pitchFamily="34" charset="0"/>
+              <a:buChar char="•"/>
+              <a:defRPr sz="1800" kern="1200">
+                <a:solidFill>
+                  <a:schemeClr val="tx1"/>
+                </a:solidFill>
+                <a:latin typeface="+mn-lt"/>
+                <a:ea typeface="+mn-ea"/>
+                <a:cs typeface="+mn-cs"/>
+              </a:defRPr>
+            </a:lvl4pPr>
+            <a:lvl5pPr marL="2057400" indent="-228600" algn="l" defTabSz="914400" rtl="0" eaLnBrk="1" latinLnBrk="0" hangingPunct="1">
+              <a:lnSpc>
+                <a:spcPct val="90000"/>
+              </a:lnSpc>
+              <a:spcBef>
+                <a:spcPts val="500"/>
+              </a:spcBef>
+              <a:buFont typeface="Arial" panose="020B0604020202020204" pitchFamily="34" charset="0"/>
+              <a:buChar char="•"/>
+              <a:defRPr sz="1800" kern="1200">
+                <a:solidFill>
+                  <a:schemeClr val="tx1"/>
+                </a:solidFill>
+                <a:latin typeface="+mn-lt"/>
+                <a:ea typeface="+mn-ea"/>
+                <a:cs typeface="+mn-cs"/>
+              </a:defRPr>
+            </a:lvl5pPr>
+            <a:lvl6pPr marL="2514600" indent="-228600" algn="l" defTabSz="914400" rtl="0" eaLnBrk="1" latinLnBrk="0" hangingPunct="1">
+              <a:lnSpc>
+                <a:spcPct val="90000"/>
+              </a:lnSpc>
+              <a:spcBef>
+                <a:spcPts val="500"/>
+              </a:spcBef>
+              <a:buFont typeface="Arial" panose="020B0604020202020204" pitchFamily="34" charset="0"/>
+              <a:buChar char="•"/>
+              <a:defRPr sz="1800" kern="1200">
+                <a:solidFill>
+                  <a:schemeClr val="tx1"/>
+                </a:solidFill>
+                <a:latin typeface="+mn-lt"/>
+                <a:ea typeface="+mn-ea"/>
+                <a:cs typeface="+mn-cs"/>
+              </a:defRPr>
+            </a:lvl6pPr>
+            <a:lvl7pPr marL="2971800" indent="-228600" algn="l" defTabSz="914400" rtl="0" eaLnBrk="1" latinLnBrk="0" hangingPunct="1">
+              <a:lnSpc>
+                <a:spcPct val="90000"/>
+              </a:lnSpc>
+              <a:spcBef>
+                <a:spcPts val="500"/>
+              </a:spcBef>
+              <a:buFont typeface="Arial" panose="020B0604020202020204" pitchFamily="34" charset="0"/>
+              <a:buChar char="•"/>
+              <a:defRPr sz="1800" kern="1200">
+                <a:solidFill>
+                  <a:schemeClr val="tx1"/>
+                </a:solidFill>
+                <a:latin typeface="+mn-lt"/>
+                <a:ea typeface="+mn-ea"/>
+                <a:cs typeface="+mn-cs"/>
+              </a:defRPr>
+            </a:lvl7pPr>
+            <a:lvl8pPr marL="3429000" indent="-228600" algn="l" defTabSz="914400" rtl="0" eaLnBrk="1" latinLnBrk="0" hangingPunct="1">
+              <a:lnSpc>
+                <a:spcPct val="90000"/>
+              </a:lnSpc>
+              <a:spcBef>
+                <a:spcPts val="500"/>
+              </a:spcBef>
+              <a:buFont typeface="Arial" panose="020B0604020202020204" pitchFamily="34" charset="0"/>
+              <a:buChar char="•"/>
+              <a:defRPr sz="1800" kern="1200">
+                <a:solidFill>
+                  <a:schemeClr val="tx1"/>
+                </a:solidFill>
+                <a:latin typeface="+mn-lt"/>
+                <a:ea typeface="+mn-ea"/>
+                <a:cs typeface="+mn-cs"/>
+              </a:defRPr>
+            </a:lvl8pPr>
+            <a:lvl9pPr marL="3886200" indent="-228600" algn="l" defTabSz="914400" rtl="0" eaLnBrk="1" latinLnBrk="0" hangingPunct="1">
+              <a:lnSpc>
+                <a:spcPct val="90000"/>
+              </a:lnSpc>
+              <a:spcBef>
+                <a:spcPts val="500"/>
+              </a:spcBef>
+              <a:buFont typeface="Arial" panose="020B0604020202020204" pitchFamily="34" charset="0"/>
+              <a:buChar char="•"/>
+              <a:defRPr sz="1800" kern="1200">
+                <a:solidFill>
+                  <a:schemeClr val="tx1"/>
+                </a:solidFill>
+                <a:latin typeface="+mn-lt"/>
+                <a:ea typeface="+mn-ea"/>
+                <a:cs typeface="+mn-cs"/>
+              </a:defRPr>
+            </a:lvl9pPr>
+          </a:lstStyle>
+          <a:p>
+            <a:pPr marL="0" indent="0">
+              <a:buFont typeface="Arial" panose="020B0604020202020204" pitchFamily="34" charset="0"/>
+              <a:buNone/>
+            </a:pPr>
+            <a:r>
+              <a:rPr lang="en-US" sz="4200" dirty="0"/>
+              <a:t> </a:t>
+            </a:r>
+            <a:r>
+              <a:rPr lang="en-US" sz="4200" dirty="0" smtClean="0"/>
+              <a:t> </a:t>
+            </a:r>
+            <a:r>
+              <a:rPr lang="en-US" dirty="0" err="1" smtClean="0"/>
+              <a:t>reate</a:t>
+            </a:r>
+            <a:endParaRPr lang="en-US" dirty="0" smtClean="0"/>
+          </a:p>
+          <a:p>
+            <a:pPr marL="0" indent="0">
+              <a:buFont typeface="Arial" panose="020B0604020202020204" pitchFamily="34" charset="0"/>
+              <a:buNone/>
+            </a:pPr>
+            <a:endParaRPr lang="en-US" sz="2000" dirty="0" smtClean="0"/>
+          </a:p>
+          <a:p>
+            <a:pPr marL="0" indent="0">
+              <a:buFont typeface="Arial" panose="020B0604020202020204" pitchFamily="34" charset="0"/>
+              <a:buNone/>
+            </a:pPr>
+            <a:r>
+              <a:rPr lang="en-US" sz="4200" dirty="0" smtClean="0"/>
+              <a:t>  </a:t>
+            </a:r>
+            <a:r>
+              <a:rPr lang="en-US" dirty="0" err="1" smtClean="0"/>
+              <a:t>ead</a:t>
+            </a:r>
+            <a:endParaRPr lang="en-US" dirty="0" smtClean="0"/>
+          </a:p>
+          <a:p>
+            <a:pPr marL="0" indent="0">
+              <a:buFont typeface="Arial" panose="020B0604020202020204" pitchFamily="34" charset="0"/>
+              <a:buNone/>
+            </a:pPr>
+            <a:endParaRPr lang="en-US" sz="2000" dirty="0" smtClean="0"/>
+          </a:p>
+          <a:p>
+            <a:pPr marL="0" indent="0">
+              <a:buFont typeface="Arial" panose="020B0604020202020204" pitchFamily="34" charset="0"/>
+              <a:buNone/>
+            </a:pPr>
+            <a:r>
+              <a:rPr lang="en-US" sz="4200" dirty="0" smtClean="0"/>
+              <a:t>  </a:t>
+            </a:r>
+            <a:r>
+              <a:rPr lang="en-US" dirty="0" err="1" smtClean="0"/>
+              <a:t>pdate</a:t>
+            </a:r>
+            <a:endParaRPr lang="en-US" dirty="0" smtClean="0"/>
+          </a:p>
+          <a:p>
+            <a:pPr marL="0" indent="0">
+              <a:buFont typeface="Arial" panose="020B0604020202020204" pitchFamily="34" charset="0"/>
+              <a:buNone/>
+            </a:pPr>
+            <a:endParaRPr lang="en-US" sz="2000" dirty="0" smtClean="0"/>
+          </a:p>
+          <a:p>
+            <a:pPr marL="0" indent="0">
+              <a:buFont typeface="Arial" panose="020B0604020202020204" pitchFamily="34" charset="0"/>
+              <a:buNone/>
+            </a:pPr>
+            <a:r>
+              <a:rPr lang="en-US" sz="4200" dirty="0" smtClean="0"/>
+              <a:t>  </a:t>
+            </a:r>
+            <a:r>
+              <a:rPr lang="en-US" dirty="0" err="1" smtClean="0"/>
+              <a:t>elete</a:t>
+            </a:r>
+            <a:endParaRPr lang="en-US" dirty="0" smtClean="0"/>
+          </a:p>
+        </p:txBody>
+      </p:sp>
+    </p:spTree>
+    <p:extLst>
+      <p:ext uri="{BB962C8B-B14F-4D97-AF65-F5344CB8AC3E}">
+        <p14:creationId xmlns:p14="http://schemas.microsoft.com/office/powerpoint/2010/main" val="495950684"/>
+      </p:ext>
+    </p:extLst>
+  </p:cSld>
+  <p:clrMapOvr>
+    <a:masterClrMapping/>
+  </p:clrMapOvr>
+  <p:timing>
+    <p:tnLst>
+      <p:par>
+        <p:cTn id="1" dur="indefinite" restart="never" nodeType="tmRoot">
+          <p:childTnLst>
+            <p:seq concurrent="1" nextAc="seek">
+              <p:cTn id="2" dur="indefinite" nodeType="mainSeq">
+                <p:childTnLst>
+                  <p:par>
+                    <p:cTn id="3" fill="hold">
+                      <p:stCondLst>
+                        <p:cond delay="indefinite"/>
+                      </p:stCondLst>
+                      <p:childTnLst>
+                        <p:par>
+                          <p:cTn id="4" fill="hold">
+                            <p:stCondLst>
+                              <p:cond delay="0"/>
+                            </p:stCondLst>
+                            <p:childTnLst>
+                              <p:par>
+                                <p:cTn id="5" presetID="2" presetClass="entr" presetSubtype="4" fill="hold" grpId="0" nodeType="clickEffect">
+                                  <p:stCondLst>
+                                    <p:cond delay="0"/>
+                                  </p:stCondLst>
+                                  <p:childTnLst>
+                                    <p:set>
+                                      <p:cBhvr>
+                                        <p:cTn id="6" dur="1" fill="hold">
+                                          <p:stCondLst>
+                                            <p:cond delay="0"/>
+                                          </p:stCondLst>
+                                        </p:cTn>
+                                        <p:tgtEl>
+                                          <p:spTgt spid="3">
+                                            <p:txEl>
+                                              <p:pRg st="0" end="0"/>
+                                            </p:txEl>
+                                          </p:spTgt>
+                                        </p:tgtEl>
+                                        <p:attrNameLst>
+                                          <p:attrName>style.visibility</p:attrName>
+                                        </p:attrNameLst>
+                                      </p:cBhvr>
+                                      <p:to>
+                                        <p:strVal val="visible"/>
+                                      </p:to>
+                                    </p:set>
+                                    <p:anim calcmode="lin" valueType="num">
+                                      <p:cBhvr additive="base">
+                                        <p:cTn id="7" dur="500" fill="hold"/>
+                                        <p:tgtEl>
+                                          <p:spTgt spid="3">
+                                            <p:txEl>
+                                              <p:pRg st="0" end="0"/>
+                                            </p:txEl>
+                                          </p:spTgt>
+                                        </p:tgtEl>
+                                        <p:attrNameLst>
+                                          <p:attrName>ppt_x</p:attrName>
+                                        </p:attrNameLst>
+                                      </p:cBhvr>
+                                      <p:tavLst>
+                                        <p:tav tm="0">
+                                          <p:val>
+                                            <p:strVal val="#ppt_x"/>
+                                          </p:val>
+                                        </p:tav>
+                                        <p:tav tm="100000">
+                                          <p:val>
+                                            <p:strVal val="#ppt_x"/>
+                                          </p:val>
+                                        </p:tav>
+                                      </p:tavLst>
+                                    </p:anim>
+                                    <p:anim calcmode="lin" valueType="num">
+                                      <p:cBhvr additive="base">
+                                        <p:cTn id="8" dur="500" fill="hold"/>
+                                        <p:tgtEl>
+                                          <p:spTgt spid="3">
+                                            <p:txEl>
+                                              <p:pRg st="0" end="0"/>
+                                            </p:txEl>
+                                          </p:spTgt>
+                                        </p:tgtEl>
+                                        <p:attrNameLst>
+                                          <p:attrName>ppt_y</p:attrName>
+                                        </p:attrNameLst>
+                                      </p:cBhvr>
+                                      <p:tavLst>
+                                        <p:tav tm="0">
+                                          <p:val>
+                                            <p:strVal val="1+#ppt_h/2"/>
+                                          </p:val>
+                                        </p:tav>
+                                        <p:tav tm="100000">
+                                          <p:val>
+                                            <p:strVal val="#ppt_y"/>
+                                          </p:val>
+                                        </p:tav>
+                                      </p:tavLst>
+                                    </p:anim>
+                                  </p:childTnLst>
+                                </p:cTn>
+                              </p:par>
+                            </p:childTnLst>
+                          </p:cTn>
+                        </p:par>
+                      </p:childTnLst>
+                    </p:cTn>
+                  </p:par>
+                  <p:par>
+                    <p:cTn id="9" fill="hold">
+                      <p:stCondLst>
+                        <p:cond delay="indefinite"/>
+                      </p:stCondLst>
+                      <p:childTnLst>
+                        <p:par>
+                          <p:cTn id="10" fill="hold">
+                            <p:stCondLst>
+                              <p:cond delay="0"/>
+                            </p:stCondLst>
+                            <p:childTnLst>
+                              <p:par>
+                                <p:cTn id="11" presetID="16" presetClass="entr" presetSubtype="21" fill="hold" grpId="0" nodeType="clickEffect">
+                                  <p:stCondLst>
+                                    <p:cond delay="0"/>
+                                  </p:stCondLst>
+                                  <p:childTnLst>
+                                    <p:set>
+                                      <p:cBhvr>
+                                        <p:cTn id="12" dur="1" fill="hold">
+                                          <p:stCondLst>
+                                            <p:cond delay="0"/>
+                                          </p:stCondLst>
+                                        </p:cTn>
+                                        <p:tgtEl>
+                                          <p:spTgt spid="3">
+                                            <p:txEl>
+                                              <p:pRg st="2" end="2"/>
+                                            </p:txEl>
+                                          </p:spTgt>
+                                        </p:tgtEl>
+                                        <p:attrNameLst>
+                                          <p:attrName>style.visibility</p:attrName>
+                                        </p:attrNameLst>
+                                      </p:cBhvr>
+                                      <p:to>
+                                        <p:strVal val="visible"/>
+                                      </p:to>
+                                    </p:set>
+                                    <p:animEffect transition="in" filter="barn(inVertical)">
+                                      <p:cBhvr>
+                                        <p:cTn id="13" dur="500"/>
+                                        <p:tgtEl>
+                                          <p:spTgt spid="3">
+                                            <p:txEl>
+                                              <p:pRg st="2" end="2"/>
+                                            </p:txEl>
+                                          </p:spTgt>
+                                        </p:tgtEl>
+                                      </p:cBhvr>
+                                    </p:animEffect>
+                                  </p:childTnLst>
+                                </p:cTn>
+                              </p:par>
+                            </p:childTnLst>
+                          </p:cTn>
+                        </p:par>
+                      </p:childTnLst>
+                    </p:cTn>
+                  </p:par>
+                  <p:par>
+                    <p:cTn id="14" fill="hold">
+                      <p:stCondLst>
+                        <p:cond delay="indefinite"/>
+                      </p:stCondLst>
+                      <p:childTnLst>
+                        <p:par>
+                          <p:cTn id="15" fill="hold">
+                            <p:stCondLst>
+                              <p:cond delay="0"/>
+                            </p:stCondLst>
+                            <p:childTnLst>
+                              <p:par>
+                                <p:cTn id="16" presetID="16" presetClass="entr" presetSubtype="21" fill="hold" grpId="0" nodeType="clickEffect">
+                                  <p:stCondLst>
+                                    <p:cond delay="0"/>
+                                  </p:stCondLst>
+                                  <p:childTnLst>
+                                    <p:set>
+                                      <p:cBhvr>
+                                        <p:cTn id="17" dur="1" fill="hold">
+                                          <p:stCondLst>
+                                            <p:cond delay="0"/>
+                                          </p:stCondLst>
+                                        </p:cTn>
+                                        <p:tgtEl>
+                                          <p:spTgt spid="3">
+                                            <p:txEl>
+                                              <p:pRg st="4" end="4"/>
+                                            </p:txEl>
+                                          </p:spTgt>
+                                        </p:tgtEl>
+                                        <p:attrNameLst>
+                                          <p:attrName>style.visibility</p:attrName>
+                                        </p:attrNameLst>
+                                      </p:cBhvr>
+                                      <p:to>
+                                        <p:strVal val="visible"/>
+                                      </p:to>
+                                    </p:set>
+                                    <p:animEffect transition="in" filter="barn(inVertical)">
+                                      <p:cBhvr>
+                                        <p:cTn id="18" dur="500"/>
+                                        <p:tgtEl>
+                                          <p:spTgt spid="3">
+                                            <p:txEl>
+                                              <p:pRg st="4" end="4"/>
+                                            </p:txEl>
+                                          </p:spTgt>
+                                        </p:tgtEl>
+                                      </p:cBhvr>
+                                    </p:animEffect>
+                                  </p:childTnLst>
+                                </p:cTn>
+                              </p:par>
+                            </p:childTnLst>
+                          </p:cTn>
+                        </p:par>
+                      </p:childTnLst>
+                    </p:cTn>
+                  </p:par>
+                  <p:par>
+                    <p:cTn id="19" fill="hold">
+                      <p:stCondLst>
+                        <p:cond delay="indefinite"/>
+                      </p:stCondLst>
+                      <p:childTnLst>
+                        <p:par>
+                          <p:cTn id="20" fill="hold">
+                            <p:stCondLst>
+                              <p:cond delay="0"/>
+                            </p:stCondLst>
+                            <p:childTnLst>
+                              <p:par>
+                                <p:cTn id="21" presetID="16" presetClass="entr" presetSubtype="21" fill="hold" grpId="0" nodeType="clickEffect">
+                                  <p:stCondLst>
+                                    <p:cond delay="0"/>
+                                  </p:stCondLst>
+                                  <p:childTnLst>
+                                    <p:set>
+                                      <p:cBhvr>
+                                        <p:cTn id="22" dur="1" fill="hold">
+                                          <p:stCondLst>
+                                            <p:cond delay="0"/>
+                                          </p:stCondLst>
+                                        </p:cTn>
+                                        <p:tgtEl>
+                                          <p:spTgt spid="3">
+                                            <p:txEl>
+                                              <p:pRg st="6" end="6"/>
+                                            </p:txEl>
+                                          </p:spTgt>
+                                        </p:tgtEl>
+                                        <p:attrNameLst>
+                                          <p:attrName>style.visibility</p:attrName>
+                                        </p:attrNameLst>
+                                      </p:cBhvr>
+                                      <p:to>
+                                        <p:strVal val="visible"/>
+                                      </p:to>
+                                    </p:set>
+                                    <p:animEffect transition="in" filter="barn(inVertical)">
+                                      <p:cBhvr>
+                                        <p:cTn id="23" dur="500"/>
+                                        <p:tgtEl>
+                                          <p:spTgt spid="3">
+                                            <p:txEl>
+                                              <p:pRg st="6" end="6"/>
+                                            </p:txEl>
+                                          </p:spTgt>
+                                        </p:tgtEl>
+                                      </p:cBhvr>
+                                    </p:animEffect>
+                                  </p:childTnLst>
+                                </p:cTn>
+                              </p:par>
+                            </p:childTnLst>
+                          </p:cTn>
+                        </p:par>
+                      </p:childTnLst>
+                    </p:cTn>
+                  </p:par>
+                  <p:par>
+                    <p:cTn id="24" fill="hold">
+                      <p:stCondLst>
+                        <p:cond delay="indefinite"/>
+                      </p:stCondLst>
+                      <p:childTnLst>
+                        <p:par>
+                          <p:cTn id="25" fill="hold">
+                            <p:stCondLst>
+                              <p:cond delay="0"/>
+                            </p:stCondLst>
+                            <p:childTnLst>
+                              <p:par>
+                                <p:cTn id="26" presetID="2" presetClass="entr" presetSubtype="2" fill="hold" grpId="0" nodeType="clickEffect">
+                                  <p:stCondLst>
+                                    <p:cond delay="0"/>
+                                  </p:stCondLst>
+                                  <p:childTnLst>
+                                    <p:set>
+                                      <p:cBhvr>
+                                        <p:cTn id="27" dur="1" fill="hold">
+                                          <p:stCondLst>
+                                            <p:cond delay="0"/>
+                                          </p:stCondLst>
+                                        </p:cTn>
+                                        <p:tgtEl>
+                                          <p:spTgt spid="4">
+                                            <p:txEl>
+                                              <p:pRg st="0" end="0"/>
+                                            </p:txEl>
+                                          </p:spTgt>
+                                        </p:tgtEl>
+                                        <p:attrNameLst>
+                                          <p:attrName>style.visibility</p:attrName>
+                                        </p:attrNameLst>
+                                      </p:cBhvr>
+                                      <p:to>
+                                        <p:strVal val="visible"/>
+                                      </p:to>
+                                    </p:set>
+                                    <p:anim calcmode="lin" valueType="num">
+                                      <p:cBhvr additive="base">
+                                        <p:cTn id="28" dur="500" fill="hold"/>
+                                        <p:tgtEl>
+                                          <p:spTgt spid="4">
+                                            <p:txEl>
+                                              <p:pRg st="0" end="0"/>
+                                            </p:txEl>
+                                          </p:spTgt>
+                                        </p:tgtEl>
+                                        <p:attrNameLst>
+                                          <p:attrName>ppt_x</p:attrName>
+                                        </p:attrNameLst>
+                                      </p:cBhvr>
+                                      <p:tavLst>
+                                        <p:tav tm="0">
+                                          <p:val>
+                                            <p:strVal val="1+#ppt_w/2"/>
+                                          </p:val>
+                                        </p:tav>
+                                        <p:tav tm="100000">
+                                          <p:val>
+                                            <p:strVal val="#ppt_x"/>
+                                          </p:val>
+                                        </p:tav>
+                                      </p:tavLst>
+                                    </p:anim>
+                                    <p:anim calcmode="lin" valueType="num">
+                                      <p:cBhvr additive="base">
+                                        <p:cTn id="29" dur="500" fill="hold"/>
+                                        <p:tgtEl>
+                                          <p:spTgt spid="4">
+                                            <p:txEl>
+                                              <p:pRg st="0" end="0"/>
+                                            </p:txEl>
+                                          </p:spTgt>
+                                        </p:tgtEl>
+                                        <p:attrNameLst>
+                                          <p:attrName>ppt_y</p:attrName>
+                                        </p:attrNameLst>
+                                      </p:cBhvr>
+                                      <p:tavLst>
+                                        <p:tav tm="0">
+                                          <p:val>
+                                            <p:strVal val="#ppt_y"/>
+                                          </p:val>
+                                        </p:tav>
+                                        <p:tav tm="100000">
+                                          <p:val>
+                                            <p:strVal val="#ppt_y"/>
+                                          </p:val>
+                                        </p:tav>
+                                      </p:tavLst>
+                                    </p:anim>
+                                  </p:childTnLst>
+                                </p:cTn>
+                              </p:par>
+                            </p:childTnLst>
+                          </p:cTn>
+                        </p:par>
+                      </p:childTnLst>
+                    </p:cTn>
+                  </p:par>
+                  <p:par>
+                    <p:cTn id="30" fill="hold">
+                      <p:stCondLst>
+                        <p:cond delay="indefinite"/>
+                      </p:stCondLst>
+                      <p:childTnLst>
+                        <p:par>
+                          <p:cTn id="31" fill="hold">
+                            <p:stCondLst>
+                              <p:cond delay="0"/>
+                            </p:stCondLst>
+                            <p:childTnLst>
+                              <p:par>
+                                <p:cTn id="32" presetID="2" presetClass="entr" presetSubtype="2" fill="hold" grpId="0" nodeType="clickEffect">
+                                  <p:stCondLst>
+                                    <p:cond delay="0"/>
+                                  </p:stCondLst>
+                                  <p:childTnLst>
+                                    <p:set>
+                                      <p:cBhvr>
+                                        <p:cTn id="33" dur="1" fill="hold">
+                                          <p:stCondLst>
+                                            <p:cond delay="0"/>
+                                          </p:stCondLst>
+                                        </p:cTn>
+                                        <p:tgtEl>
+                                          <p:spTgt spid="4">
+                                            <p:txEl>
+                                              <p:pRg st="2" end="2"/>
+                                            </p:txEl>
+                                          </p:spTgt>
+                                        </p:tgtEl>
+                                        <p:attrNameLst>
+                                          <p:attrName>style.visibility</p:attrName>
+                                        </p:attrNameLst>
+                                      </p:cBhvr>
+                                      <p:to>
+                                        <p:strVal val="visible"/>
+                                      </p:to>
+                                    </p:set>
+                                    <p:anim calcmode="lin" valueType="num">
+                                      <p:cBhvr additive="base">
+                                        <p:cTn id="34" dur="500" fill="hold"/>
+                                        <p:tgtEl>
+                                          <p:spTgt spid="4">
+                                            <p:txEl>
+                                              <p:pRg st="2" end="2"/>
+                                            </p:txEl>
+                                          </p:spTgt>
+                                        </p:tgtEl>
+                                        <p:attrNameLst>
+                                          <p:attrName>ppt_x</p:attrName>
+                                        </p:attrNameLst>
+                                      </p:cBhvr>
+                                      <p:tavLst>
+                                        <p:tav tm="0">
+                                          <p:val>
+                                            <p:strVal val="1+#ppt_w/2"/>
+                                          </p:val>
+                                        </p:tav>
+                                        <p:tav tm="100000">
+                                          <p:val>
+                                            <p:strVal val="#ppt_x"/>
+                                          </p:val>
+                                        </p:tav>
+                                      </p:tavLst>
+                                    </p:anim>
+                                    <p:anim calcmode="lin" valueType="num">
+                                      <p:cBhvr additive="base">
+                                        <p:cTn id="35" dur="500" fill="hold"/>
+                                        <p:tgtEl>
+                                          <p:spTgt spid="4">
+                                            <p:txEl>
+                                              <p:pRg st="2" end="2"/>
+                                            </p:txEl>
+                                          </p:spTgt>
+                                        </p:tgtEl>
+                                        <p:attrNameLst>
+                                          <p:attrName>ppt_y</p:attrName>
+                                        </p:attrNameLst>
+                                      </p:cBhvr>
+                                      <p:tavLst>
+                                        <p:tav tm="0">
+                                          <p:val>
+                                            <p:strVal val="#ppt_y"/>
+                                          </p:val>
+                                        </p:tav>
+                                        <p:tav tm="100000">
+                                          <p:val>
+                                            <p:strVal val="#ppt_y"/>
+                                          </p:val>
+                                        </p:tav>
+                                      </p:tavLst>
+                                    </p:anim>
+                                  </p:childTnLst>
+                                </p:cTn>
+                              </p:par>
+                            </p:childTnLst>
+                          </p:cTn>
+                        </p:par>
+                      </p:childTnLst>
+                    </p:cTn>
+                  </p:par>
+                  <p:par>
+                    <p:cTn id="36" fill="hold">
+                      <p:stCondLst>
+                        <p:cond delay="indefinite"/>
+                      </p:stCondLst>
+                      <p:childTnLst>
+                        <p:par>
+                          <p:cTn id="37" fill="hold">
+                            <p:stCondLst>
+                              <p:cond delay="0"/>
+                            </p:stCondLst>
+                            <p:childTnLst>
+                              <p:par>
+                                <p:cTn id="38" presetID="2" presetClass="entr" presetSubtype="2" fill="hold" grpId="0" nodeType="clickEffect">
+                                  <p:stCondLst>
+                                    <p:cond delay="0"/>
+                                  </p:stCondLst>
+                                  <p:childTnLst>
+                                    <p:set>
+                                      <p:cBhvr>
+                                        <p:cTn id="39" dur="1" fill="hold">
+                                          <p:stCondLst>
+                                            <p:cond delay="0"/>
+                                          </p:stCondLst>
+                                        </p:cTn>
+                                        <p:tgtEl>
+                                          <p:spTgt spid="4">
+                                            <p:txEl>
+                                              <p:pRg st="4" end="4"/>
+                                            </p:txEl>
+                                          </p:spTgt>
+                                        </p:tgtEl>
+                                        <p:attrNameLst>
+                                          <p:attrName>style.visibility</p:attrName>
+                                        </p:attrNameLst>
+                                      </p:cBhvr>
+                                      <p:to>
+                                        <p:strVal val="visible"/>
+                                      </p:to>
+                                    </p:set>
+                                    <p:anim calcmode="lin" valueType="num">
+                                      <p:cBhvr additive="base">
+                                        <p:cTn id="40" dur="500" fill="hold"/>
+                                        <p:tgtEl>
+                                          <p:spTgt spid="4">
+                                            <p:txEl>
+                                              <p:pRg st="4" end="4"/>
+                                            </p:txEl>
+                                          </p:spTgt>
+                                        </p:tgtEl>
+                                        <p:attrNameLst>
+                                          <p:attrName>ppt_x</p:attrName>
+                                        </p:attrNameLst>
+                                      </p:cBhvr>
+                                      <p:tavLst>
+                                        <p:tav tm="0">
+                                          <p:val>
+                                            <p:strVal val="1+#ppt_w/2"/>
+                                          </p:val>
+                                        </p:tav>
+                                        <p:tav tm="100000">
+                                          <p:val>
+                                            <p:strVal val="#ppt_x"/>
+                                          </p:val>
+                                        </p:tav>
+                                      </p:tavLst>
+                                    </p:anim>
+                                    <p:anim calcmode="lin" valueType="num">
+                                      <p:cBhvr additive="base">
+                                        <p:cTn id="41" dur="500" fill="hold"/>
+                                        <p:tgtEl>
+                                          <p:spTgt spid="4">
+                                            <p:txEl>
+                                              <p:pRg st="4" end="4"/>
+                                            </p:txEl>
+                                          </p:spTgt>
+                                        </p:tgtEl>
+                                        <p:attrNameLst>
+                                          <p:attrName>ppt_y</p:attrName>
+                                        </p:attrNameLst>
+                                      </p:cBhvr>
+                                      <p:tavLst>
+                                        <p:tav tm="0">
+                                          <p:val>
+                                            <p:strVal val="#ppt_y"/>
+                                          </p:val>
+                                        </p:tav>
+                                        <p:tav tm="100000">
+                                          <p:val>
+                                            <p:strVal val="#ppt_y"/>
+                                          </p:val>
+                                        </p:tav>
+                                      </p:tavLst>
+                                    </p:anim>
+                                  </p:childTnLst>
+                                </p:cTn>
+                              </p:par>
+                            </p:childTnLst>
+                          </p:cTn>
+                        </p:par>
+                      </p:childTnLst>
+                    </p:cTn>
+                  </p:par>
+                  <p:par>
+                    <p:cTn id="42" fill="hold">
+                      <p:stCondLst>
+                        <p:cond delay="indefinite"/>
+                      </p:stCondLst>
+                      <p:childTnLst>
+                        <p:par>
+                          <p:cTn id="43" fill="hold">
+                            <p:stCondLst>
+                              <p:cond delay="0"/>
+                            </p:stCondLst>
+                            <p:childTnLst>
+                              <p:par>
+                                <p:cTn id="44" presetID="2" presetClass="entr" presetSubtype="2" fill="hold" grpId="0" nodeType="clickEffect">
+                                  <p:stCondLst>
+                                    <p:cond delay="0"/>
+                                  </p:stCondLst>
+                                  <p:childTnLst>
+                                    <p:set>
+                                      <p:cBhvr>
+                                        <p:cTn id="45" dur="1" fill="hold">
+                                          <p:stCondLst>
+                                            <p:cond delay="0"/>
+                                          </p:stCondLst>
+                                        </p:cTn>
+                                        <p:tgtEl>
+                                          <p:spTgt spid="4">
+                                            <p:txEl>
+                                              <p:pRg st="6" end="6"/>
+                                            </p:txEl>
+                                          </p:spTgt>
+                                        </p:tgtEl>
+                                        <p:attrNameLst>
+                                          <p:attrName>style.visibility</p:attrName>
+                                        </p:attrNameLst>
+                                      </p:cBhvr>
+                                      <p:to>
+                                        <p:strVal val="visible"/>
+                                      </p:to>
+                                    </p:set>
+                                    <p:anim calcmode="lin" valueType="num">
+                                      <p:cBhvr additive="base">
+                                        <p:cTn id="46" dur="500" fill="hold"/>
+                                        <p:tgtEl>
+                                          <p:spTgt spid="4">
+                                            <p:txEl>
+                                              <p:pRg st="6" end="6"/>
+                                            </p:txEl>
+                                          </p:spTgt>
+                                        </p:tgtEl>
+                                        <p:attrNameLst>
+                                          <p:attrName>ppt_x</p:attrName>
+                                        </p:attrNameLst>
+                                      </p:cBhvr>
+                                      <p:tavLst>
+                                        <p:tav tm="0">
+                                          <p:val>
+                                            <p:strVal val="1+#ppt_w/2"/>
+                                          </p:val>
+                                        </p:tav>
+                                        <p:tav tm="100000">
+                                          <p:val>
+                                            <p:strVal val="#ppt_x"/>
+                                          </p:val>
+                                        </p:tav>
+                                      </p:tavLst>
+                                    </p:anim>
+                                    <p:anim calcmode="lin" valueType="num">
+                                      <p:cBhvr additive="base">
+                                        <p:cTn id="47" dur="500" fill="hold"/>
+                                        <p:tgtEl>
+                                          <p:spTgt spid="4">
+                                            <p:txEl>
+                                              <p:pRg st="6" end="6"/>
+                                            </p:txEl>
+                                          </p:spTgt>
+                                        </p:tgtEl>
+                                        <p:attrNameLst>
+                                          <p:attrName>ppt_y</p:attrName>
+                                        </p:attrNameLst>
+                                      </p:cBhvr>
+                                      <p:tavLst>
+                                        <p:tav tm="0">
+                                          <p:val>
+                                            <p:strVal val="#ppt_y"/>
+                                          </p:val>
+                                        </p:tav>
+                                        <p:tav tm="100000">
+                                          <p:val>
+                                            <p:strVal val="#ppt_y"/>
+                                          </p:val>
+                                        </p:tav>
+                                      </p:tavLst>
+                                    </p:anim>
+                                  </p:childTnLst>
+                                </p:cTn>
+                              </p:par>
+                            </p:childTnLst>
+                          </p:cTn>
+                        </p:par>
+                      </p:childTnLst>
+                    </p:cTn>
+                  </p:par>
+                </p:childTnLst>
+              </p:cTn>
+              <p:prevCondLst>
+                <p:cond evt="onPrev" delay="0">
+                  <p:tgtEl>
+                    <p:sldTgt/>
+                  </p:tgtEl>
+                </p:cond>
+              </p:prevCondLst>
+              <p:nextCondLst>
+                <p:cond evt="onNext" delay="0">
+                  <p:tgtEl>
+                    <p:sldTgt/>
+                  </p:tgtEl>
+                </p:cond>
+              </p:nextCondLst>
+            </p:seq>
+          </p:childTnLst>
+        </p:cTn>
+      </p:par>
+    </p:tnLst>
+    <p:bldLst>
+      <p:bldP spid="3" grpId="0" uiExpand="1" build="p"/>
+      <p:bldP spid="4" grpId="0" build="p"/>
+    </p:bldLst>
+  </p:timing>
+</p:sld>
+</file>
+
+<file path=ppt/slides/slide27.xml><?xml version="1.0" encoding="utf-8"?>
+<p:sld xmlns:a="http://schemas.openxmlformats.org/drawingml/2006/main" xmlns:r="http://schemas.openxmlformats.org/officeDocument/2006/relationships" xmlns:p="http://schemas.openxmlformats.org/presentationml/2006/main">
+  <p:cSld>
+    <p:spTree>
+      <p:nvGrpSpPr>
+        <p:cNvPr id="1" name=""/>
+        <p:cNvGrpSpPr/>
+        <p:nvPr/>
+      </p:nvGrpSpPr>
+      <p:grpSpPr>
+        <a:xfrm>
+          <a:off x="0" y="0"/>
+          <a:ext cx="0" cy="0"/>
+          <a:chOff x="0" y="0"/>
+          <a:chExt cx="0" cy="0"/>
+        </a:xfrm>
+      </p:grpSpPr>
+      <p:sp>
+        <p:nvSpPr>
+          <p:cNvPr id="2" name="Title 1"/>
+          <p:cNvSpPr>
+            <a:spLocks noGrp="1"/>
+          </p:cNvSpPr>
+          <p:nvPr>
+            <p:ph type="title"/>
+          </p:nvPr>
+        </p:nvSpPr>
+        <p:spPr/>
+        <p:txBody>
+          <a:bodyPr/>
+          <a:lstStyle/>
+          <a:p>
+            <a:pPr algn="ctr"/>
+            <a:r>
+              <a:rPr lang="en-US" dirty="0" smtClean="0"/>
+              <a:t>What Task Catalyst Can Do</a:t>
+            </a:r>
+            <a:endParaRPr lang="en-MY" dirty="0"/>
+          </a:p>
+        </p:txBody>
+      </p:sp>
+      <p:pic>
+        <p:nvPicPr>
+          <p:cNvPr id="4" name="Content Placeholder 3"/>
+          <p:cNvPicPr>
+            <a:picLocks noGrp="1" noChangeAspect="1"/>
+          </p:cNvPicPr>
+          <p:nvPr>
+            <p:ph idx="1"/>
+          </p:nvPr>
+        </p:nvPicPr>
+        <p:blipFill>
+          <a:blip r:embed="rId2">
+            <a:extLst>
+              <a:ext uri="{28A0092B-C50C-407E-A947-70E740481C1C}">
+                <a14:useLocalDpi xmlns:a14="http://schemas.microsoft.com/office/drawing/2010/main" val="0"/>
+              </a:ext>
+            </a:extLst>
+          </a:blip>
+          <a:stretch>
+            <a:fillRect/>
+          </a:stretch>
+        </p:blipFill>
+        <p:spPr>
+          <a:xfrm>
+            <a:off x="3257611" y="2407140"/>
+            <a:ext cx="2628778" cy="2628778"/>
+          </a:xfrm>
+        </p:spPr>
+      </p:pic>
+      <p:pic>
+        <p:nvPicPr>
+          <p:cNvPr id="5" name="Picture 4"/>
+          <p:cNvPicPr>
+            <a:picLocks noChangeAspect="1"/>
+          </p:cNvPicPr>
+          <p:nvPr/>
+        </p:nvPicPr>
+        <p:blipFill>
+          <a:blip r:embed="rId3" cstate="print">
+            <a:extLst>
+              <a:ext uri="{28A0092B-C50C-407E-A947-70E740481C1C}">
+                <a14:useLocalDpi xmlns:a14="http://schemas.microsoft.com/office/drawing/2010/main" val="0"/>
+              </a:ext>
+            </a:extLst>
+          </a:blip>
+          <a:stretch>
+            <a:fillRect/>
+          </a:stretch>
+        </p:blipFill>
+        <p:spPr>
+          <a:xfrm>
+            <a:off x="3221145" y="2173994"/>
+            <a:ext cx="2701709" cy="3438948"/>
+          </a:xfrm>
+          <a:prstGeom prst="rect">
+            <a:avLst/>
+          </a:prstGeom>
+        </p:spPr>
+      </p:pic>
+      <p:pic>
+        <p:nvPicPr>
+          <p:cNvPr id="6" name="Picture 5"/>
+          <p:cNvPicPr>
+            <a:picLocks noChangeAspect="1"/>
+          </p:cNvPicPr>
+          <p:nvPr/>
+        </p:nvPicPr>
+        <p:blipFill>
+          <a:blip r:embed="rId4">
+            <a:extLst>
+              <a:ext uri="{28A0092B-C50C-407E-A947-70E740481C1C}">
+                <a14:useLocalDpi xmlns:a14="http://schemas.microsoft.com/office/drawing/2010/main" val="0"/>
+              </a:ext>
+            </a:extLst>
+          </a:blip>
+          <a:stretch>
+            <a:fillRect/>
+          </a:stretch>
+        </p:blipFill>
+        <p:spPr>
+          <a:xfrm>
+            <a:off x="2032316" y="2212394"/>
+            <a:ext cx="5079365" cy="3377778"/>
+          </a:xfrm>
+          <a:prstGeom prst="rect">
+            <a:avLst/>
+          </a:prstGeom>
+        </p:spPr>
+      </p:pic>
+    </p:spTree>
+    <p:extLst>
+      <p:ext uri="{BB962C8B-B14F-4D97-AF65-F5344CB8AC3E}">
+        <p14:creationId xmlns:p14="http://schemas.microsoft.com/office/powerpoint/2010/main" val="203354214"/>
+      </p:ext>
+    </p:extLst>
+  </p:cSld>
+  <p:clrMapOvr>
+    <a:masterClrMapping/>
+  </p:clrMapOvr>
+  <p:timing>
+    <p:tnLst>
+      <p:par>
+        <p:cTn id="1" dur="indefinite" restart="never" nodeType="tmRoot">
+          <p:childTnLst>
+            <p:seq concurrent="1" nextAc="seek">
+              <p:cTn id="2" dur="indefinite" nodeType="mainSeq">
+                <p:childTnLst>
+                  <p:par>
+                    <p:cTn id="3" fill="hold">
+                      <p:stCondLst>
+                        <p:cond delay="indefinite"/>
+                      </p:stCondLst>
+                      <p:childTnLst>
+                        <p:par>
+                          <p:cTn id="4" fill="hold">
+                            <p:stCondLst>
+                              <p:cond delay="0"/>
+                            </p:stCondLst>
+                            <p:childTnLst>
+                              <p:par>
+                                <p:cTn id="5" presetID="1" presetClass="entr" presetSubtype="0" fill="hold" nodeType="clickEffect">
+                                  <p:stCondLst>
+                                    <p:cond delay="0"/>
+                                  </p:stCondLst>
+                                  <p:childTnLst>
+                                    <p:set>
+                                      <p:cBhvr>
+                                        <p:cTn id="6" dur="1" fill="hold">
+                                          <p:stCondLst>
+                                            <p:cond delay="0"/>
+                                          </p:stCondLst>
+                                        </p:cTn>
+                                        <p:tgtEl>
+                                          <p:spTgt spid="4"/>
+                                        </p:tgtEl>
+                                        <p:attrNameLst>
+                                          <p:attrName>style.visibility</p:attrName>
+                                        </p:attrNameLst>
+                                      </p:cBhvr>
+                                      <p:to>
+                                        <p:strVal val="visible"/>
+                                      </p:to>
+                                    </p:set>
+                                  </p:childTnLst>
+                                  <p:subTnLst>
+                                    <p:set>
+                                      <p:cBhvr override="childStyle">
+                                        <p:cTn dur="1" fill="hold" display="0" masterRel="nextClick" afterEffect="1"/>
+                                        <p:tgtEl>
+                                          <p:spTgt spid="4"/>
+                                        </p:tgtEl>
+                                        <p:attrNameLst>
+                                          <p:attrName>style.visibility</p:attrName>
+                                        </p:attrNameLst>
+                                      </p:cBhvr>
+                                      <p:to>
+                                        <p:strVal val="hidden"/>
+                                      </p:to>
+                                    </p:set>
+                                  </p:subTnLst>
+                                </p:cTn>
+                              </p:par>
+                            </p:childTnLst>
+                          </p:cTn>
+                        </p:par>
+                      </p:childTnLst>
+                    </p:cTn>
+                  </p:par>
+                  <p:par>
+                    <p:cTn id="7" fill="hold">
+                      <p:stCondLst>
+                        <p:cond delay="indefinite"/>
+                      </p:stCondLst>
+                      <p:childTnLst>
+                        <p:par>
+                          <p:cTn id="8" fill="hold">
+                            <p:stCondLst>
+                              <p:cond delay="0"/>
+                            </p:stCondLst>
+                            <p:childTnLst>
+                              <p:par>
+                                <p:cTn id="9" presetID="42" presetClass="entr" presetSubtype="0" fill="hold" nodeType="clickEffect">
+                                  <p:stCondLst>
+                                    <p:cond delay="0"/>
+                                  </p:stCondLst>
+                                  <p:childTnLst>
+                                    <p:set>
+                                      <p:cBhvr>
+                                        <p:cTn id="10" dur="1" fill="hold">
+                                          <p:stCondLst>
+                                            <p:cond delay="0"/>
+                                          </p:stCondLst>
+                                        </p:cTn>
+                                        <p:tgtEl>
+                                          <p:spTgt spid="5"/>
+                                        </p:tgtEl>
+                                        <p:attrNameLst>
+                                          <p:attrName>style.visibility</p:attrName>
+                                        </p:attrNameLst>
+                                      </p:cBhvr>
+                                      <p:to>
+                                        <p:strVal val="visible"/>
+                                      </p:to>
+                                    </p:set>
+                                    <p:animEffect transition="in" filter="fade">
+                                      <p:cBhvr>
+                                        <p:cTn id="11" dur="1000"/>
+                                        <p:tgtEl>
+                                          <p:spTgt spid="5"/>
+                                        </p:tgtEl>
+                                      </p:cBhvr>
+                                    </p:animEffect>
+                                    <p:anim calcmode="lin" valueType="num">
+                                      <p:cBhvr>
+                                        <p:cTn id="12" dur="1000" fill="hold"/>
+                                        <p:tgtEl>
+                                          <p:spTgt spid="5"/>
+                                        </p:tgtEl>
+                                        <p:attrNameLst>
+                                          <p:attrName>ppt_x</p:attrName>
+                                        </p:attrNameLst>
+                                      </p:cBhvr>
+                                      <p:tavLst>
+                                        <p:tav tm="0">
+                                          <p:val>
+                                            <p:strVal val="#ppt_x"/>
+                                          </p:val>
+                                        </p:tav>
+                                        <p:tav tm="100000">
+                                          <p:val>
+                                            <p:strVal val="#ppt_x"/>
+                                          </p:val>
+                                        </p:tav>
+                                      </p:tavLst>
+                                    </p:anim>
+                                    <p:anim calcmode="lin" valueType="num">
+                                      <p:cBhvr>
+                                        <p:cTn id="13" dur="1000" fill="hold"/>
+                                        <p:tgtEl>
+                                          <p:spTgt spid="5"/>
+                                        </p:tgtEl>
+                                        <p:attrNameLst>
+                                          <p:attrName>ppt_y</p:attrName>
+                                        </p:attrNameLst>
+                                      </p:cBhvr>
+                                      <p:tavLst>
+                                        <p:tav tm="0">
+                                          <p:val>
+                                            <p:strVal val="#ppt_y+.1"/>
+                                          </p:val>
+                                        </p:tav>
+                                        <p:tav tm="100000">
+                                          <p:val>
+                                            <p:strVal val="#ppt_y"/>
+                                          </p:val>
+                                        </p:tav>
+                                      </p:tavLst>
+                                    </p:anim>
+                                  </p:childTnLst>
+                                  <p:subTnLst>
+                                    <p:set>
+                                      <p:cBhvr override="childStyle">
+                                        <p:cTn dur="1" fill="hold" display="0" masterRel="nextClick" afterEffect="1"/>
+                                        <p:tgtEl>
+                                          <p:spTgt spid="5"/>
+                                        </p:tgtEl>
+                                        <p:attrNameLst>
+                                          <p:attrName>style.visibility</p:attrName>
+                                        </p:attrNameLst>
+                                      </p:cBhvr>
+                                      <p:to>
+                                        <p:strVal val="hidden"/>
+                                      </p:to>
+                                    </p:set>
+                                  </p:subTnLst>
+                                </p:cTn>
+                              </p:par>
+                            </p:childTnLst>
+                          </p:cTn>
+                        </p:par>
+                      </p:childTnLst>
+                    </p:cTn>
+                  </p:par>
+                  <p:par>
+                    <p:cTn id="14" fill="hold">
+                      <p:stCondLst>
+                        <p:cond delay="indefinite"/>
+                      </p:stCondLst>
+                      <p:childTnLst>
+                        <p:par>
+                          <p:cTn id="15" fill="hold">
+                            <p:stCondLst>
+                              <p:cond delay="0"/>
+                            </p:stCondLst>
+                            <p:childTnLst>
+                              <p:par>
+                                <p:cTn id="16" presetID="42" presetClass="entr" presetSubtype="0" fill="hold" nodeType="clickEffect">
+                                  <p:stCondLst>
+                                    <p:cond delay="0"/>
+                                  </p:stCondLst>
+                                  <p:childTnLst>
+                                    <p:set>
+                                      <p:cBhvr>
+                                        <p:cTn id="17" dur="1" fill="hold">
+                                          <p:stCondLst>
+                                            <p:cond delay="0"/>
+                                          </p:stCondLst>
+                                        </p:cTn>
+                                        <p:tgtEl>
+                                          <p:spTgt spid="6"/>
+                                        </p:tgtEl>
+                                        <p:attrNameLst>
+                                          <p:attrName>style.visibility</p:attrName>
+                                        </p:attrNameLst>
+                                      </p:cBhvr>
+                                      <p:to>
+                                        <p:strVal val="visible"/>
+                                      </p:to>
+                                    </p:set>
+                                    <p:animEffect transition="in" filter="fade">
+                                      <p:cBhvr>
+                                        <p:cTn id="18" dur="1000"/>
+                                        <p:tgtEl>
+                                          <p:spTgt spid="6"/>
+                                        </p:tgtEl>
+                                      </p:cBhvr>
+                                    </p:animEffect>
+                                    <p:anim calcmode="lin" valueType="num">
+                                      <p:cBhvr>
+                                        <p:cTn id="19" dur="1000" fill="hold"/>
+                                        <p:tgtEl>
+                                          <p:spTgt spid="6"/>
+                                        </p:tgtEl>
+                                        <p:attrNameLst>
+                                          <p:attrName>ppt_x</p:attrName>
+                                        </p:attrNameLst>
+                                      </p:cBhvr>
+                                      <p:tavLst>
+                                        <p:tav tm="0">
+                                          <p:val>
+                                            <p:strVal val="#ppt_x"/>
+                                          </p:val>
+                                        </p:tav>
+                                        <p:tav tm="100000">
+                                          <p:val>
+                                            <p:strVal val="#ppt_x"/>
+                                          </p:val>
+                                        </p:tav>
+                                      </p:tavLst>
+                                    </p:anim>
+                                    <p:anim calcmode="lin" valueType="num">
+                                      <p:cBhvr>
+                                        <p:cTn id="20" dur="1000" fill="hold"/>
+                                        <p:tgtEl>
+                                          <p:spTgt spid="6"/>
+                                        </p:tgtEl>
+                                        <p:attrNameLst>
+                                          <p:attrName>ppt_y</p:attrName>
+                                        </p:attrNameLst>
+                                      </p:cBhvr>
+                                      <p:tavLst>
+                                        <p:tav tm="0">
+                                          <p:val>
+                                            <p:strVal val="#ppt_y+.1"/>
+                                          </p:val>
+                                        </p:tav>
+                                        <p:tav tm="100000">
+                                          <p:val>
+                                            <p:strVal val="#ppt_y"/>
+                                          </p:val>
+                                        </p:tav>
+                                      </p:tavLst>
+                                    </p:anim>
+                                  </p:childTnLst>
+                                </p:cTn>
+                              </p:par>
+                            </p:childTnLst>
+                          </p:cTn>
+                        </p:par>
+                      </p:childTnLst>
+                    </p:cTn>
+                  </p:par>
+                </p:childTnLst>
+              </p:cTn>
+              <p:prevCondLst>
+                <p:cond evt="onPrev" delay="0">
+                  <p:tgtEl>
+                    <p:sldTgt/>
+                  </p:tgtEl>
+                </p:cond>
+              </p:prevCondLst>
+              <p:nextCondLst>
+                <p:cond evt="onNext" delay="0">
+                  <p:tgtEl>
+                    <p:sldTgt/>
+                  </p:tgtEl>
+                </p:cond>
+              </p:nextCondLst>
+            </p:seq>
+          </p:childTnLst>
+        </p:cTn>
+      </p:par>
+    </p:tnLst>
+  </p:timing>
+</p:sld>
+</file>
+
+<file path=ppt/slides/slide28.xml><?xml version="1.0" encoding="utf-8"?>
+<p:sld xmlns:a="http://schemas.openxmlformats.org/drawingml/2006/main" xmlns:r="http://schemas.openxmlformats.org/officeDocument/2006/relationships" xmlns:p="http://schemas.openxmlformats.org/presentationml/2006/main">
+  <p:cSld>
+    <p:spTree>
+      <p:nvGrpSpPr>
+        <p:cNvPr id="1" name=""/>
+        <p:cNvGrpSpPr/>
+        <p:nvPr/>
+      </p:nvGrpSpPr>
+      <p:grpSpPr>
+        <a:xfrm>
+          <a:off x="0" y="0"/>
+          <a:ext cx="0" cy="0"/>
+          <a:chOff x="0" y="0"/>
+          <a:chExt cx="0" cy="0"/>
+        </a:xfrm>
+      </p:grpSpPr>
+      <p:sp>
+        <p:nvSpPr>
+          <p:cNvPr id="2" name="Title 1"/>
+          <p:cNvSpPr>
+            <a:spLocks noGrp="1"/>
+          </p:cNvSpPr>
+          <p:nvPr>
+            <p:ph type="title"/>
+          </p:nvPr>
+        </p:nvSpPr>
+        <p:spPr/>
+        <p:txBody>
+          <a:bodyPr/>
+          <a:lstStyle/>
+          <a:p>
+            <a:pPr algn="ctr"/>
+            <a:r>
+              <a:rPr lang="en-US" dirty="0"/>
+              <a:t>What Task Catalyst Can </a:t>
+            </a:r>
+            <a:r>
+              <a:rPr lang="en-US" dirty="0" smtClean="0"/>
+              <a:t>Do</a:t>
+            </a:r>
+            <a:endParaRPr lang="en-MY" dirty="0"/>
+          </a:p>
+        </p:txBody>
+      </p:sp>
+      <p:pic>
+        <p:nvPicPr>
+          <p:cNvPr id="4" name="Content Placeholder 3"/>
+          <p:cNvPicPr>
+            <a:picLocks noGrp="1" noChangeAspect="1"/>
+          </p:cNvPicPr>
+          <p:nvPr>
+            <p:ph idx="1"/>
+          </p:nvPr>
+        </p:nvPicPr>
+        <p:blipFill>
+          <a:blip r:embed="rId2">
+            <a:extLst>
+              <a:ext uri="{28A0092B-C50C-407E-A947-70E740481C1C}">
+                <a14:useLocalDpi xmlns:a14="http://schemas.microsoft.com/office/drawing/2010/main" val="0"/>
+              </a:ext>
+            </a:extLst>
+          </a:blip>
+          <a:stretch>
+            <a:fillRect/>
+          </a:stretch>
+        </p:blipFill>
+        <p:spPr>
+          <a:xfrm>
+            <a:off x="1671108" y="1794364"/>
+            <a:ext cx="5801784" cy="4351338"/>
+          </a:xfrm>
+        </p:spPr>
+      </p:pic>
+      <p:pic>
+        <p:nvPicPr>
+          <p:cNvPr id="5" name="Picture 4"/>
+          <p:cNvPicPr>
+            <a:picLocks noChangeAspect="1"/>
+          </p:cNvPicPr>
+          <p:nvPr/>
+        </p:nvPicPr>
+        <p:blipFill>
+          <a:blip r:embed="rId3">
+            <a:extLst>
+              <a:ext uri="{28A0092B-C50C-407E-A947-70E740481C1C}">
+                <a14:useLocalDpi xmlns:a14="http://schemas.microsoft.com/office/drawing/2010/main" val="0"/>
+              </a:ext>
+            </a:extLst>
+          </a:blip>
+          <a:stretch>
+            <a:fillRect/>
+          </a:stretch>
+        </p:blipFill>
+        <p:spPr>
+          <a:xfrm>
+            <a:off x="2965450" y="1794364"/>
+            <a:ext cx="3213100" cy="4381500"/>
+          </a:xfrm>
+          <a:prstGeom prst="rect">
+            <a:avLst/>
+          </a:prstGeom>
+        </p:spPr>
+      </p:pic>
+      <p:pic>
+        <p:nvPicPr>
+          <p:cNvPr id="6" name="Picture 5"/>
+          <p:cNvPicPr>
+            <a:picLocks noChangeAspect="1"/>
+          </p:cNvPicPr>
+          <p:nvPr/>
+        </p:nvPicPr>
+        <p:blipFill>
+          <a:blip r:embed="rId4">
+            <a:extLst>
+              <a:ext uri="{28A0092B-C50C-407E-A947-70E740481C1C}">
+                <a14:useLocalDpi xmlns:a14="http://schemas.microsoft.com/office/drawing/2010/main" val="0"/>
+              </a:ext>
+            </a:extLst>
+          </a:blip>
+          <a:stretch>
+            <a:fillRect/>
+          </a:stretch>
+        </p:blipFill>
+        <p:spPr>
+          <a:xfrm>
+            <a:off x="2905125" y="2193680"/>
+            <a:ext cx="3333750" cy="3314700"/>
+          </a:xfrm>
+          <a:prstGeom prst="rect">
+            <a:avLst/>
+          </a:prstGeom>
+        </p:spPr>
+      </p:pic>
+    </p:spTree>
+    <p:extLst>
+      <p:ext uri="{BB962C8B-B14F-4D97-AF65-F5344CB8AC3E}">
+        <p14:creationId xmlns:p14="http://schemas.microsoft.com/office/powerpoint/2010/main" val="843732185"/>
+      </p:ext>
+    </p:extLst>
+  </p:cSld>
+  <p:clrMapOvr>
+    <a:masterClrMapping/>
+  </p:clrMapOvr>
+  <p:timing>
+    <p:tnLst>
+      <p:par>
+        <p:cTn id="1" dur="indefinite" restart="never" nodeType="tmRoot">
+          <p:childTnLst>
+            <p:seq concurrent="1" nextAc="seek">
+              <p:cTn id="2" dur="indefinite" nodeType="mainSeq">
+                <p:childTnLst>
+                  <p:par>
+                    <p:cTn id="3" fill="hold">
+                      <p:stCondLst>
+                        <p:cond delay="indefinite"/>
+                      </p:stCondLst>
+                      <p:childTnLst>
+                        <p:par>
+                          <p:cTn id="4" fill="hold">
+                            <p:stCondLst>
+                              <p:cond delay="0"/>
+                            </p:stCondLst>
+                            <p:childTnLst>
+                              <p:par>
+                                <p:cTn id="5" presetID="2" presetClass="entr" presetSubtype="4" fill="hold" nodeType="clickEffect">
+                                  <p:stCondLst>
+                                    <p:cond delay="0"/>
+                                  </p:stCondLst>
+                                  <p:childTnLst>
+                                    <p:set>
+                                      <p:cBhvr>
+                                        <p:cTn id="6" dur="1" fill="hold">
+                                          <p:stCondLst>
+                                            <p:cond delay="0"/>
+                                          </p:stCondLst>
+                                        </p:cTn>
+                                        <p:tgtEl>
+                                          <p:spTgt spid="4"/>
+                                        </p:tgtEl>
+                                        <p:attrNameLst>
+                                          <p:attrName>style.visibility</p:attrName>
+                                        </p:attrNameLst>
+                                      </p:cBhvr>
+                                      <p:to>
+                                        <p:strVal val="visible"/>
+                                      </p:to>
+                                    </p:set>
+                                    <p:anim calcmode="lin" valueType="num">
+                                      <p:cBhvr additive="base">
+                                        <p:cTn id="7" dur="500" fill="hold"/>
+                                        <p:tgtEl>
+                                          <p:spTgt spid="4"/>
+                                        </p:tgtEl>
+                                        <p:attrNameLst>
+                                          <p:attrName>ppt_x</p:attrName>
+                                        </p:attrNameLst>
+                                      </p:cBhvr>
+                                      <p:tavLst>
+                                        <p:tav tm="0">
+                                          <p:val>
+                                            <p:strVal val="#ppt_x"/>
+                                          </p:val>
+                                        </p:tav>
+                                        <p:tav tm="100000">
+                                          <p:val>
+                                            <p:strVal val="#ppt_x"/>
+                                          </p:val>
+                                        </p:tav>
+                                      </p:tavLst>
+                                    </p:anim>
+                                    <p:anim calcmode="lin" valueType="num">
+                                      <p:cBhvr additive="base">
+                                        <p:cTn id="8" dur="500" fill="hold"/>
+                                        <p:tgtEl>
+                                          <p:spTgt spid="4"/>
+                                        </p:tgtEl>
+                                        <p:attrNameLst>
+                                          <p:attrName>ppt_y</p:attrName>
+                                        </p:attrNameLst>
+                                      </p:cBhvr>
+                                      <p:tavLst>
+                                        <p:tav tm="0">
+                                          <p:val>
+                                            <p:strVal val="1+#ppt_h/2"/>
+                                          </p:val>
+                                        </p:tav>
+                                        <p:tav tm="100000">
+                                          <p:val>
+                                            <p:strVal val="#ppt_y"/>
+                                          </p:val>
+                                        </p:tav>
+                                      </p:tavLst>
+                                    </p:anim>
+                                  </p:childTnLst>
+                                  <p:subTnLst>
+                                    <p:set>
+                                      <p:cBhvr override="childStyle">
+                                        <p:cTn dur="1" fill="hold" display="0" masterRel="nextClick" afterEffect="1"/>
+                                        <p:tgtEl>
+                                          <p:spTgt spid="4"/>
+                                        </p:tgtEl>
+                                        <p:attrNameLst>
+                                          <p:attrName>style.visibility</p:attrName>
+                                        </p:attrNameLst>
+                                      </p:cBhvr>
+                                      <p:to>
+                                        <p:strVal val="hidden"/>
+                                      </p:to>
+                                    </p:set>
+                                  </p:subTnLst>
+                                </p:cTn>
+                              </p:par>
+                            </p:childTnLst>
+                          </p:cTn>
+                        </p:par>
+                      </p:childTnLst>
+                    </p:cTn>
+                  </p:par>
+                  <p:par>
+                    <p:cTn id="9" fill="hold">
+                      <p:stCondLst>
+                        <p:cond delay="indefinite"/>
+                      </p:stCondLst>
+                      <p:childTnLst>
+                        <p:par>
+                          <p:cTn id="10" fill="hold">
+                            <p:stCondLst>
+                              <p:cond delay="0"/>
+                            </p:stCondLst>
+                            <p:childTnLst>
+                              <p:par>
+                                <p:cTn id="11" presetID="1" presetClass="entr" presetSubtype="0" fill="hold" nodeType="clickEffect">
+                                  <p:stCondLst>
+                                    <p:cond delay="0"/>
+                                  </p:stCondLst>
+                                  <p:childTnLst>
+                                    <p:set>
+                                      <p:cBhvr>
+                                        <p:cTn id="12" dur="1" fill="hold">
+                                          <p:stCondLst>
+                                            <p:cond delay="0"/>
+                                          </p:stCondLst>
+                                        </p:cTn>
+                                        <p:tgtEl>
+                                          <p:spTgt spid="5"/>
+                                        </p:tgtEl>
+                                        <p:attrNameLst>
+                                          <p:attrName>style.visibility</p:attrName>
+                                        </p:attrNameLst>
+                                      </p:cBhvr>
+                                      <p:to>
+                                        <p:strVal val="visible"/>
+                                      </p:to>
+                                    </p:set>
+                                  </p:childTnLst>
+                                  <p:subTnLst>
+                                    <p:set>
+                                      <p:cBhvr override="childStyle">
+                                        <p:cTn dur="1" fill="hold" display="0" masterRel="nextClick" afterEffect="1"/>
+                                        <p:tgtEl>
+                                          <p:spTgt spid="5"/>
+                                        </p:tgtEl>
+                                        <p:attrNameLst>
+                                          <p:attrName>style.visibility</p:attrName>
+                                        </p:attrNameLst>
+                                      </p:cBhvr>
+                                      <p:to>
+                                        <p:strVal val="hidden"/>
+                                      </p:to>
+                                    </p:set>
+                                  </p:subTnLst>
+                                </p:cTn>
+                              </p:par>
+                            </p:childTnLst>
+                          </p:cTn>
+                        </p:par>
+                      </p:childTnLst>
+                    </p:cTn>
+                  </p:par>
+                  <p:par>
+                    <p:cTn id="13" fill="hold">
+                      <p:stCondLst>
+                        <p:cond delay="indefinite"/>
+                      </p:stCondLst>
+                      <p:childTnLst>
+                        <p:par>
+                          <p:cTn id="14" fill="hold">
+                            <p:stCondLst>
+                              <p:cond delay="0"/>
+                            </p:stCondLst>
+                            <p:childTnLst>
+                              <p:par>
+                                <p:cTn id="15" presetID="42" presetClass="entr" presetSubtype="0" fill="hold" nodeType="clickEffect">
+                                  <p:stCondLst>
+                                    <p:cond delay="0"/>
+                                  </p:stCondLst>
+                                  <p:childTnLst>
+                                    <p:set>
+                                      <p:cBhvr>
+                                        <p:cTn id="16" dur="1" fill="hold">
+                                          <p:stCondLst>
+                                            <p:cond delay="0"/>
+                                          </p:stCondLst>
+                                        </p:cTn>
+                                        <p:tgtEl>
+                                          <p:spTgt spid="6"/>
+                                        </p:tgtEl>
+                                        <p:attrNameLst>
+                                          <p:attrName>style.visibility</p:attrName>
+                                        </p:attrNameLst>
+                                      </p:cBhvr>
+                                      <p:to>
+                                        <p:strVal val="visible"/>
+                                      </p:to>
+                                    </p:set>
+                                    <p:animEffect transition="in" filter="fade">
+                                      <p:cBhvr>
+                                        <p:cTn id="17" dur="1000"/>
+                                        <p:tgtEl>
+                                          <p:spTgt spid="6"/>
+                                        </p:tgtEl>
+                                      </p:cBhvr>
+                                    </p:animEffect>
+                                    <p:anim calcmode="lin" valueType="num">
+                                      <p:cBhvr>
+                                        <p:cTn id="18" dur="1000" fill="hold"/>
+                                        <p:tgtEl>
+                                          <p:spTgt spid="6"/>
+                                        </p:tgtEl>
+                                        <p:attrNameLst>
+                                          <p:attrName>ppt_x</p:attrName>
+                                        </p:attrNameLst>
+                                      </p:cBhvr>
+                                      <p:tavLst>
+                                        <p:tav tm="0">
+                                          <p:val>
+                                            <p:strVal val="#ppt_x"/>
+                                          </p:val>
+                                        </p:tav>
+                                        <p:tav tm="100000">
+                                          <p:val>
+                                            <p:strVal val="#ppt_x"/>
+                                          </p:val>
+                                        </p:tav>
+                                      </p:tavLst>
+                                    </p:anim>
+                                    <p:anim calcmode="lin" valueType="num">
+                                      <p:cBhvr>
+                                        <p:cTn id="19" dur="1000" fill="hold"/>
+                                        <p:tgtEl>
+                                          <p:spTgt spid="6"/>
+                                        </p:tgtEl>
+                                        <p:attrNameLst>
+                                          <p:attrName>ppt_y</p:attrName>
+                                        </p:attrNameLst>
+                                      </p:cBhvr>
+                                      <p:tavLst>
+                                        <p:tav tm="0">
+                                          <p:val>
+                                            <p:strVal val="#ppt_y+.1"/>
+                                          </p:val>
+                                        </p:tav>
+                                        <p:tav tm="100000">
+                                          <p:val>
+                                            <p:strVal val="#ppt_y"/>
+                                          </p:val>
+                                        </p:tav>
+                                      </p:tavLst>
+                                    </p:anim>
+                                  </p:childTnLst>
+                                </p:cTn>
+                              </p:par>
+                            </p:childTnLst>
+                          </p:cTn>
+                        </p:par>
+                      </p:childTnLst>
+                    </p:cTn>
+                  </p:par>
+                </p:childTnLst>
+              </p:cTn>
+              <p:prevCondLst>
+                <p:cond evt="onPrev" delay="0">
+                  <p:tgtEl>
+                    <p:sldTgt/>
+                  </p:tgtEl>
+                </p:cond>
+              </p:prevCondLst>
+              <p:nextCondLst>
+                <p:cond evt="onNext" delay="0">
+                  <p:tgtEl>
+                    <p:sldTgt/>
+                  </p:tgtEl>
+                </p:cond>
+              </p:nextCondLst>
+            </p:seq>
+          </p:childTnLst>
+        </p:cTn>
+      </p:par>
+    </p:tnLst>
+  </p:timing>
+</p:sld>
+</file>
+
+<file path=ppt/slides/slide29.xml><?xml version="1.0" encoding="utf-8"?>
+<p:sld xmlns:a="http://schemas.openxmlformats.org/drawingml/2006/main" xmlns:r="http://schemas.openxmlformats.org/officeDocument/2006/relationships" xmlns:p="http://schemas.openxmlformats.org/presentationml/2006/main">
+  <p:cSld>
+    <p:spTree>
+      <p:nvGrpSpPr>
+        <p:cNvPr id="1" name=""/>
+        <p:cNvGrpSpPr/>
+        <p:nvPr/>
+      </p:nvGrpSpPr>
+      <p:grpSpPr>
+        <a:xfrm>
+          <a:off x="0" y="0"/>
+          <a:ext cx="0" cy="0"/>
+          <a:chOff x="0" y="0"/>
+          <a:chExt cx="0" cy="0"/>
+        </a:xfrm>
+      </p:grpSpPr>
+      <p:pic>
+        <p:nvPicPr>
+          <p:cNvPr id="21" name="Picture 20"/>
+          <p:cNvPicPr>
+            <a:picLocks noChangeAspect="1"/>
+          </p:cNvPicPr>
+          <p:nvPr/>
+        </p:nvPicPr>
+        <p:blipFill>
+          <a:blip r:embed="rId2" cstate="print">
+            <a:extLst>
+              <a:ext uri="{28A0092B-C50C-407E-A947-70E740481C1C}">
+                <a14:useLocalDpi xmlns:a14="http://schemas.microsoft.com/office/drawing/2010/main" val="0"/>
+              </a:ext>
+            </a:extLst>
+          </a:blip>
+          <a:stretch>
+            <a:fillRect/>
+          </a:stretch>
+        </p:blipFill>
+        <p:spPr>
+          <a:xfrm>
+            <a:off x="5937604" y="2419651"/>
+            <a:ext cx="160484" cy="160484"/>
+          </a:xfrm>
+          <a:prstGeom prst="rect">
+            <a:avLst/>
+          </a:prstGeom>
+        </p:spPr>
+      </p:pic>
+      <p:sp>
+        <p:nvSpPr>
+          <p:cNvPr id="2" name="Title 1"/>
+          <p:cNvSpPr>
+            <a:spLocks noGrp="1"/>
+          </p:cNvSpPr>
+          <p:nvPr>
+            <p:ph type="title"/>
+          </p:nvPr>
+        </p:nvSpPr>
+        <p:spPr/>
+        <p:txBody>
+          <a:bodyPr/>
+          <a:lstStyle/>
+          <a:p>
+            <a:pPr algn="ctr"/>
+            <a:r>
+              <a:rPr lang="en-US" dirty="0"/>
+              <a:t>What Task Catalyst Can </a:t>
+            </a:r>
+            <a:r>
+              <a:rPr lang="en-US" dirty="0" smtClean="0"/>
+              <a:t>Do</a:t>
+            </a:r>
+            <a:endParaRPr lang="en-MY" dirty="0"/>
+          </a:p>
+        </p:txBody>
+      </p:sp>
+      <p:pic>
+        <p:nvPicPr>
+          <p:cNvPr id="4" name="Content Placeholder 3"/>
+          <p:cNvPicPr>
+            <a:picLocks noGrp="1" noChangeAspect="1"/>
+          </p:cNvPicPr>
+          <p:nvPr>
+            <p:ph idx="1"/>
+          </p:nvPr>
+        </p:nvPicPr>
+        <p:blipFill>
+          <a:blip r:embed="rId3" cstate="print">
+            <a:extLst>
+              <a:ext uri="{28A0092B-C50C-407E-A947-70E740481C1C}">
+                <a14:useLocalDpi xmlns:a14="http://schemas.microsoft.com/office/drawing/2010/main" val="0"/>
+              </a:ext>
+            </a:extLst>
+          </a:blip>
+          <a:stretch>
+            <a:fillRect/>
+          </a:stretch>
+        </p:blipFill>
+        <p:spPr>
+          <a:xfrm>
+            <a:off x="2875308" y="3368432"/>
+            <a:ext cx="1799046" cy="2412767"/>
+          </a:xfrm>
+        </p:spPr>
+      </p:pic>
+      <p:pic>
+        <p:nvPicPr>
+          <p:cNvPr id="5" name="Picture 4"/>
+          <p:cNvPicPr>
+            <a:picLocks noChangeAspect="1"/>
+          </p:cNvPicPr>
+          <p:nvPr/>
+        </p:nvPicPr>
+        <p:blipFill>
+          <a:blip r:embed="rId4" cstate="print">
+            <a:extLst>
+              <a:ext uri="{28A0092B-C50C-407E-A947-70E740481C1C}">
+                <a14:useLocalDpi xmlns:a14="http://schemas.microsoft.com/office/drawing/2010/main" val="0"/>
+              </a:ext>
+            </a:extLst>
+          </a:blip>
+          <a:stretch>
+            <a:fillRect/>
+          </a:stretch>
+        </p:blipFill>
+        <p:spPr>
+          <a:xfrm>
+            <a:off x="3774831" y="1903040"/>
+            <a:ext cx="2657500" cy="1633398"/>
+          </a:xfrm>
+          <a:prstGeom prst="rect">
+            <a:avLst/>
+          </a:prstGeom>
+        </p:spPr>
+      </p:pic>
+      <p:sp>
+        <p:nvSpPr>
+          <p:cNvPr id="7" name="TextBox 6"/>
+          <p:cNvSpPr txBox="1"/>
+          <p:nvPr/>
+        </p:nvSpPr>
+        <p:spPr>
+          <a:xfrm>
+            <a:off x="3860799" y="2197154"/>
+            <a:ext cx="2375877" cy="492443"/>
+          </a:xfrm>
+          <a:prstGeom prst="rect">
+            <a:avLst/>
+          </a:prstGeom>
+          <a:noFill/>
+        </p:spPr>
+        <p:txBody>
+          <a:bodyPr wrap="square" rtlCol="0">
+            <a:spAutoFit/>
+          </a:bodyPr>
+          <a:lstStyle/>
+          <a:p>
+            <a:r>
+              <a:rPr lang="en-US" sz="1300" dirty="0" smtClean="0"/>
+              <a:t>Physics Online Assignment 1</a:t>
+            </a:r>
+          </a:p>
+          <a:p>
+            <a:r>
+              <a:rPr lang="en-US" sz="1300" dirty="0" smtClean="0"/>
+              <a:t>CS2101 Reflection</a:t>
+            </a:r>
+            <a:endParaRPr lang="en-MY" sz="1300" dirty="0"/>
+          </a:p>
+        </p:txBody>
+      </p:sp>
+      <p:sp>
+        <p:nvSpPr>
+          <p:cNvPr id="8" name="Rectangle 7"/>
+          <p:cNvSpPr/>
+          <p:nvPr/>
+        </p:nvSpPr>
+        <p:spPr>
+          <a:xfrm>
+            <a:off x="5955323" y="2289908"/>
+            <a:ext cx="125046" cy="117231"/>
+          </a:xfrm>
+          <a:prstGeom prst="rect">
+            <a:avLst/>
+          </a:prstGeom>
+          <a:noFill/>
+        </p:spPr>
+        <p:style>
+          <a:lnRef idx="2">
+            <a:schemeClr val="dk1">
+              <a:shade val="50000"/>
+            </a:schemeClr>
+          </a:lnRef>
+          <a:fillRef idx="1">
+            <a:schemeClr val="dk1"/>
+          </a:fillRef>
+          <a:effectRef idx="0">
+            <a:schemeClr val="dk1"/>
+          </a:effectRef>
+          <a:fontRef idx="minor">
+            <a:schemeClr val="lt1"/>
+          </a:fontRef>
+        </p:style>
+        <p:txBody>
+          <a:bodyPr rtlCol="0" anchor="ctr"/>
+          <a:lstStyle/>
+          <a:p>
+            <a:pPr algn="ctr"/>
+            <a:endParaRPr lang="en-MY"/>
+          </a:p>
+        </p:txBody>
+      </p:sp>
+      <p:sp>
+        <p:nvSpPr>
+          <p:cNvPr id="9" name="Rectangle 8"/>
+          <p:cNvSpPr/>
+          <p:nvPr/>
+        </p:nvSpPr>
+        <p:spPr>
+          <a:xfrm>
+            <a:off x="5955323" y="2443375"/>
+            <a:ext cx="125046" cy="117231"/>
+          </a:xfrm>
+          <a:prstGeom prst="rect">
+            <a:avLst/>
+          </a:prstGeom>
+          <a:noFill/>
+        </p:spPr>
+        <p:style>
+          <a:lnRef idx="2">
+            <a:schemeClr val="dk1">
+              <a:shade val="50000"/>
+            </a:schemeClr>
+          </a:lnRef>
+          <a:fillRef idx="1">
+            <a:schemeClr val="dk1"/>
+          </a:fillRef>
+          <a:effectRef idx="0">
+            <a:schemeClr val="dk1"/>
+          </a:effectRef>
+          <a:fontRef idx="minor">
+            <a:schemeClr val="lt1"/>
+          </a:fontRef>
+        </p:style>
+        <p:txBody>
+          <a:bodyPr rtlCol="0" anchor="ctr"/>
+          <a:lstStyle/>
+          <a:p>
+            <a:pPr algn="ctr"/>
+            <a:endParaRPr lang="en-MY"/>
+          </a:p>
+        </p:txBody>
+      </p:sp>
+      <p:cxnSp>
+        <p:nvCxnSpPr>
+          <p:cNvPr id="15" name="Straight Connector 14"/>
+          <p:cNvCxnSpPr/>
+          <p:nvPr/>
+        </p:nvCxnSpPr>
+        <p:spPr>
+          <a:xfrm>
+            <a:off x="5955323" y="2289908"/>
+            <a:ext cx="125046" cy="117231"/>
+          </a:xfrm>
+          <a:prstGeom prst="line">
+            <a:avLst/>
+          </a:prstGeom>
+        </p:spPr>
+        <p:style>
+          <a:lnRef idx="1">
+            <a:schemeClr val="dk1"/>
+          </a:lnRef>
+          <a:fillRef idx="0">
+            <a:schemeClr val="dk1"/>
+          </a:fillRef>
+          <a:effectRef idx="0">
+            <a:schemeClr val="dk1"/>
+          </a:effectRef>
+          <a:fontRef idx="minor">
+            <a:schemeClr val="tx1"/>
+          </a:fontRef>
+        </p:style>
+      </p:cxnSp>
+      <p:cxnSp>
+        <p:nvCxnSpPr>
+          <p:cNvPr id="19" name="Straight Connector 18"/>
+          <p:cNvCxnSpPr/>
+          <p:nvPr/>
+        </p:nvCxnSpPr>
+        <p:spPr>
+          <a:xfrm flipH="1">
+            <a:off x="5955324" y="2289908"/>
+            <a:ext cx="125045" cy="117231"/>
+          </a:xfrm>
+          <a:prstGeom prst="line">
+            <a:avLst/>
+          </a:prstGeom>
+        </p:spPr>
+        <p:style>
+          <a:lnRef idx="1">
+            <a:schemeClr val="dk1"/>
+          </a:lnRef>
+          <a:fillRef idx="0">
+            <a:schemeClr val="dk1"/>
+          </a:fillRef>
+          <a:effectRef idx="0">
+            <a:schemeClr val="dk1"/>
+          </a:effectRef>
+          <a:fontRef idx="minor">
+            <a:schemeClr val="tx1"/>
+          </a:fontRef>
+        </p:style>
+      </p:cxnSp>
+      <p:pic>
+        <p:nvPicPr>
+          <p:cNvPr id="26" name="Picture 25"/>
+          <p:cNvPicPr>
+            <a:picLocks noChangeAspect="1"/>
+          </p:cNvPicPr>
+          <p:nvPr/>
+        </p:nvPicPr>
+        <p:blipFill>
+          <a:blip r:embed="rId5" cstate="print">
+            <a:extLst>
+              <a:ext uri="{28A0092B-C50C-407E-A947-70E740481C1C}">
+                <a14:useLocalDpi xmlns:a14="http://schemas.microsoft.com/office/drawing/2010/main" val="0"/>
+              </a:ext>
+            </a:extLst>
+          </a:blip>
+          <a:stretch>
+            <a:fillRect/>
+          </a:stretch>
+        </p:blipFill>
+        <p:spPr>
+          <a:xfrm>
+            <a:off x="2747573" y="1931700"/>
+            <a:ext cx="3602915" cy="3602915"/>
+          </a:xfrm>
+          <a:prstGeom prst="rect">
+            <a:avLst/>
+          </a:prstGeom>
+        </p:spPr>
+      </p:pic>
+    </p:spTree>
+    <p:extLst>
+      <p:ext uri="{BB962C8B-B14F-4D97-AF65-F5344CB8AC3E}">
+        <p14:creationId xmlns:p14="http://schemas.microsoft.com/office/powerpoint/2010/main" val="1986105484"/>
+      </p:ext>
+    </p:extLst>
+  </p:cSld>
+  <p:clrMapOvr>
+    <a:masterClrMapping/>
+  </p:clrMapOvr>
+  <p:timing>
+    <p:tnLst>
+      <p:par>
+        <p:cTn id="1" dur="indefinite" restart="never" nodeType="tmRoot">
+          <p:childTnLst>
+            <p:seq concurrent="1" nextAc="seek">
+              <p:cTn id="2" dur="indefinite" nodeType="mainSeq">
+                <p:childTnLst>
+                  <p:par>
+                    <p:cTn id="3" fill="hold">
+                      <p:stCondLst>
+                        <p:cond delay="indefinite"/>
+                      </p:stCondLst>
+                      <p:childTnLst>
+                        <p:par>
+                          <p:cTn id="4" fill="hold">
+                            <p:stCondLst>
+                              <p:cond delay="0"/>
+                            </p:stCondLst>
+                            <p:childTnLst>
+                              <p:par>
+                                <p:cTn id="5" presetID="2" presetClass="entr" presetSubtype="4" fill="hold" nodeType="clickEffect">
+                                  <p:stCondLst>
+                                    <p:cond delay="0"/>
+                                  </p:stCondLst>
+                                  <p:childTnLst>
+                                    <p:set>
+                                      <p:cBhvr>
+                                        <p:cTn id="6" dur="1" fill="hold">
+                                          <p:stCondLst>
+                                            <p:cond delay="0"/>
+                                          </p:stCondLst>
+                                        </p:cTn>
+                                        <p:tgtEl>
+                                          <p:spTgt spid="5"/>
+                                        </p:tgtEl>
+                                        <p:attrNameLst>
+                                          <p:attrName>style.visibility</p:attrName>
+                                        </p:attrNameLst>
+                                      </p:cBhvr>
+                                      <p:to>
+                                        <p:strVal val="visible"/>
+                                      </p:to>
+                                    </p:set>
+                                    <p:anim calcmode="lin" valueType="num">
+                                      <p:cBhvr additive="base">
+                                        <p:cTn id="7" dur="500" fill="hold"/>
+                                        <p:tgtEl>
+                                          <p:spTgt spid="5"/>
+                                        </p:tgtEl>
+                                        <p:attrNameLst>
+                                          <p:attrName>ppt_x</p:attrName>
+                                        </p:attrNameLst>
+                                      </p:cBhvr>
+                                      <p:tavLst>
+                                        <p:tav tm="0">
+                                          <p:val>
+                                            <p:strVal val="#ppt_x"/>
+                                          </p:val>
+                                        </p:tav>
+                                        <p:tav tm="100000">
+                                          <p:val>
+                                            <p:strVal val="#ppt_x"/>
+                                          </p:val>
+                                        </p:tav>
+                                      </p:tavLst>
+                                    </p:anim>
+                                    <p:anim calcmode="lin" valueType="num">
+                                      <p:cBhvr additive="base">
+                                        <p:cTn id="8" dur="500" fill="hold"/>
+                                        <p:tgtEl>
+                                          <p:spTgt spid="5"/>
+                                        </p:tgtEl>
+                                        <p:attrNameLst>
+                                          <p:attrName>ppt_y</p:attrName>
+                                        </p:attrNameLst>
+                                      </p:cBhvr>
+                                      <p:tavLst>
+                                        <p:tav tm="0">
+                                          <p:val>
+                                            <p:strVal val="1+#ppt_h/2"/>
+                                          </p:val>
+                                        </p:tav>
+                                        <p:tav tm="100000">
+                                          <p:val>
+                                            <p:strVal val="#ppt_y"/>
+                                          </p:val>
+                                        </p:tav>
+                                      </p:tavLst>
+                                    </p:anim>
+                                  </p:childTnLst>
+                                </p:cTn>
+                              </p:par>
+                              <p:par>
+                                <p:cTn id="9" presetID="2" presetClass="entr" presetSubtype="4" fill="hold" nodeType="withEffect">
+                                  <p:stCondLst>
+                                    <p:cond delay="0"/>
+                                  </p:stCondLst>
+                                  <p:childTnLst>
+                                    <p:set>
+                                      <p:cBhvr>
+                                        <p:cTn id="10" dur="1" fill="hold">
+                                          <p:stCondLst>
+                                            <p:cond delay="0"/>
+                                          </p:stCondLst>
+                                        </p:cTn>
+                                        <p:tgtEl>
+                                          <p:spTgt spid="4"/>
+                                        </p:tgtEl>
+                                        <p:attrNameLst>
+                                          <p:attrName>style.visibility</p:attrName>
+                                        </p:attrNameLst>
+                                      </p:cBhvr>
+                                      <p:to>
+                                        <p:strVal val="visible"/>
+                                      </p:to>
+                                    </p:set>
+                                    <p:anim calcmode="lin" valueType="num">
+                                      <p:cBhvr additive="base">
+                                        <p:cTn id="11" dur="500" fill="hold"/>
+                                        <p:tgtEl>
+                                          <p:spTgt spid="4"/>
+                                        </p:tgtEl>
+                                        <p:attrNameLst>
+                                          <p:attrName>ppt_x</p:attrName>
+                                        </p:attrNameLst>
+                                      </p:cBhvr>
+                                      <p:tavLst>
+                                        <p:tav tm="0">
+                                          <p:val>
+                                            <p:strVal val="#ppt_x"/>
+                                          </p:val>
+                                        </p:tav>
+                                        <p:tav tm="100000">
+                                          <p:val>
+                                            <p:strVal val="#ppt_x"/>
+                                          </p:val>
+                                        </p:tav>
+                                      </p:tavLst>
+                                    </p:anim>
+                                    <p:anim calcmode="lin" valueType="num">
+                                      <p:cBhvr additive="base">
+                                        <p:cTn id="12" dur="500" fill="hold"/>
+                                        <p:tgtEl>
+                                          <p:spTgt spid="4"/>
+                                        </p:tgtEl>
+                                        <p:attrNameLst>
+                                          <p:attrName>ppt_y</p:attrName>
+                                        </p:attrNameLst>
+                                      </p:cBhvr>
+                                      <p:tavLst>
+                                        <p:tav tm="0">
+                                          <p:val>
+                                            <p:strVal val="1+#ppt_h/2"/>
+                                          </p:val>
+                                        </p:tav>
+                                        <p:tav tm="100000">
+                                          <p:val>
+                                            <p:strVal val="#ppt_y"/>
+                                          </p:val>
+                                        </p:tav>
+                                      </p:tavLst>
+                                    </p:anim>
+                                  </p:childTnLst>
+                                </p:cTn>
+                              </p:par>
+                            </p:childTnLst>
+                          </p:cTn>
+                        </p:par>
+                      </p:childTnLst>
+                    </p:cTn>
+                  </p:par>
+                  <p:par>
+                    <p:cTn id="13" fill="hold">
+                      <p:stCondLst>
+                        <p:cond delay="indefinite"/>
+                      </p:stCondLst>
+                      <p:childTnLst>
+                        <p:par>
+                          <p:cTn id="14" fill="hold">
+                            <p:stCondLst>
+                              <p:cond delay="0"/>
+                            </p:stCondLst>
+                            <p:childTnLst>
+                              <p:par>
+                                <p:cTn id="15" presetID="42" presetClass="entr" presetSubtype="0" fill="hold" nodeType="clickEffect">
+                                  <p:stCondLst>
+                                    <p:cond delay="0"/>
+                                  </p:stCondLst>
+                                  <p:childTnLst>
+                                    <p:set>
+                                      <p:cBhvr>
+                                        <p:cTn id="16" dur="1" fill="hold">
+                                          <p:stCondLst>
+                                            <p:cond delay="0"/>
+                                          </p:stCondLst>
+                                        </p:cTn>
+                                        <p:tgtEl>
+                                          <p:spTgt spid="15"/>
+                                        </p:tgtEl>
+                                        <p:attrNameLst>
+                                          <p:attrName>style.visibility</p:attrName>
+                                        </p:attrNameLst>
+                                      </p:cBhvr>
+                                      <p:to>
+                                        <p:strVal val="visible"/>
+                                      </p:to>
+                                    </p:set>
+                                    <p:animEffect transition="in" filter="fade">
+                                      <p:cBhvr>
+                                        <p:cTn id="17" dur="1000"/>
+                                        <p:tgtEl>
+                                          <p:spTgt spid="15"/>
+                                        </p:tgtEl>
+                                      </p:cBhvr>
+                                    </p:animEffect>
+                                    <p:anim calcmode="lin" valueType="num">
+                                      <p:cBhvr>
+                                        <p:cTn id="18" dur="1000" fill="hold"/>
+                                        <p:tgtEl>
+                                          <p:spTgt spid="15"/>
+                                        </p:tgtEl>
+                                        <p:attrNameLst>
+                                          <p:attrName>ppt_x</p:attrName>
+                                        </p:attrNameLst>
+                                      </p:cBhvr>
+                                      <p:tavLst>
+                                        <p:tav tm="0">
+                                          <p:val>
+                                            <p:strVal val="#ppt_x"/>
+                                          </p:val>
+                                        </p:tav>
+                                        <p:tav tm="100000">
+                                          <p:val>
+                                            <p:strVal val="#ppt_x"/>
+                                          </p:val>
+                                        </p:tav>
+                                      </p:tavLst>
+                                    </p:anim>
+                                    <p:anim calcmode="lin" valueType="num">
+                                      <p:cBhvr>
+                                        <p:cTn id="19" dur="1000" fill="hold"/>
+                                        <p:tgtEl>
+                                          <p:spTgt spid="15"/>
+                                        </p:tgtEl>
+                                        <p:attrNameLst>
+                                          <p:attrName>ppt_y</p:attrName>
+                                        </p:attrNameLst>
+                                      </p:cBhvr>
+                                      <p:tavLst>
+                                        <p:tav tm="0">
+                                          <p:val>
+                                            <p:strVal val="#ppt_y+.1"/>
+                                          </p:val>
+                                        </p:tav>
+                                        <p:tav tm="100000">
+                                          <p:val>
+                                            <p:strVal val="#ppt_y"/>
+                                          </p:val>
+                                        </p:tav>
+                                      </p:tavLst>
+                                    </p:anim>
+                                  </p:childTnLst>
+                                </p:cTn>
+                              </p:par>
+                              <p:par>
+                                <p:cTn id="20" presetID="42" presetClass="entr" presetSubtype="0" fill="hold" nodeType="withEffect">
+                                  <p:stCondLst>
+                                    <p:cond delay="0"/>
+                                  </p:stCondLst>
+                                  <p:childTnLst>
+                                    <p:set>
+                                      <p:cBhvr>
+                                        <p:cTn id="21" dur="1" fill="hold">
+                                          <p:stCondLst>
+                                            <p:cond delay="0"/>
+                                          </p:stCondLst>
+                                        </p:cTn>
+                                        <p:tgtEl>
+                                          <p:spTgt spid="19"/>
+                                        </p:tgtEl>
+                                        <p:attrNameLst>
+                                          <p:attrName>style.visibility</p:attrName>
+                                        </p:attrNameLst>
+                                      </p:cBhvr>
+                                      <p:to>
+                                        <p:strVal val="visible"/>
+                                      </p:to>
+                                    </p:set>
+                                    <p:animEffect transition="in" filter="fade">
+                                      <p:cBhvr>
+                                        <p:cTn id="22" dur="1000"/>
+                                        <p:tgtEl>
+                                          <p:spTgt spid="19"/>
+                                        </p:tgtEl>
+                                      </p:cBhvr>
+                                    </p:animEffect>
+                                    <p:anim calcmode="lin" valueType="num">
+                                      <p:cBhvr>
+                                        <p:cTn id="23" dur="1000" fill="hold"/>
+                                        <p:tgtEl>
+                                          <p:spTgt spid="19"/>
+                                        </p:tgtEl>
+                                        <p:attrNameLst>
+                                          <p:attrName>ppt_x</p:attrName>
+                                        </p:attrNameLst>
+                                      </p:cBhvr>
+                                      <p:tavLst>
+                                        <p:tav tm="0">
+                                          <p:val>
+                                            <p:strVal val="#ppt_x"/>
+                                          </p:val>
+                                        </p:tav>
+                                        <p:tav tm="100000">
+                                          <p:val>
+                                            <p:strVal val="#ppt_x"/>
+                                          </p:val>
+                                        </p:tav>
+                                      </p:tavLst>
+                                    </p:anim>
+                                    <p:anim calcmode="lin" valueType="num">
+                                      <p:cBhvr>
+                                        <p:cTn id="24" dur="1000" fill="hold"/>
+                                        <p:tgtEl>
+                                          <p:spTgt spid="19"/>
+                                        </p:tgtEl>
+                                        <p:attrNameLst>
+                                          <p:attrName>ppt_y</p:attrName>
+                                        </p:attrNameLst>
+                                      </p:cBhvr>
+                                      <p:tavLst>
+                                        <p:tav tm="0">
+                                          <p:val>
+                                            <p:strVal val="#ppt_y+.1"/>
+                                          </p:val>
+                                        </p:tav>
+                                        <p:tav tm="100000">
+                                          <p:val>
+                                            <p:strVal val="#ppt_y"/>
+                                          </p:val>
+                                        </p:tav>
+                                      </p:tavLst>
+                                    </p:anim>
+                                  </p:childTnLst>
+                                </p:cTn>
+                              </p:par>
+                              <p:par>
+                                <p:cTn id="25" presetID="42" presetClass="entr" presetSubtype="0" fill="hold" grpId="0" nodeType="withEffect">
+                                  <p:stCondLst>
+                                    <p:cond delay="0"/>
+                                  </p:stCondLst>
+                                  <p:childTnLst>
+                                    <p:set>
+                                      <p:cBhvr>
+                                        <p:cTn id="26" dur="1" fill="hold">
+                                          <p:stCondLst>
+                                            <p:cond delay="0"/>
+                                          </p:stCondLst>
+                                        </p:cTn>
+                                        <p:tgtEl>
+                                          <p:spTgt spid="8"/>
+                                        </p:tgtEl>
+                                        <p:attrNameLst>
+                                          <p:attrName>style.visibility</p:attrName>
+                                        </p:attrNameLst>
+                                      </p:cBhvr>
+                                      <p:to>
+                                        <p:strVal val="visible"/>
+                                      </p:to>
+                                    </p:set>
+                                    <p:animEffect transition="in" filter="fade">
+                                      <p:cBhvr>
+                                        <p:cTn id="27" dur="1000"/>
+                                        <p:tgtEl>
+                                          <p:spTgt spid="8"/>
+                                        </p:tgtEl>
+                                      </p:cBhvr>
+                                    </p:animEffect>
+                                    <p:anim calcmode="lin" valueType="num">
+                                      <p:cBhvr>
+                                        <p:cTn id="28" dur="1000" fill="hold"/>
+                                        <p:tgtEl>
+                                          <p:spTgt spid="8"/>
+                                        </p:tgtEl>
+                                        <p:attrNameLst>
+                                          <p:attrName>ppt_x</p:attrName>
+                                        </p:attrNameLst>
+                                      </p:cBhvr>
+                                      <p:tavLst>
+                                        <p:tav tm="0">
+                                          <p:val>
+                                            <p:strVal val="#ppt_x"/>
+                                          </p:val>
+                                        </p:tav>
+                                        <p:tav tm="100000">
+                                          <p:val>
+                                            <p:strVal val="#ppt_x"/>
+                                          </p:val>
+                                        </p:tav>
+                                      </p:tavLst>
+                                    </p:anim>
+                                    <p:anim calcmode="lin" valueType="num">
+                                      <p:cBhvr>
+                                        <p:cTn id="29" dur="1000" fill="hold"/>
+                                        <p:tgtEl>
+                                          <p:spTgt spid="8"/>
+                                        </p:tgtEl>
+                                        <p:attrNameLst>
+                                          <p:attrName>ppt_y</p:attrName>
+                                        </p:attrNameLst>
+                                      </p:cBhvr>
+                                      <p:tavLst>
+                                        <p:tav tm="0">
+                                          <p:val>
+                                            <p:strVal val="#ppt_y+.1"/>
+                                          </p:val>
+                                        </p:tav>
+                                        <p:tav tm="100000">
+                                          <p:val>
+                                            <p:strVal val="#ppt_y"/>
+                                          </p:val>
+                                        </p:tav>
+                                      </p:tavLst>
+                                    </p:anim>
+                                  </p:childTnLst>
+                                </p:cTn>
+                              </p:par>
+                              <p:par>
+                                <p:cTn id="30" presetID="42" presetClass="entr" presetSubtype="0" fill="hold" grpId="0" nodeType="withEffect">
+                                  <p:stCondLst>
+                                    <p:cond delay="0"/>
+                                  </p:stCondLst>
+                                  <p:childTnLst>
+                                    <p:set>
+                                      <p:cBhvr>
+                                        <p:cTn id="31" dur="1" fill="hold">
+                                          <p:stCondLst>
+                                            <p:cond delay="0"/>
+                                          </p:stCondLst>
+                                        </p:cTn>
+                                        <p:tgtEl>
+                                          <p:spTgt spid="9"/>
+                                        </p:tgtEl>
+                                        <p:attrNameLst>
+                                          <p:attrName>style.visibility</p:attrName>
+                                        </p:attrNameLst>
+                                      </p:cBhvr>
+                                      <p:to>
+                                        <p:strVal val="visible"/>
+                                      </p:to>
+                                    </p:set>
+                                    <p:animEffect transition="in" filter="fade">
+                                      <p:cBhvr>
+                                        <p:cTn id="32" dur="1000"/>
+                                        <p:tgtEl>
+                                          <p:spTgt spid="9"/>
+                                        </p:tgtEl>
+                                      </p:cBhvr>
+                                    </p:animEffect>
+                                    <p:anim calcmode="lin" valueType="num">
+                                      <p:cBhvr>
+                                        <p:cTn id="33" dur="1000" fill="hold"/>
+                                        <p:tgtEl>
+                                          <p:spTgt spid="9"/>
+                                        </p:tgtEl>
+                                        <p:attrNameLst>
+                                          <p:attrName>ppt_x</p:attrName>
+                                        </p:attrNameLst>
+                                      </p:cBhvr>
+                                      <p:tavLst>
+                                        <p:tav tm="0">
+                                          <p:val>
+                                            <p:strVal val="#ppt_x"/>
+                                          </p:val>
+                                        </p:tav>
+                                        <p:tav tm="100000">
+                                          <p:val>
+                                            <p:strVal val="#ppt_x"/>
+                                          </p:val>
+                                        </p:tav>
+                                      </p:tavLst>
+                                    </p:anim>
+                                    <p:anim calcmode="lin" valueType="num">
+                                      <p:cBhvr>
+                                        <p:cTn id="34" dur="1000" fill="hold"/>
+                                        <p:tgtEl>
+                                          <p:spTgt spid="9"/>
+                                        </p:tgtEl>
+                                        <p:attrNameLst>
+                                          <p:attrName>ppt_y</p:attrName>
+                                        </p:attrNameLst>
+                                      </p:cBhvr>
+                                      <p:tavLst>
+                                        <p:tav tm="0">
+                                          <p:val>
+                                            <p:strVal val="#ppt_y+.1"/>
+                                          </p:val>
+                                        </p:tav>
+                                        <p:tav tm="100000">
+                                          <p:val>
+                                            <p:strVal val="#ppt_y"/>
+                                          </p:val>
+                                        </p:tav>
+                                      </p:tavLst>
+                                    </p:anim>
+                                  </p:childTnLst>
+                                </p:cTn>
+                              </p:par>
+                              <p:par>
+                                <p:cTn id="35" presetID="42" presetClass="entr" presetSubtype="0" fill="hold" grpId="0" nodeType="withEffect">
+                                  <p:stCondLst>
+                                    <p:cond delay="0"/>
+                                  </p:stCondLst>
+                                  <p:childTnLst>
+                                    <p:set>
+                                      <p:cBhvr>
+                                        <p:cTn id="36" dur="1" fill="hold">
+                                          <p:stCondLst>
+                                            <p:cond delay="0"/>
+                                          </p:stCondLst>
+                                        </p:cTn>
+                                        <p:tgtEl>
+                                          <p:spTgt spid="7"/>
+                                        </p:tgtEl>
+                                        <p:attrNameLst>
+                                          <p:attrName>style.visibility</p:attrName>
+                                        </p:attrNameLst>
+                                      </p:cBhvr>
+                                      <p:to>
+                                        <p:strVal val="visible"/>
+                                      </p:to>
+                                    </p:set>
+                                    <p:animEffect transition="in" filter="fade">
+                                      <p:cBhvr>
+                                        <p:cTn id="37" dur="1000"/>
+                                        <p:tgtEl>
+                                          <p:spTgt spid="7"/>
+                                        </p:tgtEl>
+                                      </p:cBhvr>
+                                    </p:animEffect>
+                                    <p:anim calcmode="lin" valueType="num">
+                                      <p:cBhvr>
+                                        <p:cTn id="38" dur="1000" fill="hold"/>
+                                        <p:tgtEl>
+                                          <p:spTgt spid="7"/>
+                                        </p:tgtEl>
+                                        <p:attrNameLst>
+                                          <p:attrName>ppt_x</p:attrName>
+                                        </p:attrNameLst>
+                                      </p:cBhvr>
+                                      <p:tavLst>
+                                        <p:tav tm="0">
+                                          <p:val>
+                                            <p:strVal val="#ppt_x"/>
+                                          </p:val>
+                                        </p:tav>
+                                        <p:tav tm="100000">
+                                          <p:val>
+                                            <p:strVal val="#ppt_x"/>
+                                          </p:val>
+                                        </p:tav>
+                                      </p:tavLst>
+                                    </p:anim>
+                                    <p:anim calcmode="lin" valueType="num">
+                                      <p:cBhvr>
+                                        <p:cTn id="39" dur="1000" fill="hold"/>
+                                        <p:tgtEl>
+                                          <p:spTgt spid="7"/>
+                                        </p:tgtEl>
+                                        <p:attrNameLst>
+                                          <p:attrName>ppt_y</p:attrName>
+                                        </p:attrNameLst>
+                                      </p:cBhvr>
+                                      <p:tavLst>
+                                        <p:tav tm="0">
+                                          <p:val>
+                                            <p:strVal val="#ppt_y+.1"/>
+                                          </p:val>
+                                        </p:tav>
+                                        <p:tav tm="100000">
+                                          <p:val>
+                                            <p:strVal val="#ppt_y"/>
+                                          </p:val>
+                                        </p:tav>
+                                      </p:tavLst>
+                                    </p:anim>
+                                  </p:childTnLst>
+                                </p:cTn>
+                              </p:par>
+                              <p:par>
+                                <p:cTn id="40" presetID="42" presetClass="entr" presetSubtype="0" fill="hold" nodeType="withEffect">
+                                  <p:stCondLst>
+                                    <p:cond delay="0"/>
+                                  </p:stCondLst>
+                                  <p:childTnLst>
+                                    <p:set>
+                                      <p:cBhvr>
+                                        <p:cTn id="41" dur="1" fill="hold">
+                                          <p:stCondLst>
+                                            <p:cond delay="0"/>
+                                          </p:stCondLst>
+                                        </p:cTn>
+                                        <p:tgtEl>
+                                          <p:spTgt spid="21"/>
+                                        </p:tgtEl>
+                                        <p:attrNameLst>
+                                          <p:attrName>style.visibility</p:attrName>
+                                        </p:attrNameLst>
+                                      </p:cBhvr>
+                                      <p:to>
+                                        <p:strVal val="visible"/>
+                                      </p:to>
+                                    </p:set>
+                                    <p:animEffect transition="in" filter="fade">
+                                      <p:cBhvr>
+                                        <p:cTn id="42" dur="1000"/>
+                                        <p:tgtEl>
+                                          <p:spTgt spid="21"/>
+                                        </p:tgtEl>
+                                      </p:cBhvr>
+                                    </p:animEffect>
+                                    <p:anim calcmode="lin" valueType="num">
+                                      <p:cBhvr>
+                                        <p:cTn id="43" dur="1000" fill="hold"/>
+                                        <p:tgtEl>
+                                          <p:spTgt spid="21"/>
+                                        </p:tgtEl>
+                                        <p:attrNameLst>
+                                          <p:attrName>ppt_x</p:attrName>
+                                        </p:attrNameLst>
+                                      </p:cBhvr>
+                                      <p:tavLst>
+                                        <p:tav tm="0">
+                                          <p:val>
+                                            <p:strVal val="#ppt_x"/>
+                                          </p:val>
+                                        </p:tav>
+                                        <p:tav tm="100000">
+                                          <p:val>
+                                            <p:strVal val="#ppt_x"/>
+                                          </p:val>
+                                        </p:tav>
+                                      </p:tavLst>
+                                    </p:anim>
+                                    <p:anim calcmode="lin" valueType="num">
+                                      <p:cBhvr>
+                                        <p:cTn id="44" dur="1000" fill="hold"/>
+                                        <p:tgtEl>
+                                          <p:spTgt spid="21"/>
+                                        </p:tgtEl>
+                                        <p:attrNameLst>
+                                          <p:attrName>ppt_y</p:attrName>
+                                        </p:attrNameLst>
+                                      </p:cBhvr>
+                                      <p:tavLst>
+                                        <p:tav tm="0">
+                                          <p:val>
+                                            <p:strVal val="#ppt_y+.1"/>
+                                          </p:val>
+                                        </p:tav>
+                                        <p:tav tm="100000">
+                                          <p:val>
+                                            <p:strVal val="#ppt_y"/>
+                                          </p:val>
+                                        </p:tav>
+                                      </p:tavLst>
+                                    </p:anim>
+                                  </p:childTnLst>
+                                </p:cTn>
+                              </p:par>
+                            </p:childTnLst>
+                          </p:cTn>
+                        </p:par>
+                      </p:childTnLst>
+                    </p:cTn>
+                  </p:par>
+                  <p:par>
+                    <p:cTn id="45" fill="hold">
+                      <p:stCondLst>
+                        <p:cond delay="indefinite"/>
+                      </p:stCondLst>
+                      <p:childTnLst>
+                        <p:par>
+                          <p:cTn id="46" fill="hold">
+                            <p:stCondLst>
+                              <p:cond delay="0"/>
+                            </p:stCondLst>
+                            <p:childTnLst>
+                              <p:par>
+                                <p:cTn id="47" presetID="1" presetClass="entr" presetSubtype="0" fill="hold" nodeType="clickEffect">
+                                  <p:stCondLst>
+                                    <p:cond delay="0"/>
+                                  </p:stCondLst>
+                                  <p:childTnLst>
+                                    <p:set>
+                                      <p:cBhvr>
+                                        <p:cTn id="48" dur="1" fill="hold">
+                                          <p:stCondLst>
+                                            <p:cond delay="0"/>
+                                          </p:stCondLst>
+                                        </p:cTn>
+                                        <p:tgtEl>
+                                          <p:spTgt spid="26"/>
+                                        </p:tgtEl>
+                                        <p:attrNameLst>
+                                          <p:attrName>style.visibility</p:attrName>
+                                        </p:attrNameLst>
+                                      </p:cBhvr>
+                                      <p:to>
+                                        <p:strVal val="visible"/>
+                                      </p:to>
+                                    </p:set>
+                                  </p:childTnLst>
+                                </p:cTn>
+                              </p:par>
+                            </p:childTnLst>
+                          </p:cTn>
+                        </p:par>
+                      </p:childTnLst>
+                    </p:cTn>
+                  </p:par>
+                </p:childTnLst>
+              </p:cTn>
+              <p:prevCondLst>
+                <p:cond evt="onPrev" delay="0">
+                  <p:tgtEl>
+                    <p:sldTgt/>
+                  </p:tgtEl>
+                </p:cond>
+              </p:prevCondLst>
+              <p:nextCondLst>
+                <p:cond evt="onNext" delay="0">
+                  <p:tgtEl>
+                    <p:sldTgt/>
+                  </p:tgtEl>
+                </p:cond>
+              </p:nextCondLst>
+            </p:seq>
+          </p:childTnLst>
+        </p:cTn>
+      </p:par>
+    </p:tnLst>
+    <p:bldLst>
+      <p:bldP spid="7" grpId="0"/>
+      <p:bldP spid="8" grpId="0" animBg="1"/>
+      <p:bldP spid="9" grpId="0" animBg="1"/>
+    </p:bldLst>
+  </p:timing>
+</p:sld>
+</file>
+
 <file path=ppt/slides/slide3.xml><?xml version="1.0" encoding="utf-8"?>
 <p:sld xmlns:a="http://schemas.openxmlformats.org/drawingml/2006/main" xmlns:r="http://schemas.openxmlformats.org/officeDocument/2006/relationships" xmlns:p="http://schemas.openxmlformats.org/presentationml/2006/main">
   <p:cSld>

</xml_diff>

<commit_message>
Revert "Changes the goal of the product of my script"
This reverts commit 09e39768ed241ab8afd6e6f436913e9d4e2fec13.
</commit_message>
<xml_diff>
--- a/Task Catalyst Introduction.pptx
+++ b/Task Catalyst Introduction.pptx
@@ -28,12 +28,6 @@
     <p:sldId id="276" r:id="rId22"/>
     <p:sldId id="277" r:id="rId23"/>
     <p:sldId id="278" r:id="rId24"/>
-    <p:sldId id="280" r:id="rId25"/>
-    <p:sldId id="281" r:id="rId26"/>
-    <p:sldId id="282" r:id="rId27"/>
-    <p:sldId id="283" r:id="rId28"/>
-    <p:sldId id="284" r:id="rId29"/>
-    <p:sldId id="285" r:id="rId30"/>
   </p:sldIdLst>
   <p:sldSz cx="9144000" cy="6858000" type="screen4x3"/>
   <p:notesSz cx="6858000" cy="9144000"/>
@@ -132,11 +126,6 @@
       </a:defRPr>
     </a:lvl9pPr>
   </p:defaultTextStyle>
-  <p:extLst>
-    <p:ext uri="{EFAFB233-063F-42B5-8137-9DF3F51BA10A}">
-      <p15:sldGuideLst xmlns:p15="http://schemas.microsoft.com/office/powerpoint/2012/main"/>
-    </p:ext>
-  </p:extLst>
 </p:presentation>
 </file>
 
@@ -271,7 +260,7 @@
           <a:p>
             <a:fld id="{4B7C30BC-8773-4969-A17E-EC79D4EB08B4}" type="datetimeFigureOut">
               <a:rPr lang="en-US" smtClean="0"/>
-              <a:t>8/31/2014</a:t>
+              <a:t>08/30/14</a:t>
             </a:fld>
             <a:endParaRPr lang="en-US"/>
           </a:p>
@@ -441,7 +430,7 @@
           <a:p>
             <a:fld id="{4B7C30BC-8773-4969-A17E-EC79D4EB08B4}" type="datetimeFigureOut">
               <a:rPr lang="en-US" smtClean="0"/>
-              <a:t>8/31/2014</a:t>
+              <a:t>08/30/14</a:t>
             </a:fld>
             <a:endParaRPr lang="en-US"/>
           </a:p>
@@ -621,7 +610,7 @@
           <a:p>
             <a:fld id="{4B7C30BC-8773-4969-A17E-EC79D4EB08B4}" type="datetimeFigureOut">
               <a:rPr lang="en-US" smtClean="0"/>
-              <a:t>8/31/2014</a:t>
+              <a:t>08/30/14</a:t>
             </a:fld>
             <a:endParaRPr lang="en-US"/>
           </a:p>
@@ -791,7 +780,7 @@
           <a:p>
             <a:fld id="{4B7C30BC-8773-4969-A17E-EC79D4EB08B4}" type="datetimeFigureOut">
               <a:rPr lang="en-US" smtClean="0"/>
-              <a:t>8/31/2014</a:t>
+              <a:t>08/30/14</a:t>
             </a:fld>
             <a:endParaRPr lang="en-US"/>
           </a:p>
@@ -1035,7 +1024,7 @@
           <a:p>
             <a:fld id="{4B7C30BC-8773-4969-A17E-EC79D4EB08B4}" type="datetimeFigureOut">
               <a:rPr lang="en-US" smtClean="0"/>
-              <a:t>8/31/2014</a:t>
+              <a:t>08/30/14</a:t>
             </a:fld>
             <a:endParaRPr lang="en-US"/>
           </a:p>
@@ -1267,7 +1256,7 @@
           <a:p>
             <a:fld id="{4B7C30BC-8773-4969-A17E-EC79D4EB08B4}" type="datetimeFigureOut">
               <a:rPr lang="en-US" smtClean="0"/>
-              <a:t>8/31/2014</a:t>
+              <a:t>08/30/14</a:t>
             </a:fld>
             <a:endParaRPr lang="en-US"/>
           </a:p>
@@ -1634,7 +1623,7 @@
           <a:p>
             <a:fld id="{4B7C30BC-8773-4969-A17E-EC79D4EB08B4}" type="datetimeFigureOut">
               <a:rPr lang="en-US" smtClean="0"/>
-              <a:t>8/31/2014</a:t>
+              <a:t>08/30/14</a:t>
             </a:fld>
             <a:endParaRPr lang="en-US"/>
           </a:p>
@@ -1752,7 +1741,7 @@
           <a:p>
             <a:fld id="{4B7C30BC-8773-4969-A17E-EC79D4EB08B4}" type="datetimeFigureOut">
               <a:rPr lang="en-US" smtClean="0"/>
-              <a:t>8/31/2014</a:t>
+              <a:t>08/30/14</a:t>
             </a:fld>
             <a:endParaRPr lang="en-US"/>
           </a:p>
@@ -1847,7 +1836,7 @@
           <a:p>
             <a:fld id="{4B7C30BC-8773-4969-A17E-EC79D4EB08B4}" type="datetimeFigureOut">
               <a:rPr lang="en-US" smtClean="0"/>
-              <a:t>8/31/2014</a:t>
+              <a:t>08/30/14</a:t>
             </a:fld>
             <a:endParaRPr lang="en-US"/>
           </a:p>
@@ -2124,7 +2113,7 @@
           <a:p>
             <a:fld id="{4B7C30BC-8773-4969-A17E-EC79D4EB08B4}" type="datetimeFigureOut">
               <a:rPr lang="en-US" smtClean="0"/>
-              <a:t>8/31/2014</a:t>
+              <a:t>08/30/14</a:t>
             </a:fld>
             <a:endParaRPr lang="en-US"/>
           </a:p>
@@ -2381,7 +2370,7 @@
           <a:p>
             <a:fld id="{4B7C30BC-8773-4969-A17E-EC79D4EB08B4}" type="datetimeFigureOut">
               <a:rPr lang="en-US" smtClean="0"/>
-              <a:t>8/31/2014</a:t>
+              <a:t>08/30/14</a:t>
             </a:fld>
             <a:endParaRPr lang="en-US"/>
           </a:p>
@@ -2594,7 +2583,7 @@
           <a:p>
             <a:fld id="{4B7C30BC-8773-4969-A17E-EC79D4EB08B4}" type="datetimeFigureOut">
               <a:rPr lang="en-US" smtClean="0"/>
-              <a:t>8/31/2014</a:t>
+              <a:t>08/30/14</a:t>
             </a:fld>
             <a:endParaRPr lang="en-US"/>
           </a:p>
@@ -8990,4341 +8979,6 @@
 </p:sld>
 </file>
 
-<file path=ppt/slides/slide24.xml><?xml version="1.0" encoding="utf-8"?>
-<p:sld xmlns:a="http://schemas.openxmlformats.org/drawingml/2006/main" xmlns:r="http://schemas.openxmlformats.org/officeDocument/2006/relationships" xmlns:p="http://schemas.openxmlformats.org/presentationml/2006/main">
-  <p:cSld>
-    <p:spTree>
-      <p:nvGrpSpPr>
-        <p:cNvPr id="1" name=""/>
-        <p:cNvGrpSpPr/>
-        <p:nvPr/>
-      </p:nvGrpSpPr>
-      <p:grpSpPr>
-        <a:xfrm>
-          <a:off x="0" y="0"/>
-          <a:ext cx="0" cy="0"/>
-          <a:chOff x="0" y="0"/>
-          <a:chExt cx="0" cy="0"/>
-        </a:xfrm>
-      </p:grpSpPr>
-      <p:sp>
-        <p:nvSpPr>
-          <p:cNvPr id="2" name="Title 1"/>
-          <p:cNvSpPr>
-            <a:spLocks noGrp="1"/>
-          </p:cNvSpPr>
-          <p:nvPr>
-            <p:ph type="title"/>
-          </p:nvPr>
-        </p:nvSpPr>
-        <p:spPr/>
-        <p:txBody>
-          <a:bodyPr/>
-          <a:lstStyle/>
-          <a:p>
-            <a:pPr algn="ctr"/>
-            <a:r>
-              <a:rPr lang="en-US" dirty="0" smtClean="0"/>
-              <a:t>Task Catalyst</a:t>
-            </a:r>
-            <a:endParaRPr lang="en-MY" dirty="0"/>
-          </a:p>
-        </p:txBody>
-      </p:sp>
-      <p:pic>
-        <p:nvPicPr>
-          <p:cNvPr id="4" name="Content Placeholder 3"/>
-          <p:cNvPicPr>
-            <a:picLocks noGrp="1" noChangeAspect="1"/>
-          </p:cNvPicPr>
-          <p:nvPr>
-            <p:ph idx="1"/>
-          </p:nvPr>
-        </p:nvPicPr>
-        <p:blipFill>
-          <a:blip r:embed="rId2">
-            <a:extLst>
-              <a:ext uri="{28A0092B-C50C-407E-A947-70E740481C1C}">
-                <a14:useLocalDpi xmlns:a14="http://schemas.microsoft.com/office/drawing/2010/main" val="0"/>
-              </a:ext>
-            </a:extLst>
-          </a:blip>
-          <a:stretch>
-            <a:fillRect/>
-          </a:stretch>
-        </p:blipFill>
-        <p:spPr>
-          <a:xfrm>
-            <a:off x="628650" y="2883694"/>
-            <a:ext cx="2743200" cy="1828800"/>
-          </a:xfrm>
-        </p:spPr>
-      </p:pic>
-      <p:pic>
-        <p:nvPicPr>
-          <p:cNvPr id="5" name="Picture 4"/>
-          <p:cNvPicPr>
-            <a:picLocks noChangeAspect="1"/>
-          </p:cNvPicPr>
-          <p:nvPr/>
-        </p:nvPicPr>
-        <p:blipFill>
-          <a:blip r:embed="rId3">
-            <a:extLst>
-              <a:ext uri="{28A0092B-C50C-407E-A947-70E740481C1C}">
-                <a14:useLocalDpi xmlns:a14="http://schemas.microsoft.com/office/drawing/2010/main" val="0"/>
-              </a:ext>
-            </a:extLst>
-          </a:blip>
-          <a:stretch>
-            <a:fillRect/>
-          </a:stretch>
-        </p:blipFill>
-        <p:spPr>
-          <a:xfrm>
-            <a:off x="4574001" y="2693194"/>
-            <a:ext cx="3941349" cy="2215356"/>
-          </a:xfrm>
-          <a:prstGeom prst="rect">
-            <a:avLst/>
-          </a:prstGeom>
-        </p:spPr>
-      </p:pic>
-      <p:cxnSp>
-        <p:nvCxnSpPr>
-          <p:cNvPr id="7" name="Straight Arrow Connector 6"/>
-          <p:cNvCxnSpPr>
-            <a:stCxn id="2" idx="2"/>
-            <a:endCxn id="4" idx="0"/>
-          </p:cNvCxnSpPr>
-          <p:nvPr/>
-        </p:nvCxnSpPr>
-        <p:spPr>
-          <a:xfrm flipH="1">
-            <a:off x="2000250" y="1690689"/>
-            <a:ext cx="2571750" cy="1193005"/>
-          </a:xfrm>
-          <a:prstGeom prst="straightConnector1">
-            <a:avLst/>
-          </a:prstGeom>
-          <a:ln>
-            <a:tailEnd type="triangle"/>
-          </a:ln>
-        </p:spPr>
-        <p:style>
-          <a:lnRef idx="1">
-            <a:schemeClr val="dk1"/>
-          </a:lnRef>
-          <a:fillRef idx="0">
-            <a:schemeClr val="dk1"/>
-          </a:fillRef>
-          <a:effectRef idx="0">
-            <a:schemeClr val="dk1"/>
-          </a:effectRef>
-          <a:fontRef idx="minor">
-            <a:schemeClr val="tx1"/>
-          </a:fontRef>
-        </p:style>
-      </p:cxnSp>
-      <p:cxnSp>
-        <p:nvCxnSpPr>
-          <p:cNvPr id="9" name="Straight Arrow Connector 8"/>
-          <p:cNvCxnSpPr/>
-          <p:nvPr/>
-        </p:nvCxnSpPr>
-        <p:spPr>
-          <a:xfrm>
-            <a:off x="4572000" y="1690688"/>
-            <a:ext cx="2086708" cy="1247897"/>
-          </a:xfrm>
-          <a:prstGeom prst="straightConnector1">
-            <a:avLst/>
-          </a:prstGeom>
-          <a:ln>
-            <a:tailEnd type="triangle"/>
-          </a:ln>
-        </p:spPr>
-        <p:style>
-          <a:lnRef idx="1">
-            <a:schemeClr val="dk1"/>
-          </a:lnRef>
-          <a:fillRef idx="0">
-            <a:schemeClr val="dk1"/>
-          </a:fillRef>
-          <a:effectRef idx="0">
-            <a:schemeClr val="dk1"/>
-          </a:effectRef>
-          <a:fontRef idx="minor">
-            <a:schemeClr val="tx1"/>
-          </a:fontRef>
-        </p:style>
-      </p:cxnSp>
-    </p:spTree>
-    <p:extLst>
-      <p:ext uri="{BB962C8B-B14F-4D97-AF65-F5344CB8AC3E}">
-        <p14:creationId xmlns:p14="http://schemas.microsoft.com/office/powerpoint/2010/main" val="562229004"/>
-      </p:ext>
-    </p:extLst>
-  </p:cSld>
-  <p:clrMapOvr>
-    <a:masterClrMapping/>
-  </p:clrMapOvr>
-  <p:timing>
-    <p:tnLst>
-      <p:par>
-        <p:cTn id="1" dur="indefinite" restart="never" nodeType="tmRoot">
-          <p:childTnLst>
-            <p:seq concurrent="1" nextAc="seek">
-              <p:cTn id="2" dur="indefinite" nodeType="mainSeq">
-                <p:childTnLst>
-                  <p:par>
-                    <p:cTn id="3" fill="hold">
-                      <p:stCondLst>
-                        <p:cond delay="indefinite"/>
-                      </p:stCondLst>
-                      <p:childTnLst>
-                        <p:par>
-                          <p:cTn id="4" fill="hold">
-                            <p:stCondLst>
-                              <p:cond delay="0"/>
-                            </p:stCondLst>
-                            <p:childTnLst>
-                              <p:par>
-                                <p:cTn id="5" presetID="2" presetClass="entr" presetSubtype="4" fill="hold" nodeType="clickEffect">
-                                  <p:stCondLst>
-                                    <p:cond delay="0"/>
-                                  </p:stCondLst>
-                                  <p:childTnLst>
-                                    <p:set>
-                                      <p:cBhvr>
-                                        <p:cTn id="6" dur="1" fill="hold">
-                                          <p:stCondLst>
-                                            <p:cond delay="0"/>
-                                          </p:stCondLst>
-                                        </p:cTn>
-                                        <p:tgtEl>
-                                          <p:spTgt spid="4"/>
-                                        </p:tgtEl>
-                                        <p:attrNameLst>
-                                          <p:attrName>style.visibility</p:attrName>
-                                        </p:attrNameLst>
-                                      </p:cBhvr>
-                                      <p:to>
-                                        <p:strVal val="visible"/>
-                                      </p:to>
-                                    </p:set>
-                                    <p:anim calcmode="lin" valueType="num">
-                                      <p:cBhvr additive="base">
-                                        <p:cTn id="7" dur="500" fill="hold"/>
-                                        <p:tgtEl>
-                                          <p:spTgt spid="4"/>
-                                        </p:tgtEl>
-                                        <p:attrNameLst>
-                                          <p:attrName>ppt_x</p:attrName>
-                                        </p:attrNameLst>
-                                      </p:cBhvr>
-                                      <p:tavLst>
-                                        <p:tav tm="0">
-                                          <p:val>
-                                            <p:strVal val="#ppt_x"/>
-                                          </p:val>
-                                        </p:tav>
-                                        <p:tav tm="100000">
-                                          <p:val>
-                                            <p:strVal val="#ppt_x"/>
-                                          </p:val>
-                                        </p:tav>
-                                      </p:tavLst>
-                                    </p:anim>
-                                    <p:anim calcmode="lin" valueType="num">
-                                      <p:cBhvr additive="base">
-                                        <p:cTn id="8" dur="500" fill="hold"/>
-                                        <p:tgtEl>
-                                          <p:spTgt spid="4"/>
-                                        </p:tgtEl>
-                                        <p:attrNameLst>
-                                          <p:attrName>ppt_y</p:attrName>
-                                        </p:attrNameLst>
-                                      </p:cBhvr>
-                                      <p:tavLst>
-                                        <p:tav tm="0">
-                                          <p:val>
-                                            <p:strVal val="1+#ppt_h/2"/>
-                                          </p:val>
-                                        </p:tav>
-                                        <p:tav tm="100000">
-                                          <p:val>
-                                            <p:strVal val="#ppt_y"/>
-                                          </p:val>
-                                        </p:tav>
-                                      </p:tavLst>
-                                    </p:anim>
-                                  </p:childTnLst>
-                                </p:cTn>
-                              </p:par>
-                              <p:par>
-                                <p:cTn id="9" presetID="2" presetClass="entr" presetSubtype="4" fill="hold" nodeType="withEffect">
-                                  <p:stCondLst>
-                                    <p:cond delay="0"/>
-                                  </p:stCondLst>
-                                  <p:childTnLst>
-                                    <p:set>
-                                      <p:cBhvr>
-                                        <p:cTn id="10" dur="1" fill="hold">
-                                          <p:stCondLst>
-                                            <p:cond delay="0"/>
-                                          </p:stCondLst>
-                                        </p:cTn>
-                                        <p:tgtEl>
-                                          <p:spTgt spid="7"/>
-                                        </p:tgtEl>
-                                        <p:attrNameLst>
-                                          <p:attrName>style.visibility</p:attrName>
-                                        </p:attrNameLst>
-                                      </p:cBhvr>
-                                      <p:to>
-                                        <p:strVal val="visible"/>
-                                      </p:to>
-                                    </p:set>
-                                    <p:anim calcmode="lin" valueType="num">
-                                      <p:cBhvr additive="base">
-                                        <p:cTn id="11" dur="500" fill="hold"/>
-                                        <p:tgtEl>
-                                          <p:spTgt spid="7"/>
-                                        </p:tgtEl>
-                                        <p:attrNameLst>
-                                          <p:attrName>ppt_x</p:attrName>
-                                        </p:attrNameLst>
-                                      </p:cBhvr>
-                                      <p:tavLst>
-                                        <p:tav tm="0">
-                                          <p:val>
-                                            <p:strVal val="#ppt_x"/>
-                                          </p:val>
-                                        </p:tav>
-                                        <p:tav tm="100000">
-                                          <p:val>
-                                            <p:strVal val="#ppt_x"/>
-                                          </p:val>
-                                        </p:tav>
-                                      </p:tavLst>
-                                    </p:anim>
-                                    <p:anim calcmode="lin" valueType="num">
-                                      <p:cBhvr additive="base">
-                                        <p:cTn id="12" dur="500" fill="hold"/>
-                                        <p:tgtEl>
-                                          <p:spTgt spid="7"/>
-                                        </p:tgtEl>
-                                        <p:attrNameLst>
-                                          <p:attrName>ppt_y</p:attrName>
-                                        </p:attrNameLst>
-                                      </p:cBhvr>
-                                      <p:tavLst>
-                                        <p:tav tm="0">
-                                          <p:val>
-                                            <p:strVal val="1+#ppt_h/2"/>
-                                          </p:val>
-                                        </p:tav>
-                                        <p:tav tm="100000">
-                                          <p:val>
-                                            <p:strVal val="#ppt_y"/>
-                                          </p:val>
-                                        </p:tav>
-                                      </p:tavLst>
-                                    </p:anim>
-                                  </p:childTnLst>
-                                </p:cTn>
-                              </p:par>
-                            </p:childTnLst>
-                          </p:cTn>
-                        </p:par>
-                      </p:childTnLst>
-                    </p:cTn>
-                  </p:par>
-                  <p:par>
-                    <p:cTn id="13" fill="hold">
-                      <p:stCondLst>
-                        <p:cond delay="indefinite"/>
-                      </p:stCondLst>
-                      <p:childTnLst>
-                        <p:par>
-                          <p:cTn id="14" fill="hold">
-                            <p:stCondLst>
-                              <p:cond delay="0"/>
-                            </p:stCondLst>
-                            <p:childTnLst>
-                              <p:par>
-                                <p:cTn id="15" presetID="2" presetClass="entr" presetSubtype="4" fill="hold" nodeType="clickEffect">
-                                  <p:stCondLst>
-                                    <p:cond delay="0"/>
-                                  </p:stCondLst>
-                                  <p:childTnLst>
-                                    <p:set>
-                                      <p:cBhvr>
-                                        <p:cTn id="16" dur="1" fill="hold">
-                                          <p:stCondLst>
-                                            <p:cond delay="0"/>
-                                          </p:stCondLst>
-                                        </p:cTn>
-                                        <p:tgtEl>
-                                          <p:spTgt spid="5"/>
-                                        </p:tgtEl>
-                                        <p:attrNameLst>
-                                          <p:attrName>style.visibility</p:attrName>
-                                        </p:attrNameLst>
-                                      </p:cBhvr>
-                                      <p:to>
-                                        <p:strVal val="visible"/>
-                                      </p:to>
-                                    </p:set>
-                                    <p:anim calcmode="lin" valueType="num">
-                                      <p:cBhvr additive="base">
-                                        <p:cTn id="17" dur="500" fill="hold"/>
-                                        <p:tgtEl>
-                                          <p:spTgt spid="5"/>
-                                        </p:tgtEl>
-                                        <p:attrNameLst>
-                                          <p:attrName>ppt_x</p:attrName>
-                                        </p:attrNameLst>
-                                      </p:cBhvr>
-                                      <p:tavLst>
-                                        <p:tav tm="0">
-                                          <p:val>
-                                            <p:strVal val="#ppt_x"/>
-                                          </p:val>
-                                        </p:tav>
-                                        <p:tav tm="100000">
-                                          <p:val>
-                                            <p:strVal val="#ppt_x"/>
-                                          </p:val>
-                                        </p:tav>
-                                      </p:tavLst>
-                                    </p:anim>
-                                    <p:anim calcmode="lin" valueType="num">
-                                      <p:cBhvr additive="base">
-                                        <p:cTn id="18" dur="500" fill="hold"/>
-                                        <p:tgtEl>
-                                          <p:spTgt spid="5"/>
-                                        </p:tgtEl>
-                                        <p:attrNameLst>
-                                          <p:attrName>ppt_y</p:attrName>
-                                        </p:attrNameLst>
-                                      </p:cBhvr>
-                                      <p:tavLst>
-                                        <p:tav tm="0">
-                                          <p:val>
-                                            <p:strVal val="1+#ppt_h/2"/>
-                                          </p:val>
-                                        </p:tav>
-                                        <p:tav tm="100000">
-                                          <p:val>
-                                            <p:strVal val="#ppt_y"/>
-                                          </p:val>
-                                        </p:tav>
-                                      </p:tavLst>
-                                    </p:anim>
-                                  </p:childTnLst>
-                                </p:cTn>
-                              </p:par>
-                              <p:par>
-                                <p:cTn id="19" presetID="2" presetClass="entr" presetSubtype="4" fill="hold" nodeType="withEffect">
-                                  <p:stCondLst>
-                                    <p:cond delay="0"/>
-                                  </p:stCondLst>
-                                  <p:childTnLst>
-                                    <p:set>
-                                      <p:cBhvr>
-                                        <p:cTn id="20" dur="1" fill="hold">
-                                          <p:stCondLst>
-                                            <p:cond delay="0"/>
-                                          </p:stCondLst>
-                                        </p:cTn>
-                                        <p:tgtEl>
-                                          <p:spTgt spid="9"/>
-                                        </p:tgtEl>
-                                        <p:attrNameLst>
-                                          <p:attrName>style.visibility</p:attrName>
-                                        </p:attrNameLst>
-                                      </p:cBhvr>
-                                      <p:to>
-                                        <p:strVal val="visible"/>
-                                      </p:to>
-                                    </p:set>
-                                    <p:anim calcmode="lin" valueType="num">
-                                      <p:cBhvr additive="base">
-                                        <p:cTn id="21" dur="500" fill="hold"/>
-                                        <p:tgtEl>
-                                          <p:spTgt spid="9"/>
-                                        </p:tgtEl>
-                                        <p:attrNameLst>
-                                          <p:attrName>ppt_x</p:attrName>
-                                        </p:attrNameLst>
-                                      </p:cBhvr>
-                                      <p:tavLst>
-                                        <p:tav tm="0">
-                                          <p:val>
-                                            <p:strVal val="#ppt_x"/>
-                                          </p:val>
-                                        </p:tav>
-                                        <p:tav tm="100000">
-                                          <p:val>
-                                            <p:strVal val="#ppt_x"/>
-                                          </p:val>
-                                        </p:tav>
-                                      </p:tavLst>
-                                    </p:anim>
-                                    <p:anim calcmode="lin" valueType="num">
-                                      <p:cBhvr additive="base">
-                                        <p:cTn id="22" dur="500" fill="hold"/>
-                                        <p:tgtEl>
-                                          <p:spTgt spid="9"/>
-                                        </p:tgtEl>
-                                        <p:attrNameLst>
-                                          <p:attrName>ppt_y</p:attrName>
-                                        </p:attrNameLst>
-                                      </p:cBhvr>
-                                      <p:tavLst>
-                                        <p:tav tm="0">
-                                          <p:val>
-                                            <p:strVal val="1+#ppt_h/2"/>
-                                          </p:val>
-                                        </p:tav>
-                                        <p:tav tm="100000">
-                                          <p:val>
-                                            <p:strVal val="#ppt_y"/>
-                                          </p:val>
-                                        </p:tav>
-                                      </p:tavLst>
-                                    </p:anim>
-                                  </p:childTnLst>
-                                </p:cTn>
-                              </p:par>
-                            </p:childTnLst>
-                          </p:cTn>
-                        </p:par>
-                      </p:childTnLst>
-                    </p:cTn>
-                  </p:par>
-                </p:childTnLst>
-              </p:cTn>
-              <p:prevCondLst>
-                <p:cond evt="onPrev" delay="0">
-                  <p:tgtEl>
-                    <p:sldTgt/>
-                  </p:tgtEl>
-                </p:cond>
-              </p:prevCondLst>
-              <p:nextCondLst>
-                <p:cond evt="onNext" delay="0">
-                  <p:tgtEl>
-                    <p:sldTgt/>
-                  </p:tgtEl>
-                </p:cond>
-              </p:nextCondLst>
-            </p:seq>
-          </p:childTnLst>
-        </p:cTn>
-      </p:par>
-    </p:tnLst>
-  </p:timing>
-</p:sld>
-</file>
-
-<file path=ppt/slides/slide25.xml><?xml version="1.0" encoding="utf-8"?>
-<p:sld xmlns:a="http://schemas.openxmlformats.org/drawingml/2006/main" xmlns:r="http://schemas.openxmlformats.org/officeDocument/2006/relationships" xmlns:p="http://schemas.openxmlformats.org/presentationml/2006/main">
-  <p:cSld>
-    <p:spTree>
-      <p:nvGrpSpPr>
-        <p:cNvPr id="1" name=""/>
-        <p:cNvGrpSpPr/>
-        <p:nvPr/>
-      </p:nvGrpSpPr>
-      <p:grpSpPr>
-        <a:xfrm>
-          <a:off x="0" y="0"/>
-          <a:ext cx="0" cy="0"/>
-          <a:chOff x="0" y="0"/>
-          <a:chExt cx="0" cy="0"/>
-        </a:xfrm>
-      </p:grpSpPr>
-      <p:sp>
-        <p:nvSpPr>
-          <p:cNvPr id="2" name="Title 1"/>
-          <p:cNvSpPr>
-            <a:spLocks noGrp="1"/>
-          </p:cNvSpPr>
-          <p:nvPr>
-            <p:ph type="title"/>
-          </p:nvPr>
-        </p:nvSpPr>
-        <p:spPr/>
-        <p:txBody>
-          <a:bodyPr/>
-          <a:lstStyle/>
-          <a:p>
-            <a:pPr algn="ctr"/>
-            <a:r>
-              <a:rPr lang="en-US" dirty="0" smtClean="0"/>
-              <a:t>Vision</a:t>
-            </a:r>
-            <a:endParaRPr lang="en-MY" dirty="0"/>
-          </a:p>
-        </p:txBody>
-      </p:sp>
-      <p:pic>
-        <p:nvPicPr>
-          <p:cNvPr id="4" name="Content Placeholder 3"/>
-          <p:cNvPicPr>
-            <a:picLocks noGrp="1" noChangeAspect="1"/>
-          </p:cNvPicPr>
-          <p:nvPr>
-            <p:ph idx="1"/>
-          </p:nvPr>
-        </p:nvPicPr>
-        <p:blipFill>
-          <a:blip r:embed="rId2">
-            <a:extLst>
-              <a:ext uri="{28A0092B-C50C-407E-A947-70E740481C1C}">
-                <a14:useLocalDpi xmlns:a14="http://schemas.microsoft.com/office/drawing/2010/main" val="0"/>
-              </a:ext>
-            </a:extLst>
-          </a:blip>
-          <a:stretch>
-            <a:fillRect/>
-          </a:stretch>
-        </p:blipFill>
-        <p:spPr>
-          <a:xfrm>
-            <a:off x="628650" y="2728838"/>
-            <a:ext cx="3638550" cy="1924078"/>
-          </a:xfrm>
-        </p:spPr>
-      </p:pic>
-      <p:pic>
-        <p:nvPicPr>
-          <p:cNvPr id="5" name="Picture 4"/>
-          <p:cNvPicPr>
-            <a:picLocks noChangeAspect="1"/>
-          </p:cNvPicPr>
-          <p:nvPr/>
-        </p:nvPicPr>
-        <p:blipFill>
-          <a:blip r:embed="rId3" cstate="print">
-            <a:extLst>
-              <a:ext uri="{28A0092B-C50C-407E-A947-70E740481C1C}">
-                <a14:useLocalDpi xmlns:a14="http://schemas.microsoft.com/office/drawing/2010/main" val="0"/>
-              </a:ext>
-            </a:extLst>
-          </a:blip>
-          <a:stretch>
-            <a:fillRect/>
-          </a:stretch>
-        </p:blipFill>
-        <p:spPr>
-          <a:xfrm>
-            <a:off x="5272405" y="3255085"/>
-            <a:ext cx="1819398" cy="2440062"/>
-          </a:xfrm>
-          <a:prstGeom prst="rect">
-            <a:avLst/>
-          </a:prstGeom>
-        </p:spPr>
-      </p:pic>
-      <p:pic>
-        <p:nvPicPr>
-          <p:cNvPr id="7" name="Picture 6"/>
-          <p:cNvPicPr>
-            <a:picLocks noChangeAspect="1"/>
-          </p:cNvPicPr>
-          <p:nvPr/>
-        </p:nvPicPr>
-        <p:blipFill>
-          <a:blip r:embed="rId4" cstate="print">
-            <a:extLst>
-              <a:ext uri="{28A0092B-C50C-407E-A947-70E740481C1C}">
-                <a14:useLocalDpi xmlns:a14="http://schemas.microsoft.com/office/drawing/2010/main" val="0"/>
-              </a:ext>
-            </a:extLst>
-          </a:blip>
-          <a:stretch>
-            <a:fillRect/>
-          </a:stretch>
-        </p:blipFill>
-        <p:spPr>
-          <a:xfrm>
-            <a:off x="5810250" y="1621687"/>
-            <a:ext cx="2286758" cy="1633398"/>
-          </a:xfrm>
-          <a:prstGeom prst="rect">
-            <a:avLst/>
-          </a:prstGeom>
-        </p:spPr>
-      </p:pic>
-      <p:sp>
-        <p:nvSpPr>
-          <p:cNvPr id="8" name="TextBox 7"/>
-          <p:cNvSpPr txBox="1"/>
-          <p:nvPr/>
-        </p:nvSpPr>
-        <p:spPr>
-          <a:xfrm>
-            <a:off x="6259953" y="1904707"/>
-            <a:ext cx="1663700" cy="646331"/>
-          </a:xfrm>
-          <a:prstGeom prst="rect">
-            <a:avLst/>
-          </a:prstGeom>
-          <a:noFill/>
-        </p:spPr>
-        <p:txBody>
-          <a:bodyPr wrap="square" rtlCol="0">
-            <a:spAutoFit/>
-          </a:bodyPr>
-          <a:lstStyle/>
-          <a:p>
-            <a:r>
-              <a:rPr lang="en-US" dirty="0" smtClean="0"/>
-              <a:t>What am I doing next??</a:t>
-            </a:r>
-            <a:endParaRPr lang="en-MY" dirty="0"/>
-          </a:p>
-        </p:txBody>
-      </p:sp>
-      <p:pic>
-        <p:nvPicPr>
-          <p:cNvPr id="9" name="Picture 8"/>
-          <p:cNvPicPr>
-            <a:picLocks noChangeAspect="1"/>
-          </p:cNvPicPr>
-          <p:nvPr/>
-        </p:nvPicPr>
-        <p:blipFill>
-          <a:blip r:embed="rId5" cstate="print">
-            <a:extLst>
-              <a:ext uri="{28A0092B-C50C-407E-A947-70E740481C1C}">
-                <a14:useLocalDpi xmlns:a14="http://schemas.microsoft.com/office/drawing/2010/main" val="0"/>
-              </a:ext>
-            </a:extLst>
-          </a:blip>
-          <a:stretch>
-            <a:fillRect/>
-          </a:stretch>
-        </p:blipFill>
-        <p:spPr>
-          <a:xfrm>
-            <a:off x="4912435" y="1889419"/>
-            <a:ext cx="3602915" cy="3602915"/>
-          </a:xfrm>
-          <a:prstGeom prst="rect">
-            <a:avLst/>
-          </a:prstGeom>
-        </p:spPr>
-      </p:pic>
-    </p:spTree>
-    <p:extLst>
-      <p:ext uri="{BB962C8B-B14F-4D97-AF65-F5344CB8AC3E}">
-        <p14:creationId xmlns:p14="http://schemas.microsoft.com/office/powerpoint/2010/main" val="1546696151"/>
-      </p:ext>
-    </p:extLst>
-  </p:cSld>
-  <p:clrMapOvr>
-    <a:masterClrMapping/>
-  </p:clrMapOvr>
-  <p:timing>
-    <p:tnLst>
-      <p:par>
-        <p:cTn id="1" dur="indefinite" restart="never" nodeType="tmRoot">
-          <p:childTnLst>
-            <p:seq concurrent="1" nextAc="seek">
-              <p:cTn id="2" dur="indefinite" nodeType="mainSeq">
-                <p:childTnLst>
-                  <p:par>
-                    <p:cTn id="3" fill="hold">
-                      <p:stCondLst>
-                        <p:cond delay="indefinite"/>
-                      </p:stCondLst>
-                      <p:childTnLst>
-                        <p:par>
-                          <p:cTn id="4" fill="hold">
-                            <p:stCondLst>
-                              <p:cond delay="0"/>
-                            </p:stCondLst>
-                            <p:childTnLst>
-                              <p:par>
-                                <p:cTn id="5" presetID="2" presetClass="entr" presetSubtype="4" fill="hold" nodeType="clickEffect">
-                                  <p:stCondLst>
-                                    <p:cond delay="0"/>
-                                  </p:stCondLst>
-                                  <p:childTnLst>
-                                    <p:set>
-                                      <p:cBhvr>
-                                        <p:cTn id="6" dur="1" fill="hold">
-                                          <p:stCondLst>
-                                            <p:cond delay="0"/>
-                                          </p:stCondLst>
-                                        </p:cTn>
-                                        <p:tgtEl>
-                                          <p:spTgt spid="4"/>
-                                        </p:tgtEl>
-                                        <p:attrNameLst>
-                                          <p:attrName>style.visibility</p:attrName>
-                                        </p:attrNameLst>
-                                      </p:cBhvr>
-                                      <p:to>
-                                        <p:strVal val="visible"/>
-                                      </p:to>
-                                    </p:set>
-                                    <p:anim calcmode="lin" valueType="num">
-                                      <p:cBhvr additive="base">
-                                        <p:cTn id="7" dur="500" fill="hold"/>
-                                        <p:tgtEl>
-                                          <p:spTgt spid="4"/>
-                                        </p:tgtEl>
-                                        <p:attrNameLst>
-                                          <p:attrName>ppt_x</p:attrName>
-                                        </p:attrNameLst>
-                                      </p:cBhvr>
-                                      <p:tavLst>
-                                        <p:tav tm="0">
-                                          <p:val>
-                                            <p:strVal val="#ppt_x"/>
-                                          </p:val>
-                                        </p:tav>
-                                        <p:tav tm="100000">
-                                          <p:val>
-                                            <p:strVal val="#ppt_x"/>
-                                          </p:val>
-                                        </p:tav>
-                                      </p:tavLst>
-                                    </p:anim>
-                                    <p:anim calcmode="lin" valueType="num">
-                                      <p:cBhvr additive="base">
-                                        <p:cTn id="8" dur="500" fill="hold"/>
-                                        <p:tgtEl>
-                                          <p:spTgt spid="4"/>
-                                        </p:tgtEl>
-                                        <p:attrNameLst>
-                                          <p:attrName>ppt_y</p:attrName>
-                                        </p:attrNameLst>
-                                      </p:cBhvr>
-                                      <p:tavLst>
-                                        <p:tav tm="0">
-                                          <p:val>
-                                            <p:strVal val="1+#ppt_h/2"/>
-                                          </p:val>
-                                        </p:tav>
-                                        <p:tav tm="100000">
-                                          <p:val>
-                                            <p:strVal val="#ppt_y"/>
-                                          </p:val>
-                                        </p:tav>
-                                      </p:tavLst>
-                                    </p:anim>
-                                  </p:childTnLst>
-                                </p:cTn>
-                              </p:par>
-                            </p:childTnLst>
-                          </p:cTn>
-                        </p:par>
-                      </p:childTnLst>
-                    </p:cTn>
-                  </p:par>
-                  <p:par>
-                    <p:cTn id="9" fill="hold">
-                      <p:stCondLst>
-                        <p:cond delay="indefinite"/>
-                      </p:stCondLst>
-                      <p:childTnLst>
-                        <p:par>
-                          <p:cTn id="10" fill="hold">
-                            <p:stCondLst>
-                              <p:cond delay="0"/>
-                            </p:stCondLst>
-                            <p:childTnLst>
-                              <p:par>
-                                <p:cTn id="11" presetID="2" presetClass="entr" presetSubtype="4" fill="hold" nodeType="clickEffect">
-                                  <p:stCondLst>
-                                    <p:cond delay="0"/>
-                                  </p:stCondLst>
-                                  <p:childTnLst>
-                                    <p:set>
-                                      <p:cBhvr>
-                                        <p:cTn id="12" dur="1" fill="hold">
-                                          <p:stCondLst>
-                                            <p:cond delay="0"/>
-                                          </p:stCondLst>
-                                        </p:cTn>
-                                        <p:tgtEl>
-                                          <p:spTgt spid="5"/>
-                                        </p:tgtEl>
-                                        <p:attrNameLst>
-                                          <p:attrName>style.visibility</p:attrName>
-                                        </p:attrNameLst>
-                                      </p:cBhvr>
-                                      <p:to>
-                                        <p:strVal val="visible"/>
-                                      </p:to>
-                                    </p:set>
-                                    <p:anim calcmode="lin" valueType="num">
-                                      <p:cBhvr additive="base">
-                                        <p:cTn id="13" dur="500" fill="hold"/>
-                                        <p:tgtEl>
-                                          <p:spTgt spid="5"/>
-                                        </p:tgtEl>
-                                        <p:attrNameLst>
-                                          <p:attrName>ppt_x</p:attrName>
-                                        </p:attrNameLst>
-                                      </p:cBhvr>
-                                      <p:tavLst>
-                                        <p:tav tm="0">
-                                          <p:val>
-                                            <p:strVal val="#ppt_x"/>
-                                          </p:val>
-                                        </p:tav>
-                                        <p:tav tm="100000">
-                                          <p:val>
-                                            <p:strVal val="#ppt_x"/>
-                                          </p:val>
-                                        </p:tav>
-                                      </p:tavLst>
-                                    </p:anim>
-                                    <p:anim calcmode="lin" valueType="num">
-                                      <p:cBhvr additive="base">
-                                        <p:cTn id="14" dur="500" fill="hold"/>
-                                        <p:tgtEl>
-                                          <p:spTgt spid="5"/>
-                                        </p:tgtEl>
-                                        <p:attrNameLst>
-                                          <p:attrName>ppt_y</p:attrName>
-                                        </p:attrNameLst>
-                                      </p:cBhvr>
-                                      <p:tavLst>
-                                        <p:tav tm="0">
-                                          <p:val>
-                                            <p:strVal val="1+#ppt_h/2"/>
-                                          </p:val>
-                                        </p:tav>
-                                        <p:tav tm="100000">
-                                          <p:val>
-                                            <p:strVal val="#ppt_y"/>
-                                          </p:val>
-                                        </p:tav>
-                                      </p:tavLst>
-                                    </p:anim>
-                                  </p:childTnLst>
-                                </p:cTn>
-                              </p:par>
-                              <p:par>
-                                <p:cTn id="15" presetID="2" presetClass="entr" presetSubtype="4" fill="hold" grpId="0" nodeType="withEffect">
-                                  <p:stCondLst>
-                                    <p:cond delay="0"/>
-                                  </p:stCondLst>
-                                  <p:childTnLst>
-                                    <p:set>
-                                      <p:cBhvr>
-                                        <p:cTn id="16" dur="1" fill="hold">
-                                          <p:stCondLst>
-                                            <p:cond delay="0"/>
-                                          </p:stCondLst>
-                                        </p:cTn>
-                                        <p:tgtEl>
-                                          <p:spTgt spid="8"/>
-                                        </p:tgtEl>
-                                        <p:attrNameLst>
-                                          <p:attrName>style.visibility</p:attrName>
-                                        </p:attrNameLst>
-                                      </p:cBhvr>
-                                      <p:to>
-                                        <p:strVal val="visible"/>
-                                      </p:to>
-                                    </p:set>
-                                    <p:anim calcmode="lin" valueType="num">
-                                      <p:cBhvr additive="base">
-                                        <p:cTn id="17" dur="500" fill="hold"/>
-                                        <p:tgtEl>
-                                          <p:spTgt spid="8"/>
-                                        </p:tgtEl>
-                                        <p:attrNameLst>
-                                          <p:attrName>ppt_x</p:attrName>
-                                        </p:attrNameLst>
-                                      </p:cBhvr>
-                                      <p:tavLst>
-                                        <p:tav tm="0">
-                                          <p:val>
-                                            <p:strVal val="#ppt_x"/>
-                                          </p:val>
-                                        </p:tav>
-                                        <p:tav tm="100000">
-                                          <p:val>
-                                            <p:strVal val="#ppt_x"/>
-                                          </p:val>
-                                        </p:tav>
-                                      </p:tavLst>
-                                    </p:anim>
-                                    <p:anim calcmode="lin" valueType="num">
-                                      <p:cBhvr additive="base">
-                                        <p:cTn id="18" dur="500" fill="hold"/>
-                                        <p:tgtEl>
-                                          <p:spTgt spid="8"/>
-                                        </p:tgtEl>
-                                        <p:attrNameLst>
-                                          <p:attrName>ppt_y</p:attrName>
-                                        </p:attrNameLst>
-                                      </p:cBhvr>
-                                      <p:tavLst>
-                                        <p:tav tm="0">
-                                          <p:val>
-                                            <p:strVal val="1+#ppt_h/2"/>
-                                          </p:val>
-                                        </p:tav>
-                                        <p:tav tm="100000">
-                                          <p:val>
-                                            <p:strVal val="#ppt_y"/>
-                                          </p:val>
-                                        </p:tav>
-                                      </p:tavLst>
-                                    </p:anim>
-                                  </p:childTnLst>
-                                </p:cTn>
-                              </p:par>
-                              <p:par>
-                                <p:cTn id="19" presetID="2" presetClass="entr" presetSubtype="4" fill="hold" nodeType="withEffect">
-                                  <p:stCondLst>
-                                    <p:cond delay="0"/>
-                                  </p:stCondLst>
-                                  <p:childTnLst>
-                                    <p:set>
-                                      <p:cBhvr>
-                                        <p:cTn id="20" dur="1" fill="hold">
-                                          <p:stCondLst>
-                                            <p:cond delay="0"/>
-                                          </p:stCondLst>
-                                        </p:cTn>
-                                        <p:tgtEl>
-                                          <p:spTgt spid="7"/>
-                                        </p:tgtEl>
-                                        <p:attrNameLst>
-                                          <p:attrName>style.visibility</p:attrName>
-                                        </p:attrNameLst>
-                                      </p:cBhvr>
-                                      <p:to>
-                                        <p:strVal val="visible"/>
-                                      </p:to>
-                                    </p:set>
-                                    <p:anim calcmode="lin" valueType="num">
-                                      <p:cBhvr additive="base">
-                                        <p:cTn id="21" dur="500" fill="hold"/>
-                                        <p:tgtEl>
-                                          <p:spTgt spid="7"/>
-                                        </p:tgtEl>
-                                        <p:attrNameLst>
-                                          <p:attrName>ppt_x</p:attrName>
-                                        </p:attrNameLst>
-                                      </p:cBhvr>
-                                      <p:tavLst>
-                                        <p:tav tm="0">
-                                          <p:val>
-                                            <p:strVal val="#ppt_x"/>
-                                          </p:val>
-                                        </p:tav>
-                                        <p:tav tm="100000">
-                                          <p:val>
-                                            <p:strVal val="#ppt_x"/>
-                                          </p:val>
-                                        </p:tav>
-                                      </p:tavLst>
-                                    </p:anim>
-                                    <p:anim calcmode="lin" valueType="num">
-                                      <p:cBhvr additive="base">
-                                        <p:cTn id="22" dur="500" fill="hold"/>
-                                        <p:tgtEl>
-                                          <p:spTgt spid="7"/>
-                                        </p:tgtEl>
-                                        <p:attrNameLst>
-                                          <p:attrName>ppt_y</p:attrName>
-                                        </p:attrNameLst>
-                                      </p:cBhvr>
-                                      <p:tavLst>
-                                        <p:tav tm="0">
-                                          <p:val>
-                                            <p:strVal val="1+#ppt_h/2"/>
-                                          </p:val>
-                                        </p:tav>
-                                        <p:tav tm="100000">
-                                          <p:val>
-                                            <p:strVal val="#ppt_y"/>
-                                          </p:val>
-                                        </p:tav>
-                                      </p:tavLst>
-                                    </p:anim>
-                                  </p:childTnLst>
-                                </p:cTn>
-                              </p:par>
-                            </p:childTnLst>
-                          </p:cTn>
-                        </p:par>
-                      </p:childTnLst>
-                    </p:cTn>
-                  </p:par>
-                  <p:par>
-                    <p:cTn id="23" fill="hold">
-                      <p:stCondLst>
-                        <p:cond delay="indefinite"/>
-                      </p:stCondLst>
-                      <p:childTnLst>
-                        <p:par>
-                          <p:cTn id="24" fill="hold">
-                            <p:stCondLst>
-                              <p:cond delay="0"/>
-                            </p:stCondLst>
-                            <p:childTnLst>
-                              <p:par>
-                                <p:cTn id="25" presetID="2" presetClass="entr" presetSubtype="4" fill="hold" nodeType="clickEffect">
-                                  <p:stCondLst>
-                                    <p:cond delay="0"/>
-                                  </p:stCondLst>
-                                  <p:childTnLst>
-                                    <p:set>
-                                      <p:cBhvr>
-                                        <p:cTn id="26" dur="1" fill="hold">
-                                          <p:stCondLst>
-                                            <p:cond delay="0"/>
-                                          </p:stCondLst>
-                                        </p:cTn>
-                                        <p:tgtEl>
-                                          <p:spTgt spid="9"/>
-                                        </p:tgtEl>
-                                        <p:attrNameLst>
-                                          <p:attrName>style.visibility</p:attrName>
-                                        </p:attrNameLst>
-                                      </p:cBhvr>
-                                      <p:to>
-                                        <p:strVal val="visible"/>
-                                      </p:to>
-                                    </p:set>
-                                    <p:anim calcmode="lin" valueType="num">
-                                      <p:cBhvr additive="base">
-                                        <p:cTn id="27" dur="500" fill="hold"/>
-                                        <p:tgtEl>
-                                          <p:spTgt spid="9"/>
-                                        </p:tgtEl>
-                                        <p:attrNameLst>
-                                          <p:attrName>ppt_x</p:attrName>
-                                        </p:attrNameLst>
-                                      </p:cBhvr>
-                                      <p:tavLst>
-                                        <p:tav tm="0">
-                                          <p:val>
-                                            <p:strVal val="#ppt_x"/>
-                                          </p:val>
-                                        </p:tav>
-                                        <p:tav tm="100000">
-                                          <p:val>
-                                            <p:strVal val="#ppt_x"/>
-                                          </p:val>
-                                        </p:tav>
-                                      </p:tavLst>
-                                    </p:anim>
-                                    <p:anim calcmode="lin" valueType="num">
-                                      <p:cBhvr additive="base">
-                                        <p:cTn id="28" dur="500" fill="hold"/>
-                                        <p:tgtEl>
-                                          <p:spTgt spid="9"/>
-                                        </p:tgtEl>
-                                        <p:attrNameLst>
-                                          <p:attrName>ppt_y</p:attrName>
-                                        </p:attrNameLst>
-                                      </p:cBhvr>
-                                      <p:tavLst>
-                                        <p:tav tm="0">
-                                          <p:val>
-                                            <p:strVal val="1+#ppt_h/2"/>
-                                          </p:val>
-                                        </p:tav>
-                                        <p:tav tm="100000">
-                                          <p:val>
-                                            <p:strVal val="#ppt_y"/>
-                                          </p:val>
-                                        </p:tav>
-                                      </p:tavLst>
-                                    </p:anim>
-                                  </p:childTnLst>
-                                </p:cTn>
-                              </p:par>
-                            </p:childTnLst>
-                          </p:cTn>
-                        </p:par>
-                      </p:childTnLst>
-                    </p:cTn>
-                  </p:par>
-                </p:childTnLst>
-              </p:cTn>
-              <p:prevCondLst>
-                <p:cond evt="onPrev" delay="0">
-                  <p:tgtEl>
-                    <p:sldTgt/>
-                  </p:tgtEl>
-                </p:cond>
-              </p:prevCondLst>
-              <p:nextCondLst>
-                <p:cond evt="onNext" delay="0">
-                  <p:tgtEl>
-                    <p:sldTgt/>
-                  </p:tgtEl>
-                </p:cond>
-              </p:nextCondLst>
-            </p:seq>
-          </p:childTnLst>
-        </p:cTn>
-      </p:par>
-    </p:tnLst>
-    <p:bldLst>
-      <p:bldP spid="8" grpId="0"/>
-    </p:bldLst>
-  </p:timing>
-</p:sld>
-</file>
-
-<file path=ppt/slides/slide26.xml><?xml version="1.0" encoding="utf-8"?>
-<p:sld xmlns:a="http://schemas.openxmlformats.org/drawingml/2006/main" xmlns:r="http://schemas.openxmlformats.org/officeDocument/2006/relationships" xmlns:p="http://schemas.openxmlformats.org/presentationml/2006/main">
-  <p:cSld>
-    <p:spTree>
-      <p:nvGrpSpPr>
-        <p:cNvPr id="1" name=""/>
-        <p:cNvGrpSpPr/>
-        <p:nvPr/>
-      </p:nvGrpSpPr>
-      <p:grpSpPr>
-        <a:xfrm>
-          <a:off x="0" y="0"/>
-          <a:ext cx="0" cy="0"/>
-          <a:chOff x="0" y="0"/>
-          <a:chExt cx="0" cy="0"/>
-        </a:xfrm>
-      </p:grpSpPr>
-      <p:sp>
-        <p:nvSpPr>
-          <p:cNvPr id="2" name="Title 1"/>
-          <p:cNvSpPr>
-            <a:spLocks noGrp="1"/>
-          </p:cNvSpPr>
-          <p:nvPr>
-            <p:ph type="title"/>
-          </p:nvPr>
-        </p:nvSpPr>
-        <p:spPr/>
-        <p:txBody>
-          <a:bodyPr/>
-          <a:lstStyle/>
-          <a:p>
-            <a:pPr algn="ctr"/>
-            <a:r>
-              <a:rPr lang="en-US" dirty="0" smtClean="0"/>
-              <a:t>What </a:t>
-            </a:r>
-            <a:r>
-              <a:rPr lang="en-US" dirty="0" err="1" smtClean="0"/>
-              <a:t>Tast</a:t>
-            </a:r>
-            <a:r>
-              <a:rPr lang="en-US" dirty="0" smtClean="0"/>
-              <a:t> Catalyst Can Do</a:t>
-            </a:r>
-            <a:endParaRPr lang="en-MY" dirty="0"/>
-          </a:p>
-        </p:txBody>
-      </p:sp>
-      <p:sp>
-        <p:nvSpPr>
-          <p:cNvPr id="3" name="Content Placeholder 2"/>
-          <p:cNvSpPr>
-            <a:spLocks noGrp="1"/>
-          </p:cNvSpPr>
-          <p:nvPr>
-            <p:ph idx="1"/>
-          </p:nvPr>
-        </p:nvSpPr>
-        <p:spPr>
-          <a:xfrm>
-            <a:off x="3702050" y="1889125"/>
-            <a:ext cx="7886700" cy="4351338"/>
-          </a:xfrm>
-        </p:spPr>
-        <p:txBody>
-          <a:bodyPr>
-            <a:noAutofit/>
-          </a:bodyPr>
-          <a:lstStyle/>
-          <a:p>
-            <a:pPr marL="0" indent="0">
-              <a:buNone/>
-            </a:pPr>
-            <a:r>
-              <a:rPr lang="en-US" sz="4200" dirty="0" smtClean="0"/>
-              <a:t>C</a:t>
-            </a:r>
-          </a:p>
-          <a:p>
-            <a:pPr marL="0" indent="0">
-              <a:buNone/>
-            </a:pPr>
-            <a:endParaRPr lang="en-US" sz="2000" dirty="0" smtClean="0"/>
-          </a:p>
-          <a:p>
-            <a:pPr marL="0" indent="0">
-              <a:buNone/>
-            </a:pPr>
-            <a:r>
-              <a:rPr lang="en-US" sz="4200" dirty="0" smtClean="0"/>
-              <a:t>R</a:t>
-            </a:r>
-          </a:p>
-          <a:p>
-            <a:pPr marL="0" indent="0">
-              <a:buNone/>
-            </a:pPr>
-            <a:endParaRPr lang="en-US" sz="2000" dirty="0" smtClean="0"/>
-          </a:p>
-          <a:p>
-            <a:pPr marL="0" indent="0">
-              <a:buNone/>
-            </a:pPr>
-            <a:r>
-              <a:rPr lang="en-US" sz="4200" dirty="0" smtClean="0"/>
-              <a:t>U</a:t>
-            </a:r>
-            <a:endParaRPr lang="en-US" dirty="0" smtClean="0"/>
-          </a:p>
-          <a:p>
-            <a:pPr marL="0" indent="0">
-              <a:buNone/>
-            </a:pPr>
-            <a:endParaRPr lang="en-US" sz="2000" dirty="0" smtClean="0"/>
-          </a:p>
-          <a:p>
-            <a:pPr marL="0" indent="0">
-              <a:buNone/>
-            </a:pPr>
-            <a:r>
-              <a:rPr lang="en-US" sz="4200" dirty="0" smtClean="0"/>
-              <a:t>D</a:t>
-            </a:r>
-            <a:endParaRPr lang="en-US" dirty="0" smtClean="0"/>
-          </a:p>
-        </p:txBody>
-      </p:sp>
-      <p:sp>
-        <p:nvSpPr>
-          <p:cNvPr id="4" name="Content Placeholder 2"/>
-          <p:cNvSpPr txBox="1">
-            <a:spLocks/>
-          </p:cNvSpPr>
-          <p:nvPr/>
-        </p:nvSpPr>
-        <p:spPr>
-          <a:xfrm>
-            <a:off x="3782260" y="1889125"/>
-            <a:ext cx="7886700" cy="4351338"/>
-          </a:xfrm>
-          <a:prstGeom prst="rect">
-            <a:avLst/>
-          </a:prstGeom>
-        </p:spPr>
-        <p:txBody>
-          <a:bodyPr vert="horz" lIns="91440" tIns="45720" rIns="91440" bIns="45720" rtlCol="0">
-            <a:noAutofit/>
-          </a:bodyPr>
-          <a:lstStyle>
-            <a:lvl1pPr marL="228600" indent="-228600" algn="l" defTabSz="914400" rtl="0" eaLnBrk="1" latinLnBrk="0" hangingPunct="1">
-              <a:lnSpc>
-                <a:spcPct val="90000"/>
-              </a:lnSpc>
-              <a:spcBef>
-                <a:spcPts val="1000"/>
-              </a:spcBef>
-              <a:buFont typeface="Arial" panose="020B0604020202020204" pitchFamily="34" charset="0"/>
-              <a:buChar char="•"/>
-              <a:defRPr sz="2800" kern="1200">
-                <a:solidFill>
-                  <a:schemeClr val="tx1"/>
-                </a:solidFill>
-                <a:latin typeface="+mn-lt"/>
-                <a:ea typeface="+mn-ea"/>
-                <a:cs typeface="+mn-cs"/>
-              </a:defRPr>
-            </a:lvl1pPr>
-            <a:lvl2pPr marL="685800" indent="-228600" algn="l" defTabSz="914400" rtl="0" eaLnBrk="1" latinLnBrk="0" hangingPunct="1">
-              <a:lnSpc>
-                <a:spcPct val="90000"/>
-              </a:lnSpc>
-              <a:spcBef>
-                <a:spcPts val="500"/>
-              </a:spcBef>
-              <a:buFont typeface="Arial" panose="020B0604020202020204" pitchFamily="34" charset="0"/>
-              <a:buChar char="•"/>
-              <a:defRPr sz="2400" kern="1200">
-                <a:solidFill>
-                  <a:schemeClr val="tx1"/>
-                </a:solidFill>
-                <a:latin typeface="+mn-lt"/>
-                <a:ea typeface="+mn-ea"/>
-                <a:cs typeface="+mn-cs"/>
-              </a:defRPr>
-            </a:lvl2pPr>
-            <a:lvl3pPr marL="1143000" indent="-228600" algn="l" defTabSz="914400" rtl="0" eaLnBrk="1" latinLnBrk="0" hangingPunct="1">
-              <a:lnSpc>
-                <a:spcPct val="90000"/>
-              </a:lnSpc>
-              <a:spcBef>
-                <a:spcPts val="500"/>
-              </a:spcBef>
-              <a:buFont typeface="Arial" panose="020B0604020202020204" pitchFamily="34" charset="0"/>
-              <a:buChar char="•"/>
-              <a:defRPr sz="2000" kern="1200">
-                <a:solidFill>
-                  <a:schemeClr val="tx1"/>
-                </a:solidFill>
-                <a:latin typeface="+mn-lt"/>
-                <a:ea typeface="+mn-ea"/>
-                <a:cs typeface="+mn-cs"/>
-              </a:defRPr>
-            </a:lvl3pPr>
-            <a:lvl4pPr marL="1600200" indent="-228600" algn="l" defTabSz="914400" rtl="0" eaLnBrk="1" latinLnBrk="0" hangingPunct="1">
-              <a:lnSpc>
-                <a:spcPct val="90000"/>
-              </a:lnSpc>
-              <a:spcBef>
-                <a:spcPts val="500"/>
-              </a:spcBef>
-              <a:buFont typeface="Arial" panose="020B0604020202020204" pitchFamily="34" charset="0"/>
-              <a:buChar char="•"/>
-              <a:defRPr sz="1800" kern="1200">
-                <a:solidFill>
-                  <a:schemeClr val="tx1"/>
-                </a:solidFill>
-                <a:latin typeface="+mn-lt"/>
-                <a:ea typeface="+mn-ea"/>
-                <a:cs typeface="+mn-cs"/>
-              </a:defRPr>
-            </a:lvl4pPr>
-            <a:lvl5pPr marL="2057400" indent="-228600" algn="l" defTabSz="914400" rtl="0" eaLnBrk="1" latinLnBrk="0" hangingPunct="1">
-              <a:lnSpc>
-                <a:spcPct val="90000"/>
-              </a:lnSpc>
-              <a:spcBef>
-                <a:spcPts val="500"/>
-              </a:spcBef>
-              <a:buFont typeface="Arial" panose="020B0604020202020204" pitchFamily="34" charset="0"/>
-              <a:buChar char="•"/>
-              <a:defRPr sz="1800" kern="1200">
-                <a:solidFill>
-                  <a:schemeClr val="tx1"/>
-                </a:solidFill>
-                <a:latin typeface="+mn-lt"/>
-                <a:ea typeface="+mn-ea"/>
-                <a:cs typeface="+mn-cs"/>
-              </a:defRPr>
-            </a:lvl5pPr>
-            <a:lvl6pPr marL="2514600" indent="-228600" algn="l" defTabSz="914400" rtl="0" eaLnBrk="1" latinLnBrk="0" hangingPunct="1">
-              <a:lnSpc>
-                <a:spcPct val="90000"/>
-              </a:lnSpc>
-              <a:spcBef>
-                <a:spcPts val="500"/>
-              </a:spcBef>
-              <a:buFont typeface="Arial" panose="020B0604020202020204" pitchFamily="34" charset="0"/>
-              <a:buChar char="•"/>
-              <a:defRPr sz="1800" kern="1200">
-                <a:solidFill>
-                  <a:schemeClr val="tx1"/>
-                </a:solidFill>
-                <a:latin typeface="+mn-lt"/>
-                <a:ea typeface="+mn-ea"/>
-                <a:cs typeface="+mn-cs"/>
-              </a:defRPr>
-            </a:lvl6pPr>
-            <a:lvl7pPr marL="2971800" indent="-228600" algn="l" defTabSz="914400" rtl="0" eaLnBrk="1" latinLnBrk="0" hangingPunct="1">
-              <a:lnSpc>
-                <a:spcPct val="90000"/>
-              </a:lnSpc>
-              <a:spcBef>
-                <a:spcPts val="500"/>
-              </a:spcBef>
-              <a:buFont typeface="Arial" panose="020B0604020202020204" pitchFamily="34" charset="0"/>
-              <a:buChar char="•"/>
-              <a:defRPr sz="1800" kern="1200">
-                <a:solidFill>
-                  <a:schemeClr val="tx1"/>
-                </a:solidFill>
-                <a:latin typeface="+mn-lt"/>
-                <a:ea typeface="+mn-ea"/>
-                <a:cs typeface="+mn-cs"/>
-              </a:defRPr>
-            </a:lvl7pPr>
-            <a:lvl8pPr marL="3429000" indent="-228600" algn="l" defTabSz="914400" rtl="0" eaLnBrk="1" latinLnBrk="0" hangingPunct="1">
-              <a:lnSpc>
-                <a:spcPct val="90000"/>
-              </a:lnSpc>
-              <a:spcBef>
-                <a:spcPts val="500"/>
-              </a:spcBef>
-              <a:buFont typeface="Arial" panose="020B0604020202020204" pitchFamily="34" charset="0"/>
-              <a:buChar char="•"/>
-              <a:defRPr sz="1800" kern="1200">
-                <a:solidFill>
-                  <a:schemeClr val="tx1"/>
-                </a:solidFill>
-                <a:latin typeface="+mn-lt"/>
-                <a:ea typeface="+mn-ea"/>
-                <a:cs typeface="+mn-cs"/>
-              </a:defRPr>
-            </a:lvl8pPr>
-            <a:lvl9pPr marL="3886200" indent="-228600" algn="l" defTabSz="914400" rtl="0" eaLnBrk="1" latinLnBrk="0" hangingPunct="1">
-              <a:lnSpc>
-                <a:spcPct val="90000"/>
-              </a:lnSpc>
-              <a:spcBef>
-                <a:spcPts val="500"/>
-              </a:spcBef>
-              <a:buFont typeface="Arial" panose="020B0604020202020204" pitchFamily="34" charset="0"/>
-              <a:buChar char="•"/>
-              <a:defRPr sz="1800" kern="1200">
-                <a:solidFill>
-                  <a:schemeClr val="tx1"/>
-                </a:solidFill>
-                <a:latin typeface="+mn-lt"/>
-                <a:ea typeface="+mn-ea"/>
-                <a:cs typeface="+mn-cs"/>
-              </a:defRPr>
-            </a:lvl9pPr>
-          </a:lstStyle>
-          <a:p>
-            <a:pPr marL="0" indent="0">
-              <a:buFont typeface="Arial" panose="020B0604020202020204" pitchFamily="34" charset="0"/>
-              <a:buNone/>
-            </a:pPr>
-            <a:r>
-              <a:rPr lang="en-US" sz="4200" dirty="0"/>
-              <a:t> </a:t>
-            </a:r>
-            <a:r>
-              <a:rPr lang="en-US" sz="4200" dirty="0" smtClean="0"/>
-              <a:t> </a:t>
-            </a:r>
-            <a:r>
-              <a:rPr lang="en-US" dirty="0" err="1" smtClean="0"/>
-              <a:t>reate</a:t>
-            </a:r>
-            <a:endParaRPr lang="en-US" dirty="0" smtClean="0"/>
-          </a:p>
-          <a:p>
-            <a:pPr marL="0" indent="0">
-              <a:buFont typeface="Arial" panose="020B0604020202020204" pitchFamily="34" charset="0"/>
-              <a:buNone/>
-            </a:pPr>
-            <a:endParaRPr lang="en-US" sz="2000" dirty="0" smtClean="0"/>
-          </a:p>
-          <a:p>
-            <a:pPr marL="0" indent="0">
-              <a:buFont typeface="Arial" panose="020B0604020202020204" pitchFamily="34" charset="0"/>
-              <a:buNone/>
-            </a:pPr>
-            <a:r>
-              <a:rPr lang="en-US" sz="4200" dirty="0" smtClean="0"/>
-              <a:t>  </a:t>
-            </a:r>
-            <a:r>
-              <a:rPr lang="en-US" dirty="0" err="1" smtClean="0"/>
-              <a:t>ead</a:t>
-            </a:r>
-            <a:endParaRPr lang="en-US" dirty="0" smtClean="0"/>
-          </a:p>
-          <a:p>
-            <a:pPr marL="0" indent="0">
-              <a:buFont typeface="Arial" panose="020B0604020202020204" pitchFamily="34" charset="0"/>
-              <a:buNone/>
-            </a:pPr>
-            <a:endParaRPr lang="en-US" sz="2000" dirty="0" smtClean="0"/>
-          </a:p>
-          <a:p>
-            <a:pPr marL="0" indent="0">
-              <a:buFont typeface="Arial" panose="020B0604020202020204" pitchFamily="34" charset="0"/>
-              <a:buNone/>
-            </a:pPr>
-            <a:r>
-              <a:rPr lang="en-US" sz="4200" dirty="0" smtClean="0"/>
-              <a:t>  </a:t>
-            </a:r>
-            <a:r>
-              <a:rPr lang="en-US" dirty="0" err="1" smtClean="0"/>
-              <a:t>pdate</a:t>
-            </a:r>
-            <a:endParaRPr lang="en-US" dirty="0" smtClean="0"/>
-          </a:p>
-          <a:p>
-            <a:pPr marL="0" indent="0">
-              <a:buFont typeface="Arial" panose="020B0604020202020204" pitchFamily="34" charset="0"/>
-              <a:buNone/>
-            </a:pPr>
-            <a:endParaRPr lang="en-US" sz="2000" dirty="0" smtClean="0"/>
-          </a:p>
-          <a:p>
-            <a:pPr marL="0" indent="0">
-              <a:buFont typeface="Arial" panose="020B0604020202020204" pitchFamily="34" charset="0"/>
-              <a:buNone/>
-            </a:pPr>
-            <a:r>
-              <a:rPr lang="en-US" sz="4200" dirty="0" smtClean="0"/>
-              <a:t>  </a:t>
-            </a:r>
-            <a:r>
-              <a:rPr lang="en-US" dirty="0" err="1" smtClean="0"/>
-              <a:t>elete</a:t>
-            </a:r>
-            <a:endParaRPr lang="en-US" dirty="0" smtClean="0"/>
-          </a:p>
-        </p:txBody>
-      </p:sp>
-    </p:spTree>
-    <p:extLst>
-      <p:ext uri="{BB962C8B-B14F-4D97-AF65-F5344CB8AC3E}">
-        <p14:creationId xmlns:p14="http://schemas.microsoft.com/office/powerpoint/2010/main" val="495950684"/>
-      </p:ext>
-    </p:extLst>
-  </p:cSld>
-  <p:clrMapOvr>
-    <a:masterClrMapping/>
-  </p:clrMapOvr>
-  <p:timing>
-    <p:tnLst>
-      <p:par>
-        <p:cTn id="1" dur="indefinite" restart="never" nodeType="tmRoot">
-          <p:childTnLst>
-            <p:seq concurrent="1" nextAc="seek">
-              <p:cTn id="2" dur="indefinite" nodeType="mainSeq">
-                <p:childTnLst>
-                  <p:par>
-                    <p:cTn id="3" fill="hold">
-                      <p:stCondLst>
-                        <p:cond delay="indefinite"/>
-                      </p:stCondLst>
-                      <p:childTnLst>
-                        <p:par>
-                          <p:cTn id="4" fill="hold">
-                            <p:stCondLst>
-                              <p:cond delay="0"/>
-                            </p:stCondLst>
-                            <p:childTnLst>
-                              <p:par>
-                                <p:cTn id="5" presetID="2" presetClass="entr" presetSubtype="4" fill="hold" grpId="0" nodeType="clickEffect">
-                                  <p:stCondLst>
-                                    <p:cond delay="0"/>
-                                  </p:stCondLst>
-                                  <p:childTnLst>
-                                    <p:set>
-                                      <p:cBhvr>
-                                        <p:cTn id="6" dur="1" fill="hold">
-                                          <p:stCondLst>
-                                            <p:cond delay="0"/>
-                                          </p:stCondLst>
-                                        </p:cTn>
-                                        <p:tgtEl>
-                                          <p:spTgt spid="3">
-                                            <p:txEl>
-                                              <p:pRg st="0" end="0"/>
-                                            </p:txEl>
-                                          </p:spTgt>
-                                        </p:tgtEl>
-                                        <p:attrNameLst>
-                                          <p:attrName>style.visibility</p:attrName>
-                                        </p:attrNameLst>
-                                      </p:cBhvr>
-                                      <p:to>
-                                        <p:strVal val="visible"/>
-                                      </p:to>
-                                    </p:set>
-                                    <p:anim calcmode="lin" valueType="num">
-                                      <p:cBhvr additive="base">
-                                        <p:cTn id="7" dur="500" fill="hold"/>
-                                        <p:tgtEl>
-                                          <p:spTgt spid="3">
-                                            <p:txEl>
-                                              <p:pRg st="0" end="0"/>
-                                            </p:txEl>
-                                          </p:spTgt>
-                                        </p:tgtEl>
-                                        <p:attrNameLst>
-                                          <p:attrName>ppt_x</p:attrName>
-                                        </p:attrNameLst>
-                                      </p:cBhvr>
-                                      <p:tavLst>
-                                        <p:tav tm="0">
-                                          <p:val>
-                                            <p:strVal val="#ppt_x"/>
-                                          </p:val>
-                                        </p:tav>
-                                        <p:tav tm="100000">
-                                          <p:val>
-                                            <p:strVal val="#ppt_x"/>
-                                          </p:val>
-                                        </p:tav>
-                                      </p:tavLst>
-                                    </p:anim>
-                                    <p:anim calcmode="lin" valueType="num">
-                                      <p:cBhvr additive="base">
-                                        <p:cTn id="8" dur="500" fill="hold"/>
-                                        <p:tgtEl>
-                                          <p:spTgt spid="3">
-                                            <p:txEl>
-                                              <p:pRg st="0" end="0"/>
-                                            </p:txEl>
-                                          </p:spTgt>
-                                        </p:tgtEl>
-                                        <p:attrNameLst>
-                                          <p:attrName>ppt_y</p:attrName>
-                                        </p:attrNameLst>
-                                      </p:cBhvr>
-                                      <p:tavLst>
-                                        <p:tav tm="0">
-                                          <p:val>
-                                            <p:strVal val="1+#ppt_h/2"/>
-                                          </p:val>
-                                        </p:tav>
-                                        <p:tav tm="100000">
-                                          <p:val>
-                                            <p:strVal val="#ppt_y"/>
-                                          </p:val>
-                                        </p:tav>
-                                      </p:tavLst>
-                                    </p:anim>
-                                  </p:childTnLst>
-                                </p:cTn>
-                              </p:par>
-                            </p:childTnLst>
-                          </p:cTn>
-                        </p:par>
-                      </p:childTnLst>
-                    </p:cTn>
-                  </p:par>
-                  <p:par>
-                    <p:cTn id="9" fill="hold">
-                      <p:stCondLst>
-                        <p:cond delay="indefinite"/>
-                      </p:stCondLst>
-                      <p:childTnLst>
-                        <p:par>
-                          <p:cTn id="10" fill="hold">
-                            <p:stCondLst>
-                              <p:cond delay="0"/>
-                            </p:stCondLst>
-                            <p:childTnLst>
-                              <p:par>
-                                <p:cTn id="11" presetID="16" presetClass="entr" presetSubtype="21" fill="hold" grpId="0" nodeType="clickEffect">
-                                  <p:stCondLst>
-                                    <p:cond delay="0"/>
-                                  </p:stCondLst>
-                                  <p:childTnLst>
-                                    <p:set>
-                                      <p:cBhvr>
-                                        <p:cTn id="12" dur="1" fill="hold">
-                                          <p:stCondLst>
-                                            <p:cond delay="0"/>
-                                          </p:stCondLst>
-                                        </p:cTn>
-                                        <p:tgtEl>
-                                          <p:spTgt spid="3">
-                                            <p:txEl>
-                                              <p:pRg st="2" end="2"/>
-                                            </p:txEl>
-                                          </p:spTgt>
-                                        </p:tgtEl>
-                                        <p:attrNameLst>
-                                          <p:attrName>style.visibility</p:attrName>
-                                        </p:attrNameLst>
-                                      </p:cBhvr>
-                                      <p:to>
-                                        <p:strVal val="visible"/>
-                                      </p:to>
-                                    </p:set>
-                                    <p:animEffect transition="in" filter="barn(inVertical)">
-                                      <p:cBhvr>
-                                        <p:cTn id="13" dur="500"/>
-                                        <p:tgtEl>
-                                          <p:spTgt spid="3">
-                                            <p:txEl>
-                                              <p:pRg st="2" end="2"/>
-                                            </p:txEl>
-                                          </p:spTgt>
-                                        </p:tgtEl>
-                                      </p:cBhvr>
-                                    </p:animEffect>
-                                  </p:childTnLst>
-                                </p:cTn>
-                              </p:par>
-                            </p:childTnLst>
-                          </p:cTn>
-                        </p:par>
-                      </p:childTnLst>
-                    </p:cTn>
-                  </p:par>
-                  <p:par>
-                    <p:cTn id="14" fill="hold">
-                      <p:stCondLst>
-                        <p:cond delay="indefinite"/>
-                      </p:stCondLst>
-                      <p:childTnLst>
-                        <p:par>
-                          <p:cTn id="15" fill="hold">
-                            <p:stCondLst>
-                              <p:cond delay="0"/>
-                            </p:stCondLst>
-                            <p:childTnLst>
-                              <p:par>
-                                <p:cTn id="16" presetID="16" presetClass="entr" presetSubtype="21" fill="hold" grpId="0" nodeType="clickEffect">
-                                  <p:stCondLst>
-                                    <p:cond delay="0"/>
-                                  </p:stCondLst>
-                                  <p:childTnLst>
-                                    <p:set>
-                                      <p:cBhvr>
-                                        <p:cTn id="17" dur="1" fill="hold">
-                                          <p:stCondLst>
-                                            <p:cond delay="0"/>
-                                          </p:stCondLst>
-                                        </p:cTn>
-                                        <p:tgtEl>
-                                          <p:spTgt spid="3">
-                                            <p:txEl>
-                                              <p:pRg st="4" end="4"/>
-                                            </p:txEl>
-                                          </p:spTgt>
-                                        </p:tgtEl>
-                                        <p:attrNameLst>
-                                          <p:attrName>style.visibility</p:attrName>
-                                        </p:attrNameLst>
-                                      </p:cBhvr>
-                                      <p:to>
-                                        <p:strVal val="visible"/>
-                                      </p:to>
-                                    </p:set>
-                                    <p:animEffect transition="in" filter="barn(inVertical)">
-                                      <p:cBhvr>
-                                        <p:cTn id="18" dur="500"/>
-                                        <p:tgtEl>
-                                          <p:spTgt spid="3">
-                                            <p:txEl>
-                                              <p:pRg st="4" end="4"/>
-                                            </p:txEl>
-                                          </p:spTgt>
-                                        </p:tgtEl>
-                                      </p:cBhvr>
-                                    </p:animEffect>
-                                  </p:childTnLst>
-                                </p:cTn>
-                              </p:par>
-                            </p:childTnLst>
-                          </p:cTn>
-                        </p:par>
-                      </p:childTnLst>
-                    </p:cTn>
-                  </p:par>
-                  <p:par>
-                    <p:cTn id="19" fill="hold">
-                      <p:stCondLst>
-                        <p:cond delay="indefinite"/>
-                      </p:stCondLst>
-                      <p:childTnLst>
-                        <p:par>
-                          <p:cTn id="20" fill="hold">
-                            <p:stCondLst>
-                              <p:cond delay="0"/>
-                            </p:stCondLst>
-                            <p:childTnLst>
-                              <p:par>
-                                <p:cTn id="21" presetID="16" presetClass="entr" presetSubtype="21" fill="hold" grpId="0" nodeType="clickEffect">
-                                  <p:stCondLst>
-                                    <p:cond delay="0"/>
-                                  </p:stCondLst>
-                                  <p:childTnLst>
-                                    <p:set>
-                                      <p:cBhvr>
-                                        <p:cTn id="22" dur="1" fill="hold">
-                                          <p:stCondLst>
-                                            <p:cond delay="0"/>
-                                          </p:stCondLst>
-                                        </p:cTn>
-                                        <p:tgtEl>
-                                          <p:spTgt spid="3">
-                                            <p:txEl>
-                                              <p:pRg st="6" end="6"/>
-                                            </p:txEl>
-                                          </p:spTgt>
-                                        </p:tgtEl>
-                                        <p:attrNameLst>
-                                          <p:attrName>style.visibility</p:attrName>
-                                        </p:attrNameLst>
-                                      </p:cBhvr>
-                                      <p:to>
-                                        <p:strVal val="visible"/>
-                                      </p:to>
-                                    </p:set>
-                                    <p:animEffect transition="in" filter="barn(inVertical)">
-                                      <p:cBhvr>
-                                        <p:cTn id="23" dur="500"/>
-                                        <p:tgtEl>
-                                          <p:spTgt spid="3">
-                                            <p:txEl>
-                                              <p:pRg st="6" end="6"/>
-                                            </p:txEl>
-                                          </p:spTgt>
-                                        </p:tgtEl>
-                                      </p:cBhvr>
-                                    </p:animEffect>
-                                  </p:childTnLst>
-                                </p:cTn>
-                              </p:par>
-                            </p:childTnLst>
-                          </p:cTn>
-                        </p:par>
-                      </p:childTnLst>
-                    </p:cTn>
-                  </p:par>
-                  <p:par>
-                    <p:cTn id="24" fill="hold">
-                      <p:stCondLst>
-                        <p:cond delay="indefinite"/>
-                      </p:stCondLst>
-                      <p:childTnLst>
-                        <p:par>
-                          <p:cTn id="25" fill="hold">
-                            <p:stCondLst>
-                              <p:cond delay="0"/>
-                            </p:stCondLst>
-                            <p:childTnLst>
-                              <p:par>
-                                <p:cTn id="26" presetID="2" presetClass="entr" presetSubtype="2" fill="hold" grpId="0" nodeType="clickEffect">
-                                  <p:stCondLst>
-                                    <p:cond delay="0"/>
-                                  </p:stCondLst>
-                                  <p:childTnLst>
-                                    <p:set>
-                                      <p:cBhvr>
-                                        <p:cTn id="27" dur="1" fill="hold">
-                                          <p:stCondLst>
-                                            <p:cond delay="0"/>
-                                          </p:stCondLst>
-                                        </p:cTn>
-                                        <p:tgtEl>
-                                          <p:spTgt spid="4">
-                                            <p:txEl>
-                                              <p:pRg st="0" end="0"/>
-                                            </p:txEl>
-                                          </p:spTgt>
-                                        </p:tgtEl>
-                                        <p:attrNameLst>
-                                          <p:attrName>style.visibility</p:attrName>
-                                        </p:attrNameLst>
-                                      </p:cBhvr>
-                                      <p:to>
-                                        <p:strVal val="visible"/>
-                                      </p:to>
-                                    </p:set>
-                                    <p:anim calcmode="lin" valueType="num">
-                                      <p:cBhvr additive="base">
-                                        <p:cTn id="28" dur="500" fill="hold"/>
-                                        <p:tgtEl>
-                                          <p:spTgt spid="4">
-                                            <p:txEl>
-                                              <p:pRg st="0" end="0"/>
-                                            </p:txEl>
-                                          </p:spTgt>
-                                        </p:tgtEl>
-                                        <p:attrNameLst>
-                                          <p:attrName>ppt_x</p:attrName>
-                                        </p:attrNameLst>
-                                      </p:cBhvr>
-                                      <p:tavLst>
-                                        <p:tav tm="0">
-                                          <p:val>
-                                            <p:strVal val="1+#ppt_w/2"/>
-                                          </p:val>
-                                        </p:tav>
-                                        <p:tav tm="100000">
-                                          <p:val>
-                                            <p:strVal val="#ppt_x"/>
-                                          </p:val>
-                                        </p:tav>
-                                      </p:tavLst>
-                                    </p:anim>
-                                    <p:anim calcmode="lin" valueType="num">
-                                      <p:cBhvr additive="base">
-                                        <p:cTn id="29" dur="500" fill="hold"/>
-                                        <p:tgtEl>
-                                          <p:spTgt spid="4">
-                                            <p:txEl>
-                                              <p:pRg st="0" end="0"/>
-                                            </p:txEl>
-                                          </p:spTgt>
-                                        </p:tgtEl>
-                                        <p:attrNameLst>
-                                          <p:attrName>ppt_y</p:attrName>
-                                        </p:attrNameLst>
-                                      </p:cBhvr>
-                                      <p:tavLst>
-                                        <p:tav tm="0">
-                                          <p:val>
-                                            <p:strVal val="#ppt_y"/>
-                                          </p:val>
-                                        </p:tav>
-                                        <p:tav tm="100000">
-                                          <p:val>
-                                            <p:strVal val="#ppt_y"/>
-                                          </p:val>
-                                        </p:tav>
-                                      </p:tavLst>
-                                    </p:anim>
-                                  </p:childTnLst>
-                                </p:cTn>
-                              </p:par>
-                            </p:childTnLst>
-                          </p:cTn>
-                        </p:par>
-                      </p:childTnLst>
-                    </p:cTn>
-                  </p:par>
-                  <p:par>
-                    <p:cTn id="30" fill="hold">
-                      <p:stCondLst>
-                        <p:cond delay="indefinite"/>
-                      </p:stCondLst>
-                      <p:childTnLst>
-                        <p:par>
-                          <p:cTn id="31" fill="hold">
-                            <p:stCondLst>
-                              <p:cond delay="0"/>
-                            </p:stCondLst>
-                            <p:childTnLst>
-                              <p:par>
-                                <p:cTn id="32" presetID="2" presetClass="entr" presetSubtype="2" fill="hold" grpId="0" nodeType="clickEffect">
-                                  <p:stCondLst>
-                                    <p:cond delay="0"/>
-                                  </p:stCondLst>
-                                  <p:childTnLst>
-                                    <p:set>
-                                      <p:cBhvr>
-                                        <p:cTn id="33" dur="1" fill="hold">
-                                          <p:stCondLst>
-                                            <p:cond delay="0"/>
-                                          </p:stCondLst>
-                                        </p:cTn>
-                                        <p:tgtEl>
-                                          <p:spTgt spid="4">
-                                            <p:txEl>
-                                              <p:pRg st="2" end="2"/>
-                                            </p:txEl>
-                                          </p:spTgt>
-                                        </p:tgtEl>
-                                        <p:attrNameLst>
-                                          <p:attrName>style.visibility</p:attrName>
-                                        </p:attrNameLst>
-                                      </p:cBhvr>
-                                      <p:to>
-                                        <p:strVal val="visible"/>
-                                      </p:to>
-                                    </p:set>
-                                    <p:anim calcmode="lin" valueType="num">
-                                      <p:cBhvr additive="base">
-                                        <p:cTn id="34" dur="500" fill="hold"/>
-                                        <p:tgtEl>
-                                          <p:spTgt spid="4">
-                                            <p:txEl>
-                                              <p:pRg st="2" end="2"/>
-                                            </p:txEl>
-                                          </p:spTgt>
-                                        </p:tgtEl>
-                                        <p:attrNameLst>
-                                          <p:attrName>ppt_x</p:attrName>
-                                        </p:attrNameLst>
-                                      </p:cBhvr>
-                                      <p:tavLst>
-                                        <p:tav tm="0">
-                                          <p:val>
-                                            <p:strVal val="1+#ppt_w/2"/>
-                                          </p:val>
-                                        </p:tav>
-                                        <p:tav tm="100000">
-                                          <p:val>
-                                            <p:strVal val="#ppt_x"/>
-                                          </p:val>
-                                        </p:tav>
-                                      </p:tavLst>
-                                    </p:anim>
-                                    <p:anim calcmode="lin" valueType="num">
-                                      <p:cBhvr additive="base">
-                                        <p:cTn id="35" dur="500" fill="hold"/>
-                                        <p:tgtEl>
-                                          <p:spTgt spid="4">
-                                            <p:txEl>
-                                              <p:pRg st="2" end="2"/>
-                                            </p:txEl>
-                                          </p:spTgt>
-                                        </p:tgtEl>
-                                        <p:attrNameLst>
-                                          <p:attrName>ppt_y</p:attrName>
-                                        </p:attrNameLst>
-                                      </p:cBhvr>
-                                      <p:tavLst>
-                                        <p:tav tm="0">
-                                          <p:val>
-                                            <p:strVal val="#ppt_y"/>
-                                          </p:val>
-                                        </p:tav>
-                                        <p:tav tm="100000">
-                                          <p:val>
-                                            <p:strVal val="#ppt_y"/>
-                                          </p:val>
-                                        </p:tav>
-                                      </p:tavLst>
-                                    </p:anim>
-                                  </p:childTnLst>
-                                </p:cTn>
-                              </p:par>
-                            </p:childTnLst>
-                          </p:cTn>
-                        </p:par>
-                      </p:childTnLst>
-                    </p:cTn>
-                  </p:par>
-                  <p:par>
-                    <p:cTn id="36" fill="hold">
-                      <p:stCondLst>
-                        <p:cond delay="indefinite"/>
-                      </p:stCondLst>
-                      <p:childTnLst>
-                        <p:par>
-                          <p:cTn id="37" fill="hold">
-                            <p:stCondLst>
-                              <p:cond delay="0"/>
-                            </p:stCondLst>
-                            <p:childTnLst>
-                              <p:par>
-                                <p:cTn id="38" presetID="2" presetClass="entr" presetSubtype="2" fill="hold" grpId="0" nodeType="clickEffect">
-                                  <p:stCondLst>
-                                    <p:cond delay="0"/>
-                                  </p:stCondLst>
-                                  <p:childTnLst>
-                                    <p:set>
-                                      <p:cBhvr>
-                                        <p:cTn id="39" dur="1" fill="hold">
-                                          <p:stCondLst>
-                                            <p:cond delay="0"/>
-                                          </p:stCondLst>
-                                        </p:cTn>
-                                        <p:tgtEl>
-                                          <p:spTgt spid="4">
-                                            <p:txEl>
-                                              <p:pRg st="4" end="4"/>
-                                            </p:txEl>
-                                          </p:spTgt>
-                                        </p:tgtEl>
-                                        <p:attrNameLst>
-                                          <p:attrName>style.visibility</p:attrName>
-                                        </p:attrNameLst>
-                                      </p:cBhvr>
-                                      <p:to>
-                                        <p:strVal val="visible"/>
-                                      </p:to>
-                                    </p:set>
-                                    <p:anim calcmode="lin" valueType="num">
-                                      <p:cBhvr additive="base">
-                                        <p:cTn id="40" dur="500" fill="hold"/>
-                                        <p:tgtEl>
-                                          <p:spTgt spid="4">
-                                            <p:txEl>
-                                              <p:pRg st="4" end="4"/>
-                                            </p:txEl>
-                                          </p:spTgt>
-                                        </p:tgtEl>
-                                        <p:attrNameLst>
-                                          <p:attrName>ppt_x</p:attrName>
-                                        </p:attrNameLst>
-                                      </p:cBhvr>
-                                      <p:tavLst>
-                                        <p:tav tm="0">
-                                          <p:val>
-                                            <p:strVal val="1+#ppt_w/2"/>
-                                          </p:val>
-                                        </p:tav>
-                                        <p:tav tm="100000">
-                                          <p:val>
-                                            <p:strVal val="#ppt_x"/>
-                                          </p:val>
-                                        </p:tav>
-                                      </p:tavLst>
-                                    </p:anim>
-                                    <p:anim calcmode="lin" valueType="num">
-                                      <p:cBhvr additive="base">
-                                        <p:cTn id="41" dur="500" fill="hold"/>
-                                        <p:tgtEl>
-                                          <p:spTgt spid="4">
-                                            <p:txEl>
-                                              <p:pRg st="4" end="4"/>
-                                            </p:txEl>
-                                          </p:spTgt>
-                                        </p:tgtEl>
-                                        <p:attrNameLst>
-                                          <p:attrName>ppt_y</p:attrName>
-                                        </p:attrNameLst>
-                                      </p:cBhvr>
-                                      <p:tavLst>
-                                        <p:tav tm="0">
-                                          <p:val>
-                                            <p:strVal val="#ppt_y"/>
-                                          </p:val>
-                                        </p:tav>
-                                        <p:tav tm="100000">
-                                          <p:val>
-                                            <p:strVal val="#ppt_y"/>
-                                          </p:val>
-                                        </p:tav>
-                                      </p:tavLst>
-                                    </p:anim>
-                                  </p:childTnLst>
-                                </p:cTn>
-                              </p:par>
-                            </p:childTnLst>
-                          </p:cTn>
-                        </p:par>
-                      </p:childTnLst>
-                    </p:cTn>
-                  </p:par>
-                  <p:par>
-                    <p:cTn id="42" fill="hold">
-                      <p:stCondLst>
-                        <p:cond delay="indefinite"/>
-                      </p:stCondLst>
-                      <p:childTnLst>
-                        <p:par>
-                          <p:cTn id="43" fill="hold">
-                            <p:stCondLst>
-                              <p:cond delay="0"/>
-                            </p:stCondLst>
-                            <p:childTnLst>
-                              <p:par>
-                                <p:cTn id="44" presetID="2" presetClass="entr" presetSubtype="2" fill="hold" grpId="0" nodeType="clickEffect">
-                                  <p:stCondLst>
-                                    <p:cond delay="0"/>
-                                  </p:stCondLst>
-                                  <p:childTnLst>
-                                    <p:set>
-                                      <p:cBhvr>
-                                        <p:cTn id="45" dur="1" fill="hold">
-                                          <p:stCondLst>
-                                            <p:cond delay="0"/>
-                                          </p:stCondLst>
-                                        </p:cTn>
-                                        <p:tgtEl>
-                                          <p:spTgt spid="4">
-                                            <p:txEl>
-                                              <p:pRg st="6" end="6"/>
-                                            </p:txEl>
-                                          </p:spTgt>
-                                        </p:tgtEl>
-                                        <p:attrNameLst>
-                                          <p:attrName>style.visibility</p:attrName>
-                                        </p:attrNameLst>
-                                      </p:cBhvr>
-                                      <p:to>
-                                        <p:strVal val="visible"/>
-                                      </p:to>
-                                    </p:set>
-                                    <p:anim calcmode="lin" valueType="num">
-                                      <p:cBhvr additive="base">
-                                        <p:cTn id="46" dur="500" fill="hold"/>
-                                        <p:tgtEl>
-                                          <p:spTgt spid="4">
-                                            <p:txEl>
-                                              <p:pRg st="6" end="6"/>
-                                            </p:txEl>
-                                          </p:spTgt>
-                                        </p:tgtEl>
-                                        <p:attrNameLst>
-                                          <p:attrName>ppt_x</p:attrName>
-                                        </p:attrNameLst>
-                                      </p:cBhvr>
-                                      <p:tavLst>
-                                        <p:tav tm="0">
-                                          <p:val>
-                                            <p:strVal val="1+#ppt_w/2"/>
-                                          </p:val>
-                                        </p:tav>
-                                        <p:tav tm="100000">
-                                          <p:val>
-                                            <p:strVal val="#ppt_x"/>
-                                          </p:val>
-                                        </p:tav>
-                                      </p:tavLst>
-                                    </p:anim>
-                                    <p:anim calcmode="lin" valueType="num">
-                                      <p:cBhvr additive="base">
-                                        <p:cTn id="47" dur="500" fill="hold"/>
-                                        <p:tgtEl>
-                                          <p:spTgt spid="4">
-                                            <p:txEl>
-                                              <p:pRg st="6" end="6"/>
-                                            </p:txEl>
-                                          </p:spTgt>
-                                        </p:tgtEl>
-                                        <p:attrNameLst>
-                                          <p:attrName>ppt_y</p:attrName>
-                                        </p:attrNameLst>
-                                      </p:cBhvr>
-                                      <p:tavLst>
-                                        <p:tav tm="0">
-                                          <p:val>
-                                            <p:strVal val="#ppt_y"/>
-                                          </p:val>
-                                        </p:tav>
-                                        <p:tav tm="100000">
-                                          <p:val>
-                                            <p:strVal val="#ppt_y"/>
-                                          </p:val>
-                                        </p:tav>
-                                      </p:tavLst>
-                                    </p:anim>
-                                  </p:childTnLst>
-                                </p:cTn>
-                              </p:par>
-                            </p:childTnLst>
-                          </p:cTn>
-                        </p:par>
-                      </p:childTnLst>
-                    </p:cTn>
-                  </p:par>
-                </p:childTnLst>
-              </p:cTn>
-              <p:prevCondLst>
-                <p:cond evt="onPrev" delay="0">
-                  <p:tgtEl>
-                    <p:sldTgt/>
-                  </p:tgtEl>
-                </p:cond>
-              </p:prevCondLst>
-              <p:nextCondLst>
-                <p:cond evt="onNext" delay="0">
-                  <p:tgtEl>
-                    <p:sldTgt/>
-                  </p:tgtEl>
-                </p:cond>
-              </p:nextCondLst>
-            </p:seq>
-          </p:childTnLst>
-        </p:cTn>
-      </p:par>
-    </p:tnLst>
-    <p:bldLst>
-      <p:bldP spid="3" grpId="0" uiExpand="1" build="p"/>
-      <p:bldP spid="4" grpId="0" build="p"/>
-    </p:bldLst>
-  </p:timing>
-</p:sld>
-</file>
-
-<file path=ppt/slides/slide27.xml><?xml version="1.0" encoding="utf-8"?>
-<p:sld xmlns:a="http://schemas.openxmlformats.org/drawingml/2006/main" xmlns:r="http://schemas.openxmlformats.org/officeDocument/2006/relationships" xmlns:p="http://schemas.openxmlformats.org/presentationml/2006/main">
-  <p:cSld>
-    <p:spTree>
-      <p:nvGrpSpPr>
-        <p:cNvPr id="1" name=""/>
-        <p:cNvGrpSpPr/>
-        <p:nvPr/>
-      </p:nvGrpSpPr>
-      <p:grpSpPr>
-        <a:xfrm>
-          <a:off x="0" y="0"/>
-          <a:ext cx="0" cy="0"/>
-          <a:chOff x="0" y="0"/>
-          <a:chExt cx="0" cy="0"/>
-        </a:xfrm>
-      </p:grpSpPr>
-      <p:sp>
-        <p:nvSpPr>
-          <p:cNvPr id="2" name="Title 1"/>
-          <p:cNvSpPr>
-            <a:spLocks noGrp="1"/>
-          </p:cNvSpPr>
-          <p:nvPr>
-            <p:ph type="title"/>
-          </p:nvPr>
-        </p:nvSpPr>
-        <p:spPr/>
-        <p:txBody>
-          <a:bodyPr/>
-          <a:lstStyle/>
-          <a:p>
-            <a:pPr algn="ctr"/>
-            <a:r>
-              <a:rPr lang="en-US" dirty="0" smtClean="0"/>
-              <a:t>What Task Catalyst Can Do</a:t>
-            </a:r>
-            <a:endParaRPr lang="en-MY" dirty="0"/>
-          </a:p>
-        </p:txBody>
-      </p:sp>
-      <p:pic>
-        <p:nvPicPr>
-          <p:cNvPr id="4" name="Content Placeholder 3"/>
-          <p:cNvPicPr>
-            <a:picLocks noGrp="1" noChangeAspect="1"/>
-          </p:cNvPicPr>
-          <p:nvPr>
-            <p:ph idx="1"/>
-          </p:nvPr>
-        </p:nvPicPr>
-        <p:blipFill>
-          <a:blip r:embed="rId2">
-            <a:extLst>
-              <a:ext uri="{28A0092B-C50C-407E-A947-70E740481C1C}">
-                <a14:useLocalDpi xmlns:a14="http://schemas.microsoft.com/office/drawing/2010/main" val="0"/>
-              </a:ext>
-            </a:extLst>
-          </a:blip>
-          <a:stretch>
-            <a:fillRect/>
-          </a:stretch>
-        </p:blipFill>
-        <p:spPr>
-          <a:xfrm>
-            <a:off x="3257611" y="2407140"/>
-            <a:ext cx="2628778" cy="2628778"/>
-          </a:xfrm>
-        </p:spPr>
-      </p:pic>
-      <p:pic>
-        <p:nvPicPr>
-          <p:cNvPr id="5" name="Picture 4"/>
-          <p:cNvPicPr>
-            <a:picLocks noChangeAspect="1"/>
-          </p:cNvPicPr>
-          <p:nvPr/>
-        </p:nvPicPr>
-        <p:blipFill>
-          <a:blip r:embed="rId3" cstate="print">
-            <a:extLst>
-              <a:ext uri="{28A0092B-C50C-407E-A947-70E740481C1C}">
-                <a14:useLocalDpi xmlns:a14="http://schemas.microsoft.com/office/drawing/2010/main" val="0"/>
-              </a:ext>
-            </a:extLst>
-          </a:blip>
-          <a:stretch>
-            <a:fillRect/>
-          </a:stretch>
-        </p:blipFill>
-        <p:spPr>
-          <a:xfrm>
-            <a:off x="3221145" y="2173994"/>
-            <a:ext cx="2701709" cy="3438948"/>
-          </a:xfrm>
-          <a:prstGeom prst="rect">
-            <a:avLst/>
-          </a:prstGeom>
-        </p:spPr>
-      </p:pic>
-      <p:pic>
-        <p:nvPicPr>
-          <p:cNvPr id="6" name="Picture 5"/>
-          <p:cNvPicPr>
-            <a:picLocks noChangeAspect="1"/>
-          </p:cNvPicPr>
-          <p:nvPr/>
-        </p:nvPicPr>
-        <p:blipFill>
-          <a:blip r:embed="rId4">
-            <a:extLst>
-              <a:ext uri="{28A0092B-C50C-407E-A947-70E740481C1C}">
-                <a14:useLocalDpi xmlns:a14="http://schemas.microsoft.com/office/drawing/2010/main" val="0"/>
-              </a:ext>
-            </a:extLst>
-          </a:blip>
-          <a:stretch>
-            <a:fillRect/>
-          </a:stretch>
-        </p:blipFill>
-        <p:spPr>
-          <a:xfrm>
-            <a:off x="2032316" y="2212394"/>
-            <a:ext cx="5079365" cy="3377778"/>
-          </a:xfrm>
-          <a:prstGeom prst="rect">
-            <a:avLst/>
-          </a:prstGeom>
-        </p:spPr>
-      </p:pic>
-    </p:spTree>
-    <p:extLst>
-      <p:ext uri="{BB962C8B-B14F-4D97-AF65-F5344CB8AC3E}">
-        <p14:creationId xmlns:p14="http://schemas.microsoft.com/office/powerpoint/2010/main" val="203354214"/>
-      </p:ext>
-    </p:extLst>
-  </p:cSld>
-  <p:clrMapOvr>
-    <a:masterClrMapping/>
-  </p:clrMapOvr>
-  <p:timing>
-    <p:tnLst>
-      <p:par>
-        <p:cTn id="1" dur="indefinite" restart="never" nodeType="tmRoot">
-          <p:childTnLst>
-            <p:seq concurrent="1" nextAc="seek">
-              <p:cTn id="2" dur="indefinite" nodeType="mainSeq">
-                <p:childTnLst>
-                  <p:par>
-                    <p:cTn id="3" fill="hold">
-                      <p:stCondLst>
-                        <p:cond delay="indefinite"/>
-                      </p:stCondLst>
-                      <p:childTnLst>
-                        <p:par>
-                          <p:cTn id="4" fill="hold">
-                            <p:stCondLst>
-                              <p:cond delay="0"/>
-                            </p:stCondLst>
-                            <p:childTnLst>
-                              <p:par>
-                                <p:cTn id="5" presetID="1" presetClass="entr" presetSubtype="0" fill="hold" nodeType="clickEffect">
-                                  <p:stCondLst>
-                                    <p:cond delay="0"/>
-                                  </p:stCondLst>
-                                  <p:childTnLst>
-                                    <p:set>
-                                      <p:cBhvr>
-                                        <p:cTn id="6" dur="1" fill="hold">
-                                          <p:stCondLst>
-                                            <p:cond delay="0"/>
-                                          </p:stCondLst>
-                                        </p:cTn>
-                                        <p:tgtEl>
-                                          <p:spTgt spid="4"/>
-                                        </p:tgtEl>
-                                        <p:attrNameLst>
-                                          <p:attrName>style.visibility</p:attrName>
-                                        </p:attrNameLst>
-                                      </p:cBhvr>
-                                      <p:to>
-                                        <p:strVal val="visible"/>
-                                      </p:to>
-                                    </p:set>
-                                  </p:childTnLst>
-                                  <p:subTnLst>
-                                    <p:set>
-                                      <p:cBhvr override="childStyle">
-                                        <p:cTn dur="1" fill="hold" display="0" masterRel="nextClick" afterEffect="1"/>
-                                        <p:tgtEl>
-                                          <p:spTgt spid="4"/>
-                                        </p:tgtEl>
-                                        <p:attrNameLst>
-                                          <p:attrName>style.visibility</p:attrName>
-                                        </p:attrNameLst>
-                                      </p:cBhvr>
-                                      <p:to>
-                                        <p:strVal val="hidden"/>
-                                      </p:to>
-                                    </p:set>
-                                  </p:subTnLst>
-                                </p:cTn>
-                              </p:par>
-                            </p:childTnLst>
-                          </p:cTn>
-                        </p:par>
-                      </p:childTnLst>
-                    </p:cTn>
-                  </p:par>
-                  <p:par>
-                    <p:cTn id="7" fill="hold">
-                      <p:stCondLst>
-                        <p:cond delay="indefinite"/>
-                      </p:stCondLst>
-                      <p:childTnLst>
-                        <p:par>
-                          <p:cTn id="8" fill="hold">
-                            <p:stCondLst>
-                              <p:cond delay="0"/>
-                            </p:stCondLst>
-                            <p:childTnLst>
-                              <p:par>
-                                <p:cTn id="9" presetID="42" presetClass="entr" presetSubtype="0" fill="hold" nodeType="clickEffect">
-                                  <p:stCondLst>
-                                    <p:cond delay="0"/>
-                                  </p:stCondLst>
-                                  <p:childTnLst>
-                                    <p:set>
-                                      <p:cBhvr>
-                                        <p:cTn id="10" dur="1" fill="hold">
-                                          <p:stCondLst>
-                                            <p:cond delay="0"/>
-                                          </p:stCondLst>
-                                        </p:cTn>
-                                        <p:tgtEl>
-                                          <p:spTgt spid="5"/>
-                                        </p:tgtEl>
-                                        <p:attrNameLst>
-                                          <p:attrName>style.visibility</p:attrName>
-                                        </p:attrNameLst>
-                                      </p:cBhvr>
-                                      <p:to>
-                                        <p:strVal val="visible"/>
-                                      </p:to>
-                                    </p:set>
-                                    <p:animEffect transition="in" filter="fade">
-                                      <p:cBhvr>
-                                        <p:cTn id="11" dur="1000"/>
-                                        <p:tgtEl>
-                                          <p:spTgt spid="5"/>
-                                        </p:tgtEl>
-                                      </p:cBhvr>
-                                    </p:animEffect>
-                                    <p:anim calcmode="lin" valueType="num">
-                                      <p:cBhvr>
-                                        <p:cTn id="12" dur="1000" fill="hold"/>
-                                        <p:tgtEl>
-                                          <p:spTgt spid="5"/>
-                                        </p:tgtEl>
-                                        <p:attrNameLst>
-                                          <p:attrName>ppt_x</p:attrName>
-                                        </p:attrNameLst>
-                                      </p:cBhvr>
-                                      <p:tavLst>
-                                        <p:tav tm="0">
-                                          <p:val>
-                                            <p:strVal val="#ppt_x"/>
-                                          </p:val>
-                                        </p:tav>
-                                        <p:tav tm="100000">
-                                          <p:val>
-                                            <p:strVal val="#ppt_x"/>
-                                          </p:val>
-                                        </p:tav>
-                                      </p:tavLst>
-                                    </p:anim>
-                                    <p:anim calcmode="lin" valueType="num">
-                                      <p:cBhvr>
-                                        <p:cTn id="13" dur="1000" fill="hold"/>
-                                        <p:tgtEl>
-                                          <p:spTgt spid="5"/>
-                                        </p:tgtEl>
-                                        <p:attrNameLst>
-                                          <p:attrName>ppt_y</p:attrName>
-                                        </p:attrNameLst>
-                                      </p:cBhvr>
-                                      <p:tavLst>
-                                        <p:tav tm="0">
-                                          <p:val>
-                                            <p:strVal val="#ppt_y+.1"/>
-                                          </p:val>
-                                        </p:tav>
-                                        <p:tav tm="100000">
-                                          <p:val>
-                                            <p:strVal val="#ppt_y"/>
-                                          </p:val>
-                                        </p:tav>
-                                      </p:tavLst>
-                                    </p:anim>
-                                  </p:childTnLst>
-                                  <p:subTnLst>
-                                    <p:set>
-                                      <p:cBhvr override="childStyle">
-                                        <p:cTn dur="1" fill="hold" display="0" masterRel="nextClick" afterEffect="1"/>
-                                        <p:tgtEl>
-                                          <p:spTgt spid="5"/>
-                                        </p:tgtEl>
-                                        <p:attrNameLst>
-                                          <p:attrName>style.visibility</p:attrName>
-                                        </p:attrNameLst>
-                                      </p:cBhvr>
-                                      <p:to>
-                                        <p:strVal val="hidden"/>
-                                      </p:to>
-                                    </p:set>
-                                  </p:subTnLst>
-                                </p:cTn>
-                              </p:par>
-                            </p:childTnLst>
-                          </p:cTn>
-                        </p:par>
-                      </p:childTnLst>
-                    </p:cTn>
-                  </p:par>
-                  <p:par>
-                    <p:cTn id="14" fill="hold">
-                      <p:stCondLst>
-                        <p:cond delay="indefinite"/>
-                      </p:stCondLst>
-                      <p:childTnLst>
-                        <p:par>
-                          <p:cTn id="15" fill="hold">
-                            <p:stCondLst>
-                              <p:cond delay="0"/>
-                            </p:stCondLst>
-                            <p:childTnLst>
-                              <p:par>
-                                <p:cTn id="16" presetID="42" presetClass="entr" presetSubtype="0" fill="hold" nodeType="clickEffect">
-                                  <p:stCondLst>
-                                    <p:cond delay="0"/>
-                                  </p:stCondLst>
-                                  <p:childTnLst>
-                                    <p:set>
-                                      <p:cBhvr>
-                                        <p:cTn id="17" dur="1" fill="hold">
-                                          <p:stCondLst>
-                                            <p:cond delay="0"/>
-                                          </p:stCondLst>
-                                        </p:cTn>
-                                        <p:tgtEl>
-                                          <p:spTgt spid="6"/>
-                                        </p:tgtEl>
-                                        <p:attrNameLst>
-                                          <p:attrName>style.visibility</p:attrName>
-                                        </p:attrNameLst>
-                                      </p:cBhvr>
-                                      <p:to>
-                                        <p:strVal val="visible"/>
-                                      </p:to>
-                                    </p:set>
-                                    <p:animEffect transition="in" filter="fade">
-                                      <p:cBhvr>
-                                        <p:cTn id="18" dur="1000"/>
-                                        <p:tgtEl>
-                                          <p:spTgt spid="6"/>
-                                        </p:tgtEl>
-                                      </p:cBhvr>
-                                    </p:animEffect>
-                                    <p:anim calcmode="lin" valueType="num">
-                                      <p:cBhvr>
-                                        <p:cTn id="19" dur="1000" fill="hold"/>
-                                        <p:tgtEl>
-                                          <p:spTgt spid="6"/>
-                                        </p:tgtEl>
-                                        <p:attrNameLst>
-                                          <p:attrName>ppt_x</p:attrName>
-                                        </p:attrNameLst>
-                                      </p:cBhvr>
-                                      <p:tavLst>
-                                        <p:tav tm="0">
-                                          <p:val>
-                                            <p:strVal val="#ppt_x"/>
-                                          </p:val>
-                                        </p:tav>
-                                        <p:tav tm="100000">
-                                          <p:val>
-                                            <p:strVal val="#ppt_x"/>
-                                          </p:val>
-                                        </p:tav>
-                                      </p:tavLst>
-                                    </p:anim>
-                                    <p:anim calcmode="lin" valueType="num">
-                                      <p:cBhvr>
-                                        <p:cTn id="20" dur="1000" fill="hold"/>
-                                        <p:tgtEl>
-                                          <p:spTgt spid="6"/>
-                                        </p:tgtEl>
-                                        <p:attrNameLst>
-                                          <p:attrName>ppt_y</p:attrName>
-                                        </p:attrNameLst>
-                                      </p:cBhvr>
-                                      <p:tavLst>
-                                        <p:tav tm="0">
-                                          <p:val>
-                                            <p:strVal val="#ppt_y+.1"/>
-                                          </p:val>
-                                        </p:tav>
-                                        <p:tav tm="100000">
-                                          <p:val>
-                                            <p:strVal val="#ppt_y"/>
-                                          </p:val>
-                                        </p:tav>
-                                      </p:tavLst>
-                                    </p:anim>
-                                  </p:childTnLst>
-                                </p:cTn>
-                              </p:par>
-                            </p:childTnLst>
-                          </p:cTn>
-                        </p:par>
-                      </p:childTnLst>
-                    </p:cTn>
-                  </p:par>
-                </p:childTnLst>
-              </p:cTn>
-              <p:prevCondLst>
-                <p:cond evt="onPrev" delay="0">
-                  <p:tgtEl>
-                    <p:sldTgt/>
-                  </p:tgtEl>
-                </p:cond>
-              </p:prevCondLst>
-              <p:nextCondLst>
-                <p:cond evt="onNext" delay="0">
-                  <p:tgtEl>
-                    <p:sldTgt/>
-                  </p:tgtEl>
-                </p:cond>
-              </p:nextCondLst>
-            </p:seq>
-          </p:childTnLst>
-        </p:cTn>
-      </p:par>
-    </p:tnLst>
-  </p:timing>
-</p:sld>
-</file>
-
-<file path=ppt/slides/slide28.xml><?xml version="1.0" encoding="utf-8"?>
-<p:sld xmlns:a="http://schemas.openxmlformats.org/drawingml/2006/main" xmlns:r="http://schemas.openxmlformats.org/officeDocument/2006/relationships" xmlns:p="http://schemas.openxmlformats.org/presentationml/2006/main">
-  <p:cSld>
-    <p:spTree>
-      <p:nvGrpSpPr>
-        <p:cNvPr id="1" name=""/>
-        <p:cNvGrpSpPr/>
-        <p:nvPr/>
-      </p:nvGrpSpPr>
-      <p:grpSpPr>
-        <a:xfrm>
-          <a:off x="0" y="0"/>
-          <a:ext cx="0" cy="0"/>
-          <a:chOff x="0" y="0"/>
-          <a:chExt cx="0" cy="0"/>
-        </a:xfrm>
-      </p:grpSpPr>
-      <p:sp>
-        <p:nvSpPr>
-          <p:cNvPr id="2" name="Title 1"/>
-          <p:cNvSpPr>
-            <a:spLocks noGrp="1"/>
-          </p:cNvSpPr>
-          <p:nvPr>
-            <p:ph type="title"/>
-          </p:nvPr>
-        </p:nvSpPr>
-        <p:spPr/>
-        <p:txBody>
-          <a:bodyPr/>
-          <a:lstStyle/>
-          <a:p>
-            <a:pPr algn="ctr"/>
-            <a:r>
-              <a:rPr lang="en-US" dirty="0"/>
-              <a:t>What Task Catalyst Can </a:t>
-            </a:r>
-            <a:r>
-              <a:rPr lang="en-US" dirty="0" smtClean="0"/>
-              <a:t>Do</a:t>
-            </a:r>
-            <a:endParaRPr lang="en-MY" dirty="0"/>
-          </a:p>
-        </p:txBody>
-      </p:sp>
-      <p:pic>
-        <p:nvPicPr>
-          <p:cNvPr id="4" name="Content Placeholder 3"/>
-          <p:cNvPicPr>
-            <a:picLocks noGrp="1" noChangeAspect="1"/>
-          </p:cNvPicPr>
-          <p:nvPr>
-            <p:ph idx="1"/>
-          </p:nvPr>
-        </p:nvPicPr>
-        <p:blipFill>
-          <a:blip r:embed="rId2">
-            <a:extLst>
-              <a:ext uri="{28A0092B-C50C-407E-A947-70E740481C1C}">
-                <a14:useLocalDpi xmlns:a14="http://schemas.microsoft.com/office/drawing/2010/main" val="0"/>
-              </a:ext>
-            </a:extLst>
-          </a:blip>
-          <a:stretch>
-            <a:fillRect/>
-          </a:stretch>
-        </p:blipFill>
-        <p:spPr>
-          <a:xfrm>
-            <a:off x="1671108" y="1794364"/>
-            <a:ext cx="5801784" cy="4351338"/>
-          </a:xfrm>
-        </p:spPr>
-      </p:pic>
-      <p:pic>
-        <p:nvPicPr>
-          <p:cNvPr id="5" name="Picture 4"/>
-          <p:cNvPicPr>
-            <a:picLocks noChangeAspect="1"/>
-          </p:cNvPicPr>
-          <p:nvPr/>
-        </p:nvPicPr>
-        <p:blipFill>
-          <a:blip r:embed="rId3">
-            <a:extLst>
-              <a:ext uri="{28A0092B-C50C-407E-A947-70E740481C1C}">
-                <a14:useLocalDpi xmlns:a14="http://schemas.microsoft.com/office/drawing/2010/main" val="0"/>
-              </a:ext>
-            </a:extLst>
-          </a:blip>
-          <a:stretch>
-            <a:fillRect/>
-          </a:stretch>
-        </p:blipFill>
-        <p:spPr>
-          <a:xfrm>
-            <a:off x="2965450" y="1794364"/>
-            <a:ext cx="3213100" cy="4381500"/>
-          </a:xfrm>
-          <a:prstGeom prst="rect">
-            <a:avLst/>
-          </a:prstGeom>
-        </p:spPr>
-      </p:pic>
-      <p:pic>
-        <p:nvPicPr>
-          <p:cNvPr id="6" name="Picture 5"/>
-          <p:cNvPicPr>
-            <a:picLocks noChangeAspect="1"/>
-          </p:cNvPicPr>
-          <p:nvPr/>
-        </p:nvPicPr>
-        <p:blipFill>
-          <a:blip r:embed="rId4">
-            <a:extLst>
-              <a:ext uri="{28A0092B-C50C-407E-A947-70E740481C1C}">
-                <a14:useLocalDpi xmlns:a14="http://schemas.microsoft.com/office/drawing/2010/main" val="0"/>
-              </a:ext>
-            </a:extLst>
-          </a:blip>
-          <a:stretch>
-            <a:fillRect/>
-          </a:stretch>
-        </p:blipFill>
-        <p:spPr>
-          <a:xfrm>
-            <a:off x="2905125" y="2193680"/>
-            <a:ext cx="3333750" cy="3314700"/>
-          </a:xfrm>
-          <a:prstGeom prst="rect">
-            <a:avLst/>
-          </a:prstGeom>
-        </p:spPr>
-      </p:pic>
-    </p:spTree>
-    <p:extLst>
-      <p:ext uri="{BB962C8B-B14F-4D97-AF65-F5344CB8AC3E}">
-        <p14:creationId xmlns:p14="http://schemas.microsoft.com/office/powerpoint/2010/main" val="843732185"/>
-      </p:ext>
-    </p:extLst>
-  </p:cSld>
-  <p:clrMapOvr>
-    <a:masterClrMapping/>
-  </p:clrMapOvr>
-  <p:timing>
-    <p:tnLst>
-      <p:par>
-        <p:cTn id="1" dur="indefinite" restart="never" nodeType="tmRoot">
-          <p:childTnLst>
-            <p:seq concurrent="1" nextAc="seek">
-              <p:cTn id="2" dur="indefinite" nodeType="mainSeq">
-                <p:childTnLst>
-                  <p:par>
-                    <p:cTn id="3" fill="hold">
-                      <p:stCondLst>
-                        <p:cond delay="indefinite"/>
-                      </p:stCondLst>
-                      <p:childTnLst>
-                        <p:par>
-                          <p:cTn id="4" fill="hold">
-                            <p:stCondLst>
-                              <p:cond delay="0"/>
-                            </p:stCondLst>
-                            <p:childTnLst>
-                              <p:par>
-                                <p:cTn id="5" presetID="2" presetClass="entr" presetSubtype="4" fill="hold" nodeType="clickEffect">
-                                  <p:stCondLst>
-                                    <p:cond delay="0"/>
-                                  </p:stCondLst>
-                                  <p:childTnLst>
-                                    <p:set>
-                                      <p:cBhvr>
-                                        <p:cTn id="6" dur="1" fill="hold">
-                                          <p:stCondLst>
-                                            <p:cond delay="0"/>
-                                          </p:stCondLst>
-                                        </p:cTn>
-                                        <p:tgtEl>
-                                          <p:spTgt spid="4"/>
-                                        </p:tgtEl>
-                                        <p:attrNameLst>
-                                          <p:attrName>style.visibility</p:attrName>
-                                        </p:attrNameLst>
-                                      </p:cBhvr>
-                                      <p:to>
-                                        <p:strVal val="visible"/>
-                                      </p:to>
-                                    </p:set>
-                                    <p:anim calcmode="lin" valueType="num">
-                                      <p:cBhvr additive="base">
-                                        <p:cTn id="7" dur="500" fill="hold"/>
-                                        <p:tgtEl>
-                                          <p:spTgt spid="4"/>
-                                        </p:tgtEl>
-                                        <p:attrNameLst>
-                                          <p:attrName>ppt_x</p:attrName>
-                                        </p:attrNameLst>
-                                      </p:cBhvr>
-                                      <p:tavLst>
-                                        <p:tav tm="0">
-                                          <p:val>
-                                            <p:strVal val="#ppt_x"/>
-                                          </p:val>
-                                        </p:tav>
-                                        <p:tav tm="100000">
-                                          <p:val>
-                                            <p:strVal val="#ppt_x"/>
-                                          </p:val>
-                                        </p:tav>
-                                      </p:tavLst>
-                                    </p:anim>
-                                    <p:anim calcmode="lin" valueType="num">
-                                      <p:cBhvr additive="base">
-                                        <p:cTn id="8" dur="500" fill="hold"/>
-                                        <p:tgtEl>
-                                          <p:spTgt spid="4"/>
-                                        </p:tgtEl>
-                                        <p:attrNameLst>
-                                          <p:attrName>ppt_y</p:attrName>
-                                        </p:attrNameLst>
-                                      </p:cBhvr>
-                                      <p:tavLst>
-                                        <p:tav tm="0">
-                                          <p:val>
-                                            <p:strVal val="1+#ppt_h/2"/>
-                                          </p:val>
-                                        </p:tav>
-                                        <p:tav tm="100000">
-                                          <p:val>
-                                            <p:strVal val="#ppt_y"/>
-                                          </p:val>
-                                        </p:tav>
-                                      </p:tavLst>
-                                    </p:anim>
-                                  </p:childTnLst>
-                                  <p:subTnLst>
-                                    <p:set>
-                                      <p:cBhvr override="childStyle">
-                                        <p:cTn dur="1" fill="hold" display="0" masterRel="nextClick" afterEffect="1"/>
-                                        <p:tgtEl>
-                                          <p:spTgt spid="4"/>
-                                        </p:tgtEl>
-                                        <p:attrNameLst>
-                                          <p:attrName>style.visibility</p:attrName>
-                                        </p:attrNameLst>
-                                      </p:cBhvr>
-                                      <p:to>
-                                        <p:strVal val="hidden"/>
-                                      </p:to>
-                                    </p:set>
-                                  </p:subTnLst>
-                                </p:cTn>
-                              </p:par>
-                            </p:childTnLst>
-                          </p:cTn>
-                        </p:par>
-                      </p:childTnLst>
-                    </p:cTn>
-                  </p:par>
-                  <p:par>
-                    <p:cTn id="9" fill="hold">
-                      <p:stCondLst>
-                        <p:cond delay="indefinite"/>
-                      </p:stCondLst>
-                      <p:childTnLst>
-                        <p:par>
-                          <p:cTn id="10" fill="hold">
-                            <p:stCondLst>
-                              <p:cond delay="0"/>
-                            </p:stCondLst>
-                            <p:childTnLst>
-                              <p:par>
-                                <p:cTn id="11" presetID="1" presetClass="entr" presetSubtype="0" fill="hold" nodeType="clickEffect">
-                                  <p:stCondLst>
-                                    <p:cond delay="0"/>
-                                  </p:stCondLst>
-                                  <p:childTnLst>
-                                    <p:set>
-                                      <p:cBhvr>
-                                        <p:cTn id="12" dur="1" fill="hold">
-                                          <p:stCondLst>
-                                            <p:cond delay="0"/>
-                                          </p:stCondLst>
-                                        </p:cTn>
-                                        <p:tgtEl>
-                                          <p:spTgt spid="5"/>
-                                        </p:tgtEl>
-                                        <p:attrNameLst>
-                                          <p:attrName>style.visibility</p:attrName>
-                                        </p:attrNameLst>
-                                      </p:cBhvr>
-                                      <p:to>
-                                        <p:strVal val="visible"/>
-                                      </p:to>
-                                    </p:set>
-                                  </p:childTnLst>
-                                  <p:subTnLst>
-                                    <p:set>
-                                      <p:cBhvr override="childStyle">
-                                        <p:cTn dur="1" fill="hold" display="0" masterRel="nextClick" afterEffect="1"/>
-                                        <p:tgtEl>
-                                          <p:spTgt spid="5"/>
-                                        </p:tgtEl>
-                                        <p:attrNameLst>
-                                          <p:attrName>style.visibility</p:attrName>
-                                        </p:attrNameLst>
-                                      </p:cBhvr>
-                                      <p:to>
-                                        <p:strVal val="hidden"/>
-                                      </p:to>
-                                    </p:set>
-                                  </p:subTnLst>
-                                </p:cTn>
-                              </p:par>
-                            </p:childTnLst>
-                          </p:cTn>
-                        </p:par>
-                      </p:childTnLst>
-                    </p:cTn>
-                  </p:par>
-                  <p:par>
-                    <p:cTn id="13" fill="hold">
-                      <p:stCondLst>
-                        <p:cond delay="indefinite"/>
-                      </p:stCondLst>
-                      <p:childTnLst>
-                        <p:par>
-                          <p:cTn id="14" fill="hold">
-                            <p:stCondLst>
-                              <p:cond delay="0"/>
-                            </p:stCondLst>
-                            <p:childTnLst>
-                              <p:par>
-                                <p:cTn id="15" presetID="42" presetClass="entr" presetSubtype="0" fill="hold" nodeType="clickEffect">
-                                  <p:stCondLst>
-                                    <p:cond delay="0"/>
-                                  </p:stCondLst>
-                                  <p:childTnLst>
-                                    <p:set>
-                                      <p:cBhvr>
-                                        <p:cTn id="16" dur="1" fill="hold">
-                                          <p:stCondLst>
-                                            <p:cond delay="0"/>
-                                          </p:stCondLst>
-                                        </p:cTn>
-                                        <p:tgtEl>
-                                          <p:spTgt spid="6"/>
-                                        </p:tgtEl>
-                                        <p:attrNameLst>
-                                          <p:attrName>style.visibility</p:attrName>
-                                        </p:attrNameLst>
-                                      </p:cBhvr>
-                                      <p:to>
-                                        <p:strVal val="visible"/>
-                                      </p:to>
-                                    </p:set>
-                                    <p:animEffect transition="in" filter="fade">
-                                      <p:cBhvr>
-                                        <p:cTn id="17" dur="1000"/>
-                                        <p:tgtEl>
-                                          <p:spTgt spid="6"/>
-                                        </p:tgtEl>
-                                      </p:cBhvr>
-                                    </p:animEffect>
-                                    <p:anim calcmode="lin" valueType="num">
-                                      <p:cBhvr>
-                                        <p:cTn id="18" dur="1000" fill="hold"/>
-                                        <p:tgtEl>
-                                          <p:spTgt spid="6"/>
-                                        </p:tgtEl>
-                                        <p:attrNameLst>
-                                          <p:attrName>ppt_x</p:attrName>
-                                        </p:attrNameLst>
-                                      </p:cBhvr>
-                                      <p:tavLst>
-                                        <p:tav tm="0">
-                                          <p:val>
-                                            <p:strVal val="#ppt_x"/>
-                                          </p:val>
-                                        </p:tav>
-                                        <p:tav tm="100000">
-                                          <p:val>
-                                            <p:strVal val="#ppt_x"/>
-                                          </p:val>
-                                        </p:tav>
-                                      </p:tavLst>
-                                    </p:anim>
-                                    <p:anim calcmode="lin" valueType="num">
-                                      <p:cBhvr>
-                                        <p:cTn id="19" dur="1000" fill="hold"/>
-                                        <p:tgtEl>
-                                          <p:spTgt spid="6"/>
-                                        </p:tgtEl>
-                                        <p:attrNameLst>
-                                          <p:attrName>ppt_y</p:attrName>
-                                        </p:attrNameLst>
-                                      </p:cBhvr>
-                                      <p:tavLst>
-                                        <p:tav tm="0">
-                                          <p:val>
-                                            <p:strVal val="#ppt_y+.1"/>
-                                          </p:val>
-                                        </p:tav>
-                                        <p:tav tm="100000">
-                                          <p:val>
-                                            <p:strVal val="#ppt_y"/>
-                                          </p:val>
-                                        </p:tav>
-                                      </p:tavLst>
-                                    </p:anim>
-                                  </p:childTnLst>
-                                </p:cTn>
-                              </p:par>
-                            </p:childTnLst>
-                          </p:cTn>
-                        </p:par>
-                      </p:childTnLst>
-                    </p:cTn>
-                  </p:par>
-                </p:childTnLst>
-              </p:cTn>
-              <p:prevCondLst>
-                <p:cond evt="onPrev" delay="0">
-                  <p:tgtEl>
-                    <p:sldTgt/>
-                  </p:tgtEl>
-                </p:cond>
-              </p:prevCondLst>
-              <p:nextCondLst>
-                <p:cond evt="onNext" delay="0">
-                  <p:tgtEl>
-                    <p:sldTgt/>
-                  </p:tgtEl>
-                </p:cond>
-              </p:nextCondLst>
-            </p:seq>
-          </p:childTnLst>
-        </p:cTn>
-      </p:par>
-    </p:tnLst>
-  </p:timing>
-</p:sld>
-</file>
-
-<file path=ppt/slides/slide29.xml><?xml version="1.0" encoding="utf-8"?>
-<p:sld xmlns:a="http://schemas.openxmlformats.org/drawingml/2006/main" xmlns:r="http://schemas.openxmlformats.org/officeDocument/2006/relationships" xmlns:p="http://schemas.openxmlformats.org/presentationml/2006/main">
-  <p:cSld>
-    <p:spTree>
-      <p:nvGrpSpPr>
-        <p:cNvPr id="1" name=""/>
-        <p:cNvGrpSpPr/>
-        <p:nvPr/>
-      </p:nvGrpSpPr>
-      <p:grpSpPr>
-        <a:xfrm>
-          <a:off x="0" y="0"/>
-          <a:ext cx="0" cy="0"/>
-          <a:chOff x="0" y="0"/>
-          <a:chExt cx="0" cy="0"/>
-        </a:xfrm>
-      </p:grpSpPr>
-      <p:pic>
-        <p:nvPicPr>
-          <p:cNvPr id="21" name="Picture 20"/>
-          <p:cNvPicPr>
-            <a:picLocks noChangeAspect="1"/>
-          </p:cNvPicPr>
-          <p:nvPr/>
-        </p:nvPicPr>
-        <p:blipFill>
-          <a:blip r:embed="rId2" cstate="print">
-            <a:extLst>
-              <a:ext uri="{28A0092B-C50C-407E-A947-70E740481C1C}">
-                <a14:useLocalDpi xmlns:a14="http://schemas.microsoft.com/office/drawing/2010/main" val="0"/>
-              </a:ext>
-            </a:extLst>
-          </a:blip>
-          <a:stretch>
-            <a:fillRect/>
-          </a:stretch>
-        </p:blipFill>
-        <p:spPr>
-          <a:xfrm>
-            <a:off x="5937604" y="2419651"/>
-            <a:ext cx="160484" cy="160484"/>
-          </a:xfrm>
-          <a:prstGeom prst="rect">
-            <a:avLst/>
-          </a:prstGeom>
-        </p:spPr>
-      </p:pic>
-      <p:sp>
-        <p:nvSpPr>
-          <p:cNvPr id="2" name="Title 1"/>
-          <p:cNvSpPr>
-            <a:spLocks noGrp="1"/>
-          </p:cNvSpPr>
-          <p:nvPr>
-            <p:ph type="title"/>
-          </p:nvPr>
-        </p:nvSpPr>
-        <p:spPr/>
-        <p:txBody>
-          <a:bodyPr/>
-          <a:lstStyle/>
-          <a:p>
-            <a:pPr algn="ctr"/>
-            <a:r>
-              <a:rPr lang="en-US" dirty="0"/>
-              <a:t>What Task Catalyst Can </a:t>
-            </a:r>
-            <a:r>
-              <a:rPr lang="en-US" dirty="0" smtClean="0"/>
-              <a:t>Do</a:t>
-            </a:r>
-            <a:endParaRPr lang="en-MY" dirty="0"/>
-          </a:p>
-        </p:txBody>
-      </p:sp>
-      <p:pic>
-        <p:nvPicPr>
-          <p:cNvPr id="4" name="Content Placeholder 3"/>
-          <p:cNvPicPr>
-            <a:picLocks noGrp="1" noChangeAspect="1"/>
-          </p:cNvPicPr>
-          <p:nvPr>
-            <p:ph idx="1"/>
-          </p:nvPr>
-        </p:nvPicPr>
-        <p:blipFill>
-          <a:blip r:embed="rId3" cstate="print">
-            <a:extLst>
-              <a:ext uri="{28A0092B-C50C-407E-A947-70E740481C1C}">
-                <a14:useLocalDpi xmlns:a14="http://schemas.microsoft.com/office/drawing/2010/main" val="0"/>
-              </a:ext>
-            </a:extLst>
-          </a:blip>
-          <a:stretch>
-            <a:fillRect/>
-          </a:stretch>
-        </p:blipFill>
-        <p:spPr>
-          <a:xfrm>
-            <a:off x="2875308" y="3368432"/>
-            <a:ext cx="1799046" cy="2412767"/>
-          </a:xfrm>
-        </p:spPr>
-      </p:pic>
-      <p:pic>
-        <p:nvPicPr>
-          <p:cNvPr id="5" name="Picture 4"/>
-          <p:cNvPicPr>
-            <a:picLocks noChangeAspect="1"/>
-          </p:cNvPicPr>
-          <p:nvPr/>
-        </p:nvPicPr>
-        <p:blipFill>
-          <a:blip r:embed="rId4" cstate="print">
-            <a:extLst>
-              <a:ext uri="{28A0092B-C50C-407E-A947-70E740481C1C}">
-                <a14:useLocalDpi xmlns:a14="http://schemas.microsoft.com/office/drawing/2010/main" val="0"/>
-              </a:ext>
-            </a:extLst>
-          </a:blip>
-          <a:stretch>
-            <a:fillRect/>
-          </a:stretch>
-        </p:blipFill>
-        <p:spPr>
-          <a:xfrm>
-            <a:off x="3774831" y="1903040"/>
-            <a:ext cx="2657500" cy="1633398"/>
-          </a:xfrm>
-          <a:prstGeom prst="rect">
-            <a:avLst/>
-          </a:prstGeom>
-        </p:spPr>
-      </p:pic>
-      <p:sp>
-        <p:nvSpPr>
-          <p:cNvPr id="7" name="TextBox 6"/>
-          <p:cNvSpPr txBox="1"/>
-          <p:nvPr/>
-        </p:nvSpPr>
-        <p:spPr>
-          <a:xfrm>
-            <a:off x="3860799" y="2197154"/>
-            <a:ext cx="2375877" cy="492443"/>
-          </a:xfrm>
-          <a:prstGeom prst="rect">
-            <a:avLst/>
-          </a:prstGeom>
-          <a:noFill/>
-        </p:spPr>
-        <p:txBody>
-          <a:bodyPr wrap="square" rtlCol="0">
-            <a:spAutoFit/>
-          </a:bodyPr>
-          <a:lstStyle/>
-          <a:p>
-            <a:r>
-              <a:rPr lang="en-US" sz="1300" dirty="0" smtClean="0"/>
-              <a:t>Physics Online Assignment 1</a:t>
-            </a:r>
-          </a:p>
-          <a:p>
-            <a:r>
-              <a:rPr lang="en-US" sz="1300" dirty="0" smtClean="0"/>
-              <a:t>CS2101 Reflection</a:t>
-            </a:r>
-            <a:endParaRPr lang="en-MY" sz="1300" dirty="0"/>
-          </a:p>
-        </p:txBody>
-      </p:sp>
-      <p:sp>
-        <p:nvSpPr>
-          <p:cNvPr id="8" name="Rectangle 7"/>
-          <p:cNvSpPr/>
-          <p:nvPr/>
-        </p:nvSpPr>
-        <p:spPr>
-          <a:xfrm>
-            <a:off x="5955323" y="2289908"/>
-            <a:ext cx="125046" cy="117231"/>
-          </a:xfrm>
-          <a:prstGeom prst="rect">
-            <a:avLst/>
-          </a:prstGeom>
-          <a:noFill/>
-        </p:spPr>
-        <p:style>
-          <a:lnRef idx="2">
-            <a:schemeClr val="dk1">
-              <a:shade val="50000"/>
-            </a:schemeClr>
-          </a:lnRef>
-          <a:fillRef idx="1">
-            <a:schemeClr val="dk1"/>
-          </a:fillRef>
-          <a:effectRef idx="0">
-            <a:schemeClr val="dk1"/>
-          </a:effectRef>
-          <a:fontRef idx="minor">
-            <a:schemeClr val="lt1"/>
-          </a:fontRef>
-        </p:style>
-        <p:txBody>
-          <a:bodyPr rtlCol="0" anchor="ctr"/>
-          <a:lstStyle/>
-          <a:p>
-            <a:pPr algn="ctr"/>
-            <a:endParaRPr lang="en-MY"/>
-          </a:p>
-        </p:txBody>
-      </p:sp>
-      <p:sp>
-        <p:nvSpPr>
-          <p:cNvPr id="9" name="Rectangle 8"/>
-          <p:cNvSpPr/>
-          <p:nvPr/>
-        </p:nvSpPr>
-        <p:spPr>
-          <a:xfrm>
-            <a:off x="5955323" y="2443375"/>
-            <a:ext cx="125046" cy="117231"/>
-          </a:xfrm>
-          <a:prstGeom prst="rect">
-            <a:avLst/>
-          </a:prstGeom>
-          <a:noFill/>
-        </p:spPr>
-        <p:style>
-          <a:lnRef idx="2">
-            <a:schemeClr val="dk1">
-              <a:shade val="50000"/>
-            </a:schemeClr>
-          </a:lnRef>
-          <a:fillRef idx="1">
-            <a:schemeClr val="dk1"/>
-          </a:fillRef>
-          <a:effectRef idx="0">
-            <a:schemeClr val="dk1"/>
-          </a:effectRef>
-          <a:fontRef idx="minor">
-            <a:schemeClr val="lt1"/>
-          </a:fontRef>
-        </p:style>
-        <p:txBody>
-          <a:bodyPr rtlCol="0" anchor="ctr"/>
-          <a:lstStyle/>
-          <a:p>
-            <a:pPr algn="ctr"/>
-            <a:endParaRPr lang="en-MY"/>
-          </a:p>
-        </p:txBody>
-      </p:sp>
-      <p:cxnSp>
-        <p:nvCxnSpPr>
-          <p:cNvPr id="15" name="Straight Connector 14"/>
-          <p:cNvCxnSpPr/>
-          <p:nvPr/>
-        </p:nvCxnSpPr>
-        <p:spPr>
-          <a:xfrm>
-            <a:off x="5955323" y="2289908"/>
-            <a:ext cx="125046" cy="117231"/>
-          </a:xfrm>
-          <a:prstGeom prst="line">
-            <a:avLst/>
-          </a:prstGeom>
-        </p:spPr>
-        <p:style>
-          <a:lnRef idx="1">
-            <a:schemeClr val="dk1"/>
-          </a:lnRef>
-          <a:fillRef idx="0">
-            <a:schemeClr val="dk1"/>
-          </a:fillRef>
-          <a:effectRef idx="0">
-            <a:schemeClr val="dk1"/>
-          </a:effectRef>
-          <a:fontRef idx="minor">
-            <a:schemeClr val="tx1"/>
-          </a:fontRef>
-        </p:style>
-      </p:cxnSp>
-      <p:cxnSp>
-        <p:nvCxnSpPr>
-          <p:cNvPr id="19" name="Straight Connector 18"/>
-          <p:cNvCxnSpPr/>
-          <p:nvPr/>
-        </p:nvCxnSpPr>
-        <p:spPr>
-          <a:xfrm flipH="1">
-            <a:off x="5955324" y="2289908"/>
-            <a:ext cx="125045" cy="117231"/>
-          </a:xfrm>
-          <a:prstGeom prst="line">
-            <a:avLst/>
-          </a:prstGeom>
-        </p:spPr>
-        <p:style>
-          <a:lnRef idx="1">
-            <a:schemeClr val="dk1"/>
-          </a:lnRef>
-          <a:fillRef idx="0">
-            <a:schemeClr val="dk1"/>
-          </a:fillRef>
-          <a:effectRef idx="0">
-            <a:schemeClr val="dk1"/>
-          </a:effectRef>
-          <a:fontRef idx="minor">
-            <a:schemeClr val="tx1"/>
-          </a:fontRef>
-        </p:style>
-      </p:cxnSp>
-      <p:pic>
-        <p:nvPicPr>
-          <p:cNvPr id="26" name="Picture 25"/>
-          <p:cNvPicPr>
-            <a:picLocks noChangeAspect="1"/>
-          </p:cNvPicPr>
-          <p:nvPr/>
-        </p:nvPicPr>
-        <p:blipFill>
-          <a:blip r:embed="rId5" cstate="print">
-            <a:extLst>
-              <a:ext uri="{28A0092B-C50C-407E-A947-70E740481C1C}">
-                <a14:useLocalDpi xmlns:a14="http://schemas.microsoft.com/office/drawing/2010/main" val="0"/>
-              </a:ext>
-            </a:extLst>
-          </a:blip>
-          <a:stretch>
-            <a:fillRect/>
-          </a:stretch>
-        </p:blipFill>
-        <p:spPr>
-          <a:xfrm>
-            <a:off x="2747573" y="1931700"/>
-            <a:ext cx="3602915" cy="3602915"/>
-          </a:xfrm>
-          <a:prstGeom prst="rect">
-            <a:avLst/>
-          </a:prstGeom>
-        </p:spPr>
-      </p:pic>
-    </p:spTree>
-    <p:extLst>
-      <p:ext uri="{BB962C8B-B14F-4D97-AF65-F5344CB8AC3E}">
-        <p14:creationId xmlns:p14="http://schemas.microsoft.com/office/powerpoint/2010/main" val="1986105484"/>
-      </p:ext>
-    </p:extLst>
-  </p:cSld>
-  <p:clrMapOvr>
-    <a:masterClrMapping/>
-  </p:clrMapOvr>
-  <p:timing>
-    <p:tnLst>
-      <p:par>
-        <p:cTn id="1" dur="indefinite" restart="never" nodeType="tmRoot">
-          <p:childTnLst>
-            <p:seq concurrent="1" nextAc="seek">
-              <p:cTn id="2" dur="indefinite" nodeType="mainSeq">
-                <p:childTnLst>
-                  <p:par>
-                    <p:cTn id="3" fill="hold">
-                      <p:stCondLst>
-                        <p:cond delay="indefinite"/>
-                      </p:stCondLst>
-                      <p:childTnLst>
-                        <p:par>
-                          <p:cTn id="4" fill="hold">
-                            <p:stCondLst>
-                              <p:cond delay="0"/>
-                            </p:stCondLst>
-                            <p:childTnLst>
-                              <p:par>
-                                <p:cTn id="5" presetID="2" presetClass="entr" presetSubtype="4" fill="hold" nodeType="clickEffect">
-                                  <p:stCondLst>
-                                    <p:cond delay="0"/>
-                                  </p:stCondLst>
-                                  <p:childTnLst>
-                                    <p:set>
-                                      <p:cBhvr>
-                                        <p:cTn id="6" dur="1" fill="hold">
-                                          <p:stCondLst>
-                                            <p:cond delay="0"/>
-                                          </p:stCondLst>
-                                        </p:cTn>
-                                        <p:tgtEl>
-                                          <p:spTgt spid="5"/>
-                                        </p:tgtEl>
-                                        <p:attrNameLst>
-                                          <p:attrName>style.visibility</p:attrName>
-                                        </p:attrNameLst>
-                                      </p:cBhvr>
-                                      <p:to>
-                                        <p:strVal val="visible"/>
-                                      </p:to>
-                                    </p:set>
-                                    <p:anim calcmode="lin" valueType="num">
-                                      <p:cBhvr additive="base">
-                                        <p:cTn id="7" dur="500" fill="hold"/>
-                                        <p:tgtEl>
-                                          <p:spTgt spid="5"/>
-                                        </p:tgtEl>
-                                        <p:attrNameLst>
-                                          <p:attrName>ppt_x</p:attrName>
-                                        </p:attrNameLst>
-                                      </p:cBhvr>
-                                      <p:tavLst>
-                                        <p:tav tm="0">
-                                          <p:val>
-                                            <p:strVal val="#ppt_x"/>
-                                          </p:val>
-                                        </p:tav>
-                                        <p:tav tm="100000">
-                                          <p:val>
-                                            <p:strVal val="#ppt_x"/>
-                                          </p:val>
-                                        </p:tav>
-                                      </p:tavLst>
-                                    </p:anim>
-                                    <p:anim calcmode="lin" valueType="num">
-                                      <p:cBhvr additive="base">
-                                        <p:cTn id="8" dur="500" fill="hold"/>
-                                        <p:tgtEl>
-                                          <p:spTgt spid="5"/>
-                                        </p:tgtEl>
-                                        <p:attrNameLst>
-                                          <p:attrName>ppt_y</p:attrName>
-                                        </p:attrNameLst>
-                                      </p:cBhvr>
-                                      <p:tavLst>
-                                        <p:tav tm="0">
-                                          <p:val>
-                                            <p:strVal val="1+#ppt_h/2"/>
-                                          </p:val>
-                                        </p:tav>
-                                        <p:tav tm="100000">
-                                          <p:val>
-                                            <p:strVal val="#ppt_y"/>
-                                          </p:val>
-                                        </p:tav>
-                                      </p:tavLst>
-                                    </p:anim>
-                                  </p:childTnLst>
-                                </p:cTn>
-                              </p:par>
-                              <p:par>
-                                <p:cTn id="9" presetID="2" presetClass="entr" presetSubtype="4" fill="hold" nodeType="withEffect">
-                                  <p:stCondLst>
-                                    <p:cond delay="0"/>
-                                  </p:stCondLst>
-                                  <p:childTnLst>
-                                    <p:set>
-                                      <p:cBhvr>
-                                        <p:cTn id="10" dur="1" fill="hold">
-                                          <p:stCondLst>
-                                            <p:cond delay="0"/>
-                                          </p:stCondLst>
-                                        </p:cTn>
-                                        <p:tgtEl>
-                                          <p:spTgt spid="4"/>
-                                        </p:tgtEl>
-                                        <p:attrNameLst>
-                                          <p:attrName>style.visibility</p:attrName>
-                                        </p:attrNameLst>
-                                      </p:cBhvr>
-                                      <p:to>
-                                        <p:strVal val="visible"/>
-                                      </p:to>
-                                    </p:set>
-                                    <p:anim calcmode="lin" valueType="num">
-                                      <p:cBhvr additive="base">
-                                        <p:cTn id="11" dur="500" fill="hold"/>
-                                        <p:tgtEl>
-                                          <p:spTgt spid="4"/>
-                                        </p:tgtEl>
-                                        <p:attrNameLst>
-                                          <p:attrName>ppt_x</p:attrName>
-                                        </p:attrNameLst>
-                                      </p:cBhvr>
-                                      <p:tavLst>
-                                        <p:tav tm="0">
-                                          <p:val>
-                                            <p:strVal val="#ppt_x"/>
-                                          </p:val>
-                                        </p:tav>
-                                        <p:tav tm="100000">
-                                          <p:val>
-                                            <p:strVal val="#ppt_x"/>
-                                          </p:val>
-                                        </p:tav>
-                                      </p:tavLst>
-                                    </p:anim>
-                                    <p:anim calcmode="lin" valueType="num">
-                                      <p:cBhvr additive="base">
-                                        <p:cTn id="12" dur="500" fill="hold"/>
-                                        <p:tgtEl>
-                                          <p:spTgt spid="4"/>
-                                        </p:tgtEl>
-                                        <p:attrNameLst>
-                                          <p:attrName>ppt_y</p:attrName>
-                                        </p:attrNameLst>
-                                      </p:cBhvr>
-                                      <p:tavLst>
-                                        <p:tav tm="0">
-                                          <p:val>
-                                            <p:strVal val="1+#ppt_h/2"/>
-                                          </p:val>
-                                        </p:tav>
-                                        <p:tav tm="100000">
-                                          <p:val>
-                                            <p:strVal val="#ppt_y"/>
-                                          </p:val>
-                                        </p:tav>
-                                      </p:tavLst>
-                                    </p:anim>
-                                  </p:childTnLst>
-                                </p:cTn>
-                              </p:par>
-                            </p:childTnLst>
-                          </p:cTn>
-                        </p:par>
-                      </p:childTnLst>
-                    </p:cTn>
-                  </p:par>
-                  <p:par>
-                    <p:cTn id="13" fill="hold">
-                      <p:stCondLst>
-                        <p:cond delay="indefinite"/>
-                      </p:stCondLst>
-                      <p:childTnLst>
-                        <p:par>
-                          <p:cTn id="14" fill="hold">
-                            <p:stCondLst>
-                              <p:cond delay="0"/>
-                            </p:stCondLst>
-                            <p:childTnLst>
-                              <p:par>
-                                <p:cTn id="15" presetID="42" presetClass="entr" presetSubtype="0" fill="hold" nodeType="clickEffect">
-                                  <p:stCondLst>
-                                    <p:cond delay="0"/>
-                                  </p:stCondLst>
-                                  <p:childTnLst>
-                                    <p:set>
-                                      <p:cBhvr>
-                                        <p:cTn id="16" dur="1" fill="hold">
-                                          <p:stCondLst>
-                                            <p:cond delay="0"/>
-                                          </p:stCondLst>
-                                        </p:cTn>
-                                        <p:tgtEl>
-                                          <p:spTgt spid="15"/>
-                                        </p:tgtEl>
-                                        <p:attrNameLst>
-                                          <p:attrName>style.visibility</p:attrName>
-                                        </p:attrNameLst>
-                                      </p:cBhvr>
-                                      <p:to>
-                                        <p:strVal val="visible"/>
-                                      </p:to>
-                                    </p:set>
-                                    <p:animEffect transition="in" filter="fade">
-                                      <p:cBhvr>
-                                        <p:cTn id="17" dur="1000"/>
-                                        <p:tgtEl>
-                                          <p:spTgt spid="15"/>
-                                        </p:tgtEl>
-                                      </p:cBhvr>
-                                    </p:animEffect>
-                                    <p:anim calcmode="lin" valueType="num">
-                                      <p:cBhvr>
-                                        <p:cTn id="18" dur="1000" fill="hold"/>
-                                        <p:tgtEl>
-                                          <p:spTgt spid="15"/>
-                                        </p:tgtEl>
-                                        <p:attrNameLst>
-                                          <p:attrName>ppt_x</p:attrName>
-                                        </p:attrNameLst>
-                                      </p:cBhvr>
-                                      <p:tavLst>
-                                        <p:tav tm="0">
-                                          <p:val>
-                                            <p:strVal val="#ppt_x"/>
-                                          </p:val>
-                                        </p:tav>
-                                        <p:tav tm="100000">
-                                          <p:val>
-                                            <p:strVal val="#ppt_x"/>
-                                          </p:val>
-                                        </p:tav>
-                                      </p:tavLst>
-                                    </p:anim>
-                                    <p:anim calcmode="lin" valueType="num">
-                                      <p:cBhvr>
-                                        <p:cTn id="19" dur="1000" fill="hold"/>
-                                        <p:tgtEl>
-                                          <p:spTgt spid="15"/>
-                                        </p:tgtEl>
-                                        <p:attrNameLst>
-                                          <p:attrName>ppt_y</p:attrName>
-                                        </p:attrNameLst>
-                                      </p:cBhvr>
-                                      <p:tavLst>
-                                        <p:tav tm="0">
-                                          <p:val>
-                                            <p:strVal val="#ppt_y+.1"/>
-                                          </p:val>
-                                        </p:tav>
-                                        <p:tav tm="100000">
-                                          <p:val>
-                                            <p:strVal val="#ppt_y"/>
-                                          </p:val>
-                                        </p:tav>
-                                      </p:tavLst>
-                                    </p:anim>
-                                  </p:childTnLst>
-                                </p:cTn>
-                              </p:par>
-                              <p:par>
-                                <p:cTn id="20" presetID="42" presetClass="entr" presetSubtype="0" fill="hold" nodeType="withEffect">
-                                  <p:stCondLst>
-                                    <p:cond delay="0"/>
-                                  </p:stCondLst>
-                                  <p:childTnLst>
-                                    <p:set>
-                                      <p:cBhvr>
-                                        <p:cTn id="21" dur="1" fill="hold">
-                                          <p:stCondLst>
-                                            <p:cond delay="0"/>
-                                          </p:stCondLst>
-                                        </p:cTn>
-                                        <p:tgtEl>
-                                          <p:spTgt spid="19"/>
-                                        </p:tgtEl>
-                                        <p:attrNameLst>
-                                          <p:attrName>style.visibility</p:attrName>
-                                        </p:attrNameLst>
-                                      </p:cBhvr>
-                                      <p:to>
-                                        <p:strVal val="visible"/>
-                                      </p:to>
-                                    </p:set>
-                                    <p:animEffect transition="in" filter="fade">
-                                      <p:cBhvr>
-                                        <p:cTn id="22" dur="1000"/>
-                                        <p:tgtEl>
-                                          <p:spTgt spid="19"/>
-                                        </p:tgtEl>
-                                      </p:cBhvr>
-                                    </p:animEffect>
-                                    <p:anim calcmode="lin" valueType="num">
-                                      <p:cBhvr>
-                                        <p:cTn id="23" dur="1000" fill="hold"/>
-                                        <p:tgtEl>
-                                          <p:spTgt spid="19"/>
-                                        </p:tgtEl>
-                                        <p:attrNameLst>
-                                          <p:attrName>ppt_x</p:attrName>
-                                        </p:attrNameLst>
-                                      </p:cBhvr>
-                                      <p:tavLst>
-                                        <p:tav tm="0">
-                                          <p:val>
-                                            <p:strVal val="#ppt_x"/>
-                                          </p:val>
-                                        </p:tav>
-                                        <p:tav tm="100000">
-                                          <p:val>
-                                            <p:strVal val="#ppt_x"/>
-                                          </p:val>
-                                        </p:tav>
-                                      </p:tavLst>
-                                    </p:anim>
-                                    <p:anim calcmode="lin" valueType="num">
-                                      <p:cBhvr>
-                                        <p:cTn id="24" dur="1000" fill="hold"/>
-                                        <p:tgtEl>
-                                          <p:spTgt spid="19"/>
-                                        </p:tgtEl>
-                                        <p:attrNameLst>
-                                          <p:attrName>ppt_y</p:attrName>
-                                        </p:attrNameLst>
-                                      </p:cBhvr>
-                                      <p:tavLst>
-                                        <p:tav tm="0">
-                                          <p:val>
-                                            <p:strVal val="#ppt_y+.1"/>
-                                          </p:val>
-                                        </p:tav>
-                                        <p:tav tm="100000">
-                                          <p:val>
-                                            <p:strVal val="#ppt_y"/>
-                                          </p:val>
-                                        </p:tav>
-                                      </p:tavLst>
-                                    </p:anim>
-                                  </p:childTnLst>
-                                </p:cTn>
-                              </p:par>
-                              <p:par>
-                                <p:cTn id="25" presetID="42" presetClass="entr" presetSubtype="0" fill="hold" grpId="0" nodeType="withEffect">
-                                  <p:stCondLst>
-                                    <p:cond delay="0"/>
-                                  </p:stCondLst>
-                                  <p:childTnLst>
-                                    <p:set>
-                                      <p:cBhvr>
-                                        <p:cTn id="26" dur="1" fill="hold">
-                                          <p:stCondLst>
-                                            <p:cond delay="0"/>
-                                          </p:stCondLst>
-                                        </p:cTn>
-                                        <p:tgtEl>
-                                          <p:spTgt spid="8"/>
-                                        </p:tgtEl>
-                                        <p:attrNameLst>
-                                          <p:attrName>style.visibility</p:attrName>
-                                        </p:attrNameLst>
-                                      </p:cBhvr>
-                                      <p:to>
-                                        <p:strVal val="visible"/>
-                                      </p:to>
-                                    </p:set>
-                                    <p:animEffect transition="in" filter="fade">
-                                      <p:cBhvr>
-                                        <p:cTn id="27" dur="1000"/>
-                                        <p:tgtEl>
-                                          <p:spTgt spid="8"/>
-                                        </p:tgtEl>
-                                      </p:cBhvr>
-                                    </p:animEffect>
-                                    <p:anim calcmode="lin" valueType="num">
-                                      <p:cBhvr>
-                                        <p:cTn id="28" dur="1000" fill="hold"/>
-                                        <p:tgtEl>
-                                          <p:spTgt spid="8"/>
-                                        </p:tgtEl>
-                                        <p:attrNameLst>
-                                          <p:attrName>ppt_x</p:attrName>
-                                        </p:attrNameLst>
-                                      </p:cBhvr>
-                                      <p:tavLst>
-                                        <p:tav tm="0">
-                                          <p:val>
-                                            <p:strVal val="#ppt_x"/>
-                                          </p:val>
-                                        </p:tav>
-                                        <p:tav tm="100000">
-                                          <p:val>
-                                            <p:strVal val="#ppt_x"/>
-                                          </p:val>
-                                        </p:tav>
-                                      </p:tavLst>
-                                    </p:anim>
-                                    <p:anim calcmode="lin" valueType="num">
-                                      <p:cBhvr>
-                                        <p:cTn id="29" dur="1000" fill="hold"/>
-                                        <p:tgtEl>
-                                          <p:spTgt spid="8"/>
-                                        </p:tgtEl>
-                                        <p:attrNameLst>
-                                          <p:attrName>ppt_y</p:attrName>
-                                        </p:attrNameLst>
-                                      </p:cBhvr>
-                                      <p:tavLst>
-                                        <p:tav tm="0">
-                                          <p:val>
-                                            <p:strVal val="#ppt_y+.1"/>
-                                          </p:val>
-                                        </p:tav>
-                                        <p:tav tm="100000">
-                                          <p:val>
-                                            <p:strVal val="#ppt_y"/>
-                                          </p:val>
-                                        </p:tav>
-                                      </p:tavLst>
-                                    </p:anim>
-                                  </p:childTnLst>
-                                </p:cTn>
-                              </p:par>
-                              <p:par>
-                                <p:cTn id="30" presetID="42" presetClass="entr" presetSubtype="0" fill="hold" grpId="0" nodeType="withEffect">
-                                  <p:stCondLst>
-                                    <p:cond delay="0"/>
-                                  </p:stCondLst>
-                                  <p:childTnLst>
-                                    <p:set>
-                                      <p:cBhvr>
-                                        <p:cTn id="31" dur="1" fill="hold">
-                                          <p:stCondLst>
-                                            <p:cond delay="0"/>
-                                          </p:stCondLst>
-                                        </p:cTn>
-                                        <p:tgtEl>
-                                          <p:spTgt spid="9"/>
-                                        </p:tgtEl>
-                                        <p:attrNameLst>
-                                          <p:attrName>style.visibility</p:attrName>
-                                        </p:attrNameLst>
-                                      </p:cBhvr>
-                                      <p:to>
-                                        <p:strVal val="visible"/>
-                                      </p:to>
-                                    </p:set>
-                                    <p:animEffect transition="in" filter="fade">
-                                      <p:cBhvr>
-                                        <p:cTn id="32" dur="1000"/>
-                                        <p:tgtEl>
-                                          <p:spTgt spid="9"/>
-                                        </p:tgtEl>
-                                      </p:cBhvr>
-                                    </p:animEffect>
-                                    <p:anim calcmode="lin" valueType="num">
-                                      <p:cBhvr>
-                                        <p:cTn id="33" dur="1000" fill="hold"/>
-                                        <p:tgtEl>
-                                          <p:spTgt spid="9"/>
-                                        </p:tgtEl>
-                                        <p:attrNameLst>
-                                          <p:attrName>ppt_x</p:attrName>
-                                        </p:attrNameLst>
-                                      </p:cBhvr>
-                                      <p:tavLst>
-                                        <p:tav tm="0">
-                                          <p:val>
-                                            <p:strVal val="#ppt_x"/>
-                                          </p:val>
-                                        </p:tav>
-                                        <p:tav tm="100000">
-                                          <p:val>
-                                            <p:strVal val="#ppt_x"/>
-                                          </p:val>
-                                        </p:tav>
-                                      </p:tavLst>
-                                    </p:anim>
-                                    <p:anim calcmode="lin" valueType="num">
-                                      <p:cBhvr>
-                                        <p:cTn id="34" dur="1000" fill="hold"/>
-                                        <p:tgtEl>
-                                          <p:spTgt spid="9"/>
-                                        </p:tgtEl>
-                                        <p:attrNameLst>
-                                          <p:attrName>ppt_y</p:attrName>
-                                        </p:attrNameLst>
-                                      </p:cBhvr>
-                                      <p:tavLst>
-                                        <p:tav tm="0">
-                                          <p:val>
-                                            <p:strVal val="#ppt_y+.1"/>
-                                          </p:val>
-                                        </p:tav>
-                                        <p:tav tm="100000">
-                                          <p:val>
-                                            <p:strVal val="#ppt_y"/>
-                                          </p:val>
-                                        </p:tav>
-                                      </p:tavLst>
-                                    </p:anim>
-                                  </p:childTnLst>
-                                </p:cTn>
-                              </p:par>
-                              <p:par>
-                                <p:cTn id="35" presetID="42" presetClass="entr" presetSubtype="0" fill="hold" grpId="0" nodeType="withEffect">
-                                  <p:stCondLst>
-                                    <p:cond delay="0"/>
-                                  </p:stCondLst>
-                                  <p:childTnLst>
-                                    <p:set>
-                                      <p:cBhvr>
-                                        <p:cTn id="36" dur="1" fill="hold">
-                                          <p:stCondLst>
-                                            <p:cond delay="0"/>
-                                          </p:stCondLst>
-                                        </p:cTn>
-                                        <p:tgtEl>
-                                          <p:spTgt spid="7"/>
-                                        </p:tgtEl>
-                                        <p:attrNameLst>
-                                          <p:attrName>style.visibility</p:attrName>
-                                        </p:attrNameLst>
-                                      </p:cBhvr>
-                                      <p:to>
-                                        <p:strVal val="visible"/>
-                                      </p:to>
-                                    </p:set>
-                                    <p:animEffect transition="in" filter="fade">
-                                      <p:cBhvr>
-                                        <p:cTn id="37" dur="1000"/>
-                                        <p:tgtEl>
-                                          <p:spTgt spid="7"/>
-                                        </p:tgtEl>
-                                      </p:cBhvr>
-                                    </p:animEffect>
-                                    <p:anim calcmode="lin" valueType="num">
-                                      <p:cBhvr>
-                                        <p:cTn id="38" dur="1000" fill="hold"/>
-                                        <p:tgtEl>
-                                          <p:spTgt spid="7"/>
-                                        </p:tgtEl>
-                                        <p:attrNameLst>
-                                          <p:attrName>ppt_x</p:attrName>
-                                        </p:attrNameLst>
-                                      </p:cBhvr>
-                                      <p:tavLst>
-                                        <p:tav tm="0">
-                                          <p:val>
-                                            <p:strVal val="#ppt_x"/>
-                                          </p:val>
-                                        </p:tav>
-                                        <p:tav tm="100000">
-                                          <p:val>
-                                            <p:strVal val="#ppt_x"/>
-                                          </p:val>
-                                        </p:tav>
-                                      </p:tavLst>
-                                    </p:anim>
-                                    <p:anim calcmode="lin" valueType="num">
-                                      <p:cBhvr>
-                                        <p:cTn id="39" dur="1000" fill="hold"/>
-                                        <p:tgtEl>
-                                          <p:spTgt spid="7"/>
-                                        </p:tgtEl>
-                                        <p:attrNameLst>
-                                          <p:attrName>ppt_y</p:attrName>
-                                        </p:attrNameLst>
-                                      </p:cBhvr>
-                                      <p:tavLst>
-                                        <p:tav tm="0">
-                                          <p:val>
-                                            <p:strVal val="#ppt_y+.1"/>
-                                          </p:val>
-                                        </p:tav>
-                                        <p:tav tm="100000">
-                                          <p:val>
-                                            <p:strVal val="#ppt_y"/>
-                                          </p:val>
-                                        </p:tav>
-                                      </p:tavLst>
-                                    </p:anim>
-                                  </p:childTnLst>
-                                </p:cTn>
-                              </p:par>
-                              <p:par>
-                                <p:cTn id="40" presetID="42" presetClass="entr" presetSubtype="0" fill="hold" nodeType="withEffect">
-                                  <p:stCondLst>
-                                    <p:cond delay="0"/>
-                                  </p:stCondLst>
-                                  <p:childTnLst>
-                                    <p:set>
-                                      <p:cBhvr>
-                                        <p:cTn id="41" dur="1" fill="hold">
-                                          <p:stCondLst>
-                                            <p:cond delay="0"/>
-                                          </p:stCondLst>
-                                        </p:cTn>
-                                        <p:tgtEl>
-                                          <p:spTgt spid="21"/>
-                                        </p:tgtEl>
-                                        <p:attrNameLst>
-                                          <p:attrName>style.visibility</p:attrName>
-                                        </p:attrNameLst>
-                                      </p:cBhvr>
-                                      <p:to>
-                                        <p:strVal val="visible"/>
-                                      </p:to>
-                                    </p:set>
-                                    <p:animEffect transition="in" filter="fade">
-                                      <p:cBhvr>
-                                        <p:cTn id="42" dur="1000"/>
-                                        <p:tgtEl>
-                                          <p:spTgt spid="21"/>
-                                        </p:tgtEl>
-                                      </p:cBhvr>
-                                    </p:animEffect>
-                                    <p:anim calcmode="lin" valueType="num">
-                                      <p:cBhvr>
-                                        <p:cTn id="43" dur="1000" fill="hold"/>
-                                        <p:tgtEl>
-                                          <p:spTgt spid="21"/>
-                                        </p:tgtEl>
-                                        <p:attrNameLst>
-                                          <p:attrName>ppt_x</p:attrName>
-                                        </p:attrNameLst>
-                                      </p:cBhvr>
-                                      <p:tavLst>
-                                        <p:tav tm="0">
-                                          <p:val>
-                                            <p:strVal val="#ppt_x"/>
-                                          </p:val>
-                                        </p:tav>
-                                        <p:tav tm="100000">
-                                          <p:val>
-                                            <p:strVal val="#ppt_x"/>
-                                          </p:val>
-                                        </p:tav>
-                                      </p:tavLst>
-                                    </p:anim>
-                                    <p:anim calcmode="lin" valueType="num">
-                                      <p:cBhvr>
-                                        <p:cTn id="44" dur="1000" fill="hold"/>
-                                        <p:tgtEl>
-                                          <p:spTgt spid="21"/>
-                                        </p:tgtEl>
-                                        <p:attrNameLst>
-                                          <p:attrName>ppt_y</p:attrName>
-                                        </p:attrNameLst>
-                                      </p:cBhvr>
-                                      <p:tavLst>
-                                        <p:tav tm="0">
-                                          <p:val>
-                                            <p:strVal val="#ppt_y+.1"/>
-                                          </p:val>
-                                        </p:tav>
-                                        <p:tav tm="100000">
-                                          <p:val>
-                                            <p:strVal val="#ppt_y"/>
-                                          </p:val>
-                                        </p:tav>
-                                      </p:tavLst>
-                                    </p:anim>
-                                  </p:childTnLst>
-                                </p:cTn>
-                              </p:par>
-                            </p:childTnLst>
-                          </p:cTn>
-                        </p:par>
-                      </p:childTnLst>
-                    </p:cTn>
-                  </p:par>
-                  <p:par>
-                    <p:cTn id="45" fill="hold">
-                      <p:stCondLst>
-                        <p:cond delay="indefinite"/>
-                      </p:stCondLst>
-                      <p:childTnLst>
-                        <p:par>
-                          <p:cTn id="46" fill="hold">
-                            <p:stCondLst>
-                              <p:cond delay="0"/>
-                            </p:stCondLst>
-                            <p:childTnLst>
-                              <p:par>
-                                <p:cTn id="47" presetID="1" presetClass="entr" presetSubtype="0" fill="hold" nodeType="clickEffect">
-                                  <p:stCondLst>
-                                    <p:cond delay="0"/>
-                                  </p:stCondLst>
-                                  <p:childTnLst>
-                                    <p:set>
-                                      <p:cBhvr>
-                                        <p:cTn id="48" dur="1" fill="hold">
-                                          <p:stCondLst>
-                                            <p:cond delay="0"/>
-                                          </p:stCondLst>
-                                        </p:cTn>
-                                        <p:tgtEl>
-                                          <p:spTgt spid="26"/>
-                                        </p:tgtEl>
-                                        <p:attrNameLst>
-                                          <p:attrName>style.visibility</p:attrName>
-                                        </p:attrNameLst>
-                                      </p:cBhvr>
-                                      <p:to>
-                                        <p:strVal val="visible"/>
-                                      </p:to>
-                                    </p:set>
-                                  </p:childTnLst>
-                                </p:cTn>
-                              </p:par>
-                            </p:childTnLst>
-                          </p:cTn>
-                        </p:par>
-                      </p:childTnLst>
-                    </p:cTn>
-                  </p:par>
-                </p:childTnLst>
-              </p:cTn>
-              <p:prevCondLst>
-                <p:cond evt="onPrev" delay="0">
-                  <p:tgtEl>
-                    <p:sldTgt/>
-                  </p:tgtEl>
-                </p:cond>
-              </p:prevCondLst>
-              <p:nextCondLst>
-                <p:cond evt="onNext" delay="0">
-                  <p:tgtEl>
-                    <p:sldTgt/>
-                  </p:tgtEl>
-                </p:cond>
-              </p:nextCondLst>
-            </p:seq>
-          </p:childTnLst>
-        </p:cTn>
-      </p:par>
-    </p:tnLst>
-    <p:bldLst>
-      <p:bldP spid="7" grpId="0"/>
-      <p:bldP spid="8" grpId="0" animBg="1"/>
-      <p:bldP spid="9" grpId="0" animBg="1"/>
-    </p:bldLst>
-  </p:timing>
-</p:sld>
-</file>
-
 <file path=ppt/slides/slide3.xml><?xml version="1.0" encoding="utf-8"?>
 <p:sld xmlns:a="http://schemas.openxmlformats.org/drawingml/2006/main" xmlns:r="http://schemas.openxmlformats.org/officeDocument/2006/relationships" xmlns:p="http://schemas.openxmlformats.org/presentationml/2006/main">
   <p:cSld>

</xml_diff>

<commit_message>
update to script and ppt
changes the goal of the project in my script and added my part to the
ppt
</commit_message>
<xml_diff>
--- a/Task Catalyst Introduction.pptx
+++ b/Task Catalyst Introduction.pptx
@@ -28,6 +28,12 @@
     <p:sldId id="276" r:id="rId22"/>
     <p:sldId id="277" r:id="rId23"/>
     <p:sldId id="278" r:id="rId24"/>
+    <p:sldId id="280" r:id="rId25"/>
+    <p:sldId id="281" r:id="rId26"/>
+    <p:sldId id="282" r:id="rId27"/>
+    <p:sldId id="283" r:id="rId28"/>
+    <p:sldId id="284" r:id="rId29"/>
+    <p:sldId id="285" r:id="rId30"/>
   </p:sldIdLst>
   <p:sldSz cx="9144000" cy="6858000" type="screen4x3"/>
   <p:notesSz cx="6858000" cy="9144000"/>
@@ -126,6 +132,11 @@
       </a:defRPr>
     </a:lvl9pPr>
   </p:defaultTextStyle>
+  <p:extLst>
+    <p:ext uri="{EFAFB233-063F-42B5-8137-9DF3F51BA10A}">
+      <p15:sldGuideLst xmlns:p15="http://schemas.microsoft.com/office/powerpoint/2012/main"/>
+    </p:ext>
+  </p:extLst>
 </p:presentation>
 </file>
 
@@ -260,7 +271,7 @@
           <a:p>
             <a:fld id="{4B7C30BC-8773-4969-A17E-EC79D4EB08B4}" type="datetimeFigureOut">
               <a:rPr lang="en-US" smtClean="0"/>
-              <a:t>08/30/14</a:t>
+              <a:t>8/31/2014</a:t>
             </a:fld>
             <a:endParaRPr lang="en-US"/>
           </a:p>
@@ -430,7 +441,7 @@
           <a:p>
             <a:fld id="{4B7C30BC-8773-4969-A17E-EC79D4EB08B4}" type="datetimeFigureOut">
               <a:rPr lang="en-US" smtClean="0"/>
-              <a:t>08/30/14</a:t>
+              <a:t>8/31/2014</a:t>
             </a:fld>
             <a:endParaRPr lang="en-US"/>
           </a:p>
@@ -610,7 +621,7 @@
           <a:p>
             <a:fld id="{4B7C30BC-8773-4969-A17E-EC79D4EB08B4}" type="datetimeFigureOut">
               <a:rPr lang="en-US" smtClean="0"/>
-              <a:t>08/30/14</a:t>
+              <a:t>8/31/2014</a:t>
             </a:fld>
             <a:endParaRPr lang="en-US"/>
           </a:p>
@@ -780,7 +791,7 @@
           <a:p>
             <a:fld id="{4B7C30BC-8773-4969-A17E-EC79D4EB08B4}" type="datetimeFigureOut">
               <a:rPr lang="en-US" smtClean="0"/>
-              <a:t>08/30/14</a:t>
+              <a:t>8/31/2014</a:t>
             </a:fld>
             <a:endParaRPr lang="en-US"/>
           </a:p>
@@ -1024,7 +1035,7 @@
           <a:p>
             <a:fld id="{4B7C30BC-8773-4969-A17E-EC79D4EB08B4}" type="datetimeFigureOut">
               <a:rPr lang="en-US" smtClean="0"/>
-              <a:t>08/30/14</a:t>
+              <a:t>8/31/2014</a:t>
             </a:fld>
             <a:endParaRPr lang="en-US"/>
           </a:p>
@@ -1256,7 +1267,7 @@
           <a:p>
             <a:fld id="{4B7C30BC-8773-4969-A17E-EC79D4EB08B4}" type="datetimeFigureOut">
               <a:rPr lang="en-US" smtClean="0"/>
-              <a:t>08/30/14</a:t>
+              <a:t>8/31/2014</a:t>
             </a:fld>
             <a:endParaRPr lang="en-US"/>
           </a:p>
@@ -1623,7 +1634,7 @@
           <a:p>
             <a:fld id="{4B7C30BC-8773-4969-A17E-EC79D4EB08B4}" type="datetimeFigureOut">
               <a:rPr lang="en-US" smtClean="0"/>
-              <a:t>08/30/14</a:t>
+              <a:t>8/31/2014</a:t>
             </a:fld>
             <a:endParaRPr lang="en-US"/>
           </a:p>
@@ -1741,7 +1752,7 @@
           <a:p>
             <a:fld id="{4B7C30BC-8773-4969-A17E-EC79D4EB08B4}" type="datetimeFigureOut">
               <a:rPr lang="en-US" smtClean="0"/>
-              <a:t>08/30/14</a:t>
+              <a:t>8/31/2014</a:t>
             </a:fld>
             <a:endParaRPr lang="en-US"/>
           </a:p>
@@ -1836,7 +1847,7 @@
           <a:p>
             <a:fld id="{4B7C30BC-8773-4969-A17E-EC79D4EB08B4}" type="datetimeFigureOut">
               <a:rPr lang="en-US" smtClean="0"/>
-              <a:t>08/30/14</a:t>
+              <a:t>8/31/2014</a:t>
             </a:fld>
             <a:endParaRPr lang="en-US"/>
           </a:p>
@@ -2113,7 +2124,7 @@
           <a:p>
             <a:fld id="{4B7C30BC-8773-4969-A17E-EC79D4EB08B4}" type="datetimeFigureOut">
               <a:rPr lang="en-US" smtClean="0"/>
-              <a:t>08/30/14</a:t>
+              <a:t>8/31/2014</a:t>
             </a:fld>
             <a:endParaRPr lang="en-US"/>
           </a:p>
@@ -2370,7 +2381,7 @@
           <a:p>
             <a:fld id="{4B7C30BC-8773-4969-A17E-EC79D4EB08B4}" type="datetimeFigureOut">
               <a:rPr lang="en-US" smtClean="0"/>
-              <a:t>08/30/14</a:t>
+              <a:t>8/31/2014</a:t>
             </a:fld>
             <a:endParaRPr lang="en-US"/>
           </a:p>
@@ -2583,7 +2594,7 @@
           <a:p>
             <a:fld id="{4B7C30BC-8773-4969-A17E-EC79D4EB08B4}" type="datetimeFigureOut">
               <a:rPr lang="en-US" smtClean="0"/>
-              <a:t>08/30/14</a:t>
+              <a:t>8/31/2014</a:t>
             </a:fld>
             <a:endParaRPr lang="en-US"/>
           </a:p>
@@ -8979,6 +8990,4341 @@
 </p:sld>
 </file>
 
+<file path=ppt/slides/slide24.xml><?xml version="1.0" encoding="utf-8"?>
+<p:sld xmlns:a="http://schemas.openxmlformats.org/drawingml/2006/main" xmlns:r="http://schemas.openxmlformats.org/officeDocument/2006/relationships" xmlns:p="http://schemas.openxmlformats.org/presentationml/2006/main">
+  <p:cSld>
+    <p:spTree>
+      <p:nvGrpSpPr>
+        <p:cNvPr id="1" name=""/>
+        <p:cNvGrpSpPr/>
+        <p:nvPr/>
+      </p:nvGrpSpPr>
+      <p:grpSpPr>
+        <a:xfrm>
+          <a:off x="0" y="0"/>
+          <a:ext cx="0" cy="0"/>
+          <a:chOff x="0" y="0"/>
+          <a:chExt cx="0" cy="0"/>
+        </a:xfrm>
+      </p:grpSpPr>
+      <p:sp>
+        <p:nvSpPr>
+          <p:cNvPr id="2" name="Title 1"/>
+          <p:cNvSpPr>
+            <a:spLocks noGrp="1"/>
+          </p:cNvSpPr>
+          <p:nvPr>
+            <p:ph type="title"/>
+          </p:nvPr>
+        </p:nvSpPr>
+        <p:spPr/>
+        <p:txBody>
+          <a:bodyPr/>
+          <a:lstStyle/>
+          <a:p>
+            <a:pPr algn="ctr"/>
+            <a:r>
+              <a:rPr lang="en-US" dirty="0" smtClean="0"/>
+              <a:t>Task Catalyst</a:t>
+            </a:r>
+            <a:endParaRPr lang="en-MY" dirty="0"/>
+          </a:p>
+        </p:txBody>
+      </p:sp>
+      <p:pic>
+        <p:nvPicPr>
+          <p:cNvPr id="4" name="Content Placeholder 3"/>
+          <p:cNvPicPr>
+            <a:picLocks noGrp="1" noChangeAspect="1"/>
+          </p:cNvPicPr>
+          <p:nvPr>
+            <p:ph idx="1"/>
+          </p:nvPr>
+        </p:nvPicPr>
+        <p:blipFill>
+          <a:blip r:embed="rId2">
+            <a:extLst>
+              <a:ext uri="{28A0092B-C50C-407E-A947-70E740481C1C}">
+                <a14:useLocalDpi xmlns:a14="http://schemas.microsoft.com/office/drawing/2010/main" val="0"/>
+              </a:ext>
+            </a:extLst>
+          </a:blip>
+          <a:stretch>
+            <a:fillRect/>
+          </a:stretch>
+        </p:blipFill>
+        <p:spPr>
+          <a:xfrm>
+            <a:off x="628650" y="2883694"/>
+            <a:ext cx="2743200" cy="1828800"/>
+          </a:xfrm>
+        </p:spPr>
+      </p:pic>
+      <p:pic>
+        <p:nvPicPr>
+          <p:cNvPr id="5" name="Picture 4"/>
+          <p:cNvPicPr>
+            <a:picLocks noChangeAspect="1"/>
+          </p:cNvPicPr>
+          <p:nvPr/>
+        </p:nvPicPr>
+        <p:blipFill>
+          <a:blip r:embed="rId3">
+            <a:extLst>
+              <a:ext uri="{28A0092B-C50C-407E-A947-70E740481C1C}">
+                <a14:useLocalDpi xmlns:a14="http://schemas.microsoft.com/office/drawing/2010/main" val="0"/>
+              </a:ext>
+            </a:extLst>
+          </a:blip>
+          <a:stretch>
+            <a:fillRect/>
+          </a:stretch>
+        </p:blipFill>
+        <p:spPr>
+          <a:xfrm>
+            <a:off x="4574001" y="2693194"/>
+            <a:ext cx="3941349" cy="2215356"/>
+          </a:xfrm>
+          <a:prstGeom prst="rect">
+            <a:avLst/>
+          </a:prstGeom>
+        </p:spPr>
+      </p:pic>
+      <p:cxnSp>
+        <p:nvCxnSpPr>
+          <p:cNvPr id="7" name="Straight Arrow Connector 6"/>
+          <p:cNvCxnSpPr>
+            <a:stCxn id="2" idx="2"/>
+            <a:endCxn id="4" idx="0"/>
+          </p:cNvCxnSpPr>
+          <p:nvPr/>
+        </p:nvCxnSpPr>
+        <p:spPr>
+          <a:xfrm flipH="1">
+            <a:off x="2000250" y="1690689"/>
+            <a:ext cx="2571750" cy="1193005"/>
+          </a:xfrm>
+          <a:prstGeom prst="straightConnector1">
+            <a:avLst/>
+          </a:prstGeom>
+          <a:ln>
+            <a:tailEnd type="triangle"/>
+          </a:ln>
+        </p:spPr>
+        <p:style>
+          <a:lnRef idx="1">
+            <a:schemeClr val="dk1"/>
+          </a:lnRef>
+          <a:fillRef idx="0">
+            <a:schemeClr val="dk1"/>
+          </a:fillRef>
+          <a:effectRef idx="0">
+            <a:schemeClr val="dk1"/>
+          </a:effectRef>
+          <a:fontRef idx="minor">
+            <a:schemeClr val="tx1"/>
+          </a:fontRef>
+        </p:style>
+      </p:cxnSp>
+      <p:cxnSp>
+        <p:nvCxnSpPr>
+          <p:cNvPr id="9" name="Straight Arrow Connector 8"/>
+          <p:cNvCxnSpPr/>
+          <p:nvPr/>
+        </p:nvCxnSpPr>
+        <p:spPr>
+          <a:xfrm>
+            <a:off x="4572000" y="1690688"/>
+            <a:ext cx="2086708" cy="1247897"/>
+          </a:xfrm>
+          <a:prstGeom prst="straightConnector1">
+            <a:avLst/>
+          </a:prstGeom>
+          <a:ln>
+            <a:tailEnd type="triangle"/>
+          </a:ln>
+        </p:spPr>
+        <p:style>
+          <a:lnRef idx="1">
+            <a:schemeClr val="dk1"/>
+          </a:lnRef>
+          <a:fillRef idx="0">
+            <a:schemeClr val="dk1"/>
+          </a:fillRef>
+          <a:effectRef idx="0">
+            <a:schemeClr val="dk1"/>
+          </a:effectRef>
+          <a:fontRef idx="minor">
+            <a:schemeClr val="tx1"/>
+          </a:fontRef>
+        </p:style>
+      </p:cxnSp>
+    </p:spTree>
+    <p:extLst>
+      <p:ext uri="{BB962C8B-B14F-4D97-AF65-F5344CB8AC3E}">
+        <p14:creationId xmlns:p14="http://schemas.microsoft.com/office/powerpoint/2010/main" val="562229004"/>
+      </p:ext>
+    </p:extLst>
+  </p:cSld>
+  <p:clrMapOvr>
+    <a:masterClrMapping/>
+  </p:clrMapOvr>
+  <p:timing>
+    <p:tnLst>
+      <p:par>
+        <p:cTn id="1" dur="indefinite" restart="never" nodeType="tmRoot">
+          <p:childTnLst>
+            <p:seq concurrent="1" nextAc="seek">
+              <p:cTn id="2" dur="indefinite" nodeType="mainSeq">
+                <p:childTnLst>
+                  <p:par>
+                    <p:cTn id="3" fill="hold">
+                      <p:stCondLst>
+                        <p:cond delay="indefinite"/>
+                      </p:stCondLst>
+                      <p:childTnLst>
+                        <p:par>
+                          <p:cTn id="4" fill="hold">
+                            <p:stCondLst>
+                              <p:cond delay="0"/>
+                            </p:stCondLst>
+                            <p:childTnLst>
+                              <p:par>
+                                <p:cTn id="5" presetID="2" presetClass="entr" presetSubtype="4" fill="hold" nodeType="clickEffect">
+                                  <p:stCondLst>
+                                    <p:cond delay="0"/>
+                                  </p:stCondLst>
+                                  <p:childTnLst>
+                                    <p:set>
+                                      <p:cBhvr>
+                                        <p:cTn id="6" dur="1" fill="hold">
+                                          <p:stCondLst>
+                                            <p:cond delay="0"/>
+                                          </p:stCondLst>
+                                        </p:cTn>
+                                        <p:tgtEl>
+                                          <p:spTgt spid="4"/>
+                                        </p:tgtEl>
+                                        <p:attrNameLst>
+                                          <p:attrName>style.visibility</p:attrName>
+                                        </p:attrNameLst>
+                                      </p:cBhvr>
+                                      <p:to>
+                                        <p:strVal val="visible"/>
+                                      </p:to>
+                                    </p:set>
+                                    <p:anim calcmode="lin" valueType="num">
+                                      <p:cBhvr additive="base">
+                                        <p:cTn id="7" dur="500" fill="hold"/>
+                                        <p:tgtEl>
+                                          <p:spTgt spid="4"/>
+                                        </p:tgtEl>
+                                        <p:attrNameLst>
+                                          <p:attrName>ppt_x</p:attrName>
+                                        </p:attrNameLst>
+                                      </p:cBhvr>
+                                      <p:tavLst>
+                                        <p:tav tm="0">
+                                          <p:val>
+                                            <p:strVal val="#ppt_x"/>
+                                          </p:val>
+                                        </p:tav>
+                                        <p:tav tm="100000">
+                                          <p:val>
+                                            <p:strVal val="#ppt_x"/>
+                                          </p:val>
+                                        </p:tav>
+                                      </p:tavLst>
+                                    </p:anim>
+                                    <p:anim calcmode="lin" valueType="num">
+                                      <p:cBhvr additive="base">
+                                        <p:cTn id="8" dur="500" fill="hold"/>
+                                        <p:tgtEl>
+                                          <p:spTgt spid="4"/>
+                                        </p:tgtEl>
+                                        <p:attrNameLst>
+                                          <p:attrName>ppt_y</p:attrName>
+                                        </p:attrNameLst>
+                                      </p:cBhvr>
+                                      <p:tavLst>
+                                        <p:tav tm="0">
+                                          <p:val>
+                                            <p:strVal val="1+#ppt_h/2"/>
+                                          </p:val>
+                                        </p:tav>
+                                        <p:tav tm="100000">
+                                          <p:val>
+                                            <p:strVal val="#ppt_y"/>
+                                          </p:val>
+                                        </p:tav>
+                                      </p:tavLst>
+                                    </p:anim>
+                                  </p:childTnLst>
+                                </p:cTn>
+                              </p:par>
+                              <p:par>
+                                <p:cTn id="9" presetID="2" presetClass="entr" presetSubtype="4" fill="hold" nodeType="withEffect">
+                                  <p:stCondLst>
+                                    <p:cond delay="0"/>
+                                  </p:stCondLst>
+                                  <p:childTnLst>
+                                    <p:set>
+                                      <p:cBhvr>
+                                        <p:cTn id="10" dur="1" fill="hold">
+                                          <p:stCondLst>
+                                            <p:cond delay="0"/>
+                                          </p:stCondLst>
+                                        </p:cTn>
+                                        <p:tgtEl>
+                                          <p:spTgt spid="7"/>
+                                        </p:tgtEl>
+                                        <p:attrNameLst>
+                                          <p:attrName>style.visibility</p:attrName>
+                                        </p:attrNameLst>
+                                      </p:cBhvr>
+                                      <p:to>
+                                        <p:strVal val="visible"/>
+                                      </p:to>
+                                    </p:set>
+                                    <p:anim calcmode="lin" valueType="num">
+                                      <p:cBhvr additive="base">
+                                        <p:cTn id="11" dur="500" fill="hold"/>
+                                        <p:tgtEl>
+                                          <p:spTgt spid="7"/>
+                                        </p:tgtEl>
+                                        <p:attrNameLst>
+                                          <p:attrName>ppt_x</p:attrName>
+                                        </p:attrNameLst>
+                                      </p:cBhvr>
+                                      <p:tavLst>
+                                        <p:tav tm="0">
+                                          <p:val>
+                                            <p:strVal val="#ppt_x"/>
+                                          </p:val>
+                                        </p:tav>
+                                        <p:tav tm="100000">
+                                          <p:val>
+                                            <p:strVal val="#ppt_x"/>
+                                          </p:val>
+                                        </p:tav>
+                                      </p:tavLst>
+                                    </p:anim>
+                                    <p:anim calcmode="lin" valueType="num">
+                                      <p:cBhvr additive="base">
+                                        <p:cTn id="12" dur="500" fill="hold"/>
+                                        <p:tgtEl>
+                                          <p:spTgt spid="7"/>
+                                        </p:tgtEl>
+                                        <p:attrNameLst>
+                                          <p:attrName>ppt_y</p:attrName>
+                                        </p:attrNameLst>
+                                      </p:cBhvr>
+                                      <p:tavLst>
+                                        <p:tav tm="0">
+                                          <p:val>
+                                            <p:strVal val="1+#ppt_h/2"/>
+                                          </p:val>
+                                        </p:tav>
+                                        <p:tav tm="100000">
+                                          <p:val>
+                                            <p:strVal val="#ppt_y"/>
+                                          </p:val>
+                                        </p:tav>
+                                      </p:tavLst>
+                                    </p:anim>
+                                  </p:childTnLst>
+                                </p:cTn>
+                              </p:par>
+                            </p:childTnLst>
+                          </p:cTn>
+                        </p:par>
+                      </p:childTnLst>
+                    </p:cTn>
+                  </p:par>
+                  <p:par>
+                    <p:cTn id="13" fill="hold">
+                      <p:stCondLst>
+                        <p:cond delay="indefinite"/>
+                      </p:stCondLst>
+                      <p:childTnLst>
+                        <p:par>
+                          <p:cTn id="14" fill="hold">
+                            <p:stCondLst>
+                              <p:cond delay="0"/>
+                            </p:stCondLst>
+                            <p:childTnLst>
+                              <p:par>
+                                <p:cTn id="15" presetID="2" presetClass="entr" presetSubtype="4" fill="hold" nodeType="clickEffect">
+                                  <p:stCondLst>
+                                    <p:cond delay="0"/>
+                                  </p:stCondLst>
+                                  <p:childTnLst>
+                                    <p:set>
+                                      <p:cBhvr>
+                                        <p:cTn id="16" dur="1" fill="hold">
+                                          <p:stCondLst>
+                                            <p:cond delay="0"/>
+                                          </p:stCondLst>
+                                        </p:cTn>
+                                        <p:tgtEl>
+                                          <p:spTgt spid="5"/>
+                                        </p:tgtEl>
+                                        <p:attrNameLst>
+                                          <p:attrName>style.visibility</p:attrName>
+                                        </p:attrNameLst>
+                                      </p:cBhvr>
+                                      <p:to>
+                                        <p:strVal val="visible"/>
+                                      </p:to>
+                                    </p:set>
+                                    <p:anim calcmode="lin" valueType="num">
+                                      <p:cBhvr additive="base">
+                                        <p:cTn id="17" dur="500" fill="hold"/>
+                                        <p:tgtEl>
+                                          <p:spTgt spid="5"/>
+                                        </p:tgtEl>
+                                        <p:attrNameLst>
+                                          <p:attrName>ppt_x</p:attrName>
+                                        </p:attrNameLst>
+                                      </p:cBhvr>
+                                      <p:tavLst>
+                                        <p:tav tm="0">
+                                          <p:val>
+                                            <p:strVal val="#ppt_x"/>
+                                          </p:val>
+                                        </p:tav>
+                                        <p:tav tm="100000">
+                                          <p:val>
+                                            <p:strVal val="#ppt_x"/>
+                                          </p:val>
+                                        </p:tav>
+                                      </p:tavLst>
+                                    </p:anim>
+                                    <p:anim calcmode="lin" valueType="num">
+                                      <p:cBhvr additive="base">
+                                        <p:cTn id="18" dur="500" fill="hold"/>
+                                        <p:tgtEl>
+                                          <p:spTgt spid="5"/>
+                                        </p:tgtEl>
+                                        <p:attrNameLst>
+                                          <p:attrName>ppt_y</p:attrName>
+                                        </p:attrNameLst>
+                                      </p:cBhvr>
+                                      <p:tavLst>
+                                        <p:tav tm="0">
+                                          <p:val>
+                                            <p:strVal val="1+#ppt_h/2"/>
+                                          </p:val>
+                                        </p:tav>
+                                        <p:tav tm="100000">
+                                          <p:val>
+                                            <p:strVal val="#ppt_y"/>
+                                          </p:val>
+                                        </p:tav>
+                                      </p:tavLst>
+                                    </p:anim>
+                                  </p:childTnLst>
+                                </p:cTn>
+                              </p:par>
+                              <p:par>
+                                <p:cTn id="19" presetID="2" presetClass="entr" presetSubtype="4" fill="hold" nodeType="withEffect">
+                                  <p:stCondLst>
+                                    <p:cond delay="0"/>
+                                  </p:stCondLst>
+                                  <p:childTnLst>
+                                    <p:set>
+                                      <p:cBhvr>
+                                        <p:cTn id="20" dur="1" fill="hold">
+                                          <p:stCondLst>
+                                            <p:cond delay="0"/>
+                                          </p:stCondLst>
+                                        </p:cTn>
+                                        <p:tgtEl>
+                                          <p:spTgt spid="9"/>
+                                        </p:tgtEl>
+                                        <p:attrNameLst>
+                                          <p:attrName>style.visibility</p:attrName>
+                                        </p:attrNameLst>
+                                      </p:cBhvr>
+                                      <p:to>
+                                        <p:strVal val="visible"/>
+                                      </p:to>
+                                    </p:set>
+                                    <p:anim calcmode="lin" valueType="num">
+                                      <p:cBhvr additive="base">
+                                        <p:cTn id="21" dur="500" fill="hold"/>
+                                        <p:tgtEl>
+                                          <p:spTgt spid="9"/>
+                                        </p:tgtEl>
+                                        <p:attrNameLst>
+                                          <p:attrName>ppt_x</p:attrName>
+                                        </p:attrNameLst>
+                                      </p:cBhvr>
+                                      <p:tavLst>
+                                        <p:tav tm="0">
+                                          <p:val>
+                                            <p:strVal val="#ppt_x"/>
+                                          </p:val>
+                                        </p:tav>
+                                        <p:tav tm="100000">
+                                          <p:val>
+                                            <p:strVal val="#ppt_x"/>
+                                          </p:val>
+                                        </p:tav>
+                                      </p:tavLst>
+                                    </p:anim>
+                                    <p:anim calcmode="lin" valueType="num">
+                                      <p:cBhvr additive="base">
+                                        <p:cTn id="22" dur="500" fill="hold"/>
+                                        <p:tgtEl>
+                                          <p:spTgt spid="9"/>
+                                        </p:tgtEl>
+                                        <p:attrNameLst>
+                                          <p:attrName>ppt_y</p:attrName>
+                                        </p:attrNameLst>
+                                      </p:cBhvr>
+                                      <p:tavLst>
+                                        <p:tav tm="0">
+                                          <p:val>
+                                            <p:strVal val="1+#ppt_h/2"/>
+                                          </p:val>
+                                        </p:tav>
+                                        <p:tav tm="100000">
+                                          <p:val>
+                                            <p:strVal val="#ppt_y"/>
+                                          </p:val>
+                                        </p:tav>
+                                      </p:tavLst>
+                                    </p:anim>
+                                  </p:childTnLst>
+                                </p:cTn>
+                              </p:par>
+                            </p:childTnLst>
+                          </p:cTn>
+                        </p:par>
+                      </p:childTnLst>
+                    </p:cTn>
+                  </p:par>
+                </p:childTnLst>
+              </p:cTn>
+              <p:prevCondLst>
+                <p:cond evt="onPrev" delay="0">
+                  <p:tgtEl>
+                    <p:sldTgt/>
+                  </p:tgtEl>
+                </p:cond>
+              </p:prevCondLst>
+              <p:nextCondLst>
+                <p:cond evt="onNext" delay="0">
+                  <p:tgtEl>
+                    <p:sldTgt/>
+                  </p:tgtEl>
+                </p:cond>
+              </p:nextCondLst>
+            </p:seq>
+          </p:childTnLst>
+        </p:cTn>
+      </p:par>
+    </p:tnLst>
+  </p:timing>
+</p:sld>
+</file>
+
+<file path=ppt/slides/slide25.xml><?xml version="1.0" encoding="utf-8"?>
+<p:sld xmlns:a="http://schemas.openxmlformats.org/drawingml/2006/main" xmlns:r="http://schemas.openxmlformats.org/officeDocument/2006/relationships" xmlns:p="http://schemas.openxmlformats.org/presentationml/2006/main">
+  <p:cSld>
+    <p:spTree>
+      <p:nvGrpSpPr>
+        <p:cNvPr id="1" name=""/>
+        <p:cNvGrpSpPr/>
+        <p:nvPr/>
+      </p:nvGrpSpPr>
+      <p:grpSpPr>
+        <a:xfrm>
+          <a:off x="0" y="0"/>
+          <a:ext cx="0" cy="0"/>
+          <a:chOff x="0" y="0"/>
+          <a:chExt cx="0" cy="0"/>
+        </a:xfrm>
+      </p:grpSpPr>
+      <p:sp>
+        <p:nvSpPr>
+          <p:cNvPr id="2" name="Title 1"/>
+          <p:cNvSpPr>
+            <a:spLocks noGrp="1"/>
+          </p:cNvSpPr>
+          <p:nvPr>
+            <p:ph type="title"/>
+          </p:nvPr>
+        </p:nvSpPr>
+        <p:spPr/>
+        <p:txBody>
+          <a:bodyPr/>
+          <a:lstStyle/>
+          <a:p>
+            <a:pPr algn="ctr"/>
+            <a:r>
+              <a:rPr lang="en-US" dirty="0" smtClean="0"/>
+              <a:t>Vision</a:t>
+            </a:r>
+            <a:endParaRPr lang="en-MY" dirty="0"/>
+          </a:p>
+        </p:txBody>
+      </p:sp>
+      <p:pic>
+        <p:nvPicPr>
+          <p:cNvPr id="4" name="Content Placeholder 3"/>
+          <p:cNvPicPr>
+            <a:picLocks noGrp="1" noChangeAspect="1"/>
+          </p:cNvPicPr>
+          <p:nvPr>
+            <p:ph idx="1"/>
+          </p:nvPr>
+        </p:nvPicPr>
+        <p:blipFill>
+          <a:blip r:embed="rId2">
+            <a:extLst>
+              <a:ext uri="{28A0092B-C50C-407E-A947-70E740481C1C}">
+                <a14:useLocalDpi xmlns:a14="http://schemas.microsoft.com/office/drawing/2010/main" val="0"/>
+              </a:ext>
+            </a:extLst>
+          </a:blip>
+          <a:stretch>
+            <a:fillRect/>
+          </a:stretch>
+        </p:blipFill>
+        <p:spPr>
+          <a:xfrm>
+            <a:off x="628650" y="2728838"/>
+            <a:ext cx="3638550" cy="1924078"/>
+          </a:xfrm>
+        </p:spPr>
+      </p:pic>
+      <p:pic>
+        <p:nvPicPr>
+          <p:cNvPr id="5" name="Picture 4"/>
+          <p:cNvPicPr>
+            <a:picLocks noChangeAspect="1"/>
+          </p:cNvPicPr>
+          <p:nvPr/>
+        </p:nvPicPr>
+        <p:blipFill>
+          <a:blip r:embed="rId3" cstate="print">
+            <a:extLst>
+              <a:ext uri="{28A0092B-C50C-407E-A947-70E740481C1C}">
+                <a14:useLocalDpi xmlns:a14="http://schemas.microsoft.com/office/drawing/2010/main" val="0"/>
+              </a:ext>
+            </a:extLst>
+          </a:blip>
+          <a:stretch>
+            <a:fillRect/>
+          </a:stretch>
+        </p:blipFill>
+        <p:spPr>
+          <a:xfrm>
+            <a:off x="5272405" y="3255085"/>
+            <a:ext cx="1819398" cy="2440062"/>
+          </a:xfrm>
+          <a:prstGeom prst="rect">
+            <a:avLst/>
+          </a:prstGeom>
+        </p:spPr>
+      </p:pic>
+      <p:pic>
+        <p:nvPicPr>
+          <p:cNvPr id="7" name="Picture 6"/>
+          <p:cNvPicPr>
+            <a:picLocks noChangeAspect="1"/>
+          </p:cNvPicPr>
+          <p:nvPr/>
+        </p:nvPicPr>
+        <p:blipFill>
+          <a:blip r:embed="rId4" cstate="print">
+            <a:extLst>
+              <a:ext uri="{28A0092B-C50C-407E-A947-70E740481C1C}">
+                <a14:useLocalDpi xmlns:a14="http://schemas.microsoft.com/office/drawing/2010/main" val="0"/>
+              </a:ext>
+            </a:extLst>
+          </a:blip>
+          <a:stretch>
+            <a:fillRect/>
+          </a:stretch>
+        </p:blipFill>
+        <p:spPr>
+          <a:xfrm>
+            <a:off x="5810250" y="1621687"/>
+            <a:ext cx="2286758" cy="1633398"/>
+          </a:xfrm>
+          <a:prstGeom prst="rect">
+            <a:avLst/>
+          </a:prstGeom>
+        </p:spPr>
+      </p:pic>
+      <p:sp>
+        <p:nvSpPr>
+          <p:cNvPr id="8" name="TextBox 7"/>
+          <p:cNvSpPr txBox="1"/>
+          <p:nvPr/>
+        </p:nvSpPr>
+        <p:spPr>
+          <a:xfrm>
+            <a:off x="6259953" y="1904707"/>
+            <a:ext cx="1663700" cy="646331"/>
+          </a:xfrm>
+          <a:prstGeom prst="rect">
+            <a:avLst/>
+          </a:prstGeom>
+          <a:noFill/>
+        </p:spPr>
+        <p:txBody>
+          <a:bodyPr wrap="square" rtlCol="0">
+            <a:spAutoFit/>
+          </a:bodyPr>
+          <a:lstStyle/>
+          <a:p>
+            <a:r>
+              <a:rPr lang="en-US" dirty="0" smtClean="0"/>
+              <a:t>What am I doing next??</a:t>
+            </a:r>
+            <a:endParaRPr lang="en-MY" dirty="0"/>
+          </a:p>
+        </p:txBody>
+      </p:sp>
+      <p:pic>
+        <p:nvPicPr>
+          <p:cNvPr id="9" name="Picture 8"/>
+          <p:cNvPicPr>
+            <a:picLocks noChangeAspect="1"/>
+          </p:cNvPicPr>
+          <p:nvPr/>
+        </p:nvPicPr>
+        <p:blipFill>
+          <a:blip r:embed="rId5" cstate="print">
+            <a:extLst>
+              <a:ext uri="{28A0092B-C50C-407E-A947-70E740481C1C}">
+                <a14:useLocalDpi xmlns:a14="http://schemas.microsoft.com/office/drawing/2010/main" val="0"/>
+              </a:ext>
+            </a:extLst>
+          </a:blip>
+          <a:stretch>
+            <a:fillRect/>
+          </a:stretch>
+        </p:blipFill>
+        <p:spPr>
+          <a:xfrm>
+            <a:off x="4912435" y="1889419"/>
+            <a:ext cx="3602915" cy="3602915"/>
+          </a:xfrm>
+          <a:prstGeom prst="rect">
+            <a:avLst/>
+          </a:prstGeom>
+        </p:spPr>
+      </p:pic>
+    </p:spTree>
+    <p:extLst>
+      <p:ext uri="{BB962C8B-B14F-4D97-AF65-F5344CB8AC3E}">
+        <p14:creationId xmlns:p14="http://schemas.microsoft.com/office/powerpoint/2010/main" val="1546696151"/>
+      </p:ext>
+    </p:extLst>
+  </p:cSld>
+  <p:clrMapOvr>
+    <a:masterClrMapping/>
+  </p:clrMapOvr>
+  <p:timing>
+    <p:tnLst>
+      <p:par>
+        <p:cTn id="1" dur="indefinite" restart="never" nodeType="tmRoot">
+          <p:childTnLst>
+            <p:seq concurrent="1" nextAc="seek">
+              <p:cTn id="2" dur="indefinite" nodeType="mainSeq">
+                <p:childTnLst>
+                  <p:par>
+                    <p:cTn id="3" fill="hold">
+                      <p:stCondLst>
+                        <p:cond delay="indefinite"/>
+                      </p:stCondLst>
+                      <p:childTnLst>
+                        <p:par>
+                          <p:cTn id="4" fill="hold">
+                            <p:stCondLst>
+                              <p:cond delay="0"/>
+                            </p:stCondLst>
+                            <p:childTnLst>
+                              <p:par>
+                                <p:cTn id="5" presetID="2" presetClass="entr" presetSubtype="4" fill="hold" nodeType="clickEffect">
+                                  <p:stCondLst>
+                                    <p:cond delay="0"/>
+                                  </p:stCondLst>
+                                  <p:childTnLst>
+                                    <p:set>
+                                      <p:cBhvr>
+                                        <p:cTn id="6" dur="1" fill="hold">
+                                          <p:stCondLst>
+                                            <p:cond delay="0"/>
+                                          </p:stCondLst>
+                                        </p:cTn>
+                                        <p:tgtEl>
+                                          <p:spTgt spid="4"/>
+                                        </p:tgtEl>
+                                        <p:attrNameLst>
+                                          <p:attrName>style.visibility</p:attrName>
+                                        </p:attrNameLst>
+                                      </p:cBhvr>
+                                      <p:to>
+                                        <p:strVal val="visible"/>
+                                      </p:to>
+                                    </p:set>
+                                    <p:anim calcmode="lin" valueType="num">
+                                      <p:cBhvr additive="base">
+                                        <p:cTn id="7" dur="500" fill="hold"/>
+                                        <p:tgtEl>
+                                          <p:spTgt spid="4"/>
+                                        </p:tgtEl>
+                                        <p:attrNameLst>
+                                          <p:attrName>ppt_x</p:attrName>
+                                        </p:attrNameLst>
+                                      </p:cBhvr>
+                                      <p:tavLst>
+                                        <p:tav tm="0">
+                                          <p:val>
+                                            <p:strVal val="#ppt_x"/>
+                                          </p:val>
+                                        </p:tav>
+                                        <p:tav tm="100000">
+                                          <p:val>
+                                            <p:strVal val="#ppt_x"/>
+                                          </p:val>
+                                        </p:tav>
+                                      </p:tavLst>
+                                    </p:anim>
+                                    <p:anim calcmode="lin" valueType="num">
+                                      <p:cBhvr additive="base">
+                                        <p:cTn id="8" dur="500" fill="hold"/>
+                                        <p:tgtEl>
+                                          <p:spTgt spid="4"/>
+                                        </p:tgtEl>
+                                        <p:attrNameLst>
+                                          <p:attrName>ppt_y</p:attrName>
+                                        </p:attrNameLst>
+                                      </p:cBhvr>
+                                      <p:tavLst>
+                                        <p:tav tm="0">
+                                          <p:val>
+                                            <p:strVal val="1+#ppt_h/2"/>
+                                          </p:val>
+                                        </p:tav>
+                                        <p:tav tm="100000">
+                                          <p:val>
+                                            <p:strVal val="#ppt_y"/>
+                                          </p:val>
+                                        </p:tav>
+                                      </p:tavLst>
+                                    </p:anim>
+                                  </p:childTnLst>
+                                </p:cTn>
+                              </p:par>
+                            </p:childTnLst>
+                          </p:cTn>
+                        </p:par>
+                      </p:childTnLst>
+                    </p:cTn>
+                  </p:par>
+                  <p:par>
+                    <p:cTn id="9" fill="hold">
+                      <p:stCondLst>
+                        <p:cond delay="indefinite"/>
+                      </p:stCondLst>
+                      <p:childTnLst>
+                        <p:par>
+                          <p:cTn id="10" fill="hold">
+                            <p:stCondLst>
+                              <p:cond delay="0"/>
+                            </p:stCondLst>
+                            <p:childTnLst>
+                              <p:par>
+                                <p:cTn id="11" presetID="2" presetClass="entr" presetSubtype="4" fill="hold" nodeType="clickEffect">
+                                  <p:stCondLst>
+                                    <p:cond delay="0"/>
+                                  </p:stCondLst>
+                                  <p:childTnLst>
+                                    <p:set>
+                                      <p:cBhvr>
+                                        <p:cTn id="12" dur="1" fill="hold">
+                                          <p:stCondLst>
+                                            <p:cond delay="0"/>
+                                          </p:stCondLst>
+                                        </p:cTn>
+                                        <p:tgtEl>
+                                          <p:spTgt spid="5"/>
+                                        </p:tgtEl>
+                                        <p:attrNameLst>
+                                          <p:attrName>style.visibility</p:attrName>
+                                        </p:attrNameLst>
+                                      </p:cBhvr>
+                                      <p:to>
+                                        <p:strVal val="visible"/>
+                                      </p:to>
+                                    </p:set>
+                                    <p:anim calcmode="lin" valueType="num">
+                                      <p:cBhvr additive="base">
+                                        <p:cTn id="13" dur="500" fill="hold"/>
+                                        <p:tgtEl>
+                                          <p:spTgt spid="5"/>
+                                        </p:tgtEl>
+                                        <p:attrNameLst>
+                                          <p:attrName>ppt_x</p:attrName>
+                                        </p:attrNameLst>
+                                      </p:cBhvr>
+                                      <p:tavLst>
+                                        <p:tav tm="0">
+                                          <p:val>
+                                            <p:strVal val="#ppt_x"/>
+                                          </p:val>
+                                        </p:tav>
+                                        <p:tav tm="100000">
+                                          <p:val>
+                                            <p:strVal val="#ppt_x"/>
+                                          </p:val>
+                                        </p:tav>
+                                      </p:tavLst>
+                                    </p:anim>
+                                    <p:anim calcmode="lin" valueType="num">
+                                      <p:cBhvr additive="base">
+                                        <p:cTn id="14" dur="500" fill="hold"/>
+                                        <p:tgtEl>
+                                          <p:spTgt spid="5"/>
+                                        </p:tgtEl>
+                                        <p:attrNameLst>
+                                          <p:attrName>ppt_y</p:attrName>
+                                        </p:attrNameLst>
+                                      </p:cBhvr>
+                                      <p:tavLst>
+                                        <p:tav tm="0">
+                                          <p:val>
+                                            <p:strVal val="1+#ppt_h/2"/>
+                                          </p:val>
+                                        </p:tav>
+                                        <p:tav tm="100000">
+                                          <p:val>
+                                            <p:strVal val="#ppt_y"/>
+                                          </p:val>
+                                        </p:tav>
+                                      </p:tavLst>
+                                    </p:anim>
+                                  </p:childTnLst>
+                                </p:cTn>
+                              </p:par>
+                              <p:par>
+                                <p:cTn id="15" presetID="2" presetClass="entr" presetSubtype="4" fill="hold" grpId="0" nodeType="withEffect">
+                                  <p:stCondLst>
+                                    <p:cond delay="0"/>
+                                  </p:stCondLst>
+                                  <p:childTnLst>
+                                    <p:set>
+                                      <p:cBhvr>
+                                        <p:cTn id="16" dur="1" fill="hold">
+                                          <p:stCondLst>
+                                            <p:cond delay="0"/>
+                                          </p:stCondLst>
+                                        </p:cTn>
+                                        <p:tgtEl>
+                                          <p:spTgt spid="8"/>
+                                        </p:tgtEl>
+                                        <p:attrNameLst>
+                                          <p:attrName>style.visibility</p:attrName>
+                                        </p:attrNameLst>
+                                      </p:cBhvr>
+                                      <p:to>
+                                        <p:strVal val="visible"/>
+                                      </p:to>
+                                    </p:set>
+                                    <p:anim calcmode="lin" valueType="num">
+                                      <p:cBhvr additive="base">
+                                        <p:cTn id="17" dur="500" fill="hold"/>
+                                        <p:tgtEl>
+                                          <p:spTgt spid="8"/>
+                                        </p:tgtEl>
+                                        <p:attrNameLst>
+                                          <p:attrName>ppt_x</p:attrName>
+                                        </p:attrNameLst>
+                                      </p:cBhvr>
+                                      <p:tavLst>
+                                        <p:tav tm="0">
+                                          <p:val>
+                                            <p:strVal val="#ppt_x"/>
+                                          </p:val>
+                                        </p:tav>
+                                        <p:tav tm="100000">
+                                          <p:val>
+                                            <p:strVal val="#ppt_x"/>
+                                          </p:val>
+                                        </p:tav>
+                                      </p:tavLst>
+                                    </p:anim>
+                                    <p:anim calcmode="lin" valueType="num">
+                                      <p:cBhvr additive="base">
+                                        <p:cTn id="18" dur="500" fill="hold"/>
+                                        <p:tgtEl>
+                                          <p:spTgt spid="8"/>
+                                        </p:tgtEl>
+                                        <p:attrNameLst>
+                                          <p:attrName>ppt_y</p:attrName>
+                                        </p:attrNameLst>
+                                      </p:cBhvr>
+                                      <p:tavLst>
+                                        <p:tav tm="0">
+                                          <p:val>
+                                            <p:strVal val="1+#ppt_h/2"/>
+                                          </p:val>
+                                        </p:tav>
+                                        <p:tav tm="100000">
+                                          <p:val>
+                                            <p:strVal val="#ppt_y"/>
+                                          </p:val>
+                                        </p:tav>
+                                      </p:tavLst>
+                                    </p:anim>
+                                  </p:childTnLst>
+                                </p:cTn>
+                              </p:par>
+                              <p:par>
+                                <p:cTn id="19" presetID="2" presetClass="entr" presetSubtype="4" fill="hold" nodeType="withEffect">
+                                  <p:stCondLst>
+                                    <p:cond delay="0"/>
+                                  </p:stCondLst>
+                                  <p:childTnLst>
+                                    <p:set>
+                                      <p:cBhvr>
+                                        <p:cTn id="20" dur="1" fill="hold">
+                                          <p:stCondLst>
+                                            <p:cond delay="0"/>
+                                          </p:stCondLst>
+                                        </p:cTn>
+                                        <p:tgtEl>
+                                          <p:spTgt spid="7"/>
+                                        </p:tgtEl>
+                                        <p:attrNameLst>
+                                          <p:attrName>style.visibility</p:attrName>
+                                        </p:attrNameLst>
+                                      </p:cBhvr>
+                                      <p:to>
+                                        <p:strVal val="visible"/>
+                                      </p:to>
+                                    </p:set>
+                                    <p:anim calcmode="lin" valueType="num">
+                                      <p:cBhvr additive="base">
+                                        <p:cTn id="21" dur="500" fill="hold"/>
+                                        <p:tgtEl>
+                                          <p:spTgt spid="7"/>
+                                        </p:tgtEl>
+                                        <p:attrNameLst>
+                                          <p:attrName>ppt_x</p:attrName>
+                                        </p:attrNameLst>
+                                      </p:cBhvr>
+                                      <p:tavLst>
+                                        <p:tav tm="0">
+                                          <p:val>
+                                            <p:strVal val="#ppt_x"/>
+                                          </p:val>
+                                        </p:tav>
+                                        <p:tav tm="100000">
+                                          <p:val>
+                                            <p:strVal val="#ppt_x"/>
+                                          </p:val>
+                                        </p:tav>
+                                      </p:tavLst>
+                                    </p:anim>
+                                    <p:anim calcmode="lin" valueType="num">
+                                      <p:cBhvr additive="base">
+                                        <p:cTn id="22" dur="500" fill="hold"/>
+                                        <p:tgtEl>
+                                          <p:spTgt spid="7"/>
+                                        </p:tgtEl>
+                                        <p:attrNameLst>
+                                          <p:attrName>ppt_y</p:attrName>
+                                        </p:attrNameLst>
+                                      </p:cBhvr>
+                                      <p:tavLst>
+                                        <p:tav tm="0">
+                                          <p:val>
+                                            <p:strVal val="1+#ppt_h/2"/>
+                                          </p:val>
+                                        </p:tav>
+                                        <p:tav tm="100000">
+                                          <p:val>
+                                            <p:strVal val="#ppt_y"/>
+                                          </p:val>
+                                        </p:tav>
+                                      </p:tavLst>
+                                    </p:anim>
+                                  </p:childTnLst>
+                                </p:cTn>
+                              </p:par>
+                            </p:childTnLst>
+                          </p:cTn>
+                        </p:par>
+                      </p:childTnLst>
+                    </p:cTn>
+                  </p:par>
+                  <p:par>
+                    <p:cTn id="23" fill="hold">
+                      <p:stCondLst>
+                        <p:cond delay="indefinite"/>
+                      </p:stCondLst>
+                      <p:childTnLst>
+                        <p:par>
+                          <p:cTn id="24" fill="hold">
+                            <p:stCondLst>
+                              <p:cond delay="0"/>
+                            </p:stCondLst>
+                            <p:childTnLst>
+                              <p:par>
+                                <p:cTn id="25" presetID="2" presetClass="entr" presetSubtype="4" fill="hold" nodeType="clickEffect">
+                                  <p:stCondLst>
+                                    <p:cond delay="0"/>
+                                  </p:stCondLst>
+                                  <p:childTnLst>
+                                    <p:set>
+                                      <p:cBhvr>
+                                        <p:cTn id="26" dur="1" fill="hold">
+                                          <p:stCondLst>
+                                            <p:cond delay="0"/>
+                                          </p:stCondLst>
+                                        </p:cTn>
+                                        <p:tgtEl>
+                                          <p:spTgt spid="9"/>
+                                        </p:tgtEl>
+                                        <p:attrNameLst>
+                                          <p:attrName>style.visibility</p:attrName>
+                                        </p:attrNameLst>
+                                      </p:cBhvr>
+                                      <p:to>
+                                        <p:strVal val="visible"/>
+                                      </p:to>
+                                    </p:set>
+                                    <p:anim calcmode="lin" valueType="num">
+                                      <p:cBhvr additive="base">
+                                        <p:cTn id="27" dur="500" fill="hold"/>
+                                        <p:tgtEl>
+                                          <p:spTgt spid="9"/>
+                                        </p:tgtEl>
+                                        <p:attrNameLst>
+                                          <p:attrName>ppt_x</p:attrName>
+                                        </p:attrNameLst>
+                                      </p:cBhvr>
+                                      <p:tavLst>
+                                        <p:tav tm="0">
+                                          <p:val>
+                                            <p:strVal val="#ppt_x"/>
+                                          </p:val>
+                                        </p:tav>
+                                        <p:tav tm="100000">
+                                          <p:val>
+                                            <p:strVal val="#ppt_x"/>
+                                          </p:val>
+                                        </p:tav>
+                                      </p:tavLst>
+                                    </p:anim>
+                                    <p:anim calcmode="lin" valueType="num">
+                                      <p:cBhvr additive="base">
+                                        <p:cTn id="28" dur="500" fill="hold"/>
+                                        <p:tgtEl>
+                                          <p:spTgt spid="9"/>
+                                        </p:tgtEl>
+                                        <p:attrNameLst>
+                                          <p:attrName>ppt_y</p:attrName>
+                                        </p:attrNameLst>
+                                      </p:cBhvr>
+                                      <p:tavLst>
+                                        <p:tav tm="0">
+                                          <p:val>
+                                            <p:strVal val="1+#ppt_h/2"/>
+                                          </p:val>
+                                        </p:tav>
+                                        <p:tav tm="100000">
+                                          <p:val>
+                                            <p:strVal val="#ppt_y"/>
+                                          </p:val>
+                                        </p:tav>
+                                      </p:tavLst>
+                                    </p:anim>
+                                  </p:childTnLst>
+                                </p:cTn>
+                              </p:par>
+                            </p:childTnLst>
+                          </p:cTn>
+                        </p:par>
+                      </p:childTnLst>
+                    </p:cTn>
+                  </p:par>
+                </p:childTnLst>
+              </p:cTn>
+              <p:prevCondLst>
+                <p:cond evt="onPrev" delay="0">
+                  <p:tgtEl>
+                    <p:sldTgt/>
+                  </p:tgtEl>
+                </p:cond>
+              </p:prevCondLst>
+              <p:nextCondLst>
+                <p:cond evt="onNext" delay="0">
+                  <p:tgtEl>
+                    <p:sldTgt/>
+                  </p:tgtEl>
+                </p:cond>
+              </p:nextCondLst>
+            </p:seq>
+          </p:childTnLst>
+        </p:cTn>
+      </p:par>
+    </p:tnLst>
+    <p:bldLst>
+      <p:bldP spid="8" grpId="0"/>
+    </p:bldLst>
+  </p:timing>
+</p:sld>
+</file>
+
+<file path=ppt/slides/slide26.xml><?xml version="1.0" encoding="utf-8"?>
+<p:sld xmlns:a="http://schemas.openxmlformats.org/drawingml/2006/main" xmlns:r="http://schemas.openxmlformats.org/officeDocument/2006/relationships" xmlns:p="http://schemas.openxmlformats.org/presentationml/2006/main">
+  <p:cSld>
+    <p:spTree>
+      <p:nvGrpSpPr>
+        <p:cNvPr id="1" name=""/>
+        <p:cNvGrpSpPr/>
+        <p:nvPr/>
+      </p:nvGrpSpPr>
+      <p:grpSpPr>
+        <a:xfrm>
+          <a:off x="0" y="0"/>
+          <a:ext cx="0" cy="0"/>
+          <a:chOff x="0" y="0"/>
+          <a:chExt cx="0" cy="0"/>
+        </a:xfrm>
+      </p:grpSpPr>
+      <p:sp>
+        <p:nvSpPr>
+          <p:cNvPr id="2" name="Title 1"/>
+          <p:cNvSpPr>
+            <a:spLocks noGrp="1"/>
+          </p:cNvSpPr>
+          <p:nvPr>
+            <p:ph type="title"/>
+          </p:nvPr>
+        </p:nvSpPr>
+        <p:spPr/>
+        <p:txBody>
+          <a:bodyPr/>
+          <a:lstStyle/>
+          <a:p>
+            <a:pPr algn="ctr"/>
+            <a:r>
+              <a:rPr lang="en-US" dirty="0" smtClean="0"/>
+              <a:t>What </a:t>
+            </a:r>
+            <a:r>
+              <a:rPr lang="en-US" dirty="0" err="1" smtClean="0"/>
+              <a:t>Tast</a:t>
+            </a:r>
+            <a:r>
+              <a:rPr lang="en-US" dirty="0" smtClean="0"/>
+              <a:t> Catalyst Can Do</a:t>
+            </a:r>
+            <a:endParaRPr lang="en-MY" dirty="0"/>
+          </a:p>
+        </p:txBody>
+      </p:sp>
+      <p:sp>
+        <p:nvSpPr>
+          <p:cNvPr id="3" name="Content Placeholder 2"/>
+          <p:cNvSpPr>
+            <a:spLocks noGrp="1"/>
+          </p:cNvSpPr>
+          <p:nvPr>
+            <p:ph idx="1"/>
+          </p:nvPr>
+        </p:nvSpPr>
+        <p:spPr>
+          <a:xfrm>
+            <a:off x="3702050" y="1889125"/>
+            <a:ext cx="7886700" cy="4351338"/>
+          </a:xfrm>
+        </p:spPr>
+        <p:txBody>
+          <a:bodyPr>
+            <a:noAutofit/>
+          </a:bodyPr>
+          <a:lstStyle/>
+          <a:p>
+            <a:pPr marL="0" indent="0">
+              <a:buNone/>
+            </a:pPr>
+            <a:r>
+              <a:rPr lang="en-US" sz="4200" dirty="0" smtClean="0"/>
+              <a:t>C</a:t>
+            </a:r>
+          </a:p>
+          <a:p>
+            <a:pPr marL="0" indent="0">
+              <a:buNone/>
+            </a:pPr>
+            <a:endParaRPr lang="en-US" sz="2000" dirty="0" smtClean="0"/>
+          </a:p>
+          <a:p>
+            <a:pPr marL="0" indent="0">
+              <a:buNone/>
+            </a:pPr>
+            <a:r>
+              <a:rPr lang="en-US" sz="4200" dirty="0" smtClean="0"/>
+              <a:t>R</a:t>
+            </a:r>
+          </a:p>
+          <a:p>
+            <a:pPr marL="0" indent="0">
+              <a:buNone/>
+            </a:pPr>
+            <a:endParaRPr lang="en-US" sz="2000" dirty="0" smtClean="0"/>
+          </a:p>
+          <a:p>
+            <a:pPr marL="0" indent="0">
+              <a:buNone/>
+            </a:pPr>
+            <a:r>
+              <a:rPr lang="en-US" sz="4200" dirty="0" smtClean="0"/>
+              <a:t>U</a:t>
+            </a:r>
+            <a:endParaRPr lang="en-US" dirty="0" smtClean="0"/>
+          </a:p>
+          <a:p>
+            <a:pPr marL="0" indent="0">
+              <a:buNone/>
+            </a:pPr>
+            <a:endParaRPr lang="en-US" sz="2000" dirty="0" smtClean="0"/>
+          </a:p>
+          <a:p>
+            <a:pPr marL="0" indent="0">
+              <a:buNone/>
+            </a:pPr>
+            <a:r>
+              <a:rPr lang="en-US" sz="4200" dirty="0" smtClean="0"/>
+              <a:t>D</a:t>
+            </a:r>
+            <a:endParaRPr lang="en-US" dirty="0" smtClean="0"/>
+          </a:p>
+        </p:txBody>
+      </p:sp>
+      <p:sp>
+        <p:nvSpPr>
+          <p:cNvPr id="4" name="Content Placeholder 2"/>
+          <p:cNvSpPr txBox="1">
+            <a:spLocks/>
+          </p:cNvSpPr>
+          <p:nvPr/>
+        </p:nvSpPr>
+        <p:spPr>
+          <a:xfrm>
+            <a:off x="3782260" y="1889125"/>
+            <a:ext cx="7886700" cy="4351338"/>
+          </a:xfrm>
+          <a:prstGeom prst="rect">
+            <a:avLst/>
+          </a:prstGeom>
+        </p:spPr>
+        <p:txBody>
+          <a:bodyPr vert="horz" lIns="91440" tIns="45720" rIns="91440" bIns="45720" rtlCol="0">
+            <a:noAutofit/>
+          </a:bodyPr>
+          <a:lstStyle>
+            <a:lvl1pPr marL="228600" indent="-228600" algn="l" defTabSz="914400" rtl="0" eaLnBrk="1" latinLnBrk="0" hangingPunct="1">
+              <a:lnSpc>
+                <a:spcPct val="90000"/>
+              </a:lnSpc>
+              <a:spcBef>
+                <a:spcPts val="1000"/>
+              </a:spcBef>
+              <a:buFont typeface="Arial" panose="020B0604020202020204" pitchFamily="34" charset="0"/>
+              <a:buChar char="•"/>
+              <a:defRPr sz="2800" kern="1200">
+                <a:solidFill>
+                  <a:schemeClr val="tx1"/>
+                </a:solidFill>
+                <a:latin typeface="+mn-lt"/>
+                <a:ea typeface="+mn-ea"/>
+                <a:cs typeface="+mn-cs"/>
+              </a:defRPr>
+            </a:lvl1pPr>
+            <a:lvl2pPr marL="685800" indent="-228600" algn="l" defTabSz="914400" rtl="0" eaLnBrk="1" latinLnBrk="0" hangingPunct="1">
+              <a:lnSpc>
+                <a:spcPct val="90000"/>
+              </a:lnSpc>
+              <a:spcBef>
+                <a:spcPts val="500"/>
+              </a:spcBef>
+              <a:buFont typeface="Arial" panose="020B0604020202020204" pitchFamily="34" charset="0"/>
+              <a:buChar char="•"/>
+              <a:defRPr sz="2400" kern="1200">
+                <a:solidFill>
+                  <a:schemeClr val="tx1"/>
+                </a:solidFill>
+                <a:latin typeface="+mn-lt"/>
+                <a:ea typeface="+mn-ea"/>
+                <a:cs typeface="+mn-cs"/>
+              </a:defRPr>
+            </a:lvl2pPr>
+            <a:lvl3pPr marL="1143000" indent="-228600" algn="l" defTabSz="914400" rtl="0" eaLnBrk="1" latinLnBrk="0" hangingPunct="1">
+              <a:lnSpc>
+                <a:spcPct val="90000"/>
+              </a:lnSpc>
+              <a:spcBef>
+                <a:spcPts val="500"/>
+              </a:spcBef>
+              <a:buFont typeface="Arial" panose="020B0604020202020204" pitchFamily="34" charset="0"/>
+              <a:buChar char="•"/>
+              <a:defRPr sz="2000" kern="1200">
+                <a:solidFill>
+                  <a:schemeClr val="tx1"/>
+                </a:solidFill>
+                <a:latin typeface="+mn-lt"/>
+                <a:ea typeface="+mn-ea"/>
+                <a:cs typeface="+mn-cs"/>
+              </a:defRPr>
+            </a:lvl3pPr>
+            <a:lvl4pPr marL="1600200" indent="-228600" algn="l" defTabSz="914400" rtl="0" eaLnBrk="1" latinLnBrk="0" hangingPunct="1">
+              <a:lnSpc>
+                <a:spcPct val="90000"/>
+              </a:lnSpc>
+              <a:spcBef>
+                <a:spcPts val="500"/>
+              </a:spcBef>
+              <a:buFont typeface="Arial" panose="020B0604020202020204" pitchFamily="34" charset="0"/>
+              <a:buChar char="•"/>
+              <a:defRPr sz="1800" kern="1200">
+                <a:solidFill>
+                  <a:schemeClr val="tx1"/>
+                </a:solidFill>
+                <a:latin typeface="+mn-lt"/>
+                <a:ea typeface="+mn-ea"/>
+                <a:cs typeface="+mn-cs"/>
+              </a:defRPr>
+            </a:lvl4pPr>
+            <a:lvl5pPr marL="2057400" indent="-228600" algn="l" defTabSz="914400" rtl="0" eaLnBrk="1" latinLnBrk="0" hangingPunct="1">
+              <a:lnSpc>
+                <a:spcPct val="90000"/>
+              </a:lnSpc>
+              <a:spcBef>
+                <a:spcPts val="500"/>
+              </a:spcBef>
+              <a:buFont typeface="Arial" panose="020B0604020202020204" pitchFamily="34" charset="0"/>
+              <a:buChar char="•"/>
+              <a:defRPr sz="1800" kern="1200">
+                <a:solidFill>
+                  <a:schemeClr val="tx1"/>
+                </a:solidFill>
+                <a:latin typeface="+mn-lt"/>
+                <a:ea typeface="+mn-ea"/>
+                <a:cs typeface="+mn-cs"/>
+              </a:defRPr>
+            </a:lvl5pPr>
+            <a:lvl6pPr marL="2514600" indent="-228600" algn="l" defTabSz="914400" rtl="0" eaLnBrk="1" latinLnBrk="0" hangingPunct="1">
+              <a:lnSpc>
+                <a:spcPct val="90000"/>
+              </a:lnSpc>
+              <a:spcBef>
+                <a:spcPts val="500"/>
+              </a:spcBef>
+              <a:buFont typeface="Arial" panose="020B0604020202020204" pitchFamily="34" charset="0"/>
+              <a:buChar char="•"/>
+              <a:defRPr sz="1800" kern="1200">
+                <a:solidFill>
+                  <a:schemeClr val="tx1"/>
+                </a:solidFill>
+                <a:latin typeface="+mn-lt"/>
+                <a:ea typeface="+mn-ea"/>
+                <a:cs typeface="+mn-cs"/>
+              </a:defRPr>
+            </a:lvl6pPr>
+            <a:lvl7pPr marL="2971800" indent="-228600" algn="l" defTabSz="914400" rtl="0" eaLnBrk="1" latinLnBrk="0" hangingPunct="1">
+              <a:lnSpc>
+                <a:spcPct val="90000"/>
+              </a:lnSpc>
+              <a:spcBef>
+                <a:spcPts val="500"/>
+              </a:spcBef>
+              <a:buFont typeface="Arial" panose="020B0604020202020204" pitchFamily="34" charset="0"/>
+              <a:buChar char="•"/>
+              <a:defRPr sz="1800" kern="1200">
+                <a:solidFill>
+                  <a:schemeClr val="tx1"/>
+                </a:solidFill>
+                <a:latin typeface="+mn-lt"/>
+                <a:ea typeface="+mn-ea"/>
+                <a:cs typeface="+mn-cs"/>
+              </a:defRPr>
+            </a:lvl7pPr>
+            <a:lvl8pPr marL="3429000" indent="-228600" algn="l" defTabSz="914400" rtl="0" eaLnBrk="1" latinLnBrk="0" hangingPunct="1">
+              <a:lnSpc>
+                <a:spcPct val="90000"/>
+              </a:lnSpc>
+              <a:spcBef>
+                <a:spcPts val="500"/>
+              </a:spcBef>
+              <a:buFont typeface="Arial" panose="020B0604020202020204" pitchFamily="34" charset="0"/>
+              <a:buChar char="•"/>
+              <a:defRPr sz="1800" kern="1200">
+                <a:solidFill>
+                  <a:schemeClr val="tx1"/>
+                </a:solidFill>
+                <a:latin typeface="+mn-lt"/>
+                <a:ea typeface="+mn-ea"/>
+                <a:cs typeface="+mn-cs"/>
+              </a:defRPr>
+            </a:lvl8pPr>
+            <a:lvl9pPr marL="3886200" indent="-228600" algn="l" defTabSz="914400" rtl="0" eaLnBrk="1" latinLnBrk="0" hangingPunct="1">
+              <a:lnSpc>
+                <a:spcPct val="90000"/>
+              </a:lnSpc>
+              <a:spcBef>
+                <a:spcPts val="500"/>
+              </a:spcBef>
+              <a:buFont typeface="Arial" panose="020B0604020202020204" pitchFamily="34" charset="0"/>
+              <a:buChar char="•"/>
+              <a:defRPr sz="1800" kern="1200">
+                <a:solidFill>
+                  <a:schemeClr val="tx1"/>
+                </a:solidFill>
+                <a:latin typeface="+mn-lt"/>
+                <a:ea typeface="+mn-ea"/>
+                <a:cs typeface="+mn-cs"/>
+              </a:defRPr>
+            </a:lvl9pPr>
+          </a:lstStyle>
+          <a:p>
+            <a:pPr marL="0" indent="0">
+              <a:buFont typeface="Arial" panose="020B0604020202020204" pitchFamily="34" charset="0"/>
+              <a:buNone/>
+            </a:pPr>
+            <a:r>
+              <a:rPr lang="en-US" sz="4200" dirty="0"/>
+              <a:t> </a:t>
+            </a:r>
+            <a:r>
+              <a:rPr lang="en-US" sz="4200" dirty="0" smtClean="0"/>
+              <a:t> </a:t>
+            </a:r>
+            <a:r>
+              <a:rPr lang="en-US" dirty="0" err="1" smtClean="0"/>
+              <a:t>reate</a:t>
+            </a:r>
+            <a:endParaRPr lang="en-US" dirty="0" smtClean="0"/>
+          </a:p>
+          <a:p>
+            <a:pPr marL="0" indent="0">
+              <a:buFont typeface="Arial" panose="020B0604020202020204" pitchFamily="34" charset="0"/>
+              <a:buNone/>
+            </a:pPr>
+            <a:endParaRPr lang="en-US" sz="2000" dirty="0" smtClean="0"/>
+          </a:p>
+          <a:p>
+            <a:pPr marL="0" indent="0">
+              <a:buFont typeface="Arial" panose="020B0604020202020204" pitchFamily="34" charset="0"/>
+              <a:buNone/>
+            </a:pPr>
+            <a:r>
+              <a:rPr lang="en-US" sz="4200" dirty="0" smtClean="0"/>
+              <a:t>  </a:t>
+            </a:r>
+            <a:r>
+              <a:rPr lang="en-US" dirty="0" err="1" smtClean="0"/>
+              <a:t>ead</a:t>
+            </a:r>
+            <a:endParaRPr lang="en-US" dirty="0" smtClean="0"/>
+          </a:p>
+          <a:p>
+            <a:pPr marL="0" indent="0">
+              <a:buFont typeface="Arial" panose="020B0604020202020204" pitchFamily="34" charset="0"/>
+              <a:buNone/>
+            </a:pPr>
+            <a:endParaRPr lang="en-US" sz="2000" dirty="0" smtClean="0"/>
+          </a:p>
+          <a:p>
+            <a:pPr marL="0" indent="0">
+              <a:buFont typeface="Arial" panose="020B0604020202020204" pitchFamily="34" charset="0"/>
+              <a:buNone/>
+            </a:pPr>
+            <a:r>
+              <a:rPr lang="en-US" sz="4200" dirty="0" smtClean="0"/>
+              <a:t>  </a:t>
+            </a:r>
+            <a:r>
+              <a:rPr lang="en-US" dirty="0" err="1" smtClean="0"/>
+              <a:t>pdate</a:t>
+            </a:r>
+            <a:endParaRPr lang="en-US" dirty="0" smtClean="0"/>
+          </a:p>
+          <a:p>
+            <a:pPr marL="0" indent="0">
+              <a:buFont typeface="Arial" panose="020B0604020202020204" pitchFamily="34" charset="0"/>
+              <a:buNone/>
+            </a:pPr>
+            <a:endParaRPr lang="en-US" sz="2000" dirty="0" smtClean="0"/>
+          </a:p>
+          <a:p>
+            <a:pPr marL="0" indent="0">
+              <a:buFont typeface="Arial" panose="020B0604020202020204" pitchFamily="34" charset="0"/>
+              <a:buNone/>
+            </a:pPr>
+            <a:r>
+              <a:rPr lang="en-US" sz="4200" dirty="0" smtClean="0"/>
+              <a:t>  </a:t>
+            </a:r>
+            <a:r>
+              <a:rPr lang="en-US" dirty="0" err="1" smtClean="0"/>
+              <a:t>elete</a:t>
+            </a:r>
+            <a:endParaRPr lang="en-US" dirty="0" smtClean="0"/>
+          </a:p>
+        </p:txBody>
+      </p:sp>
+    </p:spTree>
+    <p:extLst>
+      <p:ext uri="{BB962C8B-B14F-4D97-AF65-F5344CB8AC3E}">
+        <p14:creationId xmlns:p14="http://schemas.microsoft.com/office/powerpoint/2010/main" val="495950684"/>
+      </p:ext>
+    </p:extLst>
+  </p:cSld>
+  <p:clrMapOvr>
+    <a:masterClrMapping/>
+  </p:clrMapOvr>
+  <p:timing>
+    <p:tnLst>
+      <p:par>
+        <p:cTn id="1" dur="indefinite" restart="never" nodeType="tmRoot">
+          <p:childTnLst>
+            <p:seq concurrent="1" nextAc="seek">
+              <p:cTn id="2" dur="indefinite" nodeType="mainSeq">
+                <p:childTnLst>
+                  <p:par>
+                    <p:cTn id="3" fill="hold">
+                      <p:stCondLst>
+                        <p:cond delay="indefinite"/>
+                      </p:stCondLst>
+                      <p:childTnLst>
+                        <p:par>
+                          <p:cTn id="4" fill="hold">
+                            <p:stCondLst>
+                              <p:cond delay="0"/>
+                            </p:stCondLst>
+                            <p:childTnLst>
+                              <p:par>
+                                <p:cTn id="5" presetID="2" presetClass="entr" presetSubtype="4" fill="hold" grpId="0" nodeType="clickEffect">
+                                  <p:stCondLst>
+                                    <p:cond delay="0"/>
+                                  </p:stCondLst>
+                                  <p:childTnLst>
+                                    <p:set>
+                                      <p:cBhvr>
+                                        <p:cTn id="6" dur="1" fill="hold">
+                                          <p:stCondLst>
+                                            <p:cond delay="0"/>
+                                          </p:stCondLst>
+                                        </p:cTn>
+                                        <p:tgtEl>
+                                          <p:spTgt spid="3">
+                                            <p:txEl>
+                                              <p:pRg st="0" end="0"/>
+                                            </p:txEl>
+                                          </p:spTgt>
+                                        </p:tgtEl>
+                                        <p:attrNameLst>
+                                          <p:attrName>style.visibility</p:attrName>
+                                        </p:attrNameLst>
+                                      </p:cBhvr>
+                                      <p:to>
+                                        <p:strVal val="visible"/>
+                                      </p:to>
+                                    </p:set>
+                                    <p:anim calcmode="lin" valueType="num">
+                                      <p:cBhvr additive="base">
+                                        <p:cTn id="7" dur="500" fill="hold"/>
+                                        <p:tgtEl>
+                                          <p:spTgt spid="3">
+                                            <p:txEl>
+                                              <p:pRg st="0" end="0"/>
+                                            </p:txEl>
+                                          </p:spTgt>
+                                        </p:tgtEl>
+                                        <p:attrNameLst>
+                                          <p:attrName>ppt_x</p:attrName>
+                                        </p:attrNameLst>
+                                      </p:cBhvr>
+                                      <p:tavLst>
+                                        <p:tav tm="0">
+                                          <p:val>
+                                            <p:strVal val="#ppt_x"/>
+                                          </p:val>
+                                        </p:tav>
+                                        <p:tav tm="100000">
+                                          <p:val>
+                                            <p:strVal val="#ppt_x"/>
+                                          </p:val>
+                                        </p:tav>
+                                      </p:tavLst>
+                                    </p:anim>
+                                    <p:anim calcmode="lin" valueType="num">
+                                      <p:cBhvr additive="base">
+                                        <p:cTn id="8" dur="500" fill="hold"/>
+                                        <p:tgtEl>
+                                          <p:spTgt spid="3">
+                                            <p:txEl>
+                                              <p:pRg st="0" end="0"/>
+                                            </p:txEl>
+                                          </p:spTgt>
+                                        </p:tgtEl>
+                                        <p:attrNameLst>
+                                          <p:attrName>ppt_y</p:attrName>
+                                        </p:attrNameLst>
+                                      </p:cBhvr>
+                                      <p:tavLst>
+                                        <p:tav tm="0">
+                                          <p:val>
+                                            <p:strVal val="1+#ppt_h/2"/>
+                                          </p:val>
+                                        </p:tav>
+                                        <p:tav tm="100000">
+                                          <p:val>
+                                            <p:strVal val="#ppt_y"/>
+                                          </p:val>
+                                        </p:tav>
+                                      </p:tavLst>
+                                    </p:anim>
+                                  </p:childTnLst>
+                                </p:cTn>
+                              </p:par>
+                            </p:childTnLst>
+                          </p:cTn>
+                        </p:par>
+                      </p:childTnLst>
+                    </p:cTn>
+                  </p:par>
+                  <p:par>
+                    <p:cTn id="9" fill="hold">
+                      <p:stCondLst>
+                        <p:cond delay="indefinite"/>
+                      </p:stCondLst>
+                      <p:childTnLst>
+                        <p:par>
+                          <p:cTn id="10" fill="hold">
+                            <p:stCondLst>
+                              <p:cond delay="0"/>
+                            </p:stCondLst>
+                            <p:childTnLst>
+                              <p:par>
+                                <p:cTn id="11" presetID="16" presetClass="entr" presetSubtype="21" fill="hold" grpId="0" nodeType="clickEffect">
+                                  <p:stCondLst>
+                                    <p:cond delay="0"/>
+                                  </p:stCondLst>
+                                  <p:childTnLst>
+                                    <p:set>
+                                      <p:cBhvr>
+                                        <p:cTn id="12" dur="1" fill="hold">
+                                          <p:stCondLst>
+                                            <p:cond delay="0"/>
+                                          </p:stCondLst>
+                                        </p:cTn>
+                                        <p:tgtEl>
+                                          <p:spTgt spid="3">
+                                            <p:txEl>
+                                              <p:pRg st="2" end="2"/>
+                                            </p:txEl>
+                                          </p:spTgt>
+                                        </p:tgtEl>
+                                        <p:attrNameLst>
+                                          <p:attrName>style.visibility</p:attrName>
+                                        </p:attrNameLst>
+                                      </p:cBhvr>
+                                      <p:to>
+                                        <p:strVal val="visible"/>
+                                      </p:to>
+                                    </p:set>
+                                    <p:animEffect transition="in" filter="barn(inVertical)">
+                                      <p:cBhvr>
+                                        <p:cTn id="13" dur="500"/>
+                                        <p:tgtEl>
+                                          <p:spTgt spid="3">
+                                            <p:txEl>
+                                              <p:pRg st="2" end="2"/>
+                                            </p:txEl>
+                                          </p:spTgt>
+                                        </p:tgtEl>
+                                      </p:cBhvr>
+                                    </p:animEffect>
+                                  </p:childTnLst>
+                                </p:cTn>
+                              </p:par>
+                            </p:childTnLst>
+                          </p:cTn>
+                        </p:par>
+                      </p:childTnLst>
+                    </p:cTn>
+                  </p:par>
+                  <p:par>
+                    <p:cTn id="14" fill="hold">
+                      <p:stCondLst>
+                        <p:cond delay="indefinite"/>
+                      </p:stCondLst>
+                      <p:childTnLst>
+                        <p:par>
+                          <p:cTn id="15" fill="hold">
+                            <p:stCondLst>
+                              <p:cond delay="0"/>
+                            </p:stCondLst>
+                            <p:childTnLst>
+                              <p:par>
+                                <p:cTn id="16" presetID="16" presetClass="entr" presetSubtype="21" fill="hold" grpId="0" nodeType="clickEffect">
+                                  <p:stCondLst>
+                                    <p:cond delay="0"/>
+                                  </p:stCondLst>
+                                  <p:childTnLst>
+                                    <p:set>
+                                      <p:cBhvr>
+                                        <p:cTn id="17" dur="1" fill="hold">
+                                          <p:stCondLst>
+                                            <p:cond delay="0"/>
+                                          </p:stCondLst>
+                                        </p:cTn>
+                                        <p:tgtEl>
+                                          <p:spTgt spid="3">
+                                            <p:txEl>
+                                              <p:pRg st="4" end="4"/>
+                                            </p:txEl>
+                                          </p:spTgt>
+                                        </p:tgtEl>
+                                        <p:attrNameLst>
+                                          <p:attrName>style.visibility</p:attrName>
+                                        </p:attrNameLst>
+                                      </p:cBhvr>
+                                      <p:to>
+                                        <p:strVal val="visible"/>
+                                      </p:to>
+                                    </p:set>
+                                    <p:animEffect transition="in" filter="barn(inVertical)">
+                                      <p:cBhvr>
+                                        <p:cTn id="18" dur="500"/>
+                                        <p:tgtEl>
+                                          <p:spTgt spid="3">
+                                            <p:txEl>
+                                              <p:pRg st="4" end="4"/>
+                                            </p:txEl>
+                                          </p:spTgt>
+                                        </p:tgtEl>
+                                      </p:cBhvr>
+                                    </p:animEffect>
+                                  </p:childTnLst>
+                                </p:cTn>
+                              </p:par>
+                            </p:childTnLst>
+                          </p:cTn>
+                        </p:par>
+                      </p:childTnLst>
+                    </p:cTn>
+                  </p:par>
+                  <p:par>
+                    <p:cTn id="19" fill="hold">
+                      <p:stCondLst>
+                        <p:cond delay="indefinite"/>
+                      </p:stCondLst>
+                      <p:childTnLst>
+                        <p:par>
+                          <p:cTn id="20" fill="hold">
+                            <p:stCondLst>
+                              <p:cond delay="0"/>
+                            </p:stCondLst>
+                            <p:childTnLst>
+                              <p:par>
+                                <p:cTn id="21" presetID="16" presetClass="entr" presetSubtype="21" fill="hold" grpId="0" nodeType="clickEffect">
+                                  <p:stCondLst>
+                                    <p:cond delay="0"/>
+                                  </p:stCondLst>
+                                  <p:childTnLst>
+                                    <p:set>
+                                      <p:cBhvr>
+                                        <p:cTn id="22" dur="1" fill="hold">
+                                          <p:stCondLst>
+                                            <p:cond delay="0"/>
+                                          </p:stCondLst>
+                                        </p:cTn>
+                                        <p:tgtEl>
+                                          <p:spTgt spid="3">
+                                            <p:txEl>
+                                              <p:pRg st="6" end="6"/>
+                                            </p:txEl>
+                                          </p:spTgt>
+                                        </p:tgtEl>
+                                        <p:attrNameLst>
+                                          <p:attrName>style.visibility</p:attrName>
+                                        </p:attrNameLst>
+                                      </p:cBhvr>
+                                      <p:to>
+                                        <p:strVal val="visible"/>
+                                      </p:to>
+                                    </p:set>
+                                    <p:animEffect transition="in" filter="barn(inVertical)">
+                                      <p:cBhvr>
+                                        <p:cTn id="23" dur="500"/>
+                                        <p:tgtEl>
+                                          <p:spTgt spid="3">
+                                            <p:txEl>
+                                              <p:pRg st="6" end="6"/>
+                                            </p:txEl>
+                                          </p:spTgt>
+                                        </p:tgtEl>
+                                      </p:cBhvr>
+                                    </p:animEffect>
+                                  </p:childTnLst>
+                                </p:cTn>
+                              </p:par>
+                            </p:childTnLst>
+                          </p:cTn>
+                        </p:par>
+                      </p:childTnLst>
+                    </p:cTn>
+                  </p:par>
+                  <p:par>
+                    <p:cTn id="24" fill="hold">
+                      <p:stCondLst>
+                        <p:cond delay="indefinite"/>
+                      </p:stCondLst>
+                      <p:childTnLst>
+                        <p:par>
+                          <p:cTn id="25" fill="hold">
+                            <p:stCondLst>
+                              <p:cond delay="0"/>
+                            </p:stCondLst>
+                            <p:childTnLst>
+                              <p:par>
+                                <p:cTn id="26" presetID="2" presetClass="entr" presetSubtype="2" fill="hold" grpId="0" nodeType="clickEffect">
+                                  <p:stCondLst>
+                                    <p:cond delay="0"/>
+                                  </p:stCondLst>
+                                  <p:childTnLst>
+                                    <p:set>
+                                      <p:cBhvr>
+                                        <p:cTn id="27" dur="1" fill="hold">
+                                          <p:stCondLst>
+                                            <p:cond delay="0"/>
+                                          </p:stCondLst>
+                                        </p:cTn>
+                                        <p:tgtEl>
+                                          <p:spTgt spid="4">
+                                            <p:txEl>
+                                              <p:pRg st="0" end="0"/>
+                                            </p:txEl>
+                                          </p:spTgt>
+                                        </p:tgtEl>
+                                        <p:attrNameLst>
+                                          <p:attrName>style.visibility</p:attrName>
+                                        </p:attrNameLst>
+                                      </p:cBhvr>
+                                      <p:to>
+                                        <p:strVal val="visible"/>
+                                      </p:to>
+                                    </p:set>
+                                    <p:anim calcmode="lin" valueType="num">
+                                      <p:cBhvr additive="base">
+                                        <p:cTn id="28" dur="500" fill="hold"/>
+                                        <p:tgtEl>
+                                          <p:spTgt spid="4">
+                                            <p:txEl>
+                                              <p:pRg st="0" end="0"/>
+                                            </p:txEl>
+                                          </p:spTgt>
+                                        </p:tgtEl>
+                                        <p:attrNameLst>
+                                          <p:attrName>ppt_x</p:attrName>
+                                        </p:attrNameLst>
+                                      </p:cBhvr>
+                                      <p:tavLst>
+                                        <p:tav tm="0">
+                                          <p:val>
+                                            <p:strVal val="1+#ppt_w/2"/>
+                                          </p:val>
+                                        </p:tav>
+                                        <p:tav tm="100000">
+                                          <p:val>
+                                            <p:strVal val="#ppt_x"/>
+                                          </p:val>
+                                        </p:tav>
+                                      </p:tavLst>
+                                    </p:anim>
+                                    <p:anim calcmode="lin" valueType="num">
+                                      <p:cBhvr additive="base">
+                                        <p:cTn id="29" dur="500" fill="hold"/>
+                                        <p:tgtEl>
+                                          <p:spTgt spid="4">
+                                            <p:txEl>
+                                              <p:pRg st="0" end="0"/>
+                                            </p:txEl>
+                                          </p:spTgt>
+                                        </p:tgtEl>
+                                        <p:attrNameLst>
+                                          <p:attrName>ppt_y</p:attrName>
+                                        </p:attrNameLst>
+                                      </p:cBhvr>
+                                      <p:tavLst>
+                                        <p:tav tm="0">
+                                          <p:val>
+                                            <p:strVal val="#ppt_y"/>
+                                          </p:val>
+                                        </p:tav>
+                                        <p:tav tm="100000">
+                                          <p:val>
+                                            <p:strVal val="#ppt_y"/>
+                                          </p:val>
+                                        </p:tav>
+                                      </p:tavLst>
+                                    </p:anim>
+                                  </p:childTnLst>
+                                </p:cTn>
+                              </p:par>
+                            </p:childTnLst>
+                          </p:cTn>
+                        </p:par>
+                      </p:childTnLst>
+                    </p:cTn>
+                  </p:par>
+                  <p:par>
+                    <p:cTn id="30" fill="hold">
+                      <p:stCondLst>
+                        <p:cond delay="indefinite"/>
+                      </p:stCondLst>
+                      <p:childTnLst>
+                        <p:par>
+                          <p:cTn id="31" fill="hold">
+                            <p:stCondLst>
+                              <p:cond delay="0"/>
+                            </p:stCondLst>
+                            <p:childTnLst>
+                              <p:par>
+                                <p:cTn id="32" presetID="2" presetClass="entr" presetSubtype="2" fill="hold" grpId="0" nodeType="clickEffect">
+                                  <p:stCondLst>
+                                    <p:cond delay="0"/>
+                                  </p:stCondLst>
+                                  <p:childTnLst>
+                                    <p:set>
+                                      <p:cBhvr>
+                                        <p:cTn id="33" dur="1" fill="hold">
+                                          <p:stCondLst>
+                                            <p:cond delay="0"/>
+                                          </p:stCondLst>
+                                        </p:cTn>
+                                        <p:tgtEl>
+                                          <p:spTgt spid="4">
+                                            <p:txEl>
+                                              <p:pRg st="2" end="2"/>
+                                            </p:txEl>
+                                          </p:spTgt>
+                                        </p:tgtEl>
+                                        <p:attrNameLst>
+                                          <p:attrName>style.visibility</p:attrName>
+                                        </p:attrNameLst>
+                                      </p:cBhvr>
+                                      <p:to>
+                                        <p:strVal val="visible"/>
+                                      </p:to>
+                                    </p:set>
+                                    <p:anim calcmode="lin" valueType="num">
+                                      <p:cBhvr additive="base">
+                                        <p:cTn id="34" dur="500" fill="hold"/>
+                                        <p:tgtEl>
+                                          <p:spTgt spid="4">
+                                            <p:txEl>
+                                              <p:pRg st="2" end="2"/>
+                                            </p:txEl>
+                                          </p:spTgt>
+                                        </p:tgtEl>
+                                        <p:attrNameLst>
+                                          <p:attrName>ppt_x</p:attrName>
+                                        </p:attrNameLst>
+                                      </p:cBhvr>
+                                      <p:tavLst>
+                                        <p:tav tm="0">
+                                          <p:val>
+                                            <p:strVal val="1+#ppt_w/2"/>
+                                          </p:val>
+                                        </p:tav>
+                                        <p:tav tm="100000">
+                                          <p:val>
+                                            <p:strVal val="#ppt_x"/>
+                                          </p:val>
+                                        </p:tav>
+                                      </p:tavLst>
+                                    </p:anim>
+                                    <p:anim calcmode="lin" valueType="num">
+                                      <p:cBhvr additive="base">
+                                        <p:cTn id="35" dur="500" fill="hold"/>
+                                        <p:tgtEl>
+                                          <p:spTgt spid="4">
+                                            <p:txEl>
+                                              <p:pRg st="2" end="2"/>
+                                            </p:txEl>
+                                          </p:spTgt>
+                                        </p:tgtEl>
+                                        <p:attrNameLst>
+                                          <p:attrName>ppt_y</p:attrName>
+                                        </p:attrNameLst>
+                                      </p:cBhvr>
+                                      <p:tavLst>
+                                        <p:tav tm="0">
+                                          <p:val>
+                                            <p:strVal val="#ppt_y"/>
+                                          </p:val>
+                                        </p:tav>
+                                        <p:tav tm="100000">
+                                          <p:val>
+                                            <p:strVal val="#ppt_y"/>
+                                          </p:val>
+                                        </p:tav>
+                                      </p:tavLst>
+                                    </p:anim>
+                                  </p:childTnLst>
+                                </p:cTn>
+                              </p:par>
+                            </p:childTnLst>
+                          </p:cTn>
+                        </p:par>
+                      </p:childTnLst>
+                    </p:cTn>
+                  </p:par>
+                  <p:par>
+                    <p:cTn id="36" fill="hold">
+                      <p:stCondLst>
+                        <p:cond delay="indefinite"/>
+                      </p:stCondLst>
+                      <p:childTnLst>
+                        <p:par>
+                          <p:cTn id="37" fill="hold">
+                            <p:stCondLst>
+                              <p:cond delay="0"/>
+                            </p:stCondLst>
+                            <p:childTnLst>
+                              <p:par>
+                                <p:cTn id="38" presetID="2" presetClass="entr" presetSubtype="2" fill="hold" grpId="0" nodeType="clickEffect">
+                                  <p:stCondLst>
+                                    <p:cond delay="0"/>
+                                  </p:stCondLst>
+                                  <p:childTnLst>
+                                    <p:set>
+                                      <p:cBhvr>
+                                        <p:cTn id="39" dur="1" fill="hold">
+                                          <p:stCondLst>
+                                            <p:cond delay="0"/>
+                                          </p:stCondLst>
+                                        </p:cTn>
+                                        <p:tgtEl>
+                                          <p:spTgt spid="4">
+                                            <p:txEl>
+                                              <p:pRg st="4" end="4"/>
+                                            </p:txEl>
+                                          </p:spTgt>
+                                        </p:tgtEl>
+                                        <p:attrNameLst>
+                                          <p:attrName>style.visibility</p:attrName>
+                                        </p:attrNameLst>
+                                      </p:cBhvr>
+                                      <p:to>
+                                        <p:strVal val="visible"/>
+                                      </p:to>
+                                    </p:set>
+                                    <p:anim calcmode="lin" valueType="num">
+                                      <p:cBhvr additive="base">
+                                        <p:cTn id="40" dur="500" fill="hold"/>
+                                        <p:tgtEl>
+                                          <p:spTgt spid="4">
+                                            <p:txEl>
+                                              <p:pRg st="4" end="4"/>
+                                            </p:txEl>
+                                          </p:spTgt>
+                                        </p:tgtEl>
+                                        <p:attrNameLst>
+                                          <p:attrName>ppt_x</p:attrName>
+                                        </p:attrNameLst>
+                                      </p:cBhvr>
+                                      <p:tavLst>
+                                        <p:tav tm="0">
+                                          <p:val>
+                                            <p:strVal val="1+#ppt_w/2"/>
+                                          </p:val>
+                                        </p:tav>
+                                        <p:tav tm="100000">
+                                          <p:val>
+                                            <p:strVal val="#ppt_x"/>
+                                          </p:val>
+                                        </p:tav>
+                                      </p:tavLst>
+                                    </p:anim>
+                                    <p:anim calcmode="lin" valueType="num">
+                                      <p:cBhvr additive="base">
+                                        <p:cTn id="41" dur="500" fill="hold"/>
+                                        <p:tgtEl>
+                                          <p:spTgt spid="4">
+                                            <p:txEl>
+                                              <p:pRg st="4" end="4"/>
+                                            </p:txEl>
+                                          </p:spTgt>
+                                        </p:tgtEl>
+                                        <p:attrNameLst>
+                                          <p:attrName>ppt_y</p:attrName>
+                                        </p:attrNameLst>
+                                      </p:cBhvr>
+                                      <p:tavLst>
+                                        <p:tav tm="0">
+                                          <p:val>
+                                            <p:strVal val="#ppt_y"/>
+                                          </p:val>
+                                        </p:tav>
+                                        <p:tav tm="100000">
+                                          <p:val>
+                                            <p:strVal val="#ppt_y"/>
+                                          </p:val>
+                                        </p:tav>
+                                      </p:tavLst>
+                                    </p:anim>
+                                  </p:childTnLst>
+                                </p:cTn>
+                              </p:par>
+                            </p:childTnLst>
+                          </p:cTn>
+                        </p:par>
+                      </p:childTnLst>
+                    </p:cTn>
+                  </p:par>
+                  <p:par>
+                    <p:cTn id="42" fill="hold">
+                      <p:stCondLst>
+                        <p:cond delay="indefinite"/>
+                      </p:stCondLst>
+                      <p:childTnLst>
+                        <p:par>
+                          <p:cTn id="43" fill="hold">
+                            <p:stCondLst>
+                              <p:cond delay="0"/>
+                            </p:stCondLst>
+                            <p:childTnLst>
+                              <p:par>
+                                <p:cTn id="44" presetID="2" presetClass="entr" presetSubtype="2" fill="hold" grpId="0" nodeType="clickEffect">
+                                  <p:stCondLst>
+                                    <p:cond delay="0"/>
+                                  </p:stCondLst>
+                                  <p:childTnLst>
+                                    <p:set>
+                                      <p:cBhvr>
+                                        <p:cTn id="45" dur="1" fill="hold">
+                                          <p:stCondLst>
+                                            <p:cond delay="0"/>
+                                          </p:stCondLst>
+                                        </p:cTn>
+                                        <p:tgtEl>
+                                          <p:spTgt spid="4">
+                                            <p:txEl>
+                                              <p:pRg st="6" end="6"/>
+                                            </p:txEl>
+                                          </p:spTgt>
+                                        </p:tgtEl>
+                                        <p:attrNameLst>
+                                          <p:attrName>style.visibility</p:attrName>
+                                        </p:attrNameLst>
+                                      </p:cBhvr>
+                                      <p:to>
+                                        <p:strVal val="visible"/>
+                                      </p:to>
+                                    </p:set>
+                                    <p:anim calcmode="lin" valueType="num">
+                                      <p:cBhvr additive="base">
+                                        <p:cTn id="46" dur="500" fill="hold"/>
+                                        <p:tgtEl>
+                                          <p:spTgt spid="4">
+                                            <p:txEl>
+                                              <p:pRg st="6" end="6"/>
+                                            </p:txEl>
+                                          </p:spTgt>
+                                        </p:tgtEl>
+                                        <p:attrNameLst>
+                                          <p:attrName>ppt_x</p:attrName>
+                                        </p:attrNameLst>
+                                      </p:cBhvr>
+                                      <p:tavLst>
+                                        <p:tav tm="0">
+                                          <p:val>
+                                            <p:strVal val="1+#ppt_w/2"/>
+                                          </p:val>
+                                        </p:tav>
+                                        <p:tav tm="100000">
+                                          <p:val>
+                                            <p:strVal val="#ppt_x"/>
+                                          </p:val>
+                                        </p:tav>
+                                      </p:tavLst>
+                                    </p:anim>
+                                    <p:anim calcmode="lin" valueType="num">
+                                      <p:cBhvr additive="base">
+                                        <p:cTn id="47" dur="500" fill="hold"/>
+                                        <p:tgtEl>
+                                          <p:spTgt spid="4">
+                                            <p:txEl>
+                                              <p:pRg st="6" end="6"/>
+                                            </p:txEl>
+                                          </p:spTgt>
+                                        </p:tgtEl>
+                                        <p:attrNameLst>
+                                          <p:attrName>ppt_y</p:attrName>
+                                        </p:attrNameLst>
+                                      </p:cBhvr>
+                                      <p:tavLst>
+                                        <p:tav tm="0">
+                                          <p:val>
+                                            <p:strVal val="#ppt_y"/>
+                                          </p:val>
+                                        </p:tav>
+                                        <p:tav tm="100000">
+                                          <p:val>
+                                            <p:strVal val="#ppt_y"/>
+                                          </p:val>
+                                        </p:tav>
+                                      </p:tavLst>
+                                    </p:anim>
+                                  </p:childTnLst>
+                                </p:cTn>
+                              </p:par>
+                            </p:childTnLst>
+                          </p:cTn>
+                        </p:par>
+                      </p:childTnLst>
+                    </p:cTn>
+                  </p:par>
+                </p:childTnLst>
+              </p:cTn>
+              <p:prevCondLst>
+                <p:cond evt="onPrev" delay="0">
+                  <p:tgtEl>
+                    <p:sldTgt/>
+                  </p:tgtEl>
+                </p:cond>
+              </p:prevCondLst>
+              <p:nextCondLst>
+                <p:cond evt="onNext" delay="0">
+                  <p:tgtEl>
+                    <p:sldTgt/>
+                  </p:tgtEl>
+                </p:cond>
+              </p:nextCondLst>
+            </p:seq>
+          </p:childTnLst>
+        </p:cTn>
+      </p:par>
+    </p:tnLst>
+    <p:bldLst>
+      <p:bldP spid="3" grpId="0" uiExpand="1" build="p"/>
+      <p:bldP spid="4" grpId="0" build="p"/>
+    </p:bldLst>
+  </p:timing>
+</p:sld>
+</file>
+
+<file path=ppt/slides/slide27.xml><?xml version="1.0" encoding="utf-8"?>
+<p:sld xmlns:a="http://schemas.openxmlformats.org/drawingml/2006/main" xmlns:r="http://schemas.openxmlformats.org/officeDocument/2006/relationships" xmlns:p="http://schemas.openxmlformats.org/presentationml/2006/main">
+  <p:cSld>
+    <p:spTree>
+      <p:nvGrpSpPr>
+        <p:cNvPr id="1" name=""/>
+        <p:cNvGrpSpPr/>
+        <p:nvPr/>
+      </p:nvGrpSpPr>
+      <p:grpSpPr>
+        <a:xfrm>
+          <a:off x="0" y="0"/>
+          <a:ext cx="0" cy="0"/>
+          <a:chOff x="0" y="0"/>
+          <a:chExt cx="0" cy="0"/>
+        </a:xfrm>
+      </p:grpSpPr>
+      <p:sp>
+        <p:nvSpPr>
+          <p:cNvPr id="2" name="Title 1"/>
+          <p:cNvSpPr>
+            <a:spLocks noGrp="1"/>
+          </p:cNvSpPr>
+          <p:nvPr>
+            <p:ph type="title"/>
+          </p:nvPr>
+        </p:nvSpPr>
+        <p:spPr/>
+        <p:txBody>
+          <a:bodyPr/>
+          <a:lstStyle/>
+          <a:p>
+            <a:pPr algn="ctr"/>
+            <a:r>
+              <a:rPr lang="en-US" dirty="0" smtClean="0"/>
+              <a:t>What Task Catalyst Can Do</a:t>
+            </a:r>
+            <a:endParaRPr lang="en-MY" dirty="0"/>
+          </a:p>
+        </p:txBody>
+      </p:sp>
+      <p:pic>
+        <p:nvPicPr>
+          <p:cNvPr id="4" name="Content Placeholder 3"/>
+          <p:cNvPicPr>
+            <a:picLocks noGrp="1" noChangeAspect="1"/>
+          </p:cNvPicPr>
+          <p:nvPr>
+            <p:ph idx="1"/>
+          </p:nvPr>
+        </p:nvPicPr>
+        <p:blipFill>
+          <a:blip r:embed="rId2">
+            <a:extLst>
+              <a:ext uri="{28A0092B-C50C-407E-A947-70E740481C1C}">
+                <a14:useLocalDpi xmlns:a14="http://schemas.microsoft.com/office/drawing/2010/main" val="0"/>
+              </a:ext>
+            </a:extLst>
+          </a:blip>
+          <a:stretch>
+            <a:fillRect/>
+          </a:stretch>
+        </p:blipFill>
+        <p:spPr>
+          <a:xfrm>
+            <a:off x="3257611" y="2407140"/>
+            <a:ext cx="2628778" cy="2628778"/>
+          </a:xfrm>
+        </p:spPr>
+      </p:pic>
+      <p:pic>
+        <p:nvPicPr>
+          <p:cNvPr id="5" name="Picture 4"/>
+          <p:cNvPicPr>
+            <a:picLocks noChangeAspect="1"/>
+          </p:cNvPicPr>
+          <p:nvPr/>
+        </p:nvPicPr>
+        <p:blipFill>
+          <a:blip r:embed="rId3" cstate="print">
+            <a:extLst>
+              <a:ext uri="{28A0092B-C50C-407E-A947-70E740481C1C}">
+                <a14:useLocalDpi xmlns:a14="http://schemas.microsoft.com/office/drawing/2010/main" val="0"/>
+              </a:ext>
+            </a:extLst>
+          </a:blip>
+          <a:stretch>
+            <a:fillRect/>
+          </a:stretch>
+        </p:blipFill>
+        <p:spPr>
+          <a:xfrm>
+            <a:off x="3221145" y="2173994"/>
+            <a:ext cx="2701709" cy="3438948"/>
+          </a:xfrm>
+          <a:prstGeom prst="rect">
+            <a:avLst/>
+          </a:prstGeom>
+        </p:spPr>
+      </p:pic>
+      <p:pic>
+        <p:nvPicPr>
+          <p:cNvPr id="6" name="Picture 5"/>
+          <p:cNvPicPr>
+            <a:picLocks noChangeAspect="1"/>
+          </p:cNvPicPr>
+          <p:nvPr/>
+        </p:nvPicPr>
+        <p:blipFill>
+          <a:blip r:embed="rId4">
+            <a:extLst>
+              <a:ext uri="{28A0092B-C50C-407E-A947-70E740481C1C}">
+                <a14:useLocalDpi xmlns:a14="http://schemas.microsoft.com/office/drawing/2010/main" val="0"/>
+              </a:ext>
+            </a:extLst>
+          </a:blip>
+          <a:stretch>
+            <a:fillRect/>
+          </a:stretch>
+        </p:blipFill>
+        <p:spPr>
+          <a:xfrm>
+            <a:off x="2032316" y="2212394"/>
+            <a:ext cx="5079365" cy="3377778"/>
+          </a:xfrm>
+          <a:prstGeom prst="rect">
+            <a:avLst/>
+          </a:prstGeom>
+        </p:spPr>
+      </p:pic>
+    </p:spTree>
+    <p:extLst>
+      <p:ext uri="{BB962C8B-B14F-4D97-AF65-F5344CB8AC3E}">
+        <p14:creationId xmlns:p14="http://schemas.microsoft.com/office/powerpoint/2010/main" val="203354214"/>
+      </p:ext>
+    </p:extLst>
+  </p:cSld>
+  <p:clrMapOvr>
+    <a:masterClrMapping/>
+  </p:clrMapOvr>
+  <p:timing>
+    <p:tnLst>
+      <p:par>
+        <p:cTn id="1" dur="indefinite" restart="never" nodeType="tmRoot">
+          <p:childTnLst>
+            <p:seq concurrent="1" nextAc="seek">
+              <p:cTn id="2" dur="indefinite" nodeType="mainSeq">
+                <p:childTnLst>
+                  <p:par>
+                    <p:cTn id="3" fill="hold">
+                      <p:stCondLst>
+                        <p:cond delay="indefinite"/>
+                      </p:stCondLst>
+                      <p:childTnLst>
+                        <p:par>
+                          <p:cTn id="4" fill="hold">
+                            <p:stCondLst>
+                              <p:cond delay="0"/>
+                            </p:stCondLst>
+                            <p:childTnLst>
+                              <p:par>
+                                <p:cTn id="5" presetID="1" presetClass="entr" presetSubtype="0" fill="hold" nodeType="clickEffect">
+                                  <p:stCondLst>
+                                    <p:cond delay="0"/>
+                                  </p:stCondLst>
+                                  <p:childTnLst>
+                                    <p:set>
+                                      <p:cBhvr>
+                                        <p:cTn id="6" dur="1" fill="hold">
+                                          <p:stCondLst>
+                                            <p:cond delay="0"/>
+                                          </p:stCondLst>
+                                        </p:cTn>
+                                        <p:tgtEl>
+                                          <p:spTgt spid="4"/>
+                                        </p:tgtEl>
+                                        <p:attrNameLst>
+                                          <p:attrName>style.visibility</p:attrName>
+                                        </p:attrNameLst>
+                                      </p:cBhvr>
+                                      <p:to>
+                                        <p:strVal val="visible"/>
+                                      </p:to>
+                                    </p:set>
+                                  </p:childTnLst>
+                                  <p:subTnLst>
+                                    <p:set>
+                                      <p:cBhvr override="childStyle">
+                                        <p:cTn dur="1" fill="hold" display="0" masterRel="nextClick" afterEffect="1"/>
+                                        <p:tgtEl>
+                                          <p:spTgt spid="4"/>
+                                        </p:tgtEl>
+                                        <p:attrNameLst>
+                                          <p:attrName>style.visibility</p:attrName>
+                                        </p:attrNameLst>
+                                      </p:cBhvr>
+                                      <p:to>
+                                        <p:strVal val="hidden"/>
+                                      </p:to>
+                                    </p:set>
+                                  </p:subTnLst>
+                                </p:cTn>
+                              </p:par>
+                            </p:childTnLst>
+                          </p:cTn>
+                        </p:par>
+                      </p:childTnLst>
+                    </p:cTn>
+                  </p:par>
+                  <p:par>
+                    <p:cTn id="7" fill="hold">
+                      <p:stCondLst>
+                        <p:cond delay="indefinite"/>
+                      </p:stCondLst>
+                      <p:childTnLst>
+                        <p:par>
+                          <p:cTn id="8" fill="hold">
+                            <p:stCondLst>
+                              <p:cond delay="0"/>
+                            </p:stCondLst>
+                            <p:childTnLst>
+                              <p:par>
+                                <p:cTn id="9" presetID="42" presetClass="entr" presetSubtype="0" fill="hold" nodeType="clickEffect">
+                                  <p:stCondLst>
+                                    <p:cond delay="0"/>
+                                  </p:stCondLst>
+                                  <p:childTnLst>
+                                    <p:set>
+                                      <p:cBhvr>
+                                        <p:cTn id="10" dur="1" fill="hold">
+                                          <p:stCondLst>
+                                            <p:cond delay="0"/>
+                                          </p:stCondLst>
+                                        </p:cTn>
+                                        <p:tgtEl>
+                                          <p:spTgt spid="5"/>
+                                        </p:tgtEl>
+                                        <p:attrNameLst>
+                                          <p:attrName>style.visibility</p:attrName>
+                                        </p:attrNameLst>
+                                      </p:cBhvr>
+                                      <p:to>
+                                        <p:strVal val="visible"/>
+                                      </p:to>
+                                    </p:set>
+                                    <p:animEffect transition="in" filter="fade">
+                                      <p:cBhvr>
+                                        <p:cTn id="11" dur="1000"/>
+                                        <p:tgtEl>
+                                          <p:spTgt spid="5"/>
+                                        </p:tgtEl>
+                                      </p:cBhvr>
+                                    </p:animEffect>
+                                    <p:anim calcmode="lin" valueType="num">
+                                      <p:cBhvr>
+                                        <p:cTn id="12" dur="1000" fill="hold"/>
+                                        <p:tgtEl>
+                                          <p:spTgt spid="5"/>
+                                        </p:tgtEl>
+                                        <p:attrNameLst>
+                                          <p:attrName>ppt_x</p:attrName>
+                                        </p:attrNameLst>
+                                      </p:cBhvr>
+                                      <p:tavLst>
+                                        <p:tav tm="0">
+                                          <p:val>
+                                            <p:strVal val="#ppt_x"/>
+                                          </p:val>
+                                        </p:tav>
+                                        <p:tav tm="100000">
+                                          <p:val>
+                                            <p:strVal val="#ppt_x"/>
+                                          </p:val>
+                                        </p:tav>
+                                      </p:tavLst>
+                                    </p:anim>
+                                    <p:anim calcmode="lin" valueType="num">
+                                      <p:cBhvr>
+                                        <p:cTn id="13" dur="1000" fill="hold"/>
+                                        <p:tgtEl>
+                                          <p:spTgt spid="5"/>
+                                        </p:tgtEl>
+                                        <p:attrNameLst>
+                                          <p:attrName>ppt_y</p:attrName>
+                                        </p:attrNameLst>
+                                      </p:cBhvr>
+                                      <p:tavLst>
+                                        <p:tav tm="0">
+                                          <p:val>
+                                            <p:strVal val="#ppt_y+.1"/>
+                                          </p:val>
+                                        </p:tav>
+                                        <p:tav tm="100000">
+                                          <p:val>
+                                            <p:strVal val="#ppt_y"/>
+                                          </p:val>
+                                        </p:tav>
+                                      </p:tavLst>
+                                    </p:anim>
+                                  </p:childTnLst>
+                                  <p:subTnLst>
+                                    <p:set>
+                                      <p:cBhvr override="childStyle">
+                                        <p:cTn dur="1" fill="hold" display="0" masterRel="nextClick" afterEffect="1"/>
+                                        <p:tgtEl>
+                                          <p:spTgt spid="5"/>
+                                        </p:tgtEl>
+                                        <p:attrNameLst>
+                                          <p:attrName>style.visibility</p:attrName>
+                                        </p:attrNameLst>
+                                      </p:cBhvr>
+                                      <p:to>
+                                        <p:strVal val="hidden"/>
+                                      </p:to>
+                                    </p:set>
+                                  </p:subTnLst>
+                                </p:cTn>
+                              </p:par>
+                            </p:childTnLst>
+                          </p:cTn>
+                        </p:par>
+                      </p:childTnLst>
+                    </p:cTn>
+                  </p:par>
+                  <p:par>
+                    <p:cTn id="14" fill="hold">
+                      <p:stCondLst>
+                        <p:cond delay="indefinite"/>
+                      </p:stCondLst>
+                      <p:childTnLst>
+                        <p:par>
+                          <p:cTn id="15" fill="hold">
+                            <p:stCondLst>
+                              <p:cond delay="0"/>
+                            </p:stCondLst>
+                            <p:childTnLst>
+                              <p:par>
+                                <p:cTn id="16" presetID="42" presetClass="entr" presetSubtype="0" fill="hold" nodeType="clickEffect">
+                                  <p:stCondLst>
+                                    <p:cond delay="0"/>
+                                  </p:stCondLst>
+                                  <p:childTnLst>
+                                    <p:set>
+                                      <p:cBhvr>
+                                        <p:cTn id="17" dur="1" fill="hold">
+                                          <p:stCondLst>
+                                            <p:cond delay="0"/>
+                                          </p:stCondLst>
+                                        </p:cTn>
+                                        <p:tgtEl>
+                                          <p:spTgt spid="6"/>
+                                        </p:tgtEl>
+                                        <p:attrNameLst>
+                                          <p:attrName>style.visibility</p:attrName>
+                                        </p:attrNameLst>
+                                      </p:cBhvr>
+                                      <p:to>
+                                        <p:strVal val="visible"/>
+                                      </p:to>
+                                    </p:set>
+                                    <p:animEffect transition="in" filter="fade">
+                                      <p:cBhvr>
+                                        <p:cTn id="18" dur="1000"/>
+                                        <p:tgtEl>
+                                          <p:spTgt spid="6"/>
+                                        </p:tgtEl>
+                                      </p:cBhvr>
+                                    </p:animEffect>
+                                    <p:anim calcmode="lin" valueType="num">
+                                      <p:cBhvr>
+                                        <p:cTn id="19" dur="1000" fill="hold"/>
+                                        <p:tgtEl>
+                                          <p:spTgt spid="6"/>
+                                        </p:tgtEl>
+                                        <p:attrNameLst>
+                                          <p:attrName>ppt_x</p:attrName>
+                                        </p:attrNameLst>
+                                      </p:cBhvr>
+                                      <p:tavLst>
+                                        <p:tav tm="0">
+                                          <p:val>
+                                            <p:strVal val="#ppt_x"/>
+                                          </p:val>
+                                        </p:tav>
+                                        <p:tav tm="100000">
+                                          <p:val>
+                                            <p:strVal val="#ppt_x"/>
+                                          </p:val>
+                                        </p:tav>
+                                      </p:tavLst>
+                                    </p:anim>
+                                    <p:anim calcmode="lin" valueType="num">
+                                      <p:cBhvr>
+                                        <p:cTn id="20" dur="1000" fill="hold"/>
+                                        <p:tgtEl>
+                                          <p:spTgt spid="6"/>
+                                        </p:tgtEl>
+                                        <p:attrNameLst>
+                                          <p:attrName>ppt_y</p:attrName>
+                                        </p:attrNameLst>
+                                      </p:cBhvr>
+                                      <p:tavLst>
+                                        <p:tav tm="0">
+                                          <p:val>
+                                            <p:strVal val="#ppt_y+.1"/>
+                                          </p:val>
+                                        </p:tav>
+                                        <p:tav tm="100000">
+                                          <p:val>
+                                            <p:strVal val="#ppt_y"/>
+                                          </p:val>
+                                        </p:tav>
+                                      </p:tavLst>
+                                    </p:anim>
+                                  </p:childTnLst>
+                                </p:cTn>
+                              </p:par>
+                            </p:childTnLst>
+                          </p:cTn>
+                        </p:par>
+                      </p:childTnLst>
+                    </p:cTn>
+                  </p:par>
+                </p:childTnLst>
+              </p:cTn>
+              <p:prevCondLst>
+                <p:cond evt="onPrev" delay="0">
+                  <p:tgtEl>
+                    <p:sldTgt/>
+                  </p:tgtEl>
+                </p:cond>
+              </p:prevCondLst>
+              <p:nextCondLst>
+                <p:cond evt="onNext" delay="0">
+                  <p:tgtEl>
+                    <p:sldTgt/>
+                  </p:tgtEl>
+                </p:cond>
+              </p:nextCondLst>
+            </p:seq>
+          </p:childTnLst>
+        </p:cTn>
+      </p:par>
+    </p:tnLst>
+  </p:timing>
+</p:sld>
+</file>
+
+<file path=ppt/slides/slide28.xml><?xml version="1.0" encoding="utf-8"?>
+<p:sld xmlns:a="http://schemas.openxmlformats.org/drawingml/2006/main" xmlns:r="http://schemas.openxmlformats.org/officeDocument/2006/relationships" xmlns:p="http://schemas.openxmlformats.org/presentationml/2006/main">
+  <p:cSld>
+    <p:spTree>
+      <p:nvGrpSpPr>
+        <p:cNvPr id="1" name=""/>
+        <p:cNvGrpSpPr/>
+        <p:nvPr/>
+      </p:nvGrpSpPr>
+      <p:grpSpPr>
+        <a:xfrm>
+          <a:off x="0" y="0"/>
+          <a:ext cx="0" cy="0"/>
+          <a:chOff x="0" y="0"/>
+          <a:chExt cx="0" cy="0"/>
+        </a:xfrm>
+      </p:grpSpPr>
+      <p:sp>
+        <p:nvSpPr>
+          <p:cNvPr id="2" name="Title 1"/>
+          <p:cNvSpPr>
+            <a:spLocks noGrp="1"/>
+          </p:cNvSpPr>
+          <p:nvPr>
+            <p:ph type="title"/>
+          </p:nvPr>
+        </p:nvSpPr>
+        <p:spPr/>
+        <p:txBody>
+          <a:bodyPr/>
+          <a:lstStyle/>
+          <a:p>
+            <a:pPr algn="ctr"/>
+            <a:r>
+              <a:rPr lang="en-US" dirty="0"/>
+              <a:t>What Task Catalyst Can </a:t>
+            </a:r>
+            <a:r>
+              <a:rPr lang="en-US" dirty="0" smtClean="0"/>
+              <a:t>Do</a:t>
+            </a:r>
+            <a:endParaRPr lang="en-MY" dirty="0"/>
+          </a:p>
+        </p:txBody>
+      </p:sp>
+      <p:pic>
+        <p:nvPicPr>
+          <p:cNvPr id="4" name="Content Placeholder 3"/>
+          <p:cNvPicPr>
+            <a:picLocks noGrp="1" noChangeAspect="1"/>
+          </p:cNvPicPr>
+          <p:nvPr>
+            <p:ph idx="1"/>
+          </p:nvPr>
+        </p:nvPicPr>
+        <p:blipFill>
+          <a:blip r:embed="rId2">
+            <a:extLst>
+              <a:ext uri="{28A0092B-C50C-407E-A947-70E740481C1C}">
+                <a14:useLocalDpi xmlns:a14="http://schemas.microsoft.com/office/drawing/2010/main" val="0"/>
+              </a:ext>
+            </a:extLst>
+          </a:blip>
+          <a:stretch>
+            <a:fillRect/>
+          </a:stretch>
+        </p:blipFill>
+        <p:spPr>
+          <a:xfrm>
+            <a:off x="1671108" y="1794364"/>
+            <a:ext cx="5801784" cy="4351338"/>
+          </a:xfrm>
+        </p:spPr>
+      </p:pic>
+      <p:pic>
+        <p:nvPicPr>
+          <p:cNvPr id="5" name="Picture 4"/>
+          <p:cNvPicPr>
+            <a:picLocks noChangeAspect="1"/>
+          </p:cNvPicPr>
+          <p:nvPr/>
+        </p:nvPicPr>
+        <p:blipFill>
+          <a:blip r:embed="rId3">
+            <a:extLst>
+              <a:ext uri="{28A0092B-C50C-407E-A947-70E740481C1C}">
+                <a14:useLocalDpi xmlns:a14="http://schemas.microsoft.com/office/drawing/2010/main" val="0"/>
+              </a:ext>
+            </a:extLst>
+          </a:blip>
+          <a:stretch>
+            <a:fillRect/>
+          </a:stretch>
+        </p:blipFill>
+        <p:spPr>
+          <a:xfrm>
+            <a:off x="2965450" y="1794364"/>
+            <a:ext cx="3213100" cy="4381500"/>
+          </a:xfrm>
+          <a:prstGeom prst="rect">
+            <a:avLst/>
+          </a:prstGeom>
+        </p:spPr>
+      </p:pic>
+      <p:pic>
+        <p:nvPicPr>
+          <p:cNvPr id="6" name="Picture 5"/>
+          <p:cNvPicPr>
+            <a:picLocks noChangeAspect="1"/>
+          </p:cNvPicPr>
+          <p:nvPr/>
+        </p:nvPicPr>
+        <p:blipFill>
+          <a:blip r:embed="rId4">
+            <a:extLst>
+              <a:ext uri="{28A0092B-C50C-407E-A947-70E740481C1C}">
+                <a14:useLocalDpi xmlns:a14="http://schemas.microsoft.com/office/drawing/2010/main" val="0"/>
+              </a:ext>
+            </a:extLst>
+          </a:blip>
+          <a:stretch>
+            <a:fillRect/>
+          </a:stretch>
+        </p:blipFill>
+        <p:spPr>
+          <a:xfrm>
+            <a:off x="2905125" y="2193680"/>
+            <a:ext cx="3333750" cy="3314700"/>
+          </a:xfrm>
+          <a:prstGeom prst="rect">
+            <a:avLst/>
+          </a:prstGeom>
+        </p:spPr>
+      </p:pic>
+    </p:spTree>
+    <p:extLst>
+      <p:ext uri="{BB962C8B-B14F-4D97-AF65-F5344CB8AC3E}">
+        <p14:creationId xmlns:p14="http://schemas.microsoft.com/office/powerpoint/2010/main" val="843732185"/>
+      </p:ext>
+    </p:extLst>
+  </p:cSld>
+  <p:clrMapOvr>
+    <a:masterClrMapping/>
+  </p:clrMapOvr>
+  <p:timing>
+    <p:tnLst>
+      <p:par>
+        <p:cTn id="1" dur="indefinite" restart="never" nodeType="tmRoot">
+          <p:childTnLst>
+            <p:seq concurrent="1" nextAc="seek">
+              <p:cTn id="2" dur="indefinite" nodeType="mainSeq">
+                <p:childTnLst>
+                  <p:par>
+                    <p:cTn id="3" fill="hold">
+                      <p:stCondLst>
+                        <p:cond delay="indefinite"/>
+                      </p:stCondLst>
+                      <p:childTnLst>
+                        <p:par>
+                          <p:cTn id="4" fill="hold">
+                            <p:stCondLst>
+                              <p:cond delay="0"/>
+                            </p:stCondLst>
+                            <p:childTnLst>
+                              <p:par>
+                                <p:cTn id="5" presetID="2" presetClass="entr" presetSubtype="4" fill="hold" nodeType="clickEffect">
+                                  <p:stCondLst>
+                                    <p:cond delay="0"/>
+                                  </p:stCondLst>
+                                  <p:childTnLst>
+                                    <p:set>
+                                      <p:cBhvr>
+                                        <p:cTn id="6" dur="1" fill="hold">
+                                          <p:stCondLst>
+                                            <p:cond delay="0"/>
+                                          </p:stCondLst>
+                                        </p:cTn>
+                                        <p:tgtEl>
+                                          <p:spTgt spid="4"/>
+                                        </p:tgtEl>
+                                        <p:attrNameLst>
+                                          <p:attrName>style.visibility</p:attrName>
+                                        </p:attrNameLst>
+                                      </p:cBhvr>
+                                      <p:to>
+                                        <p:strVal val="visible"/>
+                                      </p:to>
+                                    </p:set>
+                                    <p:anim calcmode="lin" valueType="num">
+                                      <p:cBhvr additive="base">
+                                        <p:cTn id="7" dur="500" fill="hold"/>
+                                        <p:tgtEl>
+                                          <p:spTgt spid="4"/>
+                                        </p:tgtEl>
+                                        <p:attrNameLst>
+                                          <p:attrName>ppt_x</p:attrName>
+                                        </p:attrNameLst>
+                                      </p:cBhvr>
+                                      <p:tavLst>
+                                        <p:tav tm="0">
+                                          <p:val>
+                                            <p:strVal val="#ppt_x"/>
+                                          </p:val>
+                                        </p:tav>
+                                        <p:tav tm="100000">
+                                          <p:val>
+                                            <p:strVal val="#ppt_x"/>
+                                          </p:val>
+                                        </p:tav>
+                                      </p:tavLst>
+                                    </p:anim>
+                                    <p:anim calcmode="lin" valueType="num">
+                                      <p:cBhvr additive="base">
+                                        <p:cTn id="8" dur="500" fill="hold"/>
+                                        <p:tgtEl>
+                                          <p:spTgt spid="4"/>
+                                        </p:tgtEl>
+                                        <p:attrNameLst>
+                                          <p:attrName>ppt_y</p:attrName>
+                                        </p:attrNameLst>
+                                      </p:cBhvr>
+                                      <p:tavLst>
+                                        <p:tav tm="0">
+                                          <p:val>
+                                            <p:strVal val="1+#ppt_h/2"/>
+                                          </p:val>
+                                        </p:tav>
+                                        <p:tav tm="100000">
+                                          <p:val>
+                                            <p:strVal val="#ppt_y"/>
+                                          </p:val>
+                                        </p:tav>
+                                      </p:tavLst>
+                                    </p:anim>
+                                  </p:childTnLst>
+                                  <p:subTnLst>
+                                    <p:set>
+                                      <p:cBhvr override="childStyle">
+                                        <p:cTn dur="1" fill="hold" display="0" masterRel="nextClick" afterEffect="1"/>
+                                        <p:tgtEl>
+                                          <p:spTgt spid="4"/>
+                                        </p:tgtEl>
+                                        <p:attrNameLst>
+                                          <p:attrName>style.visibility</p:attrName>
+                                        </p:attrNameLst>
+                                      </p:cBhvr>
+                                      <p:to>
+                                        <p:strVal val="hidden"/>
+                                      </p:to>
+                                    </p:set>
+                                  </p:subTnLst>
+                                </p:cTn>
+                              </p:par>
+                            </p:childTnLst>
+                          </p:cTn>
+                        </p:par>
+                      </p:childTnLst>
+                    </p:cTn>
+                  </p:par>
+                  <p:par>
+                    <p:cTn id="9" fill="hold">
+                      <p:stCondLst>
+                        <p:cond delay="indefinite"/>
+                      </p:stCondLst>
+                      <p:childTnLst>
+                        <p:par>
+                          <p:cTn id="10" fill="hold">
+                            <p:stCondLst>
+                              <p:cond delay="0"/>
+                            </p:stCondLst>
+                            <p:childTnLst>
+                              <p:par>
+                                <p:cTn id="11" presetID="1" presetClass="entr" presetSubtype="0" fill="hold" nodeType="clickEffect">
+                                  <p:stCondLst>
+                                    <p:cond delay="0"/>
+                                  </p:stCondLst>
+                                  <p:childTnLst>
+                                    <p:set>
+                                      <p:cBhvr>
+                                        <p:cTn id="12" dur="1" fill="hold">
+                                          <p:stCondLst>
+                                            <p:cond delay="0"/>
+                                          </p:stCondLst>
+                                        </p:cTn>
+                                        <p:tgtEl>
+                                          <p:spTgt spid="5"/>
+                                        </p:tgtEl>
+                                        <p:attrNameLst>
+                                          <p:attrName>style.visibility</p:attrName>
+                                        </p:attrNameLst>
+                                      </p:cBhvr>
+                                      <p:to>
+                                        <p:strVal val="visible"/>
+                                      </p:to>
+                                    </p:set>
+                                  </p:childTnLst>
+                                  <p:subTnLst>
+                                    <p:set>
+                                      <p:cBhvr override="childStyle">
+                                        <p:cTn dur="1" fill="hold" display="0" masterRel="nextClick" afterEffect="1"/>
+                                        <p:tgtEl>
+                                          <p:spTgt spid="5"/>
+                                        </p:tgtEl>
+                                        <p:attrNameLst>
+                                          <p:attrName>style.visibility</p:attrName>
+                                        </p:attrNameLst>
+                                      </p:cBhvr>
+                                      <p:to>
+                                        <p:strVal val="hidden"/>
+                                      </p:to>
+                                    </p:set>
+                                  </p:subTnLst>
+                                </p:cTn>
+                              </p:par>
+                            </p:childTnLst>
+                          </p:cTn>
+                        </p:par>
+                      </p:childTnLst>
+                    </p:cTn>
+                  </p:par>
+                  <p:par>
+                    <p:cTn id="13" fill="hold">
+                      <p:stCondLst>
+                        <p:cond delay="indefinite"/>
+                      </p:stCondLst>
+                      <p:childTnLst>
+                        <p:par>
+                          <p:cTn id="14" fill="hold">
+                            <p:stCondLst>
+                              <p:cond delay="0"/>
+                            </p:stCondLst>
+                            <p:childTnLst>
+                              <p:par>
+                                <p:cTn id="15" presetID="42" presetClass="entr" presetSubtype="0" fill="hold" nodeType="clickEffect">
+                                  <p:stCondLst>
+                                    <p:cond delay="0"/>
+                                  </p:stCondLst>
+                                  <p:childTnLst>
+                                    <p:set>
+                                      <p:cBhvr>
+                                        <p:cTn id="16" dur="1" fill="hold">
+                                          <p:stCondLst>
+                                            <p:cond delay="0"/>
+                                          </p:stCondLst>
+                                        </p:cTn>
+                                        <p:tgtEl>
+                                          <p:spTgt spid="6"/>
+                                        </p:tgtEl>
+                                        <p:attrNameLst>
+                                          <p:attrName>style.visibility</p:attrName>
+                                        </p:attrNameLst>
+                                      </p:cBhvr>
+                                      <p:to>
+                                        <p:strVal val="visible"/>
+                                      </p:to>
+                                    </p:set>
+                                    <p:animEffect transition="in" filter="fade">
+                                      <p:cBhvr>
+                                        <p:cTn id="17" dur="1000"/>
+                                        <p:tgtEl>
+                                          <p:spTgt spid="6"/>
+                                        </p:tgtEl>
+                                      </p:cBhvr>
+                                    </p:animEffect>
+                                    <p:anim calcmode="lin" valueType="num">
+                                      <p:cBhvr>
+                                        <p:cTn id="18" dur="1000" fill="hold"/>
+                                        <p:tgtEl>
+                                          <p:spTgt spid="6"/>
+                                        </p:tgtEl>
+                                        <p:attrNameLst>
+                                          <p:attrName>ppt_x</p:attrName>
+                                        </p:attrNameLst>
+                                      </p:cBhvr>
+                                      <p:tavLst>
+                                        <p:tav tm="0">
+                                          <p:val>
+                                            <p:strVal val="#ppt_x"/>
+                                          </p:val>
+                                        </p:tav>
+                                        <p:tav tm="100000">
+                                          <p:val>
+                                            <p:strVal val="#ppt_x"/>
+                                          </p:val>
+                                        </p:tav>
+                                      </p:tavLst>
+                                    </p:anim>
+                                    <p:anim calcmode="lin" valueType="num">
+                                      <p:cBhvr>
+                                        <p:cTn id="19" dur="1000" fill="hold"/>
+                                        <p:tgtEl>
+                                          <p:spTgt spid="6"/>
+                                        </p:tgtEl>
+                                        <p:attrNameLst>
+                                          <p:attrName>ppt_y</p:attrName>
+                                        </p:attrNameLst>
+                                      </p:cBhvr>
+                                      <p:tavLst>
+                                        <p:tav tm="0">
+                                          <p:val>
+                                            <p:strVal val="#ppt_y+.1"/>
+                                          </p:val>
+                                        </p:tav>
+                                        <p:tav tm="100000">
+                                          <p:val>
+                                            <p:strVal val="#ppt_y"/>
+                                          </p:val>
+                                        </p:tav>
+                                      </p:tavLst>
+                                    </p:anim>
+                                  </p:childTnLst>
+                                </p:cTn>
+                              </p:par>
+                            </p:childTnLst>
+                          </p:cTn>
+                        </p:par>
+                      </p:childTnLst>
+                    </p:cTn>
+                  </p:par>
+                </p:childTnLst>
+              </p:cTn>
+              <p:prevCondLst>
+                <p:cond evt="onPrev" delay="0">
+                  <p:tgtEl>
+                    <p:sldTgt/>
+                  </p:tgtEl>
+                </p:cond>
+              </p:prevCondLst>
+              <p:nextCondLst>
+                <p:cond evt="onNext" delay="0">
+                  <p:tgtEl>
+                    <p:sldTgt/>
+                  </p:tgtEl>
+                </p:cond>
+              </p:nextCondLst>
+            </p:seq>
+          </p:childTnLst>
+        </p:cTn>
+      </p:par>
+    </p:tnLst>
+  </p:timing>
+</p:sld>
+</file>
+
+<file path=ppt/slides/slide29.xml><?xml version="1.0" encoding="utf-8"?>
+<p:sld xmlns:a="http://schemas.openxmlformats.org/drawingml/2006/main" xmlns:r="http://schemas.openxmlformats.org/officeDocument/2006/relationships" xmlns:p="http://schemas.openxmlformats.org/presentationml/2006/main">
+  <p:cSld>
+    <p:spTree>
+      <p:nvGrpSpPr>
+        <p:cNvPr id="1" name=""/>
+        <p:cNvGrpSpPr/>
+        <p:nvPr/>
+      </p:nvGrpSpPr>
+      <p:grpSpPr>
+        <a:xfrm>
+          <a:off x="0" y="0"/>
+          <a:ext cx="0" cy="0"/>
+          <a:chOff x="0" y="0"/>
+          <a:chExt cx="0" cy="0"/>
+        </a:xfrm>
+      </p:grpSpPr>
+      <p:pic>
+        <p:nvPicPr>
+          <p:cNvPr id="21" name="Picture 20"/>
+          <p:cNvPicPr>
+            <a:picLocks noChangeAspect="1"/>
+          </p:cNvPicPr>
+          <p:nvPr/>
+        </p:nvPicPr>
+        <p:blipFill>
+          <a:blip r:embed="rId2" cstate="print">
+            <a:extLst>
+              <a:ext uri="{28A0092B-C50C-407E-A947-70E740481C1C}">
+                <a14:useLocalDpi xmlns:a14="http://schemas.microsoft.com/office/drawing/2010/main" val="0"/>
+              </a:ext>
+            </a:extLst>
+          </a:blip>
+          <a:stretch>
+            <a:fillRect/>
+          </a:stretch>
+        </p:blipFill>
+        <p:spPr>
+          <a:xfrm>
+            <a:off x="5937604" y="2419651"/>
+            <a:ext cx="160484" cy="160484"/>
+          </a:xfrm>
+          <a:prstGeom prst="rect">
+            <a:avLst/>
+          </a:prstGeom>
+        </p:spPr>
+      </p:pic>
+      <p:sp>
+        <p:nvSpPr>
+          <p:cNvPr id="2" name="Title 1"/>
+          <p:cNvSpPr>
+            <a:spLocks noGrp="1"/>
+          </p:cNvSpPr>
+          <p:nvPr>
+            <p:ph type="title"/>
+          </p:nvPr>
+        </p:nvSpPr>
+        <p:spPr/>
+        <p:txBody>
+          <a:bodyPr/>
+          <a:lstStyle/>
+          <a:p>
+            <a:pPr algn="ctr"/>
+            <a:r>
+              <a:rPr lang="en-US" dirty="0"/>
+              <a:t>What Task Catalyst Can </a:t>
+            </a:r>
+            <a:r>
+              <a:rPr lang="en-US" dirty="0" smtClean="0"/>
+              <a:t>Do</a:t>
+            </a:r>
+            <a:endParaRPr lang="en-MY" dirty="0"/>
+          </a:p>
+        </p:txBody>
+      </p:sp>
+      <p:pic>
+        <p:nvPicPr>
+          <p:cNvPr id="4" name="Content Placeholder 3"/>
+          <p:cNvPicPr>
+            <a:picLocks noGrp="1" noChangeAspect="1"/>
+          </p:cNvPicPr>
+          <p:nvPr>
+            <p:ph idx="1"/>
+          </p:nvPr>
+        </p:nvPicPr>
+        <p:blipFill>
+          <a:blip r:embed="rId3" cstate="print">
+            <a:extLst>
+              <a:ext uri="{28A0092B-C50C-407E-A947-70E740481C1C}">
+                <a14:useLocalDpi xmlns:a14="http://schemas.microsoft.com/office/drawing/2010/main" val="0"/>
+              </a:ext>
+            </a:extLst>
+          </a:blip>
+          <a:stretch>
+            <a:fillRect/>
+          </a:stretch>
+        </p:blipFill>
+        <p:spPr>
+          <a:xfrm>
+            <a:off x="2875308" y="3368432"/>
+            <a:ext cx="1799046" cy="2412767"/>
+          </a:xfrm>
+        </p:spPr>
+      </p:pic>
+      <p:pic>
+        <p:nvPicPr>
+          <p:cNvPr id="5" name="Picture 4"/>
+          <p:cNvPicPr>
+            <a:picLocks noChangeAspect="1"/>
+          </p:cNvPicPr>
+          <p:nvPr/>
+        </p:nvPicPr>
+        <p:blipFill>
+          <a:blip r:embed="rId4" cstate="print">
+            <a:extLst>
+              <a:ext uri="{28A0092B-C50C-407E-A947-70E740481C1C}">
+                <a14:useLocalDpi xmlns:a14="http://schemas.microsoft.com/office/drawing/2010/main" val="0"/>
+              </a:ext>
+            </a:extLst>
+          </a:blip>
+          <a:stretch>
+            <a:fillRect/>
+          </a:stretch>
+        </p:blipFill>
+        <p:spPr>
+          <a:xfrm>
+            <a:off x="3774831" y="1903040"/>
+            <a:ext cx="2657500" cy="1633398"/>
+          </a:xfrm>
+          <a:prstGeom prst="rect">
+            <a:avLst/>
+          </a:prstGeom>
+        </p:spPr>
+      </p:pic>
+      <p:sp>
+        <p:nvSpPr>
+          <p:cNvPr id="7" name="TextBox 6"/>
+          <p:cNvSpPr txBox="1"/>
+          <p:nvPr/>
+        </p:nvSpPr>
+        <p:spPr>
+          <a:xfrm>
+            <a:off x="3860799" y="2197154"/>
+            <a:ext cx="2375877" cy="492443"/>
+          </a:xfrm>
+          <a:prstGeom prst="rect">
+            <a:avLst/>
+          </a:prstGeom>
+          <a:noFill/>
+        </p:spPr>
+        <p:txBody>
+          <a:bodyPr wrap="square" rtlCol="0">
+            <a:spAutoFit/>
+          </a:bodyPr>
+          <a:lstStyle/>
+          <a:p>
+            <a:r>
+              <a:rPr lang="en-US" sz="1300" dirty="0" smtClean="0"/>
+              <a:t>Physics Online Assignment 1</a:t>
+            </a:r>
+          </a:p>
+          <a:p>
+            <a:r>
+              <a:rPr lang="en-US" sz="1300" dirty="0" smtClean="0"/>
+              <a:t>CS2101 Reflection</a:t>
+            </a:r>
+            <a:endParaRPr lang="en-MY" sz="1300" dirty="0"/>
+          </a:p>
+        </p:txBody>
+      </p:sp>
+      <p:sp>
+        <p:nvSpPr>
+          <p:cNvPr id="8" name="Rectangle 7"/>
+          <p:cNvSpPr/>
+          <p:nvPr/>
+        </p:nvSpPr>
+        <p:spPr>
+          <a:xfrm>
+            <a:off x="5955323" y="2289908"/>
+            <a:ext cx="125046" cy="117231"/>
+          </a:xfrm>
+          <a:prstGeom prst="rect">
+            <a:avLst/>
+          </a:prstGeom>
+          <a:noFill/>
+        </p:spPr>
+        <p:style>
+          <a:lnRef idx="2">
+            <a:schemeClr val="dk1">
+              <a:shade val="50000"/>
+            </a:schemeClr>
+          </a:lnRef>
+          <a:fillRef idx="1">
+            <a:schemeClr val="dk1"/>
+          </a:fillRef>
+          <a:effectRef idx="0">
+            <a:schemeClr val="dk1"/>
+          </a:effectRef>
+          <a:fontRef idx="minor">
+            <a:schemeClr val="lt1"/>
+          </a:fontRef>
+        </p:style>
+        <p:txBody>
+          <a:bodyPr rtlCol="0" anchor="ctr"/>
+          <a:lstStyle/>
+          <a:p>
+            <a:pPr algn="ctr"/>
+            <a:endParaRPr lang="en-MY"/>
+          </a:p>
+        </p:txBody>
+      </p:sp>
+      <p:sp>
+        <p:nvSpPr>
+          <p:cNvPr id="9" name="Rectangle 8"/>
+          <p:cNvSpPr/>
+          <p:nvPr/>
+        </p:nvSpPr>
+        <p:spPr>
+          <a:xfrm>
+            <a:off x="5955323" y="2443375"/>
+            <a:ext cx="125046" cy="117231"/>
+          </a:xfrm>
+          <a:prstGeom prst="rect">
+            <a:avLst/>
+          </a:prstGeom>
+          <a:noFill/>
+        </p:spPr>
+        <p:style>
+          <a:lnRef idx="2">
+            <a:schemeClr val="dk1">
+              <a:shade val="50000"/>
+            </a:schemeClr>
+          </a:lnRef>
+          <a:fillRef idx="1">
+            <a:schemeClr val="dk1"/>
+          </a:fillRef>
+          <a:effectRef idx="0">
+            <a:schemeClr val="dk1"/>
+          </a:effectRef>
+          <a:fontRef idx="minor">
+            <a:schemeClr val="lt1"/>
+          </a:fontRef>
+        </p:style>
+        <p:txBody>
+          <a:bodyPr rtlCol="0" anchor="ctr"/>
+          <a:lstStyle/>
+          <a:p>
+            <a:pPr algn="ctr"/>
+            <a:endParaRPr lang="en-MY"/>
+          </a:p>
+        </p:txBody>
+      </p:sp>
+      <p:cxnSp>
+        <p:nvCxnSpPr>
+          <p:cNvPr id="15" name="Straight Connector 14"/>
+          <p:cNvCxnSpPr/>
+          <p:nvPr/>
+        </p:nvCxnSpPr>
+        <p:spPr>
+          <a:xfrm>
+            <a:off x="5955323" y="2289908"/>
+            <a:ext cx="125046" cy="117231"/>
+          </a:xfrm>
+          <a:prstGeom prst="line">
+            <a:avLst/>
+          </a:prstGeom>
+        </p:spPr>
+        <p:style>
+          <a:lnRef idx="1">
+            <a:schemeClr val="dk1"/>
+          </a:lnRef>
+          <a:fillRef idx="0">
+            <a:schemeClr val="dk1"/>
+          </a:fillRef>
+          <a:effectRef idx="0">
+            <a:schemeClr val="dk1"/>
+          </a:effectRef>
+          <a:fontRef idx="minor">
+            <a:schemeClr val="tx1"/>
+          </a:fontRef>
+        </p:style>
+      </p:cxnSp>
+      <p:cxnSp>
+        <p:nvCxnSpPr>
+          <p:cNvPr id="19" name="Straight Connector 18"/>
+          <p:cNvCxnSpPr/>
+          <p:nvPr/>
+        </p:nvCxnSpPr>
+        <p:spPr>
+          <a:xfrm flipH="1">
+            <a:off x="5955324" y="2289908"/>
+            <a:ext cx="125045" cy="117231"/>
+          </a:xfrm>
+          <a:prstGeom prst="line">
+            <a:avLst/>
+          </a:prstGeom>
+        </p:spPr>
+        <p:style>
+          <a:lnRef idx="1">
+            <a:schemeClr val="dk1"/>
+          </a:lnRef>
+          <a:fillRef idx="0">
+            <a:schemeClr val="dk1"/>
+          </a:fillRef>
+          <a:effectRef idx="0">
+            <a:schemeClr val="dk1"/>
+          </a:effectRef>
+          <a:fontRef idx="minor">
+            <a:schemeClr val="tx1"/>
+          </a:fontRef>
+        </p:style>
+      </p:cxnSp>
+      <p:pic>
+        <p:nvPicPr>
+          <p:cNvPr id="26" name="Picture 25"/>
+          <p:cNvPicPr>
+            <a:picLocks noChangeAspect="1"/>
+          </p:cNvPicPr>
+          <p:nvPr/>
+        </p:nvPicPr>
+        <p:blipFill>
+          <a:blip r:embed="rId5" cstate="print">
+            <a:extLst>
+              <a:ext uri="{28A0092B-C50C-407E-A947-70E740481C1C}">
+                <a14:useLocalDpi xmlns:a14="http://schemas.microsoft.com/office/drawing/2010/main" val="0"/>
+              </a:ext>
+            </a:extLst>
+          </a:blip>
+          <a:stretch>
+            <a:fillRect/>
+          </a:stretch>
+        </p:blipFill>
+        <p:spPr>
+          <a:xfrm>
+            <a:off x="2747573" y="1931700"/>
+            <a:ext cx="3602915" cy="3602915"/>
+          </a:xfrm>
+          <a:prstGeom prst="rect">
+            <a:avLst/>
+          </a:prstGeom>
+        </p:spPr>
+      </p:pic>
+    </p:spTree>
+    <p:extLst>
+      <p:ext uri="{BB962C8B-B14F-4D97-AF65-F5344CB8AC3E}">
+        <p14:creationId xmlns:p14="http://schemas.microsoft.com/office/powerpoint/2010/main" val="1986105484"/>
+      </p:ext>
+    </p:extLst>
+  </p:cSld>
+  <p:clrMapOvr>
+    <a:masterClrMapping/>
+  </p:clrMapOvr>
+  <p:timing>
+    <p:tnLst>
+      <p:par>
+        <p:cTn id="1" dur="indefinite" restart="never" nodeType="tmRoot">
+          <p:childTnLst>
+            <p:seq concurrent="1" nextAc="seek">
+              <p:cTn id="2" dur="indefinite" nodeType="mainSeq">
+                <p:childTnLst>
+                  <p:par>
+                    <p:cTn id="3" fill="hold">
+                      <p:stCondLst>
+                        <p:cond delay="indefinite"/>
+                      </p:stCondLst>
+                      <p:childTnLst>
+                        <p:par>
+                          <p:cTn id="4" fill="hold">
+                            <p:stCondLst>
+                              <p:cond delay="0"/>
+                            </p:stCondLst>
+                            <p:childTnLst>
+                              <p:par>
+                                <p:cTn id="5" presetID="2" presetClass="entr" presetSubtype="4" fill="hold" nodeType="clickEffect">
+                                  <p:stCondLst>
+                                    <p:cond delay="0"/>
+                                  </p:stCondLst>
+                                  <p:childTnLst>
+                                    <p:set>
+                                      <p:cBhvr>
+                                        <p:cTn id="6" dur="1" fill="hold">
+                                          <p:stCondLst>
+                                            <p:cond delay="0"/>
+                                          </p:stCondLst>
+                                        </p:cTn>
+                                        <p:tgtEl>
+                                          <p:spTgt spid="5"/>
+                                        </p:tgtEl>
+                                        <p:attrNameLst>
+                                          <p:attrName>style.visibility</p:attrName>
+                                        </p:attrNameLst>
+                                      </p:cBhvr>
+                                      <p:to>
+                                        <p:strVal val="visible"/>
+                                      </p:to>
+                                    </p:set>
+                                    <p:anim calcmode="lin" valueType="num">
+                                      <p:cBhvr additive="base">
+                                        <p:cTn id="7" dur="500" fill="hold"/>
+                                        <p:tgtEl>
+                                          <p:spTgt spid="5"/>
+                                        </p:tgtEl>
+                                        <p:attrNameLst>
+                                          <p:attrName>ppt_x</p:attrName>
+                                        </p:attrNameLst>
+                                      </p:cBhvr>
+                                      <p:tavLst>
+                                        <p:tav tm="0">
+                                          <p:val>
+                                            <p:strVal val="#ppt_x"/>
+                                          </p:val>
+                                        </p:tav>
+                                        <p:tav tm="100000">
+                                          <p:val>
+                                            <p:strVal val="#ppt_x"/>
+                                          </p:val>
+                                        </p:tav>
+                                      </p:tavLst>
+                                    </p:anim>
+                                    <p:anim calcmode="lin" valueType="num">
+                                      <p:cBhvr additive="base">
+                                        <p:cTn id="8" dur="500" fill="hold"/>
+                                        <p:tgtEl>
+                                          <p:spTgt spid="5"/>
+                                        </p:tgtEl>
+                                        <p:attrNameLst>
+                                          <p:attrName>ppt_y</p:attrName>
+                                        </p:attrNameLst>
+                                      </p:cBhvr>
+                                      <p:tavLst>
+                                        <p:tav tm="0">
+                                          <p:val>
+                                            <p:strVal val="1+#ppt_h/2"/>
+                                          </p:val>
+                                        </p:tav>
+                                        <p:tav tm="100000">
+                                          <p:val>
+                                            <p:strVal val="#ppt_y"/>
+                                          </p:val>
+                                        </p:tav>
+                                      </p:tavLst>
+                                    </p:anim>
+                                  </p:childTnLst>
+                                </p:cTn>
+                              </p:par>
+                              <p:par>
+                                <p:cTn id="9" presetID="2" presetClass="entr" presetSubtype="4" fill="hold" nodeType="withEffect">
+                                  <p:stCondLst>
+                                    <p:cond delay="0"/>
+                                  </p:stCondLst>
+                                  <p:childTnLst>
+                                    <p:set>
+                                      <p:cBhvr>
+                                        <p:cTn id="10" dur="1" fill="hold">
+                                          <p:stCondLst>
+                                            <p:cond delay="0"/>
+                                          </p:stCondLst>
+                                        </p:cTn>
+                                        <p:tgtEl>
+                                          <p:spTgt spid="4"/>
+                                        </p:tgtEl>
+                                        <p:attrNameLst>
+                                          <p:attrName>style.visibility</p:attrName>
+                                        </p:attrNameLst>
+                                      </p:cBhvr>
+                                      <p:to>
+                                        <p:strVal val="visible"/>
+                                      </p:to>
+                                    </p:set>
+                                    <p:anim calcmode="lin" valueType="num">
+                                      <p:cBhvr additive="base">
+                                        <p:cTn id="11" dur="500" fill="hold"/>
+                                        <p:tgtEl>
+                                          <p:spTgt spid="4"/>
+                                        </p:tgtEl>
+                                        <p:attrNameLst>
+                                          <p:attrName>ppt_x</p:attrName>
+                                        </p:attrNameLst>
+                                      </p:cBhvr>
+                                      <p:tavLst>
+                                        <p:tav tm="0">
+                                          <p:val>
+                                            <p:strVal val="#ppt_x"/>
+                                          </p:val>
+                                        </p:tav>
+                                        <p:tav tm="100000">
+                                          <p:val>
+                                            <p:strVal val="#ppt_x"/>
+                                          </p:val>
+                                        </p:tav>
+                                      </p:tavLst>
+                                    </p:anim>
+                                    <p:anim calcmode="lin" valueType="num">
+                                      <p:cBhvr additive="base">
+                                        <p:cTn id="12" dur="500" fill="hold"/>
+                                        <p:tgtEl>
+                                          <p:spTgt spid="4"/>
+                                        </p:tgtEl>
+                                        <p:attrNameLst>
+                                          <p:attrName>ppt_y</p:attrName>
+                                        </p:attrNameLst>
+                                      </p:cBhvr>
+                                      <p:tavLst>
+                                        <p:tav tm="0">
+                                          <p:val>
+                                            <p:strVal val="1+#ppt_h/2"/>
+                                          </p:val>
+                                        </p:tav>
+                                        <p:tav tm="100000">
+                                          <p:val>
+                                            <p:strVal val="#ppt_y"/>
+                                          </p:val>
+                                        </p:tav>
+                                      </p:tavLst>
+                                    </p:anim>
+                                  </p:childTnLst>
+                                </p:cTn>
+                              </p:par>
+                            </p:childTnLst>
+                          </p:cTn>
+                        </p:par>
+                      </p:childTnLst>
+                    </p:cTn>
+                  </p:par>
+                  <p:par>
+                    <p:cTn id="13" fill="hold">
+                      <p:stCondLst>
+                        <p:cond delay="indefinite"/>
+                      </p:stCondLst>
+                      <p:childTnLst>
+                        <p:par>
+                          <p:cTn id="14" fill="hold">
+                            <p:stCondLst>
+                              <p:cond delay="0"/>
+                            </p:stCondLst>
+                            <p:childTnLst>
+                              <p:par>
+                                <p:cTn id="15" presetID="42" presetClass="entr" presetSubtype="0" fill="hold" nodeType="clickEffect">
+                                  <p:stCondLst>
+                                    <p:cond delay="0"/>
+                                  </p:stCondLst>
+                                  <p:childTnLst>
+                                    <p:set>
+                                      <p:cBhvr>
+                                        <p:cTn id="16" dur="1" fill="hold">
+                                          <p:stCondLst>
+                                            <p:cond delay="0"/>
+                                          </p:stCondLst>
+                                        </p:cTn>
+                                        <p:tgtEl>
+                                          <p:spTgt spid="15"/>
+                                        </p:tgtEl>
+                                        <p:attrNameLst>
+                                          <p:attrName>style.visibility</p:attrName>
+                                        </p:attrNameLst>
+                                      </p:cBhvr>
+                                      <p:to>
+                                        <p:strVal val="visible"/>
+                                      </p:to>
+                                    </p:set>
+                                    <p:animEffect transition="in" filter="fade">
+                                      <p:cBhvr>
+                                        <p:cTn id="17" dur="1000"/>
+                                        <p:tgtEl>
+                                          <p:spTgt spid="15"/>
+                                        </p:tgtEl>
+                                      </p:cBhvr>
+                                    </p:animEffect>
+                                    <p:anim calcmode="lin" valueType="num">
+                                      <p:cBhvr>
+                                        <p:cTn id="18" dur="1000" fill="hold"/>
+                                        <p:tgtEl>
+                                          <p:spTgt spid="15"/>
+                                        </p:tgtEl>
+                                        <p:attrNameLst>
+                                          <p:attrName>ppt_x</p:attrName>
+                                        </p:attrNameLst>
+                                      </p:cBhvr>
+                                      <p:tavLst>
+                                        <p:tav tm="0">
+                                          <p:val>
+                                            <p:strVal val="#ppt_x"/>
+                                          </p:val>
+                                        </p:tav>
+                                        <p:tav tm="100000">
+                                          <p:val>
+                                            <p:strVal val="#ppt_x"/>
+                                          </p:val>
+                                        </p:tav>
+                                      </p:tavLst>
+                                    </p:anim>
+                                    <p:anim calcmode="lin" valueType="num">
+                                      <p:cBhvr>
+                                        <p:cTn id="19" dur="1000" fill="hold"/>
+                                        <p:tgtEl>
+                                          <p:spTgt spid="15"/>
+                                        </p:tgtEl>
+                                        <p:attrNameLst>
+                                          <p:attrName>ppt_y</p:attrName>
+                                        </p:attrNameLst>
+                                      </p:cBhvr>
+                                      <p:tavLst>
+                                        <p:tav tm="0">
+                                          <p:val>
+                                            <p:strVal val="#ppt_y+.1"/>
+                                          </p:val>
+                                        </p:tav>
+                                        <p:tav tm="100000">
+                                          <p:val>
+                                            <p:strVal val="#ppt_y"/>
+                                          </p:val>
+                                        </p:tav>
+                                      </p:tavLst>
+                                    </p:anim>
+                                  </p:childTnLst>
+                                </p:cTn>
+                              </p:par>
+                              <p:par>
+                                <p:cTn id="20" presetID="42" presetClass="entr" presetSubtype="0" fill="hold" nodeType="withEffect">
+                                  <p:stCondLst>
+                                    <p:cond delay="0"/>
+                                  </p:stCondLst>
+                                  <p:childTnLst>
+                                    <p:set>
+                                      <p:cBhvr>
+                                        <p:cTn id="21" dur="1" fill="hold">
+                                          <p:stCondLst>
+                                            <p:cond delay="0"/>
+                                          </p:stCondLst>
+                                        </p:cTn>
+                                        <p:tgtEl>
+                                          <p:spTgt spid="19"/>
+                                        </p:tgtEl>
+                                        <p:attrNameLst>
+                                          <p:attrName>style.visibility</p:attrName>
+                                        </p:attrNameLst>
+                                      </p:cBhvr>
+                                      <p:to>
+                                        <p:strVal val="visible"/>
+                                      </p:to>
+                                    </p:set>
+                                    <p:animEffect transition="in" filter="fade">
+                                      <p:cBhvr>
+                                        <p:cTn id="22" dur="1000"/>
+                                        <p:tgtEl>
+                                          <p:spTgt spid="19"/>
+                                        </p:tgtEl>
+                                      </p:cBhvr>
+                                    </p:animEffect>
+                                    <p:anim calcmode="lin" valueType="num">
+                                      <p:cBhvr>
+                                        <p:cTn id="23" dur="1000" fill="hold"/>
+                                        <p:tgtEl>
+                                          <p:spTgt spid="19"/>
+                                        </p:tgtEl>
+                                        <p:attrNameLst>
+                                          <p:attrName>ppt_x</p:attrName>
+                                        </p:attrNameLst>
+                                      </p:cBhvr>
+                                      <p:tavLst>
+                                        <p:tav tm="0">
+                                          <p:val>
+                                            <p:strVal val="#ppt_x"/>
+                                          </p:val>
+                                        </p:tav>
+                                        <p:tav tm="100000">
+                                          <p:val>
+                                            <p:strVal val="#ppt_x"/>
+                                          </p:val>
+                                        </p:tav>
+                                      </p:tavLst>
+                                    </p:anim>
+                                    <p:anim calcmode="lin" valueType="num">
+                                      <p:cBhvr>
+                                        <p:cTn id="24" dur="1000" fill="hold"/>
+                                        <p:tgtEl>
+                                          <p:spTgt spid="19"/>
+                                        </p:tgtEl>
+                                        <p:attrNameLst>
+                                          <p:attrName>ppt_y</p:attrName>
+                                        </p:attrNameLst>
+                                      </p:cBhvr>
+                                      <p:tavLst>
+                                        <p:tav tm="0">
+                                          <p:val>
+                                            <p:strVal val="#ppt_y+.1"/>
+                                          </p:val>
+                                        </p:tav>
+                                        <p:tav tm="100000">
+                                          <p:val>
+                                            <p:strVal val="#ppt_y"/>
+                                          </p:val>
+                                        </p:tav>
+                                      </p:tavLst>
+                                    </p:anim>
+                                  </p:childTnLst>
+                                </p:cTn>
+                              </p:par>
+                              <p:par>
+                                <p:cTn id="25" presetID="42" presetClass="entr" presetSubtype="0" fill="hold" grpId="0" nodeType="withEffect">
+                                  <p:stCondLst>
+                                    <p:cond delay="0"/>
+                                  </p:stCondLst>
+                                  <p:childTnLst>
+                                    <p:set>
+                                      <p:cBhvr>
+                                        <p:cTn id="26" dur="1" fill="hold">
+                                          <p:stCondLst>
+                                            <p:cond delay="0"/>
+                                          </p:stCondLst>
+                                        </p:cTn>
+                                        <p:tgtEl>
+                                          <p:spTgt spid="8"/>
+                                        </p:tgtEl>
+                                        <p:attrNameLst>
+                                          <p:attrName>style.visibility</p:attrName>
+                                        </p:attrNameLst>
+                                      </p:cBhvr>
+                                      <p:to>
+                                        <p:strVal val="visible"/>
+                                      </p:to>
+                                    </p:set>
+                                    <p:animEffect transition="in" filter="fade">
+                                      <p:cBhvr>
+                                        <p:cTn id="27" dur="1000"/>
+                                        <p:tgtEl>
+                                          <p:spTgt spid="8"/>
+                                        </p:tgtEl>
+                                      </p:cBhvr>
+                                    </p:animEffect>
+                                    <p:anim calcmode="lin" valueType="num">
+                                      <p:cBhvr>
+                                        <p:cTn id="28" dur="1000" fill="hold"/>
+                                        <p:tgtEl>
+                                          <p:spTgt spid="8"/>
+                                        </p:tgtEl>
+                                        <p:attrNameLst>
+                                          <p:attrName>ppt_x</p:attrName>
+                                        </p:attrNameLst>
+                                      </p:cBhvr>
+                                      <p:tavLst>
+                                        <p:tav tm="0">
+                                          <p:val>
+                                            <p:strVal val="#ppt_x"/>
+                                          </p:val>
+                                        </p:tav>
+                                        <p:tav tm="100000">
+                                          <p:val>
+                                            <p:strVal val="#ppt_x"/>
+                                          </p:val>
+                                        </p:tav>
+                                      </p:tavLst>
+                                    </p:anim>
+                                    <p:anim calcmode="lin" valueType="num">
+                                      <p:cBhvr>
+                                        <p:cTn id="29" dur="1000" fill="hold"/>
+                                        <p:tgtEl>
+                                          <p:spTgt spid="8"/>
+                                        </p:tgtEl>
+                                        <p:attrNameLst>
+                                          <p:attrName>ppt_y</p:attrName>
+                                        </p:attrNameLst>
+                                      </p:cBhvr>
+                                      <p:tavLst>
+                                        <p:tav tm="0">
+                                          <p:val>
+                                            <p:strVal val="#ppt_y+.1"/>
+                                          </p:val>
+                                        </p:tav>
+                                        <p:tav tm="100000">
+                                          <p:val>
+                                            <p:strVal val="#ppt_y"/>
+                                          </p:val>
+                                        </p:tav>
+                                      </p:tavLst>
+                                    </p:anim>
+                                  </p:childTnLst>
+                                </p:cTn>
+                              </p:par>
+                              <p:par>
+                                <p:cTn id="30" presetID="42" presetClass="entr" presetSubtype="0" fill="hold" grpId="0" nodeType="withEffect">
+                                  <p:stCondLst>
+                                    <p:cond delay="0"/>
+                                  </p:stCondLst>
+                                  <p:childTnLst>
+                                    <p:set>
+                                      <p:cBhvr>
+                                        <p:cTn id="31" dur="1" fill="hold">
+                                          <p:stCondLst>
+                                            <p:cond delay="0"/>
+                                          </p:stCondLst>
+                                        </p:cTn>
+                                        <p:tgtEl>
+                                          <p:spTgt spid="9"/>
+                                        </p:tgtEl>
+                                        <p:attrNameLst>
+                                          <p:attrName>style.visibility</p:attrName>
+                                        </p:attrNameLst>
+                                      </p:cBhvr>
+                                      <p:to>
+                                        <p:strVal val="visible"/>
+                                      </p:to>
+                                    </p:set>
+                                    <p:animEffect transition="in" filter="fade">
+                                      <p:cBhvr>
+                                        <p:cTn id="32" dur="1000"/>
+                                        <p:tgtEl>
+                                          <p:spTgt spid="9"/>
+                                        </p:tgtEl>
+                                      </p:cBhvr>
+                                    </p:animEffect>
+                                    <p:anim calcmode="lin" valueType="num">
+                                      <p:cBhvr>
+                                        <p:cTn id="33" dur="1000" fill="hold"/>
+                                        <p:tgtEl>
+                                          <p:spTgt spid="9"/>
+                                        </p:tgtEl>
+                                        <p:attrNameLst>
+                                          <p:attrName>ppt_x</p:attrName>
+                                        </p:attrNameLst>
+                                      </p:cBhvr>
+                                      <p:tavLst>
+                                        <p:tav tm="0">
+                                          <p:val>
+                                            <p:strVal val="#ppt_x"/>
+                                          </p:val>
+                                        </p:tav>
+                                        <p:tav tm="100000">
+                                          <p:val>
+                                            <p:strVal val="#ppt_x"/>
+                                          </p:val>
+                                        </p:tav>
+                                      </p:tavLst>
+                                    </p:anim>
+                                    <p:anim calcmode="lin" valueType="num">
+                                      <p:cBhvr>
+                                        <p:cTn id="34" dur="1000" fill="hold"/>
+                                        <p:tgtEl>
+                                          <p:spTgt spid="9"/>
+                                        </p:tgtEl>
+                                        <p:attrNameLst>
+                                          <p:attrName>ppt_y</p:attrName>
+                                        </p:attrNameLst>
+                                      </p:cBhvr>
+                                      <p:tavLst>
+                                        <p:tav tm="0">
+                                          <p:val>
+                                            <p:strVal val="#ppt_y+.1"/>
+                                          </p:val>
+                                        </p:tav>
+                                        <p:tav tm="100000">
+                                          <p:val>
+                                            <p:strVal val="#ppt_y"/>
+                                          </p:val>
+                                        </p:tav>
+                                      </p:tavLst>
+                                    </p:anim>
+                                  </p:childTnLst>
+                                </p:cTn>
+                              </p:par>
+                              <p:par>
+                                <p:cTn id="35" presetID="42" presetClass="entr" presetSubtype="0" fill="hold" grpId="0" nodeType="withEffect">
+                                  <p:stCondLst>
+                                    <p:cond delay="0"/>
+                                  </p:stCondLst>
+                                  <p:childTnLst>
+                                    <p:set>
+                                      <p:cBhvr>
+                                        <p:cTn id="36" dur="1" fill="hold">
+                                          <p:stCondLst>
+                                            <p:cond delay="0"/>
+                                          </p:stCondLst>
+                                        </p:cTn>
+                                        <p:tgtEl>
+                                          <p:spTgt spid="7"/>
+                                        </p:tgtEl>
+                                        <p:attrNameLst>
+                                          <p:attrName>style.visibility</p:attrName>
+                                        </p:attrNameLst>
+                                      </p:cBhvr>
+                                      <p:to>
+                                        <p:strVal val="visible"/>
+                                      </p:to>
+                                    </p:set>
+                                    <p:animEffect transition="in" filter="fade">
+                                      <p:cBhvr>
+                                        <p:cTn id="37" dur="1000"/>
+                                        <p:tgtEl>
+                                          <p:spTgt spid="7"/>
+                                        </p:tgtEl>
+                                      </p:cBhvr>
+                                    </p:animEffect>
+                                    <p:anim calcmode="lin" valueType="num">
+                                      <p:cBhvr>
+                                        <p:cTn id="38" dur="1000" fill="hold"/>
+                                        <p:tgtEl>
+                                          <p:spTgt spid="7"/>
+                                        </p:tgtEl>
+                                        <p:attrNameLst>
+                                          <p:attrName>ppt_x</p:attrName>
+                                        </p:attrNameLst>
+                                      </p:cBhvr>
+                                      <p:tavLst>
+                                        <p:tav tm="0">
+                                          <p:val>
+                                            <p:strVal val="#ppt_x"/>
+                                          </p:val>
+                                        </p:tav>
+                                        <p:tav tm="100000">
+                                          <p:val>
+                                            <p:strVal val="#ppt_x"/>
+                                          </p:val>
+                                        </p:tav>
+                                      </p:tavLst>
+                                    </p:anim>
+                                    <p:anim calcmode="lin" valueType="num">
+                                      <p:cBhvr>
+                                        <p:cTn id="39" dur="1000" fill="hold"/>
+                                        <p:tgtEl>
+                                          <p:spTgt spid="7"/>
+                                        </p:tgtEl>
+                                        <p:attrNameLst>
+                                          <p:attrName>ppt_y</p:attrName>
+                                        </p:attrNameLst>
+                                      </p:cBhvr>
+                                      <p:tavLst>
+                                        <p:tav tm="0">
+                                          <p:val>
+                                            <p:strVal val="#ppt_y+.1"/>
+                                          </p:val>
+                                        </p:tav>
+                                        <p:tav tm="100000">
+                                          <p:val>
+                                            <p:strVal val="#ppt_y"/>
+                                          </p:val>
+                                        </p:tav>
+                                      </p:tavLst>
+                                    </p:anim>
+                                  </p:childTnLst>
+                                </p:cTn>
+                              </p:par>
+                              <p:par>
+                                <p:cTn id="40" presetID="42" presetClass="entr" presetSubtype="0" fill="hold" nodeType="withEffect">
+                                  <p:stCondLst>
+                                    <p:cond delay="0"/>
+                                  </p:stCondLst>
+                                  <p:childTnLst>
+                                    <p:set>
+                                      <p:cBhvr>
+                                        <p:cTn id="41" dur="1" fill="hold">
+                                          <p:stCondLst>
+                                            <p:cond delay="0"/>
+                                          </p:stCondLst>
+                                        </p:cTn>
+                                        <p:tgtEl>
+                                          <p:spTgt spid="21"/>
+                                        </p:tgtEl>
+                                        <p:attrNameLst>
+                                          <p:attrName>style.visibility</p:attrName>
+                                        </p:attrNameLst>
+                                      </p:cBhvr>
+                                      <p:to>
+                                        <p:strVal val="visible"/>
+                                      </p:to>
+                                    </p:set>
+                                    <p:animEffect transition="in" filter="fade">
+                                      <p:cBhvr>
+                                        <p:cTn id="42" dur="1000"/>
+                                        <p:tgtEl>
+                                          <p:spTgt spid="21"/>
+                                        </p:tgtEl>
+                                      </p:cBhvr>
+                                    </p:animEffect>
+                                    <p:anim calcmode="lin" valueType="num">
+                                      <p:cBhvr>
+                                        <p:cTn id="43" dur="1000" fill="hold"/>
+                                        <p:tgtEl>
+                                          <p:spTgt spid="21"/>
+                                        </p:tgtEl>
+                                        <p:attrNameLst>
+                                          <p:attrName>ppt_x</p:attrName>
+                                        </p:attrNameLst>
+                                      </p:cBhvr>
+                                      <p:tavLst>
+                                        <p:tav tm="0">
+                                          <p:val>
+                                            <p:strVal val="#ppt_x"/>
+                                          </p:val>
+                                        </p:tav>
+                                        <p:tav tm="100000">
+                                          <p:val>
+                                            <p:strVal val="#ppt_x"/>
+                                          </p:val>
+                                        </p:tav>
+                                      </p:tavLst>
+                                    </p:anim>
+                                    <p:anim calcmode="lin" valueType="num">
+                                      <p:cBhvr>
+                                        <p:cTn id="44" dur="1000" fill="hold"/>
+                                        <p:tgtEl>
+                                          <p:spTgt spid="21"/>
+                                        </p:tgtEl>
+                                        <p:attrNameLst>
+                                          <p:attrName>ppt_y</p:attrName>
+                                        </p:attrNameLst>
+                                      </p:cBhvr>
+                                      <p:tavLst>
+                                        <p:tav tm="0">
+                                          <p:val>
+                                            <p:strVal val="#ppt_y+.1"/>
+                                          </p:val>
+                                        </p:tav>
+                                        <p:tav tm="100000">
+                                          <p:val>
+                                            <p:strVal val="#ppt_y"/>
+                                          </p:val>
+                                        </p:tav>
+                                      </p:tavLst>
+                                    </p:anim>
+                                  </p:childTnLst>
+                                </p:cTn>
+                              </p:par>
+                            </p:childTnLst>
+                          </p:cTn>
+                        </p:par>
+                      </p:childTnLst>
+                    </p:cTn>
+                  </p:par>
+                  <p:par>
+                    <p:cTn id="45" fill="hold">
+                      <p:stCondLst>
+                        <p:cond delay="indefinite"/>
+                      </p:stCondLst>
+                      <p:childTnLst>
+                        <p:par>
+                          <p:cTn id="46" fill="hold">
+                            <p:stCondLst>
+                              <p:cond delay="0"/>
+                            </p:stCondLst>
+                            <p:childTnLst>
+                              <p:par>
+                                <p:cTn id="47" presetID="1" presetClass="entr" presetSubtype="0" fill="hold" nodeType="clickEffect">
+                                  <p:stCondLst>
+                                    <p:cond delay="0"/>
+                                  </p:stCondLst>
+                                  <p:childTnLst>
+                                    <p:set>
+                                      <p:cBhvr>
+                                        <p:cTn id="48" dur="1" fill="hold">
+                                          <p:stCondLst>
+                                            <p:cond delay="0"/>
+                                          </p:stCondLst>
+                                        </p:cTn>
+                                        <p:tgtEl>
+                                          <p:spTgt spid="26"/>
+                                        </p:tgtEl>
+                                        <p:attrNameLst>
+                                          <p:attrName>style.visibility</p:attrName>
+                                        </p:attrNameLst>
+                                      </p:cBhvr>
+                                      <p:to>
+                                        <p:strVal val="visible"/>
+                                      </p:to>
+                                    </p:set>
+                                  </p:childTnLst>
+                                </p:cTn>
+                              </p:par>
+                            </p:childTnLst>
+                          </p:cTn>
+                        </p:par>
+                      </p:childTnLst>
+                    </p:cTn>
+                  </p:par>
+                </p:childTnLst>
+              </p:cTn>
+              <p:prevCondLst>
+                <p:cond evt="onPrev" delay="0">
+                  <p:tgtEl>
+                    <p:sldTgt/>
+                  </p:tgtEl>
+                </p:cond>
+              </p:prevCondLst>
+              <p:nextCondLst>
+                <p:cond evt="onNext" delay="0">
+                  <p:tgtEl>
+                    <p:sldTgt/>
+                  </p:tgtEl>
+                </p:cond>
+              </p:nextCondLst>
+            </p:seq>
+          </p:childTnLst>
+        </p:cTn>
+      </p:par>
+    </p:tnLst>
+    <p:bldLst>
+      <p:bldP spid="7" grpId="0"/>
+      <p:bldP spid="8" grpId="0" animBg="1"/>
+      <p:bldP spid="9" grpId="0" animBg="1"/>
+    </p:bldLst>
+  </p:timing>
+</p:sld>
+</file>
+
 <file path=ppt/slides/slide3.xml><?xml version="1.0" encoding="utf-8"?>
 <p:sld xmlns:a="http://schemas.openxmlformats.org/drawingml/2006/main" xmlns:r="http://schemas.openxmlformats.org/officeDocument/2006/relationships" xmlns:p="http://schemas.openxmlformats.org/presentationml/2006/main">
   <p:cSld>

</xml_diff>

<commit_message>
Added UI on slide 23
</commit_message>
<xml_diff>
--- a/Task Catalyst Introduction.pptx
+++ b/Task Catalyst Introduction.pptx
@@ -8912,14 +8912,14 @@
       </p:grpSpPr>
       <p:sp>
         <p:nvSpPr>
-          <p:cNvPr id="4" name="TextBox 3"/>
+          <p:cNvPr id="5" name="TextBox 4"/>
           <p:cNvSpPr txBox="1"/>
           <p:nvPr/>
         </p:nvSpPr>
         <p:spPr>
           <a:xfrm>
-            <a:off x="3359584" y="2637065"/>
-            <a:ext cx="2355453" cy="369332"/>
+            <a:off x="1273629" y="4620986"/>
+            <a:ext cx="6527364" cy="1569660"/>
           </a:xfrm>
           <a:prstGeom prst="rect">
             <a:avLst/>
@@ -8933,36 +8933,6 @@
           <a:lstStyle/>
           <a:p>
             <a:r>
-              <a:rPr lang="en-US" dirty="0" smtClean="0"/>
-              <a:t>Picture of UI over here</a:t>
-            </a:r>
-            <a:endParaRPr lang="en-US" dirty="0"/>
-          </a:p>
-        </p:txBody>
-      </p:sp>
-      <p:sp>
-        <p:nvSpPr>
-          <p:cNvPr id="5" name="TextBox 4"/>
-          <p:cNvSpPr txBox="1"/>
-          <p:nvPr/>
-        </p:nvSpPr>
-        <p:spPr>
-          <a:xfrm>
-            <a:off x="1273629" y="4620986"/>
-            <a:ext cx="6527364" cy="1569660"/>
-          </a:xfrm>
-          <a:prstGeom prst="rect">
-            <a:avLst/>
-          </a:prstGeom>
-          <a:noFill/>
-        </p:spPr>
-        <p:txBody>
-          <a:bodyPr wrap="none" rtlCol="0">
-            <a:spAutoFit/>
-          </a:bodyPr>
-          <a:lstStyle/>
-          <a:p>
-            <a:r>
               <a:rPr lang="en-US" sz="9600" dirty="0" smtClean="0"/>
               <a:t>Task Catalyst</a:t>
             </a:r>
@@ -8970,6 +8940,29 @@
           </a:p>
         </p:txBody>
       </p:sp>
+      <p:pic>
+        <p:nvPicPr>
+          <p:cNvPr id="6" name="Picture 5"/>
+          <p:cNvPicPr>
+            <a:picLocks noChangeAspect="1"/>
+          </p:cNvPicPr>
+          <p:nvPr/>
+        </p:nvPicPr>
+        <p:blipFill rotWithShape="1">
+          <a:blip r:embed="rId2"/>
+          <a:srcRect l="22584" t="21485" r="22511" b="21289"/>
+          <a:stretch/>
+        </p:blipFill>
+        <p:spPr>
+          <a:xfrm>
+            <a:off x="965436" y="628646"/>
+            <a:ext cx="7143750" cy="4186239"/>
+          </a:xfrm>
+          <a:prstGeom prst="rect">
+            <a:avLst/>
+          </a:prstGeom>
+        </p:spPr>
+      </p:pic>
     </p:spTree>
     <p:extLst>
       <p:ext uri="{BB962C8B-B14F-4D97-AF65-F5344CB8AC3E}">

</xml_diff>